<commit_message>
Add Pode web server
</commit_message>
<xml_diff>
--- a/docs/Presentation.pptx
+++ b/docs/Presentation.pptx
@@ -31,8 +31,8 @@
           <a:schemeClr val="tx1"/>
         </a:solidFill>
         <a:effectLst/>
-        <a:latin typeface="Calibri" pitchFamily="2" charset="0"/>
-        <a:ea typeface="SimSun" pitchFamily="0" charset="0"/>
+        <a:latin typeface="Calibri" pitchFamily="1" charset="0"/>
+        <a:ea typeface="SimSun" pitchFamily="1" charset="0"/>
         <a:cs typeface="Times New Roman" pitchFamily="1" charset="0"/>
       </a:defRPr>
     </a:lvl1pPr>
@@ -53,8 +53,8 @@
           <a:schemeClr val="tx1"/>
         </a:solidFill>
         <a:effectLst/>
-        <a:latin typeface="Calibri" pitchFamily="2" charset="0"/>
-        <a:ea typeface="SimSun" pitchFamily="0" charset="0"/>
+        <a:latin typeface="Calibri" pitchFamily="1" charset="0"/>
+        <a:ea typeface="SimSun" pitchFamily="1" charset="0"/>
         <a:cs typeface="Times New Roman" pitchFamily="1" charset="0"/>
       </a:defRPr>
     </a:lvl2pPr>
@@ -75,8 +75,8 @@
           <a:schemeClr val="tx1"/>
         </a:solidFill>
         <a:effectLst/>
-        <a:latin typeface="Calibri" pitchFamily="2" charset="0"/>
-        <a:ea typeface="SimSun" pitchFamily="0" charset="0"/>
+        <a:latin typeface="Calibri" pitchFamily="1" charset="0"/>
+        <a:ea typeface="SimSun" pitchFamily="1" charset="0"/>
         <a:cs typeface="Times New Roman" pitchFamily="1" charset="0"/>
       </a:defRPr>
     </a:lvl3pPr>
@@ -97,8 +97,8 @@
           <a:schemeClr val="tx1"/>
         </a:solidFill>
         <a:effectLst/>
-        <a:latin typeface="Calibri" pitchFamily="2" charset="0"/>
-        <a:ea typeface="SimSun" pitchFamily="0" charset="0"/>
+        <a:latin typeface="Calibri" pitchFamily="1" charset="0"/>
+        <a:ea typeface="SimSun" pitchFamily="1" charset="0"/>
         <a:cs typeface="Times New Roman" pitchFamily="1" charset="0"/>
       </a:defRPr>
     </a:lvl4pPr>
@@ -119,8 +119,8 @@
           <a:schemeClr val="tx1"/>
         </a:solidFill>
         <a:effectLst/>
-        <a:latin typeface="Calibri" pitchFamily="2" charset="0"/>
-        <a:ea typeface="SimSun" pitchFamily="0" charset="0"/>
+        <a:latin typeface="Calibri" pitchFamily="1" charset="0"/>
+        <a:ea typeface="SimSun" pitchFamily="1" charset="0"/>
         <a:cs typeface="Times New Roman" pitchFamily="1" charset="0"/>
       </a:defRPr>
     </a:lvl5pPr>
@@ -141,8 +141,8 @@
           <a:schemeClr val="tx1"/>
         </a:solidFill>
         <a:effectLst/>
-        <a:latin typeface="Calibri" pitchFamily="2" charset="0"/>
-        <a:ea typeface="SimSun" pitchFamily="0" charset="0"/>
+        <a:latin typeface="Calibri" pitchFamily="1" charset="0"/>
+        <a:ea typeface="SimSun" pitchFamily="1" charset="0"/>
         <a:cs typeface="Times New Roman" pitchFamily="1" charset="0"/>
       </a:defRPr>
     </a:lvl6pPr>
@@ -163,8 +163,8 @@
           <a:schemeClr val="tx1"/>
         </a:solidFill>
         <a:effectLst/>
-        <a:latin typeface="Calibri" pitchFamily="2" charset="0"/>
-        <a:ea typeface="SimSun" pitchFamily="0" charset="0"/>
+        <a:latin typeface="Calibri" pitchFamily="1" charset="0"/>
+        <a:ea typeface="SimSun" pitchFamily="1" charset="0"/>
         <a:cs typeface="Times New Roman" pitchFamily="1" charset="0"/>
       </a:defRPr>
     </a:lvl7pPr>
@@ -185,8 +185,8 @@
           <a:schemeClr val="tx1"/>
         </a:solidFill>
         <a:effectLst/>
-        <a:latin typeface="Calibri" pitchFamily="2" charset="0"/>
-        <a:ea typeface="SimSun" pitchFamily="0" charset="0"/>
+        <a:latin typeface="Calibri" pitchFamily="1" charset="0"/>
+        <a:ea typeface="SimSun" pitchFamily="1" charset="0"/>
         <a:cs typeface="Times New Roman" pitchFamily="1" charset="0"/>
       </a:defRPr>
     </a:lvl8pPr>
@@ -207,8 +207,8 @@
           <a:schemeClr val="tx1"/>
         </a:solidFill>
         <a:effectLst/>
-        <a:latin typeface="Calibri" pitchFamily="2" charset="0"/>
-        <a:ea typeface="SimSun" pitchFamily="0" charset="0"/>
+        <a:latin typeface="Calibri" pitchFamily="1" charset="0"/>
+        <a:ea typeface="SimSun" pitchFamily="1" charset="0"/>
         <a:cs typeface="Times New Roman" pitchFamily="1" charset="0"/>
       </a:defRPr>
     </a:lvl9pPr>
@@ -240,7 +240,7 @@
             <a:spLocks noGrp="1" noChangeArrowheads="1"/>
             <a:extLst>
               <a:ext uri="smNativeData">
-                <pr:smNativeData xmlns:pr="smNativeData" xmlns="smNativeData" val="SMDATA_15_k0e5YxMAAAAlAAAAZAAAAA8BAAAAkAAAAEgAAACQAAAASAAAAAAAAAABAAAAAAAAAAEAAABQAAAAAAAAAAAA4D8AAAAAAADgPwAAAAAAAOA/AAAAAAAA4D8AAAAAAADgPwAAAAAAAOA/AAAAAAAA4D8AAAAAAADgPwAAAAAAAOA/AAAAAAAA4D8CAAAAjAAAAAAAAAAAAAAAM2bMDANPhAgAAAAAAAAAAAAAAAAAAAAAAAAAAAAAAAAAAAAAZAAAAAEAAABAAAAAAAAAAAAAAAAAAAAAAAAAAAAAAAAAAAAAAAAAAAAAAAAAAAAAAAAAAAAAAAAAAAAAAAAAAAAAAAAAAAAAAAAAAAAAAAAAAAAAAAAAAAAAAAAAAAAAFAAAADwAAAAAAAAAAAAAAP///wkUAAAAAQAAABQAAAAUAAAAFAAAAAEAAAAAAAAAZAAAAGQAAAAAAAAAZAAAAGQAAAAVAAAAYAAAAAAAAAAAAAAADwAAACADAAAAAAAAAAAAAAEAAACgMgAAVgcAAKr4//8BAAAAf39/AAEAAABkAAAAAAAAABQAAABAHwAAAAAAACYAAAAAAAAAwOD//wAAAAAmAAAAZAAAABYAAABMAAAAAAAAAAAAAAAEAAAAAAAAAAEAAABXiZEKAAAAACgAAAAoAAAAZAAAAGQAAAAAAAAAzMzMAAAAAABQAAAAUAAAAGQAAABkAAAAAAAAABcAAAAUAAAAAAAAAAAAAAD/fwAA/38AAAAAAAAJAAAABAAAAAAAAAAeAAAAaAAAAAAAAAAAAAAAAAAAAAAAAAAAAAAAECcAABAnAAAAAAAAAAAAAAAAAAAAAAAAAAAAAAAAAAAAAAAAAAAAABQAAAAAAAAAwMD/AAAAAABkAAAAMgAAAAAAAABkAAAAAAAAAH9/fwAKAAAAIgAAABgAAAAAAAAAAAAAAAAAAAAAAAAAAAAAAAAAAAAkAAAAJAAAAAAAAAAHAAAAAAAAAAAAAAAAAAAAAAAAAAAAAAAAAAAAf39/ACUAAABYAAAAAAAAAAAAAAAAAAAAAAAAAAAAAAAAAAAAAAAAAAAAAAAAAAAAAAAAAAAAAAA/AAAAAAAAAKCGAQAAAAAAAAAAAAAAAAAMAAAAAQAAAAAAAAAAAAAAAAAAAB8AAABUAAAAAAAABQAAAAEAAAAAAAAAAAAAAAAAAAAAAAAAAAAAAAAAAAAAAAAAAAAAAAJ/f38AAAAAA8zMzADAwP8Af39/AAAAAAAAAAAAAAAAAAAAAAAAAAAAIQAAABgAAAAUAAAAoAUAABoNAABgRQAAJhYAABAAAAAmAAAACAAAAAEAAAAAAAAA"/>
+                <pr:smNativeData xmlns:pr="smNativeData" xmlns="smNativeData" val="SMDATA_15_bXy5YxMAAAAlAAAAZAAAAA8BAAAAkAAAAEgAAACQAAAASAAAAAAAAAABAAAAAAAAAAEAAABQAAAAAAAAAAAA4D8AAAAAAADgPwAAAAAAAOA/AAAAAAAA4D8AAAAAAADgPwAAAAAAAOA/AAAAAAAA4D8AAAAAAADgPwAAAAAAAOA/AAAAAAAA4D8CAAAAjAAAAAAAAAAAAAAAM2bMDANPhAgAAAAAAAAAAAAAAAAAAAAAAAAAAAAAAAAAAAAAZAAAAAEAAABAAAAAAAAAAAAAAAAAAAAAAAAAAAAAAAAAAAAAAAAAAAAAAAAAAAAAAAAAAAAAAAAAAAAAAAAAAAAAAAAAAAAAAAAAAAAAAAAAAAAAAAAAAAAAAAAAAAAAFAAAADwAAAAAAAAAAAAAAP///wkUAAAAAQAAABQAAAAUAAAAFAAAAAEAAAAAAAAAZAAAAGQAAAAAAAAAZAAAAGQAAAAVAAAAYAAAAAAAAAAAAAAADwAAACADAAAAAAAAAAAAAAEAAACgMgAAVgcAAKr4//8BAAAAf39/AAEAAABkAAAAAAAAABQAAABAHwAAAAAAACYAAAAAAAAAwOD//wAAAAAmAAAAZAAAABYAAABMAAAAAAAAAAAAAAAEAAAAAAAAAAEAAABXiZEKAAAAACgAAAAoAAAAZAAAAGQAAAAAAAAAzMzMAAAAAABQAAAAUAAAAGQAAABkAAAAAAAAABcAAAAUAAAAAAAAAAAAAAD/fwAA/38AAAAAAAAJAAAABAAAAAAAAAAeAAAAaAAAAAAAAAAAAAAAAAAAAAAAAAAAAAAAECcAABAnAAAAAAAAAAAAAAAAAAAAAAAAAAAAAAAAAAAAAAAAAAAAABQAAAAAAAAAwMD/AAAAAABkAAAAMgAAAAAAAABkAAAAAAAAAH9/fwAKAAAAIgAAABgAAAAAAAAAAAAAAAAAAAAAAAAAAAAAAAAAAAAkAAAAJAAAAAAAAAAHAAAAAAAAAAAAAAAAAAAAAAAAAAAAAAAAAAAAf39/ACUAAABYAAAAAAAAAAAAAAAAAAAAAAAAAAAAAAAAAAAAAAAAAAAAAAAAAAAAAAAAAAAAAAA/AAAAAAAAAKCGAQAAAAAAAAAAAAAAAAAMAAAAAQAAAAAAAAAAAAAAAAAAAB8AAABUAAAAAAAABQAAAAEAAAAAAAAAAAAAAAAAAAAAAAAAAAAAAAAAAAAAAAAAAAAAAAJ/f38AAAAAA8zMzADAwP8Af39/AAAAAAAAAAAAAAAAAAAAAAAAAAAAIQAAABgAAAAUAAAAoAUAABoNAABgRQAAJhYAABAAAAAmAAAACAAAAAEAAAAAAAAA"/>
               </a:ext>
             </a:extLst>
           </p:cNvSpPr>
@@ -272,7 +272,7 @@
             <a:spLocks noGrp="1" noChangeArrowheads="1"/>
             <a:extLst>
               <a:ext uri="smNativeData">
-                <pr:smNativeData xmlns:pr="smNativeData" xmlns="smNativeData" val="SMDATA_15_k0e5YxMAAAAlAAAAZAAAAA8BAAAAkAAAAEgAAACQAAAASAAAAAAAAAAAAAAAAAAAAAEAAABQAAAAAAAAAAAA4D8AAAAAAADgPwAAAAAAAOA/AAAAAAAA4D8AAAAAAADgPwAAAAAAAOA/AAAAAAAA4D8AAAAAAADgPwAAAAAAAOA/AAAAAAAA4D8CAAAAjAAAAAAAAAAAAAAAM2bMDANPhAgAAAAAAAAAAAAAAAAAAAAAAAAAAAAAAAAAAAAAZAAAAAEAAABAAAAAAAAAAAAAAAAAAAAAAAAAAAAAAAAAAAAAAAAAAAAAAAAAAAAAAAAAAAAAAAAAAAAAAAAAAAAAAAAAAAAAAAAAAAAAAAAAAAAAAAAAAAAAAAAAAAAAFAAAADwAAAAAAAAAAAAAAP///wkUAAAAAQAAABQAAAAUAAAAFAAAAAEAAAAAAAAAZAAAAGQAAAAAAAAAZAAAAGQAAAAVAAAAYAAAAAAAAAAAAAAADwAAACADAAAAAAAAAAAAAAEAAACgMgAAVgcAAKr4//8BAAAAf39/AAEAAABkAAAAAAAAABQAAABAHwAAAAAAACYAAAAAAAAAwOD//wAAAAAmAAAAZAAAABYAAABMAAAAAAAAAAAAAAAEAAAAAAAAAAEAAABXiZEKAAAAACgAAAAoAAAAZAAAAGQAAAAAAAAAzMzMAAAAAABQAAAAUAAAAGQAAABkAAAAAAAAABcAAAAUAAAAAAAAAAAAAAD/fwAA/38AAAAAAAAJAAAABAAAAAAAAAAeAAAAaAAAAAAAAAAAAAAAAAAAAAAAAAAAAAAAECcAABAnAAAAAAAAAAAAAAAAAAAAAAAAAAAAAAAAAAAAAAAAAAAAABQAAAAAAAAAwMD/AAAAAABkAAAAMgAAAAAAAABkAAAAAAAAAH9/fwAKAAAAIgAAABgAAAAAAAAAAAAAAAAAAAAAAAAAAAAAAAAAAAAkAAAAJAAAAAAAAAAHAAAAAAAAAAAAAAAAAAAAAAAAAAAAAAAAAAAAf39/ACUAAABYAAAAAAAAAAAAAAAAAAAAAAAAAAAAAAAAAAAAAAAAAAAAAAAAAAAAAAAAAAAAAAA/AAAAAAAAAKCGAQAAAAAAAAAAAAAAAAAMAAAAAQAAAAAAAAAAAAAAAAAAAB8AAABUAAAAAAAABQAAAAEAAAAAAAAAAAAAAAAAAAAAAAAAAAAAAAAAAAAAAAAAAAAAAAJ/f38AAAAAA8zMzADAwP8Af39/AAAAAAAAAAAAAAAAAAAAAAAAAAAAIQAAABgAAAAUAAAAQAsAAOgXAADAPwAAsCIAABAAAAAmAAAACAAAAAGAAAAAAAAA"/>
+                <pr:smNativeData xmlns:pr="smNativeData" xmlns="smNativeData" val="SMDATA_15_bXy5YxMAAAAlAAAAZAAAAA8BAAAAkAAAAEgAAACQAAAASAAAAAAAAAAAAAAAAAAAAAEAAABQAAAAAAAAAAAA4D8AAAAAAADgPwAAAAAAAOA/AAAAAAAA4D8AAAAAAADgPwAAAAAAAOA/AAAAAAAA4D8AAAAAAADgPwAAAAAAAOA/AAAAAAAA4D8CAAAAjAAAAAAAAAAAAAAAM2bMDANPhAgAAAAAAAAAAAAAAAAAAAAAAAAAAAAAAAAAAAAAZAAAAAEAAABAAAAAAAAAAAAAAAAAAAAAAAAAAAAAAAAAAAAAAAAAAAAAAAAAAAAAAAAAAAAAAAAAAAAAAAAAAAAAAAAAAAAAAAAAAAAAAAAAAAAAAAAAAAAAAAAAAAAAFAAAADwAAAAAAAAAAAAAAP///wkUAAAAAQAAABQAAAAUAAAAFAAAAAEAAAAAAAAAZAAAAGQAAAAAAAAAZAAAAGQAAAAVAAAAYAAAAAAAAAAAAAAADwAAACADAAAAAAAAAAAAAAEAAACgMgAAVgcAAKr4//8BAAAAf39/AAEAAABkAAAAAAAAABQAAABAHwAAAAAAACYAAAAAAAAAwOD//wAAAAAmAAAAZAAAABYAAABMAAAAAAAAAAAAAAAEAAAAAAAAAAEAAABXiZEKAAAAACgAAAAoAAAAZAAAAGQAAAAAAAAAzMzMAAAAAABQAAAAUAAAAGQAAABkAAAAAAAAABcAAAAUAAAAAAAAAAAAAAD/fwAA/38AAAAAAAAJAAAABAAAAAAAAAAeAAAAaAAAAAAAAAAAAAAAAAAAAAAAAAAAAAAAECcAABAnAAAAAAAAAAAAAAAAAAAAAAAAAAAAAAAAAAAAAAAAAAAAABQAAAAAAAAAwMD/AAAAAABkAAAAMgAAAAAAAABkAAAAAAAAAH9/fwAKAAAAIgAAABgAAAAAAAAAAAAAAAAAAAAAAAAAAAAAAAAAAAAkAAAAJAAAAAAAAAAHAAAAAAAAAAAAAAAAAAAAAAAAAAAAAAAAAAAAf39/ACUAAABYAAAAAAAAAAAAAAAAAAAAAAAAAAAAAAAAAAAAAAAAAAAAAAAAAAAAAAAAAAAAAAA/AAAAAAAAAKCGAQAAAAAAAAAAAAAAAAAMAAAAAQAAAAAAAAAAAAAAAAAAAB8AAABUAAAAAAAABQAAAAEAAAAAAAAAAAAAAAAAAAAAAAAAAAAAAAAAAAAAAAAAAAAAAAJ/f38AAAAAA8zMzADAwP8Af39/AAAAAAAAAAAAAAAAAAAAAAAAAAAAIQAAABgAAAAUAAAAQAsAAOgXAADAPwAAsCIAABAAAAAmAAAACAAAAAGAAAAAAAAA"/>
               </a:ext>
             </a:extLst>
           </p:cNvSpPr>
@@ -332,7 +332,7 @@
             <a:spLocks noGrp="1" noChangeArrowheads="1"/>
             <a:extLst>
               <a:ext uri="smNativeData">
-                <pr:smNativeData xmlns:pr="smNativeData" xmlns="smNativeData" val="SMDATA_15_k0e5YxMAAAAlAAAAZAAAAA8BAAAAkAAAAEgAAACQAAAASAAAAAAAAAABAAAAAAAAAAEAAABQAAAAAAAAAAAA4D8AAAAAAADgPwAAAAAAAOA/AAAAAAAA4D8AAAAAAADgPwAAAAAAAOA/AAAAAAAA4D8AAAAAAADgPwAAAAAAAOA/AAAAAAAA4D8CAAAAjAAAAAAAAAAAAAAAM2bMDANPhAgAAAAAAAAAAAAAAAAAAAAAAAAAAAAAAAAAAAAAZAAAAAEAAABAAAAAAAAAAAAAAAAAAAAAAAAAAAAAAAAAAAAAAAAAAAAAAAAAAAAAAAAAAAAAAAAAAAAAAAAAAAAAAAAAAAAAAAAAAAAAAAAAAAAAAAAAAAAAAAAAAAAAFAAAADwAAAAAAAAAAAAAAP///wkUAAAAAQAAABQAAAAUAAAAFAAAAAEAAAAAAAAAZAAAAGQAAAAAAAAAZAAAAGQAAAAVAAAAYAAAAAAAAAAAAAAADwAAACADAAAAAAAAAAAAAAEAAACgMgAAVgcAAKr4//8BAAAAf39/AAEAAABkAAAAAAAAABQAAABAHwAAAAAAACYAAAAAAAAAwOD//wAAAAAmAAAAZAAAABYAAABMAAAAAAAAAAAAAAAEAAAAAAAAAAEAAABXiZEKAAAAACgAAAAoAAAAZAAAAGQAAAAAAAAAzMzMAAAAAABQAAAAUAAAAGQAAABkAAAAAAAAABcAAAAUAAAAAAAAAAAAAAD/fwAA/38AAAAAAAAJAAAABAAAAAAAAAAeAAAAaAAAAAAAAAAAAAAAAAAAAAAAAAAAAAAAECcAABAnAAAAAAAAAAAAAAAAAAAAAAAAAAAAAAAAAAAAAAAAAAAAABQAAAAAAAAAwMD/AAAAAABkAAAAMgAAAAAAAABkAAAAAAAAAH9/fwAKAAAAIgAAABgAAAAAAAAAAAAAAAAAAAAAAAAAAAAAAAAAAAAkAAAAJAAAAAAAAAAHAAAAAAAAAAAAAAAAAAAAAAAAAAAAAAAAAAAAf39/ACUAAABYAAAAAAAAAAAAAAAAAAAAAAAAAAAAAAAAAAAAAAAAAAAAAAAAAAAAAAAAAAAAAAA/AAAAAAAAAKCGAQAAAAAAAAAAAAAAAAAMAAAAAQAAAAAAAAAAAAAAAAAAAB8AAABUAAAAAAAABQAAAAEAAAAAAAAAAAAAAAAAAAAAAAAAAAAAAAAAAAAAAAAAAAAAAAJ/f38AAAAAA8zMzADAwP8Af39/AAAAAAAAAAAAAAAAAAAAAAAAAAAAIQAAABgAAAAUAAAAwAMAABsnAAA/FQAAWSkAABAAAAAmAAAACAAAAAAAAAAAAAAA"/>
+                <pr:smNativeData xmlns:pr="smNativeData" xmlns="smNativeData" val="SMDATA_15_bXy5YxMAAAAlAAAAZAAAAA8BAAAAkAAAAEgAAACQAAAASAAAAAAAAAABAAAAAAAAAAEAAABQAAAAAAAAAAAA4D8AAAAAAADgPwAAAAAAAOA/AAAAAAAA4D8AAAAAAADgPwAAAAAAAOA/AAAAAAAA4D8AAAAAAADgPwAAAAAAAOA/AAAAAAAA4D8CAAAAjAAAAAAAAAAAAAAAM2bMDANPhAgAAAAAAAAAAAAAAAAAAAAAAAAAAAAAAAAAAAAAZAAAAAEAAABAAAAAAAAAAAAAAAAAAAAAAAAAAAAAAAAAAAAAAAAAAAAAAAAAAAAAAAAAAAAAAAAAAAAAAAAAAAAAAAAAAAAAAAAAAAAAAAAAAAAAAAAAAAAAAAAAAAAAFAAAADwAAAAAAAAAAAAAAP///wkUAAAAAQAAABQAAAAUAAAAFAAAAAEAAAAAAAAAZAAAAGQAAAAAAAAAZAAAAGQAAAAVAAAAYAAAAAAAAAAAAAAADwAAACADAAAAAAAAAAAAAAEAAACgMgAAVgcAAKr4//8BAAAAf39/AAEAAABkAAAAAAAAABQAAABAHwAAAAAAACYAAAAAAAAAwOD//wAAAAAmAAAAZAAAABYAAABMAAAAAAAAAAAAAAAEAAAAAAAAAAEAAABXiZEKAAAAACgAAAAoAAAAZAAAAGQAAAAAAAAAzMzMAAAAAABQAAAAUAAAAGQAAABkAAAAAAAAABcAAAAUAAAAAAAAAAAAAAD/fwAA/38AAAAAAAAJAAAABAAAAAAAAAAeAAAAaAAAAAAAAAAAAAAAAAAAAAAAAAAAAAAAECcAABAnAAAAAAAAAAAAAAAAAAAAAAAAAAAAAAAAAAAAAAAAAAAAABQAAAAAAAAAwMD/AAAAAABkAAAAMgAAAAAAAABkAAAAAAAAAH9/fwAKAAAAIgAAABgAAAAAAAAAAAAAAAAAAAAAAAAAAAAAAAAAAAAkAAAAJAAAAAAAAAAHAAAAAAAAAAAAAAAAAAAAAAAAAAAAAAAAAAAAf39/ACUAAABYAAAAAAAAAAAAAAAAAAAAAAAAAAAAAAAAAAAAAAAAAAAAAAAAAAAAAAAAAAAAAAA/AAAAAAAAAKCGAQAAAAAAAAAAAAAAAAAMAAAAAQAAAAAAAAAAAAAAAAAAAB8AAABUAAAAAAAABQAAAAEAAAAAAAAAAAAAAAAAAAAAAAAAAAAAAAAAAAAAAAAAAAAAAAJ/f38AAAAAA8zMzADAwP8Af39/AAAAAAAAAAAAAAAAAAAAAAAAAAAAIQAAABgAAAAUAAAAwAMAABsnAAA/FQAAWSkAABAAAAAmAAAACAAAAAAAAAAAAAAA"/>
               </a:ext>
             </a:extLst>
           </p:cNvSpPr>
@@ -346,7 +346,7 @@
           <a:lstStyle/>
           <a:p>
             <a:pPr/>
-            <a:fld id="{2C5F8495-DBC1-0A72-8FE7-2D27CAA97978}" type="datetime1">
+            <a:fld id="{2091F126-68CD-C407-8329-9E52BF6775CB}" type="datetime1">
               <a:t/>
             </a:fld>
           </a:p>
@@ -359,7 +359,7 @@
             <a:spLocks noGrp="1" noChangeArrowheads="1"/>
             <a:extLst>
               <a:ext uri="smNativeData">
-                <pr:smNativeData xmlns:pr="smNativeData" xmlns="smNativeData" val="SMDATA_15_k0e5YxMAAAAlAAAAZAAAAA8BAAAAkAAAAEgAAACQAAAASAAAAAAAAAABAAAAAAAAAAEAAABQAAAAAAAAAAAA4D8AAAAAAADgPwAAAAAAAOA/AAAAAAAA4D8AAAAAAADgPwAAAAAAAOA/AAAAAAAA4D8AAAAAAADgPwAAAAAAAOA/AAAAAAAA4D8CAAAAjAAAAAAAAAAAAAAAM2bMDANPhAgAAAAAAAAAAAAAAAAAAAAAAAAAAAAAAAAAAAAAZAAAAAEAAABAAAAAAAAAAAAAAAAAAAAAAAAAAAAAAAAAAAAAAAAAAAAAAAAAAAAAAAAAAAAAAAAAAAAAAAAAAAAAAAAAAAAAAAAAAAAAAAAAAAAAAAAAAAAAAAAAAAAAFAAAADwAAAAAAAAAAAAAAP///wkUAAAAAQAAABQAAAAUAAAAFAAAAAEAAAAAAAAAZAAAAGQAAAAAAAAAZAAAAGQAAAAVAAAAYAAAAAAAAAAAAAAADwAAACADAAAAAAAAAAAAAAEAAACgMgAAVgcAAKr4//8BAAAAf39/AAEAAABkAAAAAAAAABQAAABAHwAAAAAAACYAAAAAAAAAwOD//wAAAAAmAAAAZAAAABYAAABMAAAAAAAAAAAAAAAEAAAAAAAAAAEAAABXiZEKAAAAACgAAAAoAAAAZAAAAGQAAAAAAAAAzMzMAAAAAABQAAAAUAAAAGQAAABkAAAAAAAAABcAAAAUAAAAAAAAAAAAAAD/fwAA/38AAAAAAAAJAAAABAAAAAAAAAAeAAAAaAAAAAAAAAAAAAAAAAAAAAAAAAAAAAAAECcAABAnAAAAAAAAAAAAAAAAAAAAAAAAAAAAAAAAAAAAAAAAAAAAABQAAAAAAAAAwMD/AAAAAABkAAAAMgAAAAAAAABkAAAAAAAAAH9/fwAKAAAAIgAAABgAAAAAAAAAAAAAAAAAAAAAAAAAAAAAAAAAAAAkAAAAJAAAAAAAAAAHAAAAAAAAAAAAAAAAAAAAAAAAAAAAAAAAAAAAf39/ACUAAABYAAAAAAAAAAAAAAAAAAAAAAAAAAAAAAAAAAAAAAAAAAAAAAAAAAAAAAAAAAAAAAA/AAAAAAAAAKCGAQAAAAAAAAAAAAAAAAAMAAAAAQAAAAAAAAAAAAAAAAAAAB8AAABUAAAAAAAABQAAAAEAAAAAAAAAAAAAAAAAAAAAAAAAAAAAAAAAAAAAAAAAAAAAAAJ/f38AAAAAA8zMzADAwP8Af39/AAAAAAAAAAAAAAAAAAAAAAAAAAAAIQAAABgAAAAUAAAAoRkAABsnAABfMQAAWSkAABAAAAAmAAAACAAAAAAAAAAAAAAA"/>
+                <pr:smNativeData xmlns:pr="smNativeData" xmlns="smNativeData" val="SMDATA_15_bXy5YxMAAAAlAAAAZAAAAA8BAAAAkAAAAEgAAACQAAAASAAAAAAAAAABAAAAAAAAAAEAAABQAAAAAAAAAAAA4D8AAAAAAADgPwAAAAAAAOA/AAAAAAAA4D8AAAAAAADgPwAAAAAAAOA/AAAAAAAA4D8AAAAAAADgPwAAAAAAAOA/AAAAAAAA4D8CAAAAjAAAAAAAAAAAAAAAM2bMDANPhAgAAAAAAAAAAAAAAAAAAAAAAAAAAAAAAAAAAAAAZAAAAAEAAABAAAAAAAAAAAAAAAAAAAAAAAAAAAAAAAAAAAAAAAAAAAAAAAAAAAAAAAAAAAAAAAAAAAAAAAAAAAAAAAAAAAAAAAAAAAAAAAAAAAAAAAAAAAAAAAAAAAAAFAAAADwAAAAAAAAAAAAAAP///wkUAAAAAQAAABQAAAAUAAAAFAAAAAEAAAAAAAAAZAAAAGQAAAAAAAAAZAAAAGQAAAAVAAAAYAAAAAAAAAAAAAAADwAAACADAAAAAAAAAAAAAAEAAACgMgAAVgcAAKr4//8BAAAAf39/AAEAAABkAAAAAAAAABQAAABAHwAAAAAAACYAAAAAAAAAwOD//wAAAAAmAAAAZAAAABYAAABMAAAAAAAAAAAAAAAEAAAAAAAAAAEAAABXiZEKAAAAACgAAAAoAAAAZAAAAGQAAAAAAAAAzMzMAAAAAABQAAAAUAAAAGQAAABkAAAAAAAAABcAAAAUAAAAAAAAAAAAAAD/fwAA/38AAAAAAAAJAAAABAAAAAAAAAAeAAAAaAAAAAAAAAAAAAAAAAAAAAAAAAAAAAAAECcAABAnAAAAAAAAAAAAAAAAAAAAAAAAAAAAAAAAAAAAAAAAAAAAABQAAAAAAAAAwMD/AAAAAABkAAAAMgAAAAAAAABkAAAAAAAAAH9/fwAKAAAAIgAAABgAAAAAAAAAAAAAAAAAAAAAAAAAAAAAAAAAAAAkAAAAJAAAAAAAAAAHAAAAAAAAAAAAAAAAAAAAAAAAAAAAAAAAAAAAf39/ACUAAABYAAAAAAAAAAAAAAAAAAAAAAAAAAAAAAAAAAAAAAAAAAAAAAAAAAAAAAAAAAAAAAA/AAAAAAAAAKCGAQAAAAAAAAAAAAAAAAAMAAAAAQAAAAAAAAAAAAAAAAAAAB8AAABUAAAAAAAABQAAAAEAAAAAAAAAAAAAAAAAAAAAAAAAAAAAAAAAAAAAAAAAAAAAAAJ/f38AAAAAA8zMzADAwP8Af39/AAAAAAAAAAAAAAAAAAAAAAAAAAAAIQAAABgAAAAUAAAAoRkAABsnAABfMQAAWSkAABAAAAAmAAAACAAAAAAAAAAAAAAA"/>
               </a:ext>
             </a:extLst>
           </p:cNvSpPr>
@@ -383,7 +383,7 @@
             <a:spLocks noGrp="1" noChangeArrowheads="1"/>
             <a:extLst>
               <a:ext uri="smNativeData">
-                <pr:smNativeData xmlns:pr="smNativeData" xmlns="smNativeData" val="SMDATA_15_k0e5YxMAAAAlAAAAZAAAAA8BAAAAkAAAAEgAAACQAAAASAAAAAAAAAABAAAAAAAAAAEAAABQAAAAAAAAAAAA4D8AAAAAAADgPwAAAAAAAOA/AAAAAAAA4D8AAAAAAADgPwAAAAAAAOA/AAAAAAAA4D8AAAAAAADgPwAAAAAAAOA/AAAAAAAA4D8CAAAAjAAAAAAAAAAAAAAAM2bMDANPhAgAAAAAAAAAAAAAAAAAAAAAAAAAAAAAAAAAAAAAZAAAAAEAAABAAAAAAAAAAAAAAAAAAAAAAAAAAAAAAAAAAAAAAAAAAAAAAAAAAAAAAAAAAAAAAAAAAAAAAAAAAAAAAAAAAAAAAAAAAAAAAAAAAAAAAAAAAAAAAAAAAAAAFAAAADwAAAAAAAAAAAAAAP///wkUAAAAAQAAABQAAAAUAAAAFAAAAAEAAAAAAAAAZAAAAGQAAAAAAAAAZAAAAGQAAAAVAAAAYAAAAAAAAAAAAAAADwAAACADAAAAAAAAAAAAAAEAAACgMgAAVgcAAKr4//8BAAAAf39/AAEAAABkAAAAAAAAABQAAABAHwAAAAAAACYAAAAAAAAAwOD//wAAAAAmAAAAZAAAABYAAABMAAAAAAAAAAAAAAAEAAAAAAAAAAEAAABXiZEKAAAAACgAAAAoAAAAZAAAAGQAAAAAAAAAzMzMAAAAAABQAAAAUAAAAGQAAABkAAAAAAAAABcAAAAUAAAAAAAAAAAAAAD/fwAA/38AAAAAAAAJAAAABAAAAHsAfAAeAAAAaAAAAAAAAAAAAAAAAAAAAAAAAAAAAAAAECcAABAnAAAAAAAAAAAAAAAAAAAAAAAAAAAAAAAAAAAAAAAAAAAAABQAAAAAAAAAwMD/AAAAAABkAAAAMgAAAAAAAABkAAAAAAAAAH9/fwAKAAAAIgAAABgAAAAAAAAAAAAAAAAAAAAAAAAAAAAAAAAAAAAkAAAAJAAAAAAAAAAHAAAAAAAAAAAAAAAAAAAAAAAAAAAAAAAAAAAAf39/ACUAAABYAAAAAAAAAAAAAAAAAAAAAAAAAAAAAAAAAAAAAAAAAAAAAAAAAAAAAAAAAAAAAAA/AAAAAAAAAKCGAQAAAAAAAAAAAAAAAAAMAAAAAQAAAAAAAAAAAAAAAAAAAB8AAABUAAAAAAAABQAAAAEAAAAAAAAAAAAAAAAAAAAAAAAAAAAAAAAAAAAAAAAAAAAAAAJ/f38AAAAAA8zMzADAwP8Af39/AAAAAAAAAAAAAAAAAAAAAAAAAAAAIQAAABgAAAAUAAAAwTUAABsnAABARwAAWSkAABAAAAAmAAAACAAAAAAAAAAAAAAA"/>
+                <pr:smNativeData xmlns:pr="smNativeData" xmlns="smNativeData" val="SMDATA_15_bXy5YxMAAAAlAAAAZAAAAA8BAAAAkAAAAEgAAACQAAAASAAAAAAAAAABAAAAAAAAAAEAAABQAAAAAAAAAAAA4D8AAAAAAADgPwAAAAAAAOA/AAAAAAAA4D8AAAAAAADgPwAAAAAAAOA/AAAAAAAA4D8AAAAAAADgPwAAAAAAAOA/AAAAAAAA4D8CAAAAjAAAAAAAAAAAAAAAM2bMDANPhAgAAAAAAAAAAAAAAAAAAAAAAAAAAAAAAAAAAAAAZAAAAAEAAABAAAAAAAAAAAAAAAAAAAAAAAAAAAAAAAAAAAAAAAAAAAAAAAAAAAAAAAAAAAAAAAAAAAAAAAAAAAAAAAAAAAAAAAAAAAAAAAAAAAAAAAAAAAAAAAAAAAAAFAAAADwAAAAAAAAAAAAAAP///wkUAAAAAQAAABQAAAAUAAAAFAAAAAEAAAAAAAAAZAAAAGQAAAAAAAAAZAAAAGQAAAAVAAAAYAAAAAAAAAAAAAAADwAAACADAAAAAAAAAAAAAAEAAACgMgAAVgcAAKr4//8BAAAAf39/AAEAAABkAAAAAAAAABQAAABAHwAAAAAAACYAAAAAAAAAwOD//wAAAAAmAAAAZAAAABYAAABMAAAAAAAAAAAAAAAEAAAAAAAAAAEAAABXiZEKAAAAACgAAAAoAAAAZAAAAGQAAAAAAAAAzMzMAAAAAABQAAAAUAAAAGQAAABkAAAAAAAAABcAAAAUAAAAAAAAAAAAAAD/fwAA/38AAAAAAAAJAAAABAAAAHsAfAAeAAAAaAAAAAAAAAAAAAAAAAAAAAAAAAAAAAAAECcAABAnAAAAAAAAAAAAAAAAAAAAAAAAAAAAAAAAAAAAAAAAAAAAABQAAAAAAAAAwMD/AAAAAABkAAAAMgAAAAAAAABkAAAAAAAAAH9/fwAKAAAAIgAAABgAAAAAAAAAAAAAAAAAAAAAAAAAAAAAAAAAAAAkAAAAJAAAAAAAAAAHAAAAAAAAAAAAAAAAAAAAAAAAAAAAAAAAAAAAf39/ACUAAABYAAAAAAAAAAAAAAAAAAAAAAAAAAAAAAAAAAAAAAAAAAAAAAAAAAAAAAAAAAAAAAA/AAAAAAAAAKCGAQAAAAAAAAAAAAAAAAAMAAAAAQAAAAAAAAAAAAAAAAAAAB8AAABUAAAAAAAABQAAAAEAAAAAAAAAAAAAAAAAAAAAAAAAAAAAAAAAAAAAAAAAAAAAAAJ/f38AAAAAA8zMzADAwP8Af39/AAAAAAAAAAAAAAAAAAAAAAAAAAAAIQAAABgAAAAUAAAAwTUAABsnAABARwAAWSkAABAAAAAmAAAACAAAAAAAAAAAAAAA"/>
               </a:ext>
             </a:extLst>
           </p:cNvSpPr>
@@ -397,7 +397,7 @@
           <a:lstStyle/>
           <a:p>
             <a:pPr/>
-            <a:fld id="{2C5FA0C9-87C1-0A56-8FE7-7103EEA97924}" type="slidenum">
+            <a:fld id="{45CE9901-4FA8-9B6F-E676-B93AD73810EC}" type="slidenum">
               <a:t/>
             </a:fld>
           </a:p>
@@ -436,7 +436,7 @@
             <a:spLocks noGrp="1" noChangeArrowheads="1"/>
             <a:extLst>
               <a:ext uri="smNativeData">
-                <pr:smNativeData xmlns:pr="smNativeData" xmlns="smNativeData" val="SMDATA_15_k0e5YxMAAAAlAAAAZAAAAA8BAAAAkAAAAEgAAACQAAAASAAAAAAAAAABAAAAAAAAAAEAAABQAAAAAAAAAAAA4D8AAAAAAADgPwAAAAAAAOA/AAAAAAAA4D8AAAAAAADgPwAAAAAAAOA/AAAAAAAA4D8AAAAAAADgPwAAAAAAAOA/AAAAAAAA4D8CAAAAjAAAAAAAAAAAAAAAM2bMDANPhAgAAAAAAAAAAAAAAAAAAAAAAAAAAAAAAAAAAAAAZAAAAAEAAABAAAAAAAAAAAAAAAAAAAAAAAAAAAAAAAAAAAAAAAAAAAAAAAAAAAAAAAAAAAAAAAAAAAAAAAAAAAAAAAAAAAAAAAAAAAAAAAAAAAAAAAAAAAAAAAAAAAAAFAAAADwAAAAAAAAAAAAAAP///wkUAAAAAQAAABQAAAAUAAAAFAAAAAEAAAAAAAAAZAAAAGQAAAAAAAAAZAAAAGQAAAAVAAAAYAAAAAAAAAAAAAAADwAAACADAAAAAAAAAAAAAAEAAACgMgAAVgcAAKr4//8BAAAAf39/AAEAAABkAAAAAAAAABQAAABAHwAAAAAAACYAAAAAAAAAwOD//wAAAAAmAAAAZAAAABYAAABMAAAAAAAAAAAAAAAEAAAAAAAAAAEAAABXiZEKAAAAACgAAAAoAAAAZAAAAGQAAAAAAAAAzMzMAAAAAABQAAAAUAAAAGQAAABkAAAAAAAAABcAAAAUAAAAAAAAAAAAAAD/fwAA/38AAAAAAAAJAAAABAAAAG49IjEeAAAAaAAAAAAAAAAAAAAAAAAAAAAAAAAAAAAAECcAABAnAAAAAAAAAAAAAAAAAAAAAAAAAAAAAAAAAAAAAAAAAAAAABQAAAAAAAAAwMD/AAAAAABkAAAAMgAAAAAAAABkAAAAAAAAAH9/fwAKAAAAIgAAABgAAAAAAAAAAAAAAAAAAAAAAAAAAAAAAAAAAAAkAAAAJAAAAAAAAAAHAAAAAAAAAAAAAAAAAAAAAAAAAAAAAAAAAAAAf39/ACUAAABYAAAAAAAAAAAAAAAAAAAAAAAAAAAAAAAAAAAAAAAAAAAAAAAAAAAAAAAAAAAAAAA/AAAAAAAAAKCGAQAAAAAAAAAAAAAAAAAMAAAAAQAAAAAAAAAAAAAAAAAAAB8AAABUAAAAAAAABQAAAAEAAAAAAAAAAAAAAAAAAAAAAAAAAAAAAAAAAAAAAAAAAAAAAAJ/f38AAAAAA8zMzADAwP8Af39/AAAAAAAAAAAAAAAAAAAAAAAAAAAAIQAAABgAAAAUAAAAwAMAALABAABARwAAuAgAABAAAAAmAAAACAAAAAAAAAAAAAAA"/>
+                <pr:smNativeData xmlns:pr="smNativeData" xmlns="smNativeData" val="SMDATA_15_bXy5YxMAAAAlAAAAZAAAAA8BAAAAkAAAAEgAAACQAAAASAAAAAAAAAABAAAAAAAAAAEAAABQAAAAAAAAAAAA4D8AAAAAAADgPwAAAAAAAOA/AAAAAAAA4D8AAAAAAADgPwAAAAAAAOA/AAAAAAAA4D8AAAAAAADgPwAAAAAAAOA/AAAAAAAA4D8CAAAAjAAAAAAAAAAAAAAAM2bMDANPhAgAAAAAAAAAAAAAAAAAAAAAAAAAAAAAAAAAAAAAZAAAAAEAAABAAAAAAAAAAAAAAAAAAAAAAAAAAAAAAAAAAAAAAAAAAAAAAAAAAAAAAAAAAAAAAAAAAAAAAAAAAAAAAAAAAAAAAAAAAAAAAAAAAAAAAAAAAAAAAAAAAAAAFAAAADwAAAAAAAAAAAAAAP///wkUAAAAAQAAABQAAAAUAAAAFAAAAAEAAAAAAAAAZAAAAGQAAAAAAAAAZAAAAGQAAAAVAAAAYAAAAAAAAAAAAAAADwAAACADAAAAAAAAAAAAAAEAAACgMgAAVgcAAKr4//8BAAAAf39/AAEAAABkAAAAAAAAABQAAABAHwAAAAAAACYAAAAAAAAAwOD//wAAAAAmAAAAZAAAABYAAABMAAAAAAAAAAAAAAAEAAAAAAAAAAEAAABXiZEKAAAAACgAAAAoAAAAZAAAAGQAAAAAAAAAzMzMAAAAAABQAAAAUAAAAGQAAABkAAAAAAAAABcAAAAUAAAAAAAAAAAAAAD/fwAA/38AAAAAAAAJAAAABAAAAG49IjEeAAAAaAAAAAAAAAAAAAAAAAAAAAAAAAAAAAAAECcAABAnAAAAAAAAAAAAAAAAAAAAAAAAAAAAAAAAAAAAAAAAAAAAABQAAAAAAAAAwMD/AAAAAABkAAAAMgAAAAAAAABkAAAAAAAAAH9/fwAKAAAAIgAAABgAAAAAAAAAAAAAAAAAAAAAAAAAAAAAAAAAAAAkAAAAJAAAAAAAAAAHAAAAAAAAAAAAAAAAAAAAAAAAAAAAAAAAAAAAf39/ACUAAABYAAAAAAAAAAAAAAAAAAAAAAAAAAAAAAAAAAAAAAAAAAAAAAAAAAAAAAAAAAAAAAA/AAAAAAAAAKCGAQAAAAAAAAAAAAAAAAAMAAAAAQAAAAAAAAAAAAAAAAAAAB8AAABUAAAAAAAABQAAAAEAAAAAAAAAAAAAAAAAAAAAAAAAAAAAAAAAAAAAAAAAAAAAAAJ/f38AAAAAA8zMzADAwP8Af39/AAAAAAAAAAAAAAAAAAAAAAAAAAAAIQAAABgAAAAUAAAAwAMAALABAABARwAAuAgAABAAAAAmAAAACAAAAAAAAAAAAAAA"/>
               </a:ext>
             </a:extLst>
           </p:cNvSpPr>
@@ -463,7 +463,7 @@
             <a:spLocks noGrp="1" noChangeArrowheads="1"/>
             <a:extLst>
               <a:ext uri="smNativeData">
-                <pr:smNativeData xmlns:pr="smNativeData" xmlns="smNativeData" val="SMDATA_15_k0e5YxMAAAAlAAAAZAAAAA8BAAAAkAAAAEgAAACQAAAASAAAAAAAAAAAAAAAAQAAAAEAAABQAAAAAAAAAAAA4D8AAAAAAADgPwAAAAAAAOA/AAAAAAAA4D8AAAAAAADgPwAAAAAAAOA/AAAAAAAA4D8AAAAAAADgPwAAAAAAAOA/AAAAAAAA4D8CAAAAjAAAAAAAAAAAAAAAM2bMDANPhAgAAAAAAAAAAAAAAAAAAAAAAAAAAAAAAAAAAAAAZAAAAAEAAABAAAAAAAAAAAAAAAAAAAAAAAAAAAAAAAAAAAAAAAAAAAAAAAAAAAAAAAAAAAAAAAAAAAAAAAAAAAAAAAAAAAAAAAAAAAAAAAAAAAAAAAAAAAAAAAAAAAAAFAAAADwAAAAAAAAAAAAAAP///wkUAAAAAQAAABQAAAAUAAAAFAAAAAEAAAAAAAAAZAAAAGQAAAAAAAAAZAAAAGQAAAAVAAAAYAAAAAAAAAAAAAAADwAAACADAAAAAAAAAAAAAAEAAACgMgAAVgcAAKr4//8BAAAAf39/AAEAAABkAAAAAAAAABQAAABAHwAAAAAAACYAAAAAAAAAwOD//wAAAAAmAAAAZAAAABYAAABMAAAAAAAAAAAAAAAEAAAAAAAAAAEAAABXiZEKAAAAACgAAAAoAAAAZAAAAGQAAAAAAAAAzMzMAAAAAABQAAAAUAAAAGQAAABkAAAAAAAAABcAAAAUAAAAAAAAAAAAAAD/fwAA/38AAAAAAAAJAAAABAAAAAAAAAAeAAAAaAAAAAAAAAAAAAAAAAAAAAAAAAAAAAAAECcAABAnAAAAAAAAAAAAAAAAAAAAAAAAAAAAAAAAAAAAAAAAAAAAABQAAAAAAAAAwMD/AAAAAABkAAAAMgAAAAAAAABkAAAAAAAAAH9/fwAKAAAAIgAAABgAAAAAAAAAAAAAAAAAAAAAAAAAAAAAAAAAAAAkAAAAJAAAAAAAAAAHAAAAAAAAAAAAAAAAAAAAAAAAAAAAAAAAAAAAf39/ACUAAABYAAAAAAAAAAAAAAAAAAAAAAAAAAAAAAAAAAAAAAAAAAAAAAAAAAAAAAAAAAAAAAA/AAAAAAAAAKCGAQAAAAAAAAAAAAAAAAAMAAAAAQAAAAAAAAAAAAAAAAAAAB8AAABUAAAAAAAABQAAAAEAAAAAAAAAAAAAAAAAAAAAAAAAAAAAAAAAAAAAAAAAAAAAAAJ/f38AAAAAA8zMzADAwP8Af39/AAAAAAAAAAAAAAAAAAAAAAAAAAAAIQAAABgAAAAUAAAAwAMAANgJAABARwAAsCUAABAAAAAmAAAACAAAAAIAAAAAAAAA"/>
+                <pr:smNativeData xmlns:pr="smNativeData" xmlns="smNativeData" val="SMDATA_15_bXy5YxMAAAAlAAAAZAAAAA8BAAAAkAAAAEgAAACQAAAASAAAAAAAAAAAAAAAAQAAAAEAAABQAAAAAAAAAAAA4D8AAAAAAADgPwAAAAAAAOA/AAAAAAAA4D8AAAAAAADgPwAAAAAAAOA/AAAAAAAA4D8AAAAAAADgPwAAAAAAAOA/AAAAAAAA4D8CAAAAjAAAAAAAAAAAAAAAM2bMDANPhAgAAAAAAAAAAAAAAAAAAAAAAAAAAAAAAAAAAAAAZAAAAAEAAABAAAAAAAAAAAAAAAAAAAAAAAAAAAAAAAAAAAAAAAAAAAAAAAAAAAAAAAAAAAAAAAAAAAAAAAAAAAAAAAAAAAAAAAAAAAAAAAAAAAAAAAAAAAAAAAAAAAAAFAAAADwAAAAAAAAAAAAAAP///wkUAAAAAQAAABQAAAAUAAAAFAAAAAEAAAAAAAAAZAAAAGQAAAAAAAAAZAAAAGQAAAAVAAAAYAAAAAAAAAAAAAAADwAAACADAAAAAAAAAAAAAAEAAACgMgAAVgcAAKr4//8BAAAAf39/AAEAAABkAAAAAAAAABQAAABAHwAAAAAAACYAAAAAAAAAwOD//wAAAAAmAAAAZAAAABYAAABMAAAAAAAAAAAAAAAEAAAAAAAAAAEAAABXiZEKAAAAACgAAAAoAAAAZAAAAGQAAAAAAAAAzMzMAAAAAABQAAAAUAAAAGQAAABkAAAAAAAAABcAAAAUAAAAAAAAAAAAAAD/fwAA/38AAAAAAAAJAAAABAAAAAAAAAAeAAAAaAAAAAAAAAAAAAAAAAAAAAAAAAAAAAAAECcAABAnAAAAAAAAAAAAAAAAAAAAAAAAAAAAAAAAAAAAAAAAAAAAABQAAAAAAAAAwMD/AAAAAABkAAAAMgAAAAAAAABkAAAAAAAAAH9/fwAKAAAAIgAAABgAAAAAAAAAAAAAAAAAAAAAAAAAAAAAAAAAAAAkAAAAJAAAAAAAAAAHAAAAAAAAAAAAAAAAAAAAAAAAAAAAAAAAAAAAf39/ACUAAABYAAAAAAAAAAAAAAAAAAAAAAAAAAAAAAAAAAAAAAAAAAAAAAAAAAAAAAAAAAAAAAA/AAAAAAAAAKCGAQAAAAAAAAAAAAAAAAAMAAAAAQAAAAAAAAAAAAAAAAAAAB8AAABUAAAAAAAABQAAAAEAAAAAAAAAAAAAAAAAAAAAAAAAAAAAAAAAAAAAAAAAAAAAAAJ/f38AAAAAA8zMzADAwP8Af39/AAAAAAAAAAAAAAAAAAAAAAAAAAAAIQAAABgAAAAUAAAAwAMAANgJAABARwAAsCUAABAAAAAmAAAACAAAAAIAAAAAAAAA"/>
               </a:ext>
             </a:extLst>
           </p:cNvSpPr>
@@ -518,7 +518,7 @@
             <a:spLocks noGrp="1" noChangeArrowheads="1"/>
             <a:extLst>
               <a:ext uri="smNativeData">
-                <pr:smNativeData xmlns:pr="smNativeData" xmlns="smNativeData" val="SMDATA_15_k0e5YxMAAAAlAAAAZAAAAA8BAAAAkAAAAEgAAACQAAAASAAAAAAAAAABAAAAAAAAAAEAAABQAAAAAAAAAAAA4D8AAAAAAADgPwAAAAAAAOA/AAAAAAAA4D8AAAAAAADgPwAAAAAAAOA/AAAAAAAA4D8AAAAAAADgPwAAAAAAAOA/AAAAAAAA4D8CAAAAjAAAAAAAAAAAAAAAM2bMDANPhAgAAAAAAAAAAAAAAAAAAAAAAAAAAAAAAAAAAAAAZAAAAAEAAABAAAAAAAAAAAAAAAAAAAAAAAAAAAAAAAAAAAAAAAAAAAAAAAAAAAAAAAAAAAAAAAAAAAAAAAAAAAAAAAAAAAAAAAAAAAAAAAAAAAAAAAAAAAAAAAAAAAAAFAAAADwAAAAAAAAAAAAAAP///wkUAAAAAQAAABQAAAAUAAAAFAAAAAEAAAAAAAAAZAAAAGQAAAAAAAAAZAAAAGQAAAAVAAAAYAAAAAAAAAAAAAAADwAAACADAAAAAAAAAAAAAAEAAACgMgAAVgcAAKr4//8BAAAAf39/AAEAAABkAAAAAAAAABQAAABAHwAAAAAAACYAAAAAAAAAwOD//wAAAAAmAAAAZAAAABYAAABMAAAAAAAAAAAAAAAEAAAAAAAAAAEAAABXiZEKAAAAACgAAAAoAAAAZAAAAGQAAAAAAAAAzMzMAAAAAABQAAAAUAAAAGQAAABkAAAAAAAAABcAAAAUAAAAAAAAAAAAAAD/fwAA/38AAAAAAAAJAAAABAAAAAAAAAAeAAAAaAAAAAAAAAAAAAAAAAAAAAAAAAAAAAAAECcAABAnAAAAAAAAAAAAAAAAAAAAAAAAAAAAAAAAAAAAAAAAAAAAABQAAAAAAAAAwMD/AAAAAABkAAAAMgAAAAAAAABkAAAAAAAAAH9/fwAKAAAAIgAAABgAAAAAAAAAAAAAAAAAAAAAAAAAAAAAAAAAAAAkAAAAJAAAAAAAAAAHAAAAAAAAAAAAAAAAAAAAAAAAAAAAAAAAAAAAf39/ACUAAABYAAAAAAAAAAAAAAAAAAAAAAAAAAAAAAAAAAAAAAAAAAAAAAAAAAAAAAAAAAAAAAA/AAAAAAAAAKCGAQAAAAAAAAAAAAAAAAAMAAAAAQAAAAAAAAAAAAAAAAAAAB8AAABUAAAAAAAABQAAAAEAAAAAAAAAAAAAAAAAAAAAAAAAAAAAAAAAAAAAAAAAAAAAAAJ/f38AAAAAA8zMzADAwP8Af39/AAAAAAAAAAAAAAAAAAAAAAAAAAAAIQAAABgAAAAUAAAAwAMAABsnAAA/FQAAWSkAABAAAAAmAAAACAAAAAAAAAAAAAAA"/>
+                <pr:smNativeData xmlns:pr="smNativeData" xmlns="smNativeData" val="SMDATA_15_bXy5YxMAAAAlAAAAZAAAAA8BAAAAkAAAAEgAAACQAAAASAAAAAAAAAABAAAAAAAAAAEAAABQAAAAAAAAAAAA4D8AAAAAAADgPwAAAAAAAOA/AAAAAAAA4D8AAAAAAADgPwAAAAAAAOA/AAAAAAAA4D8AAAAAAADgPwAAAAAAAOA/AAAAAAAA4D8CAAAAjAAAAAAAAAAAAAAAM2bMDANPhAgAAAAAAAAAAAAAAAAAAAAAAAAAAAAAAAAAAAAAZAAAAAEAAABAAAAAAAAAAAAAAAAAAAAAAAAAAAAAAAAAAAAAAAAAAAAAAAAAAAAAAAAAAAAAAAAAAAAAAAAAAAAAAAAAAAAAAAAAAAAAAAAAAAAAAAAAAAAAAAAAAAAAFAAAADwAAAAAAAAAAAAAAP///wkUAAAAAQAAABQAAAAUAAAAFAAAAAEAAAAAAAAAZAAAAGQAAAAAAAAAZAAAAGQAAAAVAAAAYAAAAAAAAAAAAAAADwAAACADAAAAAAAAAAAAAAEAAACgMgAAVgcAAKr4//8BAAAAf39/AAEAAABkAAAAAAAAABQAAABAHwAAAAAAACYAAAAAAAAAwOD//wAAAAAmAAAAZAAAABYAAABMAAAAAAAAAAAAAAAEAAAAAAAAAAEAAABXiZEKAAAAACgAAAAoAAAAZAAAAGQAAAAAAAAAzMzMAAAAAABQAAAAUAAAAGQAAABkAAAAAAAAABcAAAAUAAAAAAAAAAAAAAD/fwAA/38AAAAAAAAJAAAABAAAAAAAAAAeAAAAaAAAAAAAAAAAAAAAAAAAAAAAAAAAAAAAECcAABAnAAAAAAAAAAAAAAAAAAAAAAAAAAAAAAAAAAAAAAAAAAAAABQAAAAAAAAAwMD/AAAAAABkAAAAMgAAAAAAAABkAAAAAAAAAH9/fwAKAAAAIgAAABgAAAAAAAAAAAAAAAAAAAAAAAAAAAAAAAAAAAAkAAAAJAAAAAAAAAAHAAAAAAAAAAAAAAAAAAAAAAAAAAAAAAAAAAAAf39/ACUAAABYAAAAAAAAAAAAAAAAAAAAAAAAAAAAAAAAAAAAAAAAAAAAAAAAAAAAAAAAAAAAAAA/AAAAAAAAAKCGAQAAAAAAAAAAAAAAAAAMAAAAAQAAAAAAAAAAAAAAAAAAAB8AAABUAAAAAAAABQAAAAEAAAAAAAAAAAAAAAAAAAAAAAAAAAAAAAAAAAAAAAAAAAAAAAJ/f38AAAAAA8zMzADAwP8Af39/AAAAAAAAAAAAAAAAAAAAAAAAAAAAIQAAABgAAAAUAAAAwAMAABsnAAA/FQAAWSkAABAAAAAmAAAACAAAAAAAAAAAAAAA"/>
               </a:ext>
             </a:extLst>
           </p:cNvSpPr>
@@ -532,7 +532,7 @@
           <a:lstStyle/>
           <a:p>
             <a:pPr/>
-            <a:fld id="{2C5F97C6-88C1-0A61-8FE7-7E34D9A9792B}" type="datetime1">
+            <a:fld id="{6BCF64CC-8286-9A92-C877-74C72A393E21}" type="datetime1">
               <a:t/>
             </a:fld>
           </a:p>
@@ -545,7 +545,7 @@
             <a:spLocks noGrp="1" noChangeArrowheads="1"/>
             <a:extLst>
               <a:ext uri="smNativeData">
-                <pr:smNativeData xmlns:pr="smNativeData" xmlns="smNativeData" val="SMDATA_15_k0e5YxMAAAAlAAAAZAAAAA8BAAAAkAAAAEgAAACQAAAASAAAAAAAAAABAAAAAAAAAAEAAABQAAAAAAAAAAAA4D8AAAAAAADgPwAAAAAAAOA/AAAAAAAA4D8AAAAAAADgPwAAAAAAAOA/AAAAAAAA4D8AAAAAAADgPwAAAAAAAOA/AAAAAAAA4D8CAAAAjAAAAAAAAAAAAAAAM2bMDANPhAgAAAAAAAAAAAAAAAAAAAAAAAAAAAAAAAAAAAAAZAAAAAEAAABAAAAAAAAAAAAAAAAAAAAAAAAAAAAAAAAAAAAAAAAAAAAAAAAAAAAAAAAAAAAAAAAAAAAAAAAAAAAAAAAAAAAAAAAAAAAAAAAAAAAAAAAAAAAAAAAAAAAAFAAAADwAAAAAAAAAAAAAAP///wkUAAAAAQAAABQAAAAUAAAAFAAAAAEAAAAAAAAAZAAAAGQAAAAAAAAAZAAAAGQAAAAVAAAAYAAAAAAAAAAAAAAADwAAACADAAAAAAAAAAAAAAEAAACgMgAAVgcAAKr4//8BAAAAf39/AAEAAABkAAAAAAAAABQAAABAHwAAAAAAACYAAAAAAAAAwOD//wAAAAAmAAAAZAAAABYAAABMAAAAAAAAAAAAAAAEAAAAAAAAAAEAAABXiZEKAAAAACgAAAAoAAAAZAAAAGQAAAAAAAAAzMzMAAAAAABQAAAAUAAAAGQAAABkAAAAAAAAABcAAAAUAAAAAAAAAAAAAAD/fwAA/38AAAAAAAAJAAAABAAAAGE6c3AeAAAAaAAAAAAAAAAAAAAAAAAAAAAAAAAAAAAAECcAABAnAAAAAAAAAAAAAAAAAAAAAAAAAAAAAAAAAAAAAAAAAAAAABQAAAAAAAAAwMD/AAAAAABkAAAAMgAAAAAAAABkAAAAAAAAAH9/fwAKAAAAIgAAABgAAAAAAAAAAAAAAAAAAAAAAAAAAAAAAAAAAAAkAAAAJAAAAAAAAAAHAAAAAAAAAAAAAAAAAAAAAAAAAAAAAAAAAAAAf39/ACUAAABYAAAAAAAAAAAAAAAAAAAAAAAAAAAAAAAAAAAAAAAAAAAAAAAAAAAAAAAAAAAAAAA/AAAAAAAAAKCGAQAAAAAAAAAAAAAAAAAMAAAAAQAAAAAAAAAAAAAAAAAAAB8AAABUAAAAAAAABQAAAAEAAAAAAAAAAAAAAAAAAAAAAAAAAAAAAAAAAAAAAAAAAAAAAAJ/f38AAAAAA8zMzADAwP8Af39/AAAAAAAAAAAAAAAAAAAAAAAAAAAAIQAAABgAAAAUAAAAoRkAABsnAABfMQAAWSkAABAAAAAmAAAACAAAAAAAAAAAAAAA"/>
+                <pr:smNativeData xmlns:pr="smNativeData" xmlns="smNativeData" val="SMDATA_15_bXy5YxMAAAAlAAAAZAAAAA8BAAAAkAAAAEgAAACQAAAASAAAAAAAAAABAAAAAAAAAAEAAABQAAAAAAAAAAAA4D8AAAAAAADgPwAAAAAAAOA/AAAAAAAA4D8AAAAAAADgPwAAAAAAAOA/AAAAAAAA4D8AAAAAAADgPwAAAAAAAOA/AAAAAAAA4D8CAAAAjAAAAAAAAAAAAAAAM2bMDANPhAgAAAAAAAAAAAAAAAAAAAAAAAAAAAAAAAAAAAAAZAAAAAEAAABAAAAAAAAAAAAAAAAAAAAAAAAAAAAAAAAAAAAAAAAAAAAAAAAAAAAAAAAAAAAAAAAAAAAAAAAAAAAAAAAAAAAAAAAAAAAAAAAAAAAAAAAAAAAAAAAAAAAAFAAAADwAAAAAAAAAAAAAAP///wkUAAAAAQAAABQAAAAUAAAAFAAAAAEAAAAAAAAAZAAAAGQAAAAAAAAAZAAAAGQAAAAVAAAAYAAAAAAAAAAAAAAADwAAACADAAAAAAAAAAAAAAEAAACgMgAAVgcAAKr4//8BAAAAf39/AAEAAABkAAAAAAAAABQAAABAHwAAAAAAACYAAAAAAAAAwOD//wAAAAAmAAAAZAAAABYAAABMAAAAAAAAAAAAAAAEAAAAAAAAAAEAAABXiZEKAAAAACgAAAAoAAAAZAAAAGQAAAAAAAAAzMzMAAAAAABQAAAAUAAAAGQAAABkAAAAAAAAABcAAAAUAAAAAAAAAAAAAAD/fwAA/38AAAAAAAAJAAAABAAAAGE6c3AeAAAAaAAAAAAAAAAAAAAAAAAAAAAAAAAAAAAAECcAABAnAAAAAAAAAAAAAAAAAAAAAAAAAAAAAAAAAAAAAAAAAAAAABQAAAAAAAAAwMD/AAAAAABkAAAAMgAAAAAAAABkAAAAAAAAAH9/fwAKAAAAIgAAABgAAAAAAAAAAAAAAAAAAAAAAAAAAAAAAAAAAAAkAAAAJAAAAAAAAAAHAAAAAAAAAAAAAAAAAAAAAAAAAAAAAAAAAAAAf39/ACUAAABYAAAAAAAAAAAAAAAAAAAAAAAAAAAAAAAAAAAAAAAAAAAAAAAAAAAAAAAAAAAAAAA/AAAAAAAAAKCGAQAAAAAAAAAAAAAAAAAMAAAAAQAAAAAAAAAAAAAAAAAAAB8AAABUAAAAAAAABQAAAAEAAAAAAAAAAAAAAAAAAAAAAAAAAAAAAAAAAAAAAAAAAAAAAAJ/f38AAAAAA8zMzADAwP8Af39/AAAAAAAAAAAAAAAAAAAAAAAAAAAAIQAAABgAAAAUAAAAoRkAABsnAABfMQAAWSkAABAAAAAmAAAACAAAAAAAAAAAAAAA"/>
               </a:ext>
             </a:extLst>
           </p:cNvSpPr>
@@ -569,7 +569,7 @@
             <a:spLocks noGrp="1" noChangeArrowheads="1"/>
             <a:extLst>
               <a:ext uri="smNativeData">
-                <pr:smNativeData xmlns:pr="smNativeData" xmlns="smNativeData" val="SMDATA_15_k0e5YxMAAAAlAAAAZAAAAA8BAAAAkAAAAEgAAACQAAAASAAAAAAAAAABAAAAAAAAAAEAAABQAAAAAAAAAAAA4D8AAAAAAADgPwAAAAAAAOA/AAAAAAAA4D8AAAAAAADgPwAAAAAAAOA/AAAAAAAA4D8AAAAAAADgPwAAAAAAAOA/AAAAAAAA4D8CAAAAjAAAAAAAAAAAAAAAM2bMDANPhAgAAAAAAAAAAAAAAAAAAAAAAAAAAAAAAAAAAAAAZAAAAAEAAABAAAAAAAAAAAAAAAAAAAAAAAAAAAAAAAAAAAAAAAAAAAAAAAAAAAAAAAAAAAAAAAAAAAAAAAAAAAAAAAAAAAAAAAAAAAAAAAAAAAAAAAAAAAAAAAAAAAAAFAAAADwAAAAAAAAAAAAAAP///wkUAAAAAQAAABQAAAAUAAAAFAAAAAEAAAAAAAAAZAAAAGQAAAAAAAAAZAAAAGQAAAAVAAAAYAAAAAAAAAAAAAAADwAAACADAAAAAAAAAAAAAAEAAACgMgAAVgcAAKr4//8BAAAAf39/AAEAAABkAAAAAAAAABQAAABAHwAAAAAAACYAAAAAAAAAwOD//wAAAAAmAAAAZAAAABYAAABMAAAAAAAAAAAAAAAEAAAAAAAAAAEAAABXiZEKAAAAACgAAAAoAAAAZAAAAGQAAAAAAAAAzMzMAAAAAABQAAAAUAAAAGQAAABkAAAAAAAAABcAAAAUAAAAAAAAAAAAAAD/fwAA/38AAAAAAAAJAAAABAAAAAAAAAAeAAAAaAAAAAAAAAAAAAAAAAAAAAAAAAAAAAAAECcAABAnAAAAAAAAAAAAAAAAAAAAAAAAAAAAAAAAAAAAAAAAAAAAABQAAAAAAAAAwMD/AAAAAABkAAAAMgAAAAAAAABkAAAAAAAAAH9/fwAKAAAAIgAAABgAAAAAAAAAAAAAAAAAAAAAAAAAAAAAAAAAAAAkAAAAJAAAAAAAAAAHAAAAAAAAAAAAAAAAAAAAAAAAAAAAAAAAAAAAf39/ACUAAABYAAAAAAAAAAAAAAAAAAAAAAAAAAAAAAAAAAAAAAAAAAAAAAAAAAAAAAAAAAAAAAA/AAAAAAAAAKCGAQAAAAAAAAAAAAAAAAAMAAAAAQAAAAAAAAAAAAAAAAAAAB8AAABUAAAAAAAABQAAAAEAAAAAAAAAAAAAAAAAAAAAAAAAAAAAAAAAAAAAAAAAAAAAAAJ/f38AAAAAA8zMzADAwP8Af39/AAAAAAAAAAAAAAAAAAAAAAAAAAAAIQAAABgAAAAUAAAAwTUAABsnAABARwAAWSkAABAAAAAmAAAACAAAAAAAAAAAAAAA"/>
+                <pr:smNativeData xmlns:pr="smNativeData" xmlns="smNativeData" val="SMDATA_15_bXy5YxMAAAAlAAAAZAAAAA8BAAAAkAAAAEgAAACQAAAASAAAAAAAAAABAAAAAAAAAAEAAABQAAAAAAAAAAAA4D8AAAAAAADgPwAAAAAAAOA/AAAAAAAA4D8AAAAAAADgPwAAAAAAAOA/AAAAAAAA4D8AAAAAAADgPwAAAAAAAOA/AAAAAAAA4D8CAAAAjAAAAAAAAAAAAAAAM2bMDANPhAgAAAAAAAAAAAAAAAAAAAAAAAAAAAAAAAAAAAAAZAAAAAEAAABAAAAAAAAAAAAAAAAAAAAAAAAAAAAAAAAAAAAAAAAAAAAAAAAAAAAAAAAAAAAAAAAAAAAAAAAAAAAAAAAAAAAAAAAAAAAAAAAAAAAAAAAAAAAAAAAAAAAAFAAAADwAAAAAAAAAAAAAAP///wkUAAAAAQAAABQAAAAUAAAAFAAAAAEAAAAAAAAAZAAAAGQAAAAAAAAAZAAAAGQAAAAVAAAAYAAAAAAAAAAAAAAADwAAACADAAAAAAAAAAAAAAEAAACgMgAAVgcAAKr4//8BAAAAf39/AAEAAABkAAAAAAAAABQAAABAHwAAAAAAACYAAAAAAAAAwOD//wAAAAAmAAAAZAAAABYAAABMAAAAAAAAAAAAAAAEAAAAAAAAAAEAAABXiZEKAAAAACgAAAAoAAAAZAAAAGQAAAAAAAAAzMzMAAAAAABQAAAAUAAAAGQAAABkAAAAAAAAABcAAAAUAAAAAAAAAAAAAAD/fwAA/38AAAAAAAAJAAAABAAAAAAAAAAeAAAAaAAAAAAAAAAAAAAAAAAAAAAAAAAAAAAAECcAABAnAAAAAAAAAAAAAAAAAAAAAAAAAAAAAAAAAAAAAAAAAAAAABQAAAAAAAAAwMD/AAAAAABkAAAAMgAAAAAAAABkAAAAAAAAAH9/fwAKAAAAIgAAABgAAAAAAAAAAAAAAAAAAAAAAAAAAAAAAAAAAAAkAAAAJAAAAAAAAAAHAAAAAAAAAAAAAAAAAAAAAAAAAAAAAAAAAAAAf39/ACUAAABYAAAAAAAAAAAAAAAAAAAAAAAAAAAAAAAAAAAAAAAAAAAAAAAAAAAAAAAAAAAAAAA/AAAAAAAAAKCGAQAAAAAAAAAAAAAAAAAMAAAAAQAAAAAAAAAAAAAAAAAAAB8AAABUAAAAAAAABQAAAAEAAAAAAAAAAAAAAAAAAAAAAAAAAAAAAAAAAAAAAAAAAAAAAAJ/f38AAAAAA8zMzADAwP8Af39/AAAAAAAAAAAAAAAAAAAAAAAAAAAAIQAAABgAAAAUAAAAwTUAABsnAABARwAAWSkAABAAAAAmAAAACAAAAAAAAAAAAAAA"/>
               </a:ext>
             </a:extLst>
           </p:cNvSpPr>
@@ -583,7 +583,7 @@
           <a:lstStyle/>
           <a:p>
             <a:pPr/>
-            <a:fld id="{2C5FFCAF-E1C1-0A0A-8FE7-175FB2A97942}" type="slidenum">
+            <a:fld id="{31704A0E-40DC-25BC-92C8-B6E9048664E3}" type="slidenum">
               <a:t/>
             </a:fld>
           </a:p>
@@ -622,7 +622,7 @@
             <a:spLocks noGrp="1" noChangeArrowheads="1"/>
             <a:extLst>
               <a:ext uri="smNativeData">
-                <pr:smNativeData xmlns:pr="smNativeData" xmlns="smNativeData" val="SMDATA_15_k0e5YxMAAAAlAAAAZAAAAA8BAAAAkAAAAEgAAACQAAAASAAAAAAAAAACAAAAAQAAAAEAAABQAAAAAAAAAAAA4D8AAAAAAADgPwAAAAAAAOA/AAAAAAAA4D8AAAAAAADgPwAAAAAAAOA/AAAAAAAA4D8AAAAAAADgPwAAAAAAAOA/AAAAAAAA4D8CAAAAjAAAAAAAAAAAAAAAM2bMDANPhAgAAAAAAAAAAAAAAAAAAAAAAAAAAAAAAAAAAAAAZAAAAAEAAABAAAAAAAAAAAAAAAAAAAAAAAAAAAAAAAAAAAAAAAAAAAAAAAAAAAAAAAAAAAAAAAAAAAAAAAAAAAAAAAAAAAAAAAAAAAAAAAAAAAAAAAAAAAAAAAAAAAAAFAAAADwAAAAAAAAAAAAAAP///wkUAAAAAQAAABQAAAAUAAAAFAAAAAEAAAAAAAAAZAAAAGQAAAAAAAAAZAAAAGQAAAAVAAAAYAAAAAAAAAAAAAAADwAAACADAAAAAAAAAAAAAAEAAACgMgAAVgcAAKr4//8BAAAAf39/AAEAAABkAAAAAAAAABQAAABAHwAAAAAAACYAAAAAAAAAwOD//wAAAAAmAAAAZAAAABYAAABMAAAAAAAAAAAAAAAEAAAAAAAAAAEAAABXiZEKAAAAACgAAAAoAAAAZAAAAGQAAAAAAAAAzMzMAAAAAABQAAAAUAAAAGQAAABkAAAAAAAAABcAAAAUAAAAAAAAAAAAAAD/fwAA/38AAAAAAAAJAAAABAAAAAAAAAAeAAAAaAAAAAAAAAAAAAAAAAAAAAAAAAAAAAAAECcAABAnAAAAAAAAAAAAAAAAAAAAAAAAAAAAAAAAAAAAAAAAAAAAABQAAAAAAAAAwMD/AAAAAABkAAAAMgAAAAAAAABkAAAAAAAAAH9/fwAKAAAAIgAAABgAAAAAAAAAAAAAAAAAAAAAAAAAAAAAAAAAAAAkAAAAJAAAAAAAAAAHAAAAAAAAAAAAAAAAAAAAAAAAAAAAAAAAAAAAf39/ACUAAABYAAAAAAAAAAAAAAAAAAAAAAAAAAAAAAAAAAAAAAAAAAAAAAAAAAAAAAAAAAAAAAA/AAAAAAAAAKCGAQAAAAAAAAAAAAAAAAAMAAAAAQAAAAAAAAAAAAAAAAAAAB8AAABUAAAAAAAABQAAAAEAAAAAAAAAAAAAAAAAAAAAAAAAAAAAAAAAAAAAAAAAAAAAAAJ/f38AAAAAA8zMzADAwP8Af39/AAAAAAAAAAAAAAAAAAAAAAAAAAAAIQAAABgAAAAUAAAAYDYAALABAABARwAAsCUAABAAAAAmAAAACAAAAIMAAAAAAAAA"/>
+                <pr:smNativeData xmlns:pr="smNativeData" xmlns="smNativeData" val="SMDATA_15_bXy5YxMAAAAlAAAAZAAAAA8BAAAAkAAAAEgAAACQAAAASAAAAAAAAAACAAAAAQAAAAEAAABQAAAAAAAAAAAA4D8AAAAAAADgPwAAAAAAAOA/AAAAAAAA4D8AAAAAAADgPwAAAAAAAOA/AAAAAAAA4D8AAAAAAADgPwAAAAAAAOA/AAAAAAAA4D8CAAAAjAAAAAAAAAAAAAAAM2bMDANPhAgAAAAAAAAAAAAAAAAAAAAAAAAAAAAAAAAAAAAAZAAAAAEAAABAAAAAAAAAAAAAAAAAAAAAAAAAAAAAAAAAAAAAAAAAAAAAAAAAAAAAAAAAAAAAAAAAAAAAAAAAAAAAAAAAAAAAAAAAAAAAAAAAAAAAAAAAAAAAAAAAAAAAFAAAADwAAAAAAAAAAAAAAP///wkUAAAAAQAAABQAAAAUAAAAFAAAAAEAAAAAAAAAZAAAAGQAAAAAAAAAZAAAAGQAAAAVAAAAYAAAAAAAAAAAAAAADwAAACADAAAAAAAAAAAAAAEAAACgMgAAVgcAAKr4//8BAAAAf39/AAEAAABkAAAAAAAAABQAAABAHwAAAAAAACYAAAAAAAAAwOD//wAAAAAmAAAAZAAAABYAAABMAAAAAAAAAAAAAAAEAAAAAAAAAAEAAABXiZEKAAAAACgAAAAoAAAAZAAAAGQAAAAAAAAAzMzMAAAAAABQAAAAUAAAAGQAAABkAAAAAAAAABcAAAAUAAAAAAAAAAAAAAD/fwAA/38AAAAAAAAJAAAABAAAAAAAAAAeAAAAaAAAAAAAAAAAAAAAAAAAAAAAAAAAAAAAECcAABAnAAAAAAAAAAAAAAAAAAAAAAAAAAAAAAAAAAAAAAAAAAAAABQAAAAAAAAAwMD/AAAAAABkAAAAMgAAAAAAAABkAAAAAAAAAH9/fwAKAAAAIgAAABgAAAAAAAAAAAAAAAAAAAAAAAAAAAAAAAAAAAAkAAAAJAAAAAAAAAAHAAAAAAAAAAAAAAAAAAAAAAAAAAAAAAAAAAAAf39/ACUAAABYAAAAAAAAAAAAAAAAAAAAAAAAAAAAAAAAAAAAAAAAAAAAAAAAAAAAAAAAAAAAAAA/AAAAAAAAAKCGAQAAAAAAAAAAAAAAAAAMAAAAAQAAAAAAAAAAAAAAAAAAAB8AAABUAAAAAAAABQAAAAEAAAAAAAAAAAAAAAAAAAAAAAAAAAAAAAAAAAAAAAAAAAAAAAJ/f38AAAAAA8zMzADAwP8Af39/AAAAAAAAAAAAAAAAAAAAAAAAAAAAIQAAABgAAAAUAAAAYDYAALABAABARwAAsCUAABAAAAAmAAAACAAAAIMAAAAAAAAA"/>
               </a:ext>
             </a:extLst>
           </p:cNvSpPr>
@@ -658,7 +658,7 @@
             <a:spLocks noGrp="1" noChangeArrowheads="1"/>
             <a:extLst>
               <a:ext uri="smNativeData">
-                <pr:smNativeData xmlns:pr="smNativeData" xmlns="smNativeData" val="SMDATA_15_k0e5YxMAAAAlAAAAZAAAAA8BAAAAkAAAAEgAAACQAAAASAAAAAAAAAAAAAAAAQAAAAEAAABQAAAAAAAAAAAA4D8AAAAAAADgPwAAAAAAAOA/AAAAAAAA4D8AAAAAAADgPwAAAAAAAOA/AAAAAAAA4D8AAAAAAADgPwAAAAAAAOA/AAAAAAAA4D8CAAAAjAAAAAAAAAAAAAAAM2bMDANPhAgAAAAAAAAAAAAAAAAAAAAAAAAAAAAAAAAAAAAAZAAAAAEAAABAAAAAAAAAAAAAAAAAAAAAAAAAAAAAAAAAAAAAAAAAAAAAAAAAAAAAAAAAAAAAAAAAAAAAAAAAAAAAAAAAAAAAAAAAAAAAAAAAAAAAAAAAAAAAAAAAAAAAFAAAADwAAAAAAAAAAAAAAP///wkUAAAAAQAAABQAAAAUAAAAFAAAAAEAAAAAAAAAZAAAAGQAAAAAAAAAZAAAAGQAAAAVAAAAYAAAAAAAAAAAAAAADwAAACADAAAAAAAAAAAAAAEAAACgMgAAVgcAAKr4//8BAAAAf39/AAEAAABkAAAAAAAAABQAAABAHwAAAAAAACYAAAAAAAAAwOD//wAAAAAmAAAAZAAAABYAAABMAAAAAAAAAAAAAAAEAAAAAAAAAAEAAABXiZEKAAAAACgAAAAoAAAAZAAAAGQAAAAAAAAAzMzMAAAAAABQAAAAUAAAAGQAAABkAAAAAAAAABcAAAAUAAAAAAAAAAAAAAD/fwAA/38AAAAAAAAJAAAABAAAAAAAAAAeAAAAaAAAAAAAAAAAAAAAAAAAAAAAAAAAAAAAECcAABAnAAAAAAAAAAAAAAAAAAAAAAAAAAAAAAAAAAAAAAAAAAAAABQAAAAAAAAAwMD/AAAAAABkAAAAMgAAAAAAAABkAAAAAAAAAH9/fwAKAAAAIgAAABgAAAAAAAAAAAAAAAAAAAAAAAAAAAAAAAAAAAAkAAAAJAAAAAAAAAAHAAAAAAAAAAAAAAAAAAAAAAAAAAAAAAAAAAAAf39/ACUAAABYAAAAAAAAAAAAAAAAAAAAAAAAAAAAAAAAAAAAAAAAAAAAAAAAAAAAAAAAAAAAAAA/AAAAAAAAAKCGAQAAAAAAAAAAAAAAAAAMAAAAAQAAAAAAAAAAAAAAAAAAAB8AAABUAAAAAAAABQAAAAEAAAAAAAAAAAAAAAAAAAAAAAAAAAAAAAAAAAAAAAAAAAAAAAJ/f38AAAAAA8zMzADAwP8Af39/AAAAAAAAAAAAAAAAAAAAAAAAAAAAIQAAABgAAAAUAAAAwAMAALABAAAfNQAAsCUAABAAAAAmAAAACAAAAAMAAAAAAAAA"/>
+                <pr:smNativeData xmlns:pr="smNativeData" xmlns="smNativeData" val="SMDATA_15_bXy5YxMAAAAlAAAAZAAAAA8BAAAAkAAAAEgAAACQAAAASAAAAAAAAAAAAAAAAQAAAAEAAABQAAAAAAAAAAAA4D8AAAAAAADgPwAAAAAAAOA/AAAAAAAA4D8AAAAAAADgPwAAAAAAAOA/AAAAAAAA4D8AAAAAAADgPwAAAAAAAOA/AAAAAAAA4D8CAAAAjAAAAAAAAAAAAAAAM2bMDANPhAgAAAAAAAAAAAAAAAAAAAAAAAAAAAAAAAAAAAAAZAAAAAEAAABAAAAAAAAAAAAAAAAAAAAAAAAAAAAAAAAAAAAAAAAAAAAAAAAAAAAAAAAAAAAAAAAAAAAAAAAAAAAAAAAAAAAAAAAAAAAAAAAAAAAAAAAAAAAAAAAAAAAAFAAAADwAAAAAAAAAAAAAAP///wkUAAAAAQAAABQAAAAUAAAAFAAAAAEAAAAAAAAAZAAAAGQAAAAAAAAAZAAAAGQAAAAVAAAAYAAAAAAAAAAAAAAADwAAACADAAAAAAAAAAAAAAEAAACgMgAAVgcAAKr4//8BAAAAf39/AAEAAABkAAAAAAAAABQAAABAHwAAAAAAACYAAAAAAAAAwOD//wAAAAAmAAAAZAAAABYAAABMAAAAAAAAAAAAAAAEAAAAAAAAAAEAAABXiZEKAAAAACgAAAAoAAAAZAAAAGQAAAAAAAAAzMzMAAAAAABQAAAAUAAAAGQAAABkAAAAAAAAABcAAAAUAAAAAAAAAAAAAAD/fwAA/38AAAAAAAAJAAAABAAAAAAAAAAeAAAAaAAAAAAAAAAAAAAAAAAAAAAAAAAAAAAAECcAABAnAAAAAAAAAAAAAAAAAAAAAAAAAAAAAAAAAAAAAAAAAAAAABQAAAAAAAAAwMD/AAAAAABkAAAAMgAAAAAAAABkAAAAAAAAAH9/fwAKAAAAIgAAABgAAAAAAAAAAAAAAAAAAAAAAAAAAAAAAAAAAAAkAAAAJAAAAAAAAAAHAAAAAAAAAAAAAAAAAAAAAAAAAAAAAAAAAAAAf39/ACUAAABYAAAAAAAAAAAAAAAAAAAAAAAAAAAAAAAAAAAAAAAAAAAAAAAAAAAAAAAAAAAAAAA/AAAAAAAAAKCGAQAAAAAAAAAAAAAAAAAMAAAAAQAAAAAAAAAAAAAAAAAAAB8AAABUAAAAAAAABQAAAAEAAAAAAAAAAAAAAAAAAAAAAAAAAAAAAAAAAAAAAAAAAAAAAAJ/f38AAAAAA8zMzADAwP8Af39/AAAAAAAAAAAAAAAAAAAAAAAAAAAAIQAAABgAAAAUAAAAwAMAALABAAAfNQAAsCUAABAAAAAmAAAACAAAAAMAAAAAAAAA"/>
               </a:ext>
             </a:extLst>
           </p:cNvSpPr>
@@ -718,7 +718,7 @@
             <a:spLocks noGrp="1" noChangeArrowheads="1"/>
             <a:extLst>
               <a:ext uri="smNativeData">
-                <pr:smNativeData xmlns:pr="smNativeData" xmlns="smNativeData" val="SMDATA_15_k0e5YxMAAAAlAAAAZAAAAA8BAAAAkAAAAEgAAACQAAAASAAAAAAAAAABAAAAAAAAAAEAAABQAAAAAAAAAAAA4D8AAAAAAADgPwAAAAAAAOA/AAAAAAAA4D8AAAAAAADgPwAAAAAAAOA/AAAAAAAA4D8AAAAAAADgPwAAAAAAAOA/AAAAAAAA4D8CAAAAjAAAAAAAAAAAAAAAM2bMDANPhAgAAAAAAAAAAAAAAAAAAAAAAAAAAAAAAAAAAAAAZAAAAAEAAABAAAAAAAAAAAAAAAAAAAAAAAAAAAAAAAAAAAAAAAAAAAAAAAAAAAAAAAAAAAAAAAAAAAAAAAAAAAAAAAAAAAAAAAAAAAAAAAAAAAAAAAAAAAAAAAAAAAAAFAAAADwAAAAAAAAAAAAAAP///wkUAAAAAQAAABQAAAAUAAAAFAAAAAEAAAAAAAAAZAAAAGQAAAAAAAAAZAAAAGQAAAAVAAAAYAAAAAAAAAAAAAAADwAAACADAAAAAAAAAAAAAAEAAACgMgAAVgcAAKr4//8BAAAAf39/AAEAAABkAAAAAAAAABQAAABAHwAAAAAAACYAAAAAAAAAwOD//wAAAAAmAAAAZAAAABYAAABMAAAAAAAAAAAAAAAEAAAAAAAAAAEAAABXiZEKAAAAACgAAAAoAAAAZAAAAGQAAAAAAAAAzMzMAAAAAABQAAAAUAAAAGQAAABkAAAAAAAAABcAAAAUAAAAAAAAAAAAAAD/fwAA/38AAAAAAAAJAAAABAAAAAAAAAAeAAAAaAAAAAAAAAAAAAAAAAAAAAAAAAAAAAAAECcAABAnAAAAAAAAAAAAAAAAAAAAAAAAAAAAAAAAAAAAAAAAAAAAABQAAAAAAAAAwMD/AAAAAABkAAAAMgAAAAAAAABkAAAAAAAAAH9/fwAKAAAAIgAAABgAAAAAAAAAAAAAAAAAAAAAAAAAAAAAAAAAAAAkAAAAJAAAAAAAAAAHAAAAAAAAAAAAAAAAAAAAAAAAAAAAAAAAAAAAf39/ACUAAABYAAAAAAAAAAAAAAAAAAAAAAAAAAAAAAAAAAAAAAAAAAAAAAAAAAAAAAAAAAAAAAA/AAAAAAAAAKCGAQAAAAAAAAAAAAAAAAAMAAAAAQAAAAAAAAAAAAAAAAAAAB8AAABUAAAAAAAABQAAAAEAAAAAAAAAAAAAAAAAAAAAAAAAAAAAAAAAAAAAAAAAAAAAAAJ/f38AAAAAA8zMzADAwP8Af39/AAAAAAAAAAAAAAAAAAAAAAAAAAAAIQAAABgAAAAUAAAAwAMAABsnAAA/FQAAWSkAABAAAAAmAAAACAAAAAAAAAAAAAAA"/>
+                <pr:smNativeData xmlns:pr="smNativeData" xmlns="smNativeData" val="SMDATA_15_bXy5YxMAAAAlAAAAZAAAAA8BAAAAkAAAAEgAAACQAAAASAAAAAAAAAABAAAAAAAAAAEAAABQAAAAAAAAAAAA4D8AAAAAAADgPwAAAAAAAOA/AAAAAAAA4D8AAAAAAADgPwAAAAAAAOA/AAAAAAAA4D8AAAAAAADgPwAAAAAAAOA/AAAAAAAA4D8CAAAAjAAAAAAAAAAAAAAAM2bMDANPhAgAAAAAAAAAAAAAAAAAAAAAAAAAAAAAAAAAAAAAZAAAAAEAAABAAAAAAAAAAAAAAAAAAAAAAAAAAAAAAAAAAAAAAAAAAAAAAAAAAAAAAAAAAAAAAAAAAAAAAAAAAAAAAAAAAAAAAAAAAAAAAAAAAAAAAAAAAAAAAAAAAAAAFAAAADwAAAAAAAAAAAAAAP///wkUAAAAAQAAABQAAAAUAAAAFAAAAAEAAAAAAAAAZAAAAGQAAAAAAAAAZAAAAGQAAAAVAAAAYAAAAAAAAAAAAAAADwAAACADAAAAAAAAAAAAAAEAAACgMgAAVgcAAKr4//8BAAAAf39/AAEAAABkAAAAAAAAABQAAABAHwAAAAAAACYAAAAAAAAAwOD//wAAAAAmAAAAZAAAABYAAABMAAAAAAAAAAAAAAAEAAAAAAAAAAEAAABXiZEKAAAAACgAAAAoAAAAZAAAAGQAAAAAAAAAzMzMAAAAAABQAAAAUAAAAGQAAABkAAAAAAAAABcAAAAUAAAAAAAAAAAAAAD/fwAA/38AAAAAAAAJAAAABAAAAAAAAAAeAAAAaAAAAAAAAAAAAAAAAAAAAAAAAAAAAAAAECcAABAnAAAAAAAAAAAAAAAAAAAAAAAAAAAAAAAAAAAAAAAAAAAAABQAAAAAAAAAwMD/AAAAAABkAAAAMgAAAAAAAABkAAAAAAAAAH9/fwAKAAAAIgAAABgAAAAAAAAAAAAAAAAAAAAAAAAAAAAAAAAAAAAkAAAAJAAAAAAAAAAHAAAAAAAAAAAAAAAAAAAAAAAAAAAAAAAAAAAAf39/ACUAAABYAAAAAAAAAAAAAAAAAAAAAAAAAAAAAAAAAAAAAAAAAAAAAAAAAAAAAAAAAAAAAAA/AAAAAAAAAKCGAQAAAAAAAAAAAAAAAAAMAAAAAQAAAAAAAAAAAAAAAAAAAB8AAABUAAAAAAAABQAAAAEAAAAAAAAAAAAAAAAAAAAAAAAAAAAAAAAAAAAAAAAAAAAAAAJ/f38AAAAAA8zMzADAwP8Af39/AAAAAAAAAAAAAAAAAAAAAAAAAAAAIQAAABgAAAAUAAAAwAMAABsnAAA/FQAAWSkAABAAAAAmAAAACAAAAAAAAAAAAAAA"/>
               </a:ext>
             </a:extLst>
           </p:cNvSpPr>
@@ -732,7 +732,7 @@
           <a:lstStyle/>
           <a:p>
             <a:pPr/>
-            <a:fld id="{2C5FFF13-5DC1-0A09-8FE7-AB5CB1A979FE}" type="datetime1">
+            <a:fld id="{372422BB-F5DA-71D4-949C-03816CD26256}" type="datetime1">
               <a:t/>
             </a:fld>
           </a:p>
@@ -745,7 +745,7 @@
             <a:spLocks noGrp="1" noChangeArrowheads="1"/>
             <a:extLst>
               <a:ext uri="smNativeData">
-                <pr:smNativeData xmlns:pr="smNativeData" xmlns="smNativeData" val="SMDATA_15_k0e5YxMAAAAlAAAAZAAAAA8BAAAAkAAAAEgAAACQAAAASAAAAAAAAAABAAAAAAAAAAEAAABQAAAAAAAAAAAA4D8AAAAAAADgPwAAAAAAAOA/AAAAAAAA4D8AAAAAAADgPwAAAAAAAOA/AAAAAAAA4D8AAAAAAADgPwAAAAAAAOA/AAAAAAAA4D8CAAAAjAAAAAAAAAAAAAAAM2bMDANPhAgAAAAAAAAAAAAAAAAAAAAAAAAAAAAAAAAAAAAAZAAAAAEAAABAAAAAAAAAAAAAAAAAAAAAAAAAAAAAAAAAAAAAAAAAAAAAAAAAAAAAAAAAAAAAAAAAAAAAAAAAAAAAAAAAAAAAAAAAAAAAAAAAAAAAAAAAAAAAAAAAAAAAFAAAADwAAAAAAAAAAAAAAP///wkUAAAAAQAAABQAAAAUAAAAFAAAAAEAAAAAAAAAZAAAAGQAAAAAAAAAZAAAAGQAAAAVAAAAYAAAAAAAAAAAAAAADwAAACADAAAAAAAAAAAAAAEAAACgMgAAVgcAAKr4//8BAAAAf39/AAEAAABkAAAAAAAAABQAAABAHwAAAAAAACYAAAAAAAAAwOD//wAAAAAmAAAAZAAAABYAAABMAAAAAAAAAAAAAAAEAAAAAAAAAAEAAABXiZEKAAAAACgAAAAoAAAAZAAAAGQAAAAAAAAAzMzMAAAAAABQAAAAUAAAAGQAAABkAAAAAAAAABcAAAAUAAAAAAAAAAAAAAD/fwAA/38AAAAAAAAJAAAABAAAAAAAAAAeAAAAaAAAAAAAAAAAAAAAAAAAAAAAAAAAAAAAECcAABAnAAAAAAAAAAAAAAAAAAAAAAAAAAAAAAAAAAAAAAAAAAAAABQAAAAAAAAAwMD/AAAAAABkAAAAMgAAAAAAAABkAAAAAAAAAH9/fwAKAAAAIgAAABgAAAAAAAAAAAAAAAAAAAAAAAAAAAAAAAAAAAAkAAAAJAAAAAAAAAAHAAAAAAAAAAAAAAAAAAAAAAAAAAAAAAAAAAAAf39/ACUAAABYAAAAAAAAAAAAAAAAAAAAAAAAAAAAAAAAAAAAAAAAAAAAAAAAAAAAAAAAAAAAAAA/AAAAAAAAAKCGAQAAAAAAAAAAAAAAAAAMAAAAAQAAAAAAAAAAAAAAAAAAAB8AAABUAAAAAAAABQAAAAEAAAAAAAAAAAAAAAAAAAAAAAAAAAAAAAAAAAAAAAAAAAAAAAJ/f38AAAAAA8zMzADAwP8Af39/AAAAAAAAAAAAAAAAAAAAAAAAAAAAIQAAABgAAAAUAAAAoRkAABsnAABfMQAAWSkAABAAAAAmAAAACAAAAAAAAAAAAAAA"/>
+                <pr:smNativeData xmlns:pr="smNativeData" xmlns="smNativeData" val="SMDATA_15_bXy5YxMAAAAlAAAAZAAAAA8BAAAAkAAAAEgAAACQAAAASAAAAAAAAAABAAAAAAAAAAEAAABQAAAAAAAAAAAA4D8AAAAAAADgPwAAAAAAAOA/AAAAAAAA4D8AAAAAAADgPwAAAAAAAOA/AAAAAAAA4D8AAAAAAADgPwAAAAAAAOA/AAAAAAAA4D8CAAAAjAAAAAAAAAAAAAAAM2bMDANPhAgAAAAAAAAAAAAAAAAAAAAAAAAAAAAAAAAAAAAAZAAAAAEAAABAAAAAAAAAAAAAAAAAAAAAAAAAAAAAAAAAAAAAAAAAAAAAAAAAAAAAAAAAAAAAAAAAAAAAAAAAAAAAAAAAAAAAAAAAAAAAAAAAAAAAAAAAAAAAAAAAAAAAFAAAADwAAAAAAAAAAAAAAP///wkUAAAAAQAAABQAAAAUAAAAFAAAAAEAAAAAAAAAZAAAAGQAAAAAAAAAZAAAAGQAAAAVAAAAYAAAAAAAAAAAAAAADwAAACADAAAAAAAAAAAAAAEAAACgMgAAVgcAAKr4//8BAAAAf39/AAEAAABkAAAAAAAAABQAAABAHwAAAAAAACYAAAAAAAAAwOD//wAAAAAmAAAAZAAAABYAAABMAAAAAAAAAAAAAAAEAAAAAAAAAAEAAABXiZEKAAAAACgAAAAoAAAAZAAAAGQAAAAAAAAAzMzMAAAAAABQAAAAUAAAAGQAAABkAAAAAAAAABcAAAAUAAAAAAAAAAAAAAD/fwAA/38AAAAAAAAJAAAABAAAAAAAAAAeAAAAaAAAAAAAAAAAAAAAAAAAAAAAAAAAAAAAECcAABAnAAAAAAAAAAAAAAAAAAAAAAAAAAAAAAAAAAAAAAAAAAAAABQAAAAAAAAAwMD/AAAAAABkAAAAMgAAAAAAAABkAAAAAAAAAH9/fwAKAAAAIgAAABgAAAAAAAAAAAAAAAAAAAAAAAAAAAAAAAAAAAAkAAAAJAAAAAAAAAAHAAAAAAAAAAAAAAAAAAAAAAAAAAAAAAAAAAAAf39/ACUAAABYAAAAAAAAAAAAAAAAAAAAAAAAAAAAAAAAAAAAAAAAAAAAAAAAAAAAAAAAAAAAAAA/AAAAAAAAAKCGAQAAAAAAAAAAAAAAAAAMAAAAAQAAAAAAAAAAAAAAAAAAAB8AAABUAAAAAAAABQAAAAEAAAAAAAAAAAAAAAAAAAAAAAAAAAAAAAAAAAAAAAAAAAAAAAJ/f38AAAAAA8zMzADAwP8Af39/AAAAAAAAAAAAAAAAAAAAAAAAAAAAIQAAABgAAAAUAAAAoRkAABsnAABfMQAAWSkAABAAAAAmAAAACAAAAAAAAAAAAAAA"/>
               </a:ext>
             </a:extLst>
           </p:cNvSpPr>
@@ -769,7 +769,7 @@
             <a:spLocks noGrp="1" noChangeArrowheads="1"/>
             <a:extLst>
               <a:ext uri="smNativeData">
-                <pr:smNativeData xmlns:pr="smNativeData" xmlns="smNativeData" val="SMDATA_15_k0e5YxMAAAAlAAAAZAAAAA8BAAAAkAAAAEgAAACQAAAASAAAAAAAAAABAAAAAAAAAAEAAABQAAAAAAAAAAAA4D8AAAAAAADgPwAAAAAAAOA/AAAAAAAA4D8AAAAAAADgPwAAAAAAAOA/AAAAAAAA4D8AAAAAAADgPwAAAAAAAOA/AAAAAAAA4D8CAAAAjAAAAAAAAAAAAAAAM2bMDANPhAgAAAAAAAAAAAAAAAAAAAAAAAAAAAAAAAAAAAAAZAAAAAEAAABAAAAAAAAAAAAAAAAAAAAAAAAAAAAAAAAAAAAAAAAAAAAAAAAAAAAAAAAAAAAAAAAAAAAAAAAAAAAAAAAAAAAAAAAAAAAAAAAAAAAAAAAAAAAAAAAAAAAAFAAAADwAAAAAAAAAAAAAAP///wkUAAAAAQAAABQAAAAUAAAAFAAAAAEAAAAAAAAAZAAAAGQAAAAAAAAAZAAAAGQAAAAVAAAAYAAAAAAAAAAAAAAADwAAACADAAAAAAAAAAAAAAEAAACgMgAAVgcAAKr4//8BAAAAf39/AAEAAABkAAAAAAAAABQAAABAHwAAAAAAACYAAAAAAAAAwOD//wAAAAAmAAAAZAAAABYAAABMAAAAAAAAAAAAAAAEAAAAAAAAAAEAAABXiZEKAAAAACgAAAAoAAAAZAAAAGQAAAAAAAAAzMzMAAAAAABQAAAAUAAAAGQAAABkAAAAAAAAABcAAAAUAAAAAAAAAAAAAAD/fwAA/38AAAAAAAAJAAAABAAAAAAAAAAeAAAAaAAAAAAAAAAAAAAAAAAAAAAAAAAAAAAAECcAABAnAAAAAAAAAAAAAAAAAAAAAAAAAAAAAAAAAAAAAAAAAAAAABQAAAAAAAAAwMD/AAAAAABkAAAAMgAAAAAAAABkAAAAAAAAAH9/fwAKAAAAIgAAABgAAAAAAAAAAAAAAAAAAAAAAAAAAAAAAAAAAAAkAAAAJAAAAAAAAAAHAAAAAAAAAAAAAAAAAAAAAAAAAAAAAAAAAAAAf39/ACUAAABYAAAAAAAAAAAAAAAAAAAAAAAAAAAAAAAAAAAAAAAAAAAAAAAAAAAAAAAAAAAAAAA/AAAAAAAAAKCGAQAAAAAAAAAAAAAAAAAMAAAAAQAAAAAAAAAAAAAAAAAAAB8AAABUAAAAAAAABQAAAAEAAAAAAAAAAAAAAAAAAAAAAAAAAAAAAAAAAAAAAAAAAAAAAAJ/f38AAAAAA8zMzADAwP8Af39/AAAAAAAAAAAAAAAAAAAAAAAAAAAAIQAAABgAAAAUAAAAwTUAABsnAABARwAAWSkAABAAAAAmAAAACAAAAAAAAAAAAAAA"/>
+                <pr:smNativeData xmlns:pr="smNativeData" xmlns="smNativeData" val="SMDATA_15_bXy5YxMAAAAlAAAAZAAAAA8BAAAAkAAAAEgAAACQAAAASAAAAAAAAAABAAAAAAAAAAEAAABQAAAAAAAAAAAA4D8AAAAAAADgPwAAAAAAAOA/AAAAAAAA4D8AAAAAAADgPwAAAAAAAOA/AAAAAAAA4D8AAAAAAADgPwAAAAAAAOA/AAAAAAAA4D8CAAAAjAAAAAAAAAAAAAAAM2bMDANPhAgAAAAAAAAAAAAAAAAAAAAAAAAAAAAAAAAAAAAAZAAAAAEAAABAAAAAAAAAAAAAAAAAAAAAAAAAAAAAAAAAAAAAAAAAAAAAAAAAAAAAAAAAAAAAAAAAAAAAAAAAAAAAAAAAAAAAAAAAAAAAAAAAAAAAAAAAAAAAAAAAAAAAFAAAADwAAAAAAAAAAAAAAP///wkUAAAAAQAAABQAAAAUAAAAFAAAAAEAAAAAAAAAZAAAAGQAAAAAAAAAZAAAAGQAAAAVAAAAYAAAAAAAAAAAAAAADwAAACADAAAAAAAAAAAAAAEAAACgMgAAVgcAAKr4//8BAAAAf39/AAEAAABkAAAAAAAAABQAAABAHwAAAAAAACYAAAAAAAAAwOD//wAAAAAmAAAAZAAAABYAAABMAAAAAAAAAAAAAAAEAAAAAAAAAAEAAABXiZEKAAAAACgAAAAoAAAAZAAAAGQAAAAAAAAAzMzMAAAAAABQAAAAUAAAAGQAAABkAAAAAAAAABcAAAAUAAAAAAAAAAAAAAD/fwAA/38AAAAAAAAJAAAABAAAAAAAAAAeAAAAaAAAAAAAAAAAAAAAAAAAAAAAAAAAAAAAECcAABAnAAAAAAAAAAAAAAAAAAAAAAAAAAAAAAAAAAAAAAAAAAAAABQAAAAAAAAAwMD/AAAAAABkAAAAMgAAAAAAAABkAAAAAAAAAH9/fwAKAAAAIgAAABgAAAAAAAAAAAAAAAAAAAAAAAAAAAAAAAAAAAAkAAAAJAAAAAAAAAAHAAAAAAAAAAAAAAAAAAAAAAAAAAAAAAAAAAAAf39/ACUAAABYAAAAAAAAAAAAAAAAAAAAAAAAAAAAAAAAAAAAAAAAAAAAAAAAAAAAAAAAAAAAAAA/AAAAAAAAAKCGAQAAAAAAAAAAAAAAAAAMAAAAAQAAAAAAAAAAAAAAAAAAAB8AAABUAAAAAAAABQAAAAEAAAAAAAAAAAAAAAAAAAAAAAAAAAAAAAAAAAAAAAAAAAAAAAJ/f38AAAAAA8zMzADAwP8Af39/AAAAAAAAAAAAAAAAAAAAAAAAAAAAIQAAABgAAAAUAAAAwTUAABsnAABARwAAWSkAABAAAAAmAAAACAAAAAAAAAAAAAAA"/>
               </a:ext>
             </a:extLst>
           </p:cNvSpPr>
@@ -783,7 +783,7 @@
           <a:lstStyle/>
           <a:p>
             <a:pPr/>
-            <a:fld id="{2C5F857A-34C1-0A73-8FE7-C226CBA97997}" type="slidenum">
+            <a:fld id="{21AE8938-76CC-FB7F-8216-802AC75874D5}" type="slidenum">
               <a:t/>
             </a:fld>
           </a:p>
@@ -822,7 +822,7 @@
             <a:spLocks noGrp="1" noChangeArrowheads="1"/>
             <a:extLst>
               <a:ext uri="smNativeData">
-                <pr:smNativeData xmlns:pr="smNativeData" xmlns="smNativeData" val="SMDATA_15_k0e5YxMAAAAlAAAAZAAAAA8BAAAAkAAAAEgAAACQAAAASAAAAAAAAAABAAAAAAAAAAEAAABQAAAAAAAAAAAA4D8AAAAAAADgPwAAAAAAAOA/AAAAAAAA4D8AAAAAAADgPwAAAAAAAOA/AAAAAAAA4D8AAAAAAADgPwAAAAAAAOA/AAAAAAAA4D8CAAAAjAAAAAAAAAAAAAAAM2bMDANPhAgAAAAAAAAAAAAAAAAAAAAAAAAAAAAAAAAAAAAAZAAAAAEAAABAAAAAAAAAAAAAAAAAAAAAAAAAAAAAAAAAAAAAAAAAAAAAAAAAAAAAAAAAAAAAAAAAAAAAAAAAAAAAAAAAAAAAAAAAAAAAAAAAAAAAAAAAAAAAAAAAAAAAFAAAADwAAAAAAAAAAAAAAP///wkUAAAAAQAAABQAAAAUAAAAFAAAAAEAAAAAAAAAZAAAAGQAAAAAAAAAZAAAAGQAAAAVAAAAYAAAAAAAAAAAAAAADwAAACADAAAAAAAAAAAAAAEAAACgMgAAVgcAAKr4//8BAAAAf39/AAEAAABkAAAAAAAAABQAAABAHwAAAAAAACYAAAAAAAAAwOD//wAAAAAmAAAAZAAAABYAAABMAAAAAAAAAAAAAAAEAAAAAAAAAAEAAABXiZEKAAAAACgAAAAoAAAAZAAAAGQAAAAAAAAAzMzMAAAAAABQAAAAUAAAAGQAAABkAAAAAAAAABcAAAAUAAAAAAAAAAAAAAD/fwAA/38AAAAAAAAJAAAABAAAAAAAAAAeAAAAaAAAAAAAAAAAAAAAAAAAAAAAAAAAAAAAECcAABAnAAAAAAAAAAAAAAAAAAAAAAAAAAAAAAAAAAAAAAAAAAAAABQAAAAAAAAAwMD/AAAAAABkAAAAMgAAAAAAAABkAAAAAAAAAH9/fwAKAAAAIgAAABgAAAAAAAAAAAAAAAAAAAAAAAAAAAAAAAAAAAAkAAAAJAAAAAAAAAAHAAAAAAAAAAAAAAAAAAAAAAAAAAAAAAAAAAAAf39/ACUAAABYAAAAAAAAAAAAAAAAAAAAAAAAAAAAAAAAAAAAAAAAAAAAAAAAAAAAAAAAAAAAAAA/AAAAAAAAAKCGAQAAAAAAAAAAAAAAAAAMAAAAAQAAAAAAAAAAAAAAAAAAAB8AAABUAAAAAAAABQAAAAEAAAAAAAAAAAAAAAAAAAAAAAAAAAAAAAAAAAAAAAAAAAAAAAJ/f38AAAAAA8zMzADAwP8Af39/AAAAAAAAAAAAAAAAAAAAAAAAAAAAIQAAABgAAAAUAAAAwAMAALABAABARwAAuAgAABAAAAAmAAAACAAAAAAAAAAAAAAA"/>
+                <pr:smNativeData xmlns:pr="smNativeData" xmlns="smNativeData" val="SMDATA_15_bXy5YxMAAAAlAAAAZAAAAA8BAAAAkAAAAEgAAACQAAAASAAAAAAAAAABAAAAAAAAAAEAAABQAAAAAAAAAAAA4D8AAAAAAADgPwAAAAAAAOA/AAAAAAAA4D8AAAAAAADgPwAAAAAAAOA/AAAAAAAA4D8AAAAAAADgPwAAAAAAAOA/AAAAAAAA4D8CAAAAjAAAAAAAAAAAAAAAM2bMDANPhAgAAAAAAAAAAAAAAAAAAAAAAAAAAAAAAAAAAAAAZAAAAAEAAABAAAAAAAAAAAAAAAAAAAAAAAAAAAAAAAAAAAAAAAAAAAAAAAAAAAAAAAAAAAAAAAAAAAAAAAAAAAAAAAAAAAAAAAAAAAAAAAAAAAAAAAAAAAAAAAAAAAAAFAAAADwAAAAAAAAAAAAAAP///wkUAAAAAQAAABQAAAAUAAAAFAAAAAEAAAAAAAAAZAAAAGQAAAAAAAAAZAAAAGQAAAAVAAAAYAAAAAAAAAAAAAAADwAAACADAAAAAAAAAAAAAAEAAACgMgAAVgcAAKr4//8BAAAAf39/AAEAAABkAAAAAAAAABQAAABAHwAAAAAAACYAAAAAAAAAwOD//wAAAAAmAAAAZAAAABYAAABMAAAAAAAAAAAAAAAEAAAAAAAAAAEAAABXiZEKAAAAACgAAAAoAAAAZAAAAGQAAAAAAAAAzMzMAAAAAABQAAAAUAAAAGQAAABkAAAAAAAAABcAAAAUAAAAAAAAAAAAAAD/fwAA/38AAAAAAAAJAAAABAAAAAAAAAAeAAAAaAAAAAAAAAAAAAAAAAAAAAAAAAAAAAAAECcAABAnAAAAAAAAAAAAAAAAAAAAAAAAAAAAAAAAAAAAAAAAAAAAABQAAAAAAAAAwMD/AAAAAABkAAAAMgAAAAAAAABkAAAAAAAAAH9/fwAKAAAAIgAAABgAAAAAAAAAAAAAAAAAAAAAAAAAAAAAAAAAAAAkAAAAJAAAAAAAAAAHAAAAAAAAAAAAAAAAAAAAAAAAAAAAAAAAAAAAf39/ACUAAABYAAAAAAAAAAAAAAAAAAAAAAAAAAAAAAAAAAAAAAAAAAAAAAAAAAAAAAAAAAAAAAA/AAAAAAAAAKCGAQAAAAAAAAAAAAAAAAAMAAAAAQAAAAAAAAAAAAAAAAAAAB8AAABUAAAAAAAABQAAAAEAAAAAAAAAAAAAAAAAAAAAAAAAAAAAAAAAAAAAAAAAAAAAAAJ/f38AAAAAA8zMzADAwP8Af39/AAAAAAAAAAAAAAAAAAAAAAAAAAAAIQAAABgAAAAUAAAAwAMAALABAABARwAAuAgAABAAAAAmAAAACAAAAAAAAAAAAAAA"/>
               </a:ext>
             </a:extLst>
           </p:cNvSpPr>
@@ -849,7 +849,7 @@
             <a:spLocks noGrp="1" noChangeArrowheads="1"/>
             <a:extLst>
               <a:ext uri="smNativeData">
-                <pr:smNativeData xmlns:pr="smNativeData" xmlns="smNativeData" val="SMDATA_15_k0e5YxMAAAAlAAAAZAAAAA8BAAAAkAAAAEgAAACQAAAASAAAAAAAAAAAAAAAAAAAAAEAAABQAAAAAAAAAAAA4D8AAAAAAADgPwAAAAAAAOA/AAAAAAAA4D8AAAAAAADgPwAAAAAAAOA/AAAAAAAA4D8AAAAAAADgPwAAAAAAAOA/AAAAAAAA4D8CAAAAjAAAAAAAAAAAAAAAM2bMDANPhAgAAAAAAAAAAAAAAAAAAAAAAAAAAAAAAAAAAAAAZAAAAAEAAABAAAAAAAAAAAAAAAAAAAAAAAAAAAAAAAAAAAAAAAAAAAAAAAAAAAAAAAAAAAAAAAAAAAAAAAAAAAAAAAAAAAAAAAAAAAAAAAAAAAAAAAAAAAAAAAAAAAAAFAAAADwAAAAAAAAAAAAAAP///wkUAAAAAQAAABQAAAAUAAAAFAAAAAEAAAAAAAAAZAAAAGQAAAAAAAAAZAAAAGQAAAAVAAAAYAAAAAAAAAAAAAAADwAAACADAAAAAAAAAAAAAAEAAACgMgAAVgcAAKr4//8BAAAAf39/AAEAAABkAAAAAAAAABQAAABAHwAAAAAAACYAAAAAAAAAwOD//wAAAAAmAAAAZAAAABYAAABMAAAAAAAAAAAAAAAEAAAAAAAAAAEAAABXiZEKAAAAACgAAAAoAAAAZAAAAGQAAAAAAAAAzMzMAAAAAABQAAAAUAAAAGQAAABkAAAAAAAAABcAAAAUAAAAAAAAAAAAAAD/fwAA/38AAAAAAAAJAAAABAAAAAAAAAAeAAAAaAAAAAAAAAAAAAAAAAAAAAAAAAAAAAAAECcAABAnAAAAAAAAAAAAAAAAAAAAAAAAAAAAAAAAAAAAAAAAAAAAABQAAAAAAAAAwMD/AAAAAABkAAAAMgAAAAAAAABkAAAAAAAAAH9/fwAKAAAAIgAAABgAAAAAAAAAAAAAAAAAAAAAAAAAAAAAAAAAAAAkAAAAJAAAAAAAAAAHAAAAAAAAAAAAAAAAAAAAAAAAAAAAAAAAAAAAf39/ACUAAABYAAAAAAAAAAAAAAAAAAAAAAAAAAAAAAAAAAAAAAAAAAAAAAAAAAAAAAAAAAAAAAA/AAAAAAAAAKCGAQAAAAAAAAAAAAAAAAAMAAAAAQAAAAAAAAAAAAAAAAAAAB8AAABUAAAAAAAABQAAAAEAAAAAAAAAAAAAAAAAAAAAAAAAAAAAAAAAAAAAAAAAAAAAAAJ/f38AAAAAA8zMzADAwP8Af39/AAAAAAAAAAAAAAAAAAAAAAAAAAAAIQAAABgAAAAUAAAAwAMAANgJAABARwAAsCUAABAAAAAmAAAACAAAAAAAAAAAAAAA"/>
+                <pr:smNativeData xmlns:pr="smNativeData" xmlns="smNativeData" val="SMDATA_15_bXy5YxMAAAAlAAAAZAAAAA8BAAAAkAAAAEgAAACQAAAASAAAAAAAAAAAAAAAAAAAAAEAAABQAAAAAAAAAAAA4D8AAAAAAADgPwAAAAAAAOA/AAAAAAAA4D8AAAAAAADgPwAAAAAAAOA/AAAAAAAA4D8AAAAAAADgPwAAAAAAAOA/AAAAAAAA4D8CAAAAjAAAAAAAAAAAAAAAM2bMDANPhAgAAAAAAAAAAAAAAAAAAAAAAAAAAAAAAAAAAAAAZAAAAAEAAABAAAAAAAAAAAAAAAAAAAAAAAAAAAAAAAAAAAAAAAAAAAAAAAAAAAAAAAAAAAAAAAAAAAAAAAAAAAAAAAAAAAAAAAAAAAAAAAAAAAAAAAAAAAAAAAAAAAAAFAAAADwAAAAAAAAAAAAAAP///wkUAAAAAQAAABQAAAAUAAAAFAAAAAEAAAAAAAAAZAAAAGQAAAAAAAAAZAAAAGQAAAAVAAAAYAAAAAAAAAAAAAAADwAAACADAAAAAAAAAAAAAAEAAACgMgAAVgcAAKr4//8BAAAAf39/AAEAAABkAAAAAAAAABQAAABAHwAAAAAAACYAAAAAAAAAwOD//wAAAAAmAAAAZAAAABYAAABMAAAAAAAAAAAAAAAEAAAAAAAAAAEAAABXiZEKAAAAACgAAAAoAAAAZAAAAGQAAAAAAAAAzMzMAAAAAABQAAAAUAAAAGQAAABkAAAAAAAAABcAAAAUAAAAAAAAAAAAAAD/fwAA/38AAAAAAAAJAAAABAAAAAAAAAAeAAAAaAAAAAAAAAAAAAAAAAAAAAAAAAAAAAAAECcAABAnAAAAAAAAAAAAAAAAAAAAAAAAAAAAAAAAAAAAAAAAAAAAABQAAAAAAAAAwMD/AAAAAABkAAAAMgAAAAAAAABkAAAAAAAAAH9/fwAKAAAAIgAAABgAAAAAAAAAAAAAAAAAAAAAAAAAAAAAAAAAAAAkAAAAJAAAAAAAAAAHAAAAAAAAAAAAAAAAAAAAAAAAAAAAAAAAAAAAf39/ACUAAABYAAAAAAAAAAAAAAAAAAAAAAAAAAAAAAAAAAAAAAAAAAAAAAAAAAAAAAAAAAAAAAA/AAAAAAAAAKCGAQAAAAAAAAAAAAAAAAAMAAAAAQAAAAAAAAAAAAAAAAAAAB8AAABUAAAAAAAABQAAAAEAAAAAAAAAAAAAAAAAAAAAAAAAAAAAAAAAAAAAAAAAAAAAAAJ/f38AAAAAA8zMzADAwP8Af39/AAAAAAAAAAAAAAAAAAAAAAAAAAAAIQAAABgAAAAUAAAAwAMAANgJAABARwAAsCUAABAAAAAmAAAACAAAAAAAAAAAAAAA"/>
               </a:ext>
             </a:extLst>
           </p:cNvSpPr>
@@ -900,7 +900,7 @@
             <a:spLocks noGrp="1" noChangeArrowheads="1"/>
             <a:extLst>
               <a:ext uri="smNativeData">
-                <pr:smNativeData xmlns:pr="smNativeData" xmlns="smNativeData" val="SMDATA_15_k0e5YxMAAAAlAAAAZAAAAA8BAAAAkAAAAEgAAACQAAAASAAAAAAAAAABAAAAAAAAAAEAAABQAAAAAAAAAAAA4D8AAAAAAADgPwAAAAAAAOA/AAAAAAAA4D8AAAAAAADgPwAAAAAAAOA/AAAAAAAA4D8AAAAAAADgPwAAAAAAAOA/AAAAAAAA4D8CAAAAjAAAAAAAAAAAAAAAM2bMDANPhAgAAAAAAAAAAAAAAAAAAAAAAAAAAAAAAAAAAAAAZAAAAAEAAABAAAAAAAAAAAAAAAAAAAAAAAAAAAAAAAAAAAAAAAAAAAAAAAAAAAAAAAAAAAAAAAAAAAAAAAAAAAAAAAAAAAAAAAAAAAAAAAAAAAAAAAAAAAAAAAAAAAAAFAAAADwAAAAAAAAAAAAAAP///wkUAAAAAQAAABQAAAAUAAAAFAAAAAEAAAAAAAAAZAAAAGQAAAAAAAAAZAAAAGQAAAAVAAAAYAAAAAAAAAAAAAAADwAAACADAAAAAAAAAAAAAAEAAACgMgAAVgcAAKr4//8BAAAAf39/AAEAAABkAAAAAAAAABQAAABAHwAAAAAAACYAAAAAAAAAwOD//wAAAAAmAAAAZAAAABYAAABMAAAAAAAAAAAAAAAEAAAAAAAAAAEAAABXiZEKAAAAACgAAAAoAAAAZAAAAGQAAAAAAAAAzMzMAAAAAABQAAAAUAAAAGQAAABkAAAAAAAAABcAAAAUAAAAAAAAAAAAAAD/fwAA/38AAAAAAAAJAAAABAAAANw7IAEeAAAAaAAAAAAAAAAAAAAAAAAAAAAAAAAAAAAAECcAABAnAAAAAAAAAAAAAAAAAAAAAAAAAAAAAAAAAAAAAAAAAAAAABQAAAAAAAAAwMD/AAAAAABkAAAAMgAAAAAAAABkAAAAAAAAAH9/fwAKAAAAIgAAABgAAAAAAAAAAAAAAAAAAAAAAAAAAAAAAAAAAAAkAAAAJAAAAAAAAAAHAAAAAAAAAAAAAAAAAAAAAAAAAAAAAAAAAAAAf39/ACUAAABYAAAAAAAAAAAAAAAAAAAAAAAAAAAAAAAAAAAAAAAAAAAAAAAAAAAAAAAAAAAAAAA/AAAAAAAAAKCGAQAAAAAAAAAAAAAAAAAMAAAAAQAAAAAAAAAAAAAAAAAAAB8AAABUAAAAAAAABQAAAAEAAAAAAAAAAAAAAAAAAAAAAAAAAAAAAAAAAAAAAAAAAAAAAAJ/f38AAAAAA8zMzADAwP8Af39/AAAAAAAAAAAAAAAAAAAAAAAAAAAAIQAAABgAAAAUAAAAwAMAABsnAAA/FQAAWSkAABAAAAAmAAAACAAAAAAAAAAAAAAA"/>
+                <pr:smNativeData xmlns:pr="smNativeData" xmlns="smNativeData" val="SMDATA_15_bXy5YxMAAAAlAAAAZAAAAA8BAAAAkAAAAEgAAACQAAAASAAAAAAAAAABAAAAAAAAAAEAAABQAAAAAAAAAAAA4D8AAAAAAADgPwAAAAAAAOA/AAAAAAAA4D8AAAAAAADgPwAAAAAAAOA/AAAAAAAA4D8AAAAAAADgPwAAAAAAAOA/AAAAAAAA4D8CAAAAjAAAAAAAAAAAAAAAM2bMDANPhAgAAAAAAAAAAAAAAAAAAAAAAAAAAAAAAAAAAAAAZAAAAAEAAABAAAAAAAAAAAAAAAAAAAAAAAAAAAAAAAAAAAAAAAAAAAAAAAAAAAAAAAAAAAAAAAAAAAAAAAAAAAAAAAAAAAAAAAAAAAAAAAAAAAAAAAAAAAAAAAAAAAAAFAAAADwAAAAAAAAAAAAAAP///wkUAAAAAQAAABQAAAAUAAAAFAAAAAEAAAAAAAAAZAAAAGQAAAAAAAAAZAAAAGQAAAAVAAAAYAAAAAAAAAAAAAAADwAAACADAAAAAAAAAAAAAAEAAACgMgAAVgcAAKr4//8BAAAAf39/AAEAAABkAAAAAAAAABQAAABAHwAAAAAAACYAAAAAAAAAwOD//wAAAAAmAAAAZAAAABYAAABMAAAAAAAAAAAAAAAEAAAAAAAAAAEAAABXiZEKAAAAACgAAAAoAAAAZAAAAGQAAAAAAAAAzMzMAAAAAABQAAAAUAAAAGQAAABkAAAAAAAAABcAAAAUAAAAAAAAAAAAAAD/fwAA/38AAAAAAAAJAAAABAAAANw7IAEeAAAAaAAAAAAAAAAAAAAAAAAAAAAAAAAAAAAAECcAABAnAAAAAAAAAAAAAAAAAAAAAAAAAAAAAAAAAAAAAAAAAAAAABQAAAAAAAAAwMD/AAAAAABkAAAAMgAAAAAAAABkAAAAAAAAAH9/fwAKAAAAIgAAABgAAAAAAAAAAAAAAAAAAAAAAAAAAAAAAAAAAAAkAAAAJAAAAAAAAAAHAAAAAAAAAAAAAAAAAAAAAAAAAAAAAAAAAAAAf39/ACUAAABYAAAAAAAAAAAAAAAAAAAAAAAAAAAAAAAAAAAAAAAAAAAAAAAAAAAAAAAAAAAAAAA/AAAAAAAAAKCGAQAAAAAAAAAAAAAAAAAMAAAAAQAAAAAAAAAAAAAAAAAAAB8AAABUAAAAAAAABQAAAAEAAAAAAAAAAAAAAAAAAAAAAAAAAAAAAAAAAAAAAAAAAAAAAAJ/f38AAAAAA8zMzADAwP8Af39/AAAAAAAAAAAAAAAAAAAAAAAAAAAAIQAAABgAAAAUAAAAwAMAABsnAAA/FQAAWSkAABAAAAAmAAAACAAAAAAAAAAAAAAA"/>
               </a:ext>
             </a:extLst>
           </p:cNvSpPr>
@@ -914,7 +914,7 @@
           <a:lstStyle/>
           <a:p>
             <a:pPr/>
-            <a:fld id="{2C5F8B03-4DC1-0A7D-8FE7-BB28C5A979EE}" type="datetime1">
+            <a:fld id="{16F32C17-59FB-A6DA-B54B-AF8F620543FA}" type="datetime1">
               <a:t/>
             </a:fld>
           </a:p>
@@ -927,7 +927,7 @@
             <a:spLocks noGrp="1" noChangeArrowheads="1"/>
             <a:extLst>
               <a:ext uri="smNativeData">
-                <pr:smNativeData xmlns:pr="smNativeData" xmlns="smNativeData" val="SMDATA_15_k0e5YxMAAAAlAAAAZAAAAA8BAAAAkAAAAEgAAACQAAAASAAAAAAAAAABAAAAAAAAAAEAAABQAAAAAAAAAAAA4D8AAAAAAADgPwAAAAAAAOA/AAAAAAAA4D8AAAAAAADgPwAAAAAAAOA/AAAAAAAA4D8AAAAAAADgPwAAAAAAAOA/AAAAAAAA4D8CAAAAjAAAAAAAAAAAAAAAM2bMDANPhAgAAAAAAAAAAAAAAAAAAAAAAAAAAAAAAAAAAAAAZAAAAAEAAABAAAAAAAAAAAAAAAAAAAAAAAAAAAAAAAAAAAAAAAAAAAAAAAAAAAAAAAAAAAAAAAAAAAAAAAAAAAAAAAAAAAAAAAAAAAAAAAAAAAAAAAAAAAAAAAAAAAAAFAAAADwAAAAAAAAAAAAAAP///wkUAAAAAQAAABQAAAAUAAAAFAAAAAEAAAAAAAAAZAAAAGQAAAAAAAAAZAAAAGQAAAAVAAAAYAAAAAAAAAAAAAAADwAAACADAAAAAAAAAAAAAAEAAACgMgAAVgcAAKr4//8BAAAAf39/AAEAAABkAAAAAAAAABQAAABAHwAAAAAAACYAAAAAAAAAwOD//wAAAAAmAAAAZAAAABYAAABMAAAAAAAAAAAAAAAEAAAAAAAAAAEAAABXiZEKAAAAACgAAAAoAAAAZAAAAGQAAAAAAAAAzMzMAAAAAABQAAAAUAAAAGQAAABkAAAAAAAAABcAAAAUAAAAAAAAAAAAAAD/fwAA/38AAAAAAAAJAAAABAAAANw7IAEeAAAAaAAAAAAAAAAAAAAAAAAAAAAAAAAAAAAAECcAABAnAAAAAAAAAAAAAAAAAAAAAAAAAAAAAAAAAAAAAAAAAAAAABQAAAAAAAAAwMD/AAAAAABkAAAAMgAAAAAAAABkAAAAAAAAAH9/fwAKAAAAIgAAABgAAAAAAAAAAAAAAAAAAAAAAAAAAAAAAAAAAAAkAAAAJAAAAAAAAAAHAAAAAAAAAAAAAAAAAAAAAAAAAAAAAAAAAAAAf39/ACUAAABYAAAAAAAAAAAAAAAAAAAAAAAAAAAAAAAAAAAAAAAAAAAAAAAAAAAAAAAAAAAAAAA/AAAAAAAAAKCGAQAAAAAAAAAAAAAAAAAMAAAAAQAAAAAAAAAAAAAAAAAAAB8AAABUAAAAAAAABQAAAAEAAAAAAAAAAAAAAAAAAAAAAAAAAAAAAAAAAAAAAAAAAAAAAAJ/f38AAAAAA8zMzADAwP8Af39/AAAAAAAAAAAAAAAAAAAAAAAAAAAAIQAAABgAAAAUAAAAoRkAABsnAABfMQAAWSkAABAAAAAmAAAACAAAAAAAAAAAAAAA"/>
+                <pr:smNativeData xmlns:pr="smNativeData" xmlns="smNativeData" val="SMDATA_15_bXy5YxMAAAAlAAAAZAAAAA8BAAAAkAAAAEgAAACQAAAASAAAAAAAAAABAAAAAAAAAAEAAABQAAAAAAAAAAAA4D8AAAAAAADgPwAAAAAAAOA/AAAAAAAA4D8AAAAAAADgPwAAAAAAAOA/AAAAAAAA4D8AAAAAAADgPwAAAAAAAOA/AAAAAAAA4D8CAAAAjAAAAAAAAAAAAAAAM2bMDANPhAgAAAAAAAAAAAAAAAAAAAAAAAAAAAAAAAAAAAAAZAAAAAEAAABAAAAAAAAAAAAAAAAAAAAAAAAAAAAAAAAAAAAAAAAAAAAAAAAAAAAAAAAAAAAAAAAAAAAAAAAAAAAAAAAAAAAAAAAAAAAAAAAAAAAAAAAAAAAAAAAAAAAAFAAAADwAAAAAAAAAAAAAAP///wkUAAAAAQAAABQAAAAUAAAAFAAAAAEAAAAAAAAAZAAAAGQAAAAAAAAAZAAAAGQAAAAVAAAAYAAAAAAAAAAAAAAADwAAACADAAAAAAAAAAAAAAEAAACgMgAAVgcAAKr4//8BAAAAf39/AAEAAABkAAAAAAAAABQAAABAHwAAAAAAACYAAAAAAAAAwOD//wAAAAAmAAAAZAAAABYAAABMAAAAAAAAAAAAAAAEAAAAAAAAAAEAAABXiZEKAAAAACgAAAAoAAAAZAAAAGQAAAAAAAAAzMzMAAAAAABQAAAAUAAAAGQAAABkAAAAAAAAABcAAAAUAAAAAAAAAAAAAAD/fwAA/38AAAAAAAAJAAAABAAAANw7IAEeAAAAaAAAAAAAAAAAAAAAAAAAAAAAAAAAAAAAECcAABAnAAAAAAAAAAAAAAAAAAAAAAAAAAAAAAAAAAAAAAAAAAAAABQAAAAAAAAAwMD/AAAAAABkAAAAMgAAAAAAAABkAAAAAAAAAH9/fwAKAAAAIgAAABgAAAAAAAAAAAAAAAAAAAAAAAAAAAAAAAAAAAAkAAAAJAAAAAAAAAAHAAAAAAAAAAAAAAAAAAAAAAAAAAAAAAAAAAAAf39/ACUAAABYAAAAAAAAAAAAAAAAAAAAAAAAAAAAAAAAAAAAAAAAAAAAAAAAAAAAAAAAAAAAAAA/AAAAAAAAAKCGAQAAAAAAAAAAAAAAAAAMAAAAAQAAAAAAAAAAAAAAAAAAAB8AAABUAAAAAAAABQAAAAEAAAAAAAAAAAAAAAAAAAAAAAAAAAAAAAAAAAAAAAAAAAAAAAJ/f38AAAAAA8zMzADAwP8Af39/AAAAAAAAAAAAAAAAAAAAAAAAAAAAIQAAABgAAAAUAAAAoRkAABsnAABfMQAAWSkAABAAAAAmAAAACAAAAAAAAAAAAAAA"/>
               </a:ext>
             </a:extLst>
           </p:cNvSpPr>
@@ -951,7 +951,7 @@
             <a:spLocks noGrp="1" noChangeArrowheads="1"/>
             <a:extLst>
               <a:ext uri="smNativeData">
-                <pr:smNativeData xmlns:pr="smNativeData" xmlns="smNativeData" val="SMDATA_15_k0e5YxMAAAAlAAAAZAAAAA8BAAAAkAAAAEgAAACQAAAASAAAAAAAAAABAAAAAAAAAAEAAABQAAAAAAAAAAAA4D8AAAAAAADgPwAAAAAAAOA/AAAAAAAA4D8AAAAAAADgPwAAAAAAAOA/AAAAAAAA4D8AAAAAAADgPwAAAAAAAOA/AAAAAAAA4D8CAAAAjAAAAAAAAAAAAAAAM2bMDANPhAgAAAAAAAAAAAAAAAAAAAAAAAAAAAAAAAAAAAAAZAAAAAEAAABAAAAAAAAAAAAAAAAAAAAAAAAAAAAAAAAAAAAAAAAAAAAAAAAAAAAAAAAAAAAAAAAAAAAAAAAAAAAAAAAAAAAAAAAAAAAAAAAAAAAAAAAAAAAAAAAAAAAAFAAAADwAAAAAAAAAAAAAAP///wkUAAAAAQAAABQAAAAUAAAAFAAAAAEAAAAAAAAAZAAAAGQAAAAAAAAAZAAAAGQAAAAVAAAAYAAAAAAAAAAAAAAADwAAACADAAAAAAAAAAAAAAEAAACgMgAAVgcAAKr4//8BAAAAf39/AAEAAABkAAAAAAAAABQAAABAHwAAAAAAACYAAAAAAAAAwOD//wAAAAAmAAAAZAAAABYAAABMAAAAAAAAAAAAAAAEAAAAAAAAAAEAAABXiZEKAAAAACgAAAAoAAAAZAAAAGQAAAAAAAAAzMzMAAAAAABQAAAAUAAAAGQAAABkAAAAAAAAABcAAAAUAAAAAAAAAAAAAAD/fwAA/38AAAAAAAAJAAAABAAAAAAAAAAeAAAAaAAAAAAAAAAAAAAAAAAAAAAAAAAAAAAAECcAABAnAAAAAAAAAAAAAAAAAAAAAAAAAAAAAAAAAAAAAAAAAAAAABQAAAAAAAAAwMD/AAAAAABkAAAAMgAAAAAAAABkAAAAAAAAAH9/fwAKAAAAIgAAABgAAAAAAAAAAAAAAAAAAAAAAAAAAAAAAAAAAAAkAAAAJAAAAAAAAAAHAAAAAAAAAAAAAAAAAAAAAAAAAAAAAAAAAAAAf39/ACUAAABYAAAAAAAAAAAAAAAAAAAAAAAAAAAAAAAAAAAAAAAAAAAAAAAAAAAAAAAAAAAAAAA/AAAAAAAAAKCGAQAAAAAAAAAAAAAAAAAMAAAAAQAAAAAAAAAAAAAAAAAAAB8AAABUAAAAAAAABQAAAAEAAAAAAAAAAAAAAAAAAAAAAAAAAAAAAAAAAAAAAAAAAAAAAAJ/f38AAAAAA8zMzADAwP8Af39/AAAAAAAAAAAAAAAAAAAAAAAAAAAAIQAAABgAAAAUAAAAwTUAABsnAABARwAAWSkAABAAAAAmAAAACAAAAAAAAAAAAAAA"/>
+                <pr:smNativeData xmlns:pr="smNativeData" xmlns="smNativeData" val="SMDATA_15_bXy5YxMAAAAlAAAAZAAAAA8BAAAAkAAAAEgAAACQAAAASAAAAAAAAAABAAAAAAAAAAEAAABQAAAAAAAAAAAA4D8AAAAAAADgPwAAAAAAAOA/AAAAAAAA4D8AAAAAAADgPwAAAAAAAOA/AAAAAAAA4D8AAAAAAADgPwAAAAAAAOA/AAAAAAAA4D8CAAAAjAAAAAAAAAAAAAAAM2bMDANPhAgAAAAAAAAAAAAAAAAAAAAAAAAAAAAAAAAAAAAAZAAAAAEAAABAAAAAAAAAAAAAAAAAAAAAAAAAAAAAAAAAAAAAAAAAAAAAAAAAAAAAAAAAAAAAAAAAAAAAAAAAAAAAAAAAAAAAAAAAAAAAAAAAAAAAAAAAAAAAAAAAAAAAFAAAADwAAAAAAAAAAAAAAP///wkUAAAAAQAAABQAAAAUAAAAFAAAAAEAAAAAAAAAZAAAAGQAAAAAAAAAZAAAAGQAAAAVAAAAYAAAAAAAAAAAAAAADwAAACADAAAAAAAAAAAAAAEAAACgMgAAVgcAAKr4//8BAAAAf39/AAEAAABkAAAAAAAAABQAAABAHwAAAAAAACYAAAAAAAAAwOD//wAAAAAmAAAAZAAAABYAAABMAAAAAAAAAAAAAAAEAAAAAAAAAAEAAABXiZEKAAAAACgAAAAoAAAAZAAAAGQAAAAAAAAAzMzMAAAAAABQAAAAUAAAAGQAAABkAAAAAAAAABcAAAAUAAAAAAAAAAAAAAD/fwAA/38AAAAAAAAJAAAABAAAAAAAAAAeAAAAaAAAAAAAAAAAAAAAAAAAAAAAAAAAAAAAECcAABAnAAAAAAAAAAAAAAAAAAAAAAAAAAAAAAAAAAAAAAAAAAAAABQAAAAAAAAAwMD/AAAAAABkAAAAMgAAAAAAAABkAAAAAAAAAH9/fwAKAAAAIgAAABgAAAAAAAAAAAAAAAAAAAAAAAAAAAAAAAAAAAAkAAAAJAAAAAAAAAAHAAAAAAAAAAAAAAAAAAAAAAAAAAAAAAAAAAAAf39/ACUAAABYAAAAAAAAAAAAAAAAAAAAAAAAAAAAAAAAAAAAAAAAAAAAAAAAAAAAAAAAAAAAAAA/AAAAAAAAAKCGAQAAAAAAAAAAAAAAAAAMAAAAAQAAAAAAAAAAAAAAAAAAAB8AAABUAAAAAAAABQAAAAEAAAAAAAAAAAAAAAAAAAAAAAAAAAAAAAAAAAAAAAAAAAAAAAJ/f38AAAAAA8zMzADAwP8Af39/AAAAAAAAAAAAAAAAAAAAAAAAAAAAIQAAABgAAAAUAAAAwTUAABsnAABARwAAWSkAABAAAAAmAAAACAAAAAAAAAAAAAAA"/>
               </a:ext>
             </a:extLst>
           </p:cNvSpPr>
@@ -965,7 +965,7 @@
           <a:lstStyle/>
           <a:p>
             <a:pPr/>
-            <a:fld id="{2C5F835A-14C1-0A75-8FE7-E220CDA979B7}" type="slidenum">
+            <a:fld id="{154A544F-01F8-1FA2-B6F2-F7F71ABC40A2}" type="slidenum">
               <a:t/>
             </a:fld>
           </a:p>
@@ -1004,7 +1004,7 @@
             <a:spLocks noGrp="1" noChangeArrowheads="1"/>
             <a:extLst>
               <a:ext uri="smNativeData">
-                <pr:smNativeData xmlns:pr="smNativeData" xmlns="smNativeData" val="SMDATA_15_k0e5YxMAAAAlAAAAZAAAAA8BAAAAkAAAAEgAAACQAAAASAAAAAAAAAAAAAAAAAAAAAEAAABQAAAAAAAAAAAA4D8AAAAAAADgPwAAAAAAAOA/AAAAAAAA4D8AAAAAAADgPwAAAAAAAOA/AAAAAAAA4D8AAAAAAADgPwAAAAAAAOA/AAAAAAAA4D8CAAAAjAAAAAAAAAAAAAAAM2bMDANPhAgAAAAAAAAAAAAAAAAAAAAAAAAAAAAAAAAAAAAAZAAAAAEAAABAAAAAAAAAAAAAAAAAAAAAAAAAAAAAAAAAAAAAAAAAAAAAAAAAAAAAAAAAAAAAAAAAAAAAAAAAAAAAAAAAAAAAAAAAAAAAAAAAAAAAAAAAAAAAAAAAAAAAFAAAADwAAAAAAAAAAAAAAP///wkUAAAAAQAAABQAAAAUAAAAFAAAAAEAAAAAAAAAZAAAAGQAAAAAAAAAZAAAAGQAAAAVAAAAYAAAAAAAAAAAAAAADwAAACADAAAAAAAAAAAAAAEAAACgMgAAVgcAAKr4//8BAAAAf39/AAEAAABkAAAAAAAAABQAAABAHwAAAAAAACYAAAAAAAAAwOD//wAAAAAmAAAAZAAAABYAAABMAAAAAAAAAAAAAAAEAAAAAAAAAAEAAABXiZEKAAAAACgAAAAoAAAAZAAAAGQAAAAAAAAAzMzMAAAAAABQAAAAUAAAAGQAAABkAAAAAAAAABcAAAAUAAAAAAAAAAAAAAD/fwAA/38AAAAAAAAJAAAABAAAANw7IAEeAAAAaAAAAAAAAAAAAAAAAAAAAAAAAAAAAAAAECcAABAnAAAAAAAAAAAAAAAAAAAAAAAAAAAAAAAAAAAAAAAAAAAAABQAAAAAAAAAwMD/AAAAAABkAAAAMgAAAAAAAABkAAAAAAAAAH9/fwAKAAAAIgAAABgAAAAAAAAAAAAAAAAAAAAAAAAAAAAAAAAAAAAkAAAAJAAAAAAAAAAHAAAAAAAAAAAAAAAAAAAAAAAAAAAAAAAAAAAAf39/ACUAAABYAAAAAAAAAAAAAAAAAAAAAAAAAAAAAAAAAAAAAAAAAAAAAAAAAAAAAAAAAAAAAAA/AAAAAAAAAKCGAQAAAAAAAAAAAAAAAAAMAAAAAQAAAAAAAAAAAAAAAAAAAB8AAABUAAAAAAAABQAAAAEAAAAAAAAAAAAAAAAAAAAAAAAAAAAAAAAAAAAAAAAAAAAAAAJ/f38AAAAAA8zMzADAwP8Af39/AAAAAAAAAAAAAAAAAAAAAAAAAAAAIQAAABgAAAAUAAAA7QUAABwbAACtRQAAfSMAABAAAAAmAAAACAAAAIGAAAAAAAAA"/>
+                <pr:smNativeData xmlns:pr="smNativeData" xmlns="smNativeData" val="SMDATA_15_bXy5YxMAAAAlAAAAZAAAAA8BAAAAkAAAAEgAAACQAAAASAAAAAAAAAAAAAAAAAAAAAEAAABQAAAAAAAAAAAA4D8AAAAAAADgPwAAAAAAAOA/AAAAAAAA4D8AAAAAAADgPwAAAAAAAOA/AAAAAAAA4D8AAAAAAADgPwAAAAAAAOA/AAAAAAAA4D8CAAAAjAAAAAAAAAAAAAAAM2bMDANPhAgAAAAAAAAAAAAAAAAAAAAAAAAAAAAAAAAAAAAAZAAAAAEAAABAAAAAAAAAAAAAAAAAAAAAAAAAAAAAAAAAAAAAAAAAAAAAAAAAAAAAAAAAAAAAAAAAAAAAAAAAAAAAAAAAAAAAAAAAAAAAAAAAAAAAAAAAAAAAAAAAAAAAFAAAADwAAAAAAAAAAAAAAP///wkUAAAAAQAAABQAAAAUAAAAFAAAAAEAAAAAAAAAZAAAAGQAAAAAAAAAZAAAAGQAAAAVAAAAYAAAAAAAAAAAAAAADwAAACADAAAAAAAAAAAAAAEAAACgMgAAVgcAAKr4//8BAAAAf39/AAEAAABkAAAAAAAAABQAAABAHwAAAAAAACYAAAAAAAAAwOD//wAAAAAmAAAAZAAAABYAAABMAAAAAAAAAAAAAAAEAAAAAAAAAAEAAABXiZEKAAAAACgAAAAoAAAAZAAAAGQAAAAAAAAAzMzMAAAAAABQAAAAUAAAAGQAAABkAAAAAAAAABcAAAAUAAAAAAAAAAAAAAD/fwAA/38AAAAAAAAJAAAABAAAANw7IAEeAAAAaAAAAAAAAAAAAAAAAAAAAAAAAAAAAAAAECcAABAnAAAAAAAAAAAAAAAAAAAAAAAAAAAAAAAAAAAAAAAAAAAAABQAAAAAAAAAwMD/AAAAAABkAAAAMgAAAAAAAABkAAAAAAAAAH9/fwAKAAAAIgAAABgAAAAAAAAAAAAAAAAAAAAAAAAAAAAAAAAAAAAkAAAAJAAAAAAAAAAHAAAAAAAAAAAAAAAAAAAAAAAAAAAAAAAAAAAAf39/ACUAAABYAAAAAAAAAAAAAAAAAAAAAAAAAAAAAAAAAAAAAAAAAAAAAAAAAAAAAAAAAAAAAAA/AAAAAAAAAKCGAQAAAAAAAAAAAAAAAAAMAAAAAQAAAAAAAAAAAAAAAAAAAB8AAABUAAAAAAAABQAAAAEAAAAAAAAAAAAAAAAAAAAAAAAAAAAAAAAAAAAAAAAAAAAAAAJ/f38AAAAAA8zMzADAwP8Af39/AAAAAAAAAAAAAAAAAAAAAAAAAAAAIQAAABgAAAAUAAAA7QUAABwbAACtRQAAfSMAABAAAAAmAAAACAAAAIGAAAAAAAAA"/>
               </a:ext>
             </a:extLst>
           </p:cNvSpPr>
@@ -1044,7 +1044,7 @@
             <a:spLocks noGrp="1" noChangeArrowheads="1"/>
             <a:extLst>
               <a:ext uri="smNativeData">
-                <pr:smNativeData xmlns:pr="smNativeData" xmlns="smNativeData" val="SMDATA_15_k0e5YxMAAAAlAAAAZAAAAA8BAAAAkAAAAEgAAACQAAAASAAAAAAAAAACAAAAAAAAAAEAAABQAAAAAAAAAAAA4D8AAAAAAADgPwAAAAAAAOA/AAAAAAAA4D8AAAAAAADgPwAAAAAAAOA/AAAAAAAA4D8AAAAAAADgPwAAAAAAAOA/AAAAAAAA4D8CAAAAjAAAAAAAAAAAAAAAM2bMDANPhAgAAAAAAAAAAAAAAAAAAAAAAAAAAAAAAAAAAAAAZAAAAAEAAABAAAAAAAAAAAAAAAAAAAAAAAAAAAAAAAAAAAAAAAAAAAAAAAAAAAAAAAAAAAAAAAAAAAAAAAAAAAAAAAAAAAAAAAAAAAAAAAAAAAAAAAAAAAAAAAAAAAAAFAAAADwAAAAAAAAAAAAAAP///wkUAAAAAQAAABQAAAAUAAAAFAAAAAEAAAAAAAAAZAAAAGQAAAAAAAAAZAAAAGQAAAAVAAAAYAAAAAAAAAAAAAAADwAAACADAAAAAAAAAAAAAAEAAACgMgAAVgcAAKr4//8BAAAAf39/AAEAAABkAAAAAAAAABQAAABAHwAAAAAAACYAAAAAAAAAwOD//wAAAAAmAAAAZAAAABYAAABMAAAAAAAAAAAAAAAEAAAAAAAAAAEAAABXiZEKAAAAACgAAAAoAAAAZAAAAGQAAAAAAAAAzMzMAAAAAABQAAAAUAAAAGQAAABkAAAAAAAAABcAAAAUAAAAAAAAAAAAAAD/fwAA/38AAAAAAAAJAAAABAAAANw7IAEeAAAAaAAAAAAAAAAAAAAAAAAAAAAAAAAAAAAAECcAABAnAAAAAAAAAAAAAAAAAAAAAAAAAAAAAAAAAAAAAAAAAAAAABQAAAAAAAAAwMD/AAAAAABkAAAAMgAAAAAAAABkAAAAAAAAAH9/fwAKAAAAIgAAABgAAAAAAAAAAAAAAAAAAAAAAAAAAAAAAAAAAAAkAAAAJAAAAAAAAAAHAAAAAAAAAAAAAAAAAAAAAAAAAAAAAAAAAAAAf39/ACUAAABYAAAAAAAAAAAAAAAAAAAAAAAAAAAAAAAAAAAAAAAAAAAAAAAAAAAAAAAAAAAAAAA/AAAAAAAAAKCGAQAAAAAAAAAAAAAAAAAMAAAAAQAAAAAAAAAAAAAAAAAAAB8AAABUAAAAAAAABQAAAAEAAAAAAAAAAAAAAAAAAAAAAAAAAAAAAAAAAAAAAAAAAAAAAAJ/f38AAAAAA8zMzADAwP8Af39/AAAAAAAAAAAAAAAAAAAAAAAAAAAAIQAAABgAAAAUAAAA7QUAAOERAACtRQAAHBsAABAAAAAmAAAACAAAAIGAAAAAAAAA"/>
+                <pr:smNativeData xmlns:pr="smNativeData" xmlns="smNativeData" val="SMDATA_15_bXy5YxMAAAAlAAAAZAAAAA8BAAAAkAAAAEgAAACQAAAASAAAAAAAAAACAAAAAAAAAAEAAABQAAAAAAAAAAAA4D8AAAAAAADgPwAAAAAAAOA/AAAAAAAA4D8AAAAAAADgPwAAAAAAAOA/AAAAAAAA4D8AAAAAAADgPwAAAAAAAOA/AAAAAAAA4D8CAAAAjAAAAAAAAAAAAAAAM2bMDANPhAgAAAAAAAAAAAAAAAAAAAAAAAAAAAAAAAAAAAAAZAAAAAEAAABAAAAAAAAAAAAAAAAAAAAAAAAAAAAAAAAAAAAAAAAAAAAAAAAAAAAAAAAAAAAAAAAAAAAAAAAAAAAAAAAAAAAAAAAAAAAAAAAAAAAAAAAAAAAAAAAAAAAAFAAAADwAAAAAAAAAAAAAAP///wkUAAAAAQAAABQAAAAUAAAAFAAAAAEAAAAAAAAAZAAAAGQAAAAAAAAAZAAAAGQAAAAVAAAAYAAAAAAAAAAAAAAADwAAACADAAAAAAAAAAAAAAEAAACgMgAAVgcAAKr4//8BAAAAf39/AAEAAABkAAAAAAAAABQAAABAHwAAAAAAACYAAAAAAAAAwOD//wAAAAAmAAAAZAAAABYAAABMAAAAAAAAAAAAAAAEAAAAAAAAAAEAAABXiZEKAAAAACgAAAAoAAAAZAAAAGQAAAAAAAAAzMzMAAAAAABQAAAAUAAAAGQAAABkAAAAAAAAABcAAAAUAAAAAAAAAAAAAAD/fwAA/38AAAAAAAAJAAAABAAAANw7IAEeAAAAaAAAAAAAAAAAAAAAAAAAAAAAAAAAAAAAECcAABAnAAAAAAAAAAAAAAAAAAAAAAAAAAAAAAAAAAAAAAAAAAAAABQAAAAAAAAAwMD/AAAAAABkAAAAMgAAAAAAAABkAAAAAAAAAH9/fwAKAAAAIgAAABgAAAAAAAAAAAAAAAAAAAAAAAAAAAAAAAAAAAAkAAAAJAAAAAAAAAAHAAAAAAAAAAAAAAAAAAAAAAAAAAAAAAAAAAAAf39/ACUAAABYAAAAAAAAAAAAAAAAAAAAAAAAAAAAAAAAAAAAAAAAAAAAAAAAAAAAAAAAAAAAAAA/AAAAAAAAAKCGAQAAAAAAAAAAAAAAAAAMAAAAAQAAAAAAAAAAAAAAAAAAAB8AAABUAAAAAAAABQAAAAEAAAAAAAAAAAAAAAAAAAAAAAAAAAAAAAAAAAAAAAAAAAAAAAJ/f38AAAAAA8zMzADAwP8Af39/AAAAAAAAAAAAAAAAAAAAAAAAAAAAIQAAABgAAAAUAAAA7QUAAOERAACtRQAAHBsAABAAAAAmAAAACAAAAIGAAAAAAAAA"/>
               </a:ext>
             </a:extLst>
           </p:cNvSpPr>
@@ -1117,7 +1117,7 @@
             <a:spLocks noGrp="1" noChangeArrowheads="1"/>
             <a:extLst>
               <a:ext uri="smNativeData">
-                <pr:smNativeData xmlns:pr="smNativeData" xmlns="smNativeData" val="SMDATA_15_k0e5YxMAAAAlAAAAZAAAAA8BAAAAkAAAAEgAAACQAAAASAAAAAAAAAABAAAAAAAAAAEAAABQAAAAAAAAAAAA4D8AAAAAAADgPwAAAAAAAOA/AAAAAAAA4D8AAAAAAADgPwAAAAAAAOA/AAAAAAAA4D8AAAAAAADgPwAAAAAAAOA/AAAAAAAA4D8CAAAAjAAAAAAAAAAAAAAAM2bMDANPhAgAAAAAAAAAAAAAAAAAAAAAAAAAAAAAAAAAAAAAZAAAAAEAAABAAAAAAAAAAAAAAAAAAAAAAAAAAAAAAAAAAAAAAAAAAAAAAAAAAAAAAAAAAAAAAAAAAAAAAAAAAAAAAAAAAAAAAAAAAAAAAAAAAAAAAAAAAAAAAAAAAAAAFAAAADwAAAAAAAAAAAAAAP///wkUAAAAAQAAABQAAAAUAAAAFAAAAAEAAAAAAAAAZAAAAGQAAAAAAAAAZAAAAGQAAAAVAAAAYAAAAAAAAAAAAAAADwAAACADAAAAAAAAAAAAAAEAAACgMgAAVgcAAKr4//8BAAAAf39/AAEAAABkAAAAAAAAABQAAABAHwAAAAAAACYAAAAAAAAAwOD//wAAAAAmAAAAZAAAABYAAABMAAAAAAAAAAAAAAAEAAAAAAAAAAEAAABXiZEKAAAAACgAAAAoAAAAZAAAAGQAAAAAAAAAzMzMAAAAAABQAAAAUAAAAGQAAABkAAAAAAAAABcAAAAUAAAAAAAAAAAAAAD/fwAA/38AAAAAAAAJAAAABAAAAAAAAAAeAAAAaAAAAAAAAAAAAAAAAAAAAAAAAAAAAAAAECcAABAnAAAAAAAAAAAAAAAAAAAAAAAAAAAAAAAAAAAAAAAAAAAAABQAAAAAAAAAwMD/AAAAAABkAAAAMgAAAAAAAABkAAAAAAAAAH9/fwAKAAAAIgAAABgAAAAAAAAAAAAAAAAAAAAAAAAAAAAAAAAAAAAkAAAAJAAAAAAAAAAHAAAAAAAAAAAAAAAAAAAAAAAAAAAAAAAAAAAAf39/ACUAAABYAAAAAAAAAAAAAAAAAAAAAAAAAAAAAAAAAAAAAAAAAAAAAAAAAAAAAAAAAAAAAAA/AAAAAAAAAKCGAQAAAAAAAAAAAAAAAAAMAAAAAQAAAAAAAAAAAAAAAAAAAB8AAABUAAAAAAAABQAAAAEAAAAAAAAAAAAAAAAAAAAAAAAAAAAAAAAAAAAAAAAAAAAAAAJ/f38AAAAAA8zMzADAwP8Af39/AAAAAAAAAAAAAAAAAAAAAAAAAAAAIQAAABgAAAAUAAAAwAMAABsnAAA/FQAAWSkAABAAAAAmAAAACAAAAAAAAAAAAAAA"/>
+                <pr:smNativeData xmlns:pr="smNativeData" xmlns="smNativeData" val="SMDATA_15_bXy5YxMAAAAlAAAAZAAAAA8BAAAAkAAAAEgAAACQAAAASAAAAAAAAAABAAAAAAAAAAEAAABQAAAAAAAAAAAA4D8AAAAAAADgPwAAAAAAAOA/AAAAAAAA4D8AAAAAAADgPwAAAAAAAOA/AAAAAAAA4D8AAAAAAADgPwAAAAAAAOA/AAAAAAAA4D8CAAAAjAAAAAAAAAAAAAAAM2bMDANPhAgAAAAAAAAAAAAAAAAAAAAAAAAAAAAAAAAAAAAAZAAAAAEAAABAAAAAAAAAAAAAAAAAAAAAAAAAAAAAAAAAAAAAAAAAAAAAAAAAAAAAAAAAAAAAAAAAAAAAAAAAAAAAAAAAAAAAAAAAAAAAAAAAAAAAAAAAAAAAAAAAAAAAFAAAADwAAAAAAAAAAAAAAP///wkUAAAAAQAAABQAAAAUAAAAFAAAAAEAAAAAAAAAZAAAAGQAAAAAAAAAZAAAAGQAAAAVAAAAYAAAAAAAAAAAAAAADwAAACADAAAAAAAAAAAAAAEAAACgMgAAVgcAAKr4//8BAAAAf39/AAEAAABkAAAAAAAAABQAAABAHwAAAAAAACYAAAAAAAAAwOD//wAAAAAmAAAAZAAAABYAAABMAAAAAAAAAAAAAAAEAAAAAAAAAAEAAABXiZEKAAAAACgAAAAoAAAAZAAAAGQAAAAAAAAAzMzMAAAAAABQAAAAUAAAAGQAAABkAAAAAAAAABcAAAAUAAAAAAAAAAAAAAD/fwAA/38AAAAAAAAJAAAABAAAAAAAAAAeAAAAaAAAAAAAAAAAAAAAAAAAAAAAAAAAAAAAECcAABAnAAAAAAAAAAAAAAAAAAAAAAAAAAAAAAAAAAAAAAAAAAAAABQAAAAAAAAAwMD/AAAAAABkAAAAMgAAAAAAAABkAAAAAAAAAH9/fwAKAAAAIgAAABgAAAAAAAAAAAAAAAAAAAAAAAAAAAAAAAAAAAAkAAAAJAAAAAAAAAAHAAAAAAAAAAAAAAAAAAAAAAAAAAAAAAAAAAAAf39/ACUAAABYAAAAAAAAAAAAAAAAAAAAAAAAAAAAAAAAAAAAAAAAAAAAAAAAAAAAAAAAAAAAAAA/AAAAAAAAAKCGAQAAAAAAAAAAAAAAAAAMAAAAAQAAAAAAAAAAAAAAAAAAAB8AAABUAAAAAAAABQAAAAEAAAAAAAAAAAAAAAAAAAAAAAAAAAAAAAAAAAAAAAAAAAAAAAJ/f38AAAAAA8zMzADAwP8Af39/AAAAAAAAAAAAAAAAAAAAAAAAAAAAIQAAABgAAAAUAAAAwAMAABsnAAA/FQAAWSkAABAAAAAmAAAACAAAAAAAAAAAAAAA"/>
               </a:ext>
             </a:extLst>
           </p:cNvSpPr>
@@ -1131,7 +1131,7 @@
           <a:lstStyle/>
           <a:p>
             <a:pPr/>
-            <a:fld id="{2C5FB253-1DC1-0A44-8FE7-EB11FCA979BE}" type="datetime1">
+            <a:fld id="{34E4B487-C9D9-B142-975C-3F17FA12616A}" type="datetime1">
               <a:t/>
             </a:fld>
           </a:p>
@@ -1144,7 +1144,7 @@
             <a:spLocks noGrp="1" noChangeArrowheads="1"/>
             <a:extLst>
               <a:ext uri="smNativeData">
-                <pr:smNativeData xmlns:pr="smNativeData" xmlns="smNativeData" val="SMDATA_15_k0e5YxMAAAAlAAAAZAAAAA8BAAAAkAAAAEgAAACQAAAASAAAAAAAAAABAAAAAAAAAAEAAABQAAAAAAAAAAAA4D8AAAAAAADgPwAAAAAAAOA/AAAAAAAA4D8AAAAAAADgPwAAAAAAAOA/AAAAAAAA4D8AAAAAAADgPwAAAAAAAOA/AAAAAAAA4D8CAAAAjAAAAAAAAAAAAAAAM2bMDANPhAgAAAAAAAAAAAAAAAAAAAAAAAAAAAAAAAAAAAAAZAAAAAEAAABAAAAAAAAAAAAAAAAAAAAAAAAAAAAAAAAAAAAAAAAAAAAAAAAAAAAAAAAAAAAAAAAAAAAAAAAAAAAAAAAAAAAAAAAAAAAAAAAAAAAAAAAAAAAAAAAAAAAAFAAAADwAAAAAAAAAAAAAAP///wkUAAAAAQAAABQAAAAUAAAAFAAAAAEAAAAAAAAAZAAAAGQAAAAAAAAAZAAAAGQAAAAVAAAAYAAAAAAAAAAAAAAADwAAACADAAAAAAAAAAAAAAEAAACgMgAAVgcAAKr4//8BAAAAf39/AAEAAABkAAAAAAAAABQAAABAHwAAAAAAACYAAAAAAAAAwOD//wAAAAAmAAAAZAAAABYAAABMAAAAAAAAAAAAAAAEAAAAAAAAAAEAAABXiZEKAAAAACgAAAAoAAAAZAAAAGQAAAAAAAAAzMzMAAAAAABQAAAAUAAAAGQAAABkAAAAAAAAABcAAAAUAAAAAAAAAAAAAAD/fwAA/38AAAAAAAAJAAAABAAAANw7IAEeAAAAaAAAAAAAAAAAAAAAAAAAAAAAAAAAAAAAECcAABAnAAAAAAAAAAAAAAAAAAAAAAAAAAAAAAAAAAAAAAAAAAAAABQAAAAAAAAAwMD/AAAAAABkAAAAMgAAAAAAAABkAAAAAAAAAH9/fwAKAAAAIgAAABgAAAAAAAAAAAAAAAAAAAAAAAAAAAAAAAAAAAAkAAAAJAAAAAAAAAAHAAAAAAAAAAAAAAAAAAAAAAAAAAAAAAAAAAAAf39/ACUAAABYAAAAAAAAAAAAAAAAAAAAAAAAAAAAAAAAAAAAAAAAAAAAAAAAAAAAAAAAAAAAAAA/AAAAAAAAAKCGAQAAAAAAAAAAAAAAAAAMAAAAAQAAAAAAAAAAAAAAAAAAAB8AAABUAAAAAAAABQAAAAEAAAAAAAAAAAAAAAAAAAAAAAAAAAAAAAAAAAAAAAAAAAAAAAJ/f38AAAAAA8zMzADAwP8Af39/AAAAAAAAAAAAAAAAAAAAAAAAAAAAIQAAABgAAAAUAAAAoRkAABsnAABfMQAAWSkAABAAAAAmAAAACAAAAAAAAAAAAAAA"/>
+                <pr:smNativeData xmlns:pr="smNativeData" xmlns="smNativeData" val="SMDATA_15_bXy5YxMAAAAlAAAAZAAAAA8BAAAAkAAAAEgAAACQAAAASAAAAAAAAAABAAAAAAAAAAEAAABQAAAAAAAAAAAA4D8AAAAAAADgPwAAAAAAAOA/AAAAAAAA4D8AAAAAAADgPwAAAAAAAOA/AAAAAAAA4D8AAAAAAADgPwAAAAAAAOA/AAAAAAAA4D8CAAAAjAAAAAAAAAAAAAAAM2bMDANPhAgAAAAAAAAAAAAAAAAAAAAAAAAAAAAAAAAAAAAAZAAAAAEAAABAAAAAAAAAAAAAAAAAAAAAAAAAAAAAAAAAAAAAAAAAAAAAAAAAAAAAAAAAAAAAAAAAAAAAAAAAAAAAAAAAAAAAAAAAAAAAAAAAAAAAAAAAAAAAAAAAAAAAFAAAADwAAAAAAAAAAAAAAP///wkUAAAAAQAAABQAAAAUAAAAFAAAAAEAAAAAAAAAZAAAAGQAAAAAAAAAZAAAAGQAAAAVAAAAYAAAAAAAAAAAAAAADwAAACADAAAAAAAAAAAAAAEAAACgMgAAVgcAAKr4//8BAAAAf39/AAEAAABkAAAAAAAAABQAAABAHwAAAAAAACYAAAAAAAAAwOD//wAAAAAmAAAAZAAAABYAAABMAAAAAAAAAAAAAAAEAAAAAAAAAAEAAABXiZEKAAAAACgAAAAoAAAAZAAAAGQAAAAAAAAAzMzMAAAAAABQAAAAUAAAAGQAAABkAAAAAAAAABcAAAAUAAAAAAAAAAAAAAD/fwAA/38AAAAAAAAJAAAABAAAANw7IAEeAAAAaAAAAAAAAAAAAAAAAAAAAAAAAAAAAAAAECcAABAnAAAAAAAAAAAAAAAAAAAAAAAAAAAAAAAAAAAAAAAAAAAAABQAAAAAAAAAwMD/AAAAAABkAAAAMgAAAAAAAABkAAAAAAAAAH9/fwAKAAAAIgAAABgAAAAAAAAAAAAAAAAAAAAAAAAAAAAAAAAAAAAkAAAAJAAAAAAAAAAHAAAAAAAAAAAAAAAAAAAAAAAAAAAAAAAAAAAAf39/ACUAAABYAAAAAAAAAAAAAAAAAAAAAAAAAAAAAAAAAAAAAAAAAAAAAAAAAAAAAAAAAAAAAAA/AAAAAAAAAKCGAQAAAAAAAAAAAAAAAAAMAAAAAQAAAAAAAAAAAAAAAAAAAB8AAABUAAAAAAAABQAAAAEAAAAAAAAAAAAAAAAAAAAAAAAAAAAAAAAAAAAAAAAAAAAAAAJ/f38AAAAAA8zMzADAwP8Af39/AAAAAAAAAAAAAAAAAAAAAAAAAAAAIQAAABgAAAAUAAAAoRkAABsnAABfMQAAWSkAABAAAAAmAAAACAAAAAAAAAAAAAAA"/>
               </a:ext>
             </a:extLst>
           </p:cNvSpPr>
@@ -1168,7 +1168,7 @@
             <a:spLocks noGrp="1" noChangeArrowheads="1"/>
             <a:extLst>
               <a:ext uri="smNativeData">
-                <pr:smNativeData xmlns:pr="smNativeData" xmlns="smNativeData" val="SMDATA_15_k0e5YxMAAAAlAAAAZAAAAA8BAAAAkAAAAEgAAACQAAAASAAAAAAAAAABAAAAAAAAAAEAAABQAAAAAAAAAAAA4D8AAAAAAADgPwAAAAAAAOA/AAAAAAAA4D8AAAAAAADgPwAAAAAAAOA/AAAAAAAA4D8AAAAAAADgPwAAAAAAAOA/AAAAAAAA4D8CAAAAjAAAAAAAAAAAAAAAM2bMDANPhAgAAAAAAAAAAAAAAAAAAAAAAAAAAAAAAAAAAAAAZAAAAAEAAABAAAAAAAAAAAAAAAAAAAAAAAAAAAAAAAAAAAAAAAAAAAAAAAAAAAAAAAAAAAAAAAAAAAAAAAAAAAAAAAAAAAAAAAAAAAAAAAAAAAAAAAAAAAAAAAAAAAAAFAAAADwAAAAAAAAAAAAAAP///wkUAAAAAQAAABQAAAAUAAAAFAAAAAEAAAAAAAAAZAAAAGQAAAAAAAAAZAAAAGQAAAAVAAAAYAAAAAAAAAAAAAAADwAAACADAAAAAAAAAAAAAAEAAACgMgAAVgcAAKr4//8BAAAAf39/AAEAAABkAAAAAAAAABQAAABAHwAAAAAAACYAAAAAAAAAwOD//wAAAAAmAAAAZAAAABYAAABMAAAAAAAAAAAAAAAEAAAAAAAAAAEAAABXiZEKAAAAACgAAAAoAAAAZAAAAGQAAAAAAAAAzMzMAAAAAABQAAAAUAAAAGQAAABkAAAAAAAAABcAAAAUAAAAAAAAAAAAAAD/fwAA/38AAAAAAAAJAAAABAAAANw7IAEeAAAAaAAAAAAAAAAAAAAAAAAAAAAAAAAAAAAAECcAABAnAAAAAAAAAAAAAAAAAAAAAAAAAAAAAAAAAAAAAAAAAAAAABQAAAAAAAAAwMD/AAAAAABkAAAAMgAAAAAAAABkAAAAAAAAAH9/fwAKAAAAIgAAABgAAAAAAAAAAAAAAAAAAAAAAAAAAAAAAAAAAAAkAAAAJAAAAAAAAAAHAAAAAAAAAAAAAAAAAAAAAAAAAAAAAAAAAAAAf39/ACUAAABYAAAAAAAAAAAAAAAAAAAAAAAAAAAAAAAAAAAAAAAAAAAAAAAAAAAAAAAAAAAAAAA/AAAAAAAAAKCGAQAAAAAAAAAAAAAAAAAMAAAAAQAAAAAAAAAAAAAAAAAAAB8AAABUAAAAAAAABQAAAAEAAAAAAAAAAAAAAAAAAAAAAAAAAAAAAAAAAAAAAAAAAAAAAAJ/f38AAAAAA8zMzADAwP8Af39/AAAAAAAAAAAAAAAAAAAAAAAAAAAAIQAAABgAAAAUAAAAwTUAABsnAABARwAAWSkAABAAAAAmAAAACAAAAAAAAAAAAAAA"/>
+                <pr:smNativeData xmlns:pr="smNativeData" xmlns="smNativeData" val="SMDATA_15_bXy5YxMAAAAlAAAAZAAAAA8BAAAAkAAAAEgAAACQAAAASAAAAAAAAAABAAAAAAAAAAEAAABQAAAAAAAAAAAA4D8AAAAAAADgPwAAAAAAAOA/AAAAAAAA4D8AAAAAAADgPwAAAAAAAOA/AAAAAAAA4D8AAAAAAADgPwAAAAAAAOA/AAAAAAAA4D8CAAAAjAAAAAAAAAAAAAAAM2bMDANPhAgAAAAAAAAAAAAAAAAAAAAAAAAAAAAAAAAAAAAAZAAAAAEAAABAAAAAAAAAAAAAAAAAAAAAAAAAAAAAAAAAAAAAAAAAAAAAAAAAAAAAAAAAAAAAAAAAAAAAAAAAAAAAAAAAAAAAAAAAAAAAAAAAAAAAAAAAAAAAAAAAAAAAFAAAADwAAAAAAAAAAAAAAP///wkUAAAAAQAAABQAAAAUAAAAFAAAAAEAAAAAAAAAZAAAAGQAAAAAAAAAZAAAAGQAAAAVAAAAYAAAAAAAAAAAAAAADwAAACADAAAAAAAAAAAAAAEAAACgMgAAVgcAAKr4//8BAAAAf39/AAEAAABkAAAAAAAAABQAAABAHwAAAAAAACYAAAAAAAAAwOD//wAAAAAmAAAAZAAAABYAAABMAAAAAAAAAAAAAAAEAAAAAAAAAAEAAABXiZEKAAAAACgAAAAoAAAAZAAAAGQAAAAAAAAAzMzMAAAAAABQAAAAUAAAAGQAAABkAAAAAAAAABcAAAAUAAAAAAAAAAAAAAD/fwAA/38AAAAAAAAJAAAABAAAANw7IAEeAAAAaAAAAAAAAAAAAAAAAAAAAAAAAAAAAAAAECcAABAnAAAAAAAAAAAAAAAAAAAAAAAAAAAAAAAAAAAAAAAAAAAAABQAAAAAAAAAwMD/AAAAAABkAAAAMgAAAAAAAABkAAAAAAAAAH9/fwAKAAAAIgAAABgAAAAAAAAAAAAAAAAAAAAAAAAAAAAAAAAAAAAkAAAAJAAAAAAAAAAHAAAAAAAAAAAAAAAAAAAAAAAAAAAAAAAAAAAAf39/ACUAAABYAAAAAAAAAAAAAAAAAAAAAAAAAAAAAAAAAAAAAAAAAAAAAAAAAAAAAAAAAAAAAAA/AAAAAAAAAKCGAQAAAAAAAAAAAAAAAAAMAAAAAQAAAAAAAAAAAAAAAAAAAB8AAABUAAAAAAAABQAAAAEAAAAAAAAAAAAAAAAAAAAAAAAAAAAAAAAAAAAAAAAAAAAAAAJ/f38AAAAAA8zMzADAwP8Af39/AAAAAAAAAAAAAAAAAAAAAAAAAAAAIQAAABgAAAAUAAAAwTUAABsnAABARwAAWSkAABAAAAAmAAAACAAAAAAAAAAAAAAA"/>
               </a:ext>
             </a:extLst>
           </p:cNvSpPr>
@@ -1182,7 +1182,7 @@
           <a:lstStyle/>
           <a:p>
             <a:pPr/>
-            <a:fld id="{2C5F95BA-F4C1-0A63-8FE7-0236DBA97957}" type="slidenum">
+            <a:fld id="{1F96CD66-28F2-C33B-BC2E-DE6E83604A8B}" type="slidenum">
               <a:t/>
             </a:fld>
           </a:p>
@@ -1221,7 +1221,7 @@
             <a:spLocks noGrp="1" noChangeArrowheads="1"/>
             <a:extLst>
               <a:ext uri="smNativeData">
-                <pr:smNativeData xmlns:pr="smNativeData" xmlns="smNativeData" val="SMDATA_15_k0e5YxMAAAAlAAAAZAAAAA8BAAAAkAAAAEgAAACQAAAASAAAAAAAAAABAAAAAAAAAAEAAABQAAAAAAAAAAAA4D8AAAAAAADgPwAAAAAAAOA/AAAAAAAA4D8AAAAAAADgPwAAAAAAAOA/AAAAAAAA4D8AAAAAAADgPwAAAAAAAOA/AAAAAAAA4D8CAAAAjAAAAAAAAAAAAAAAM2bMDANPhAgAAAAAAAAAAAAAAAAAAAAAAAAAAAAAAAAAAAAAZAAAAAEAAABAAAAAAAAAAAAAAAAAAAAAAAAAAAAAAAAAAAAAAAAAAAAAAAAAAAAAAAAAAAAAAAAAAAAAAAAAAAAAAAAAAAAAAAAAAAAAAAAAAAAAAAAAAAAAAAAAAAAAFAAAADwAAAAAAAAAAAAAAP///wkUAAAAAQAAABQAAAAUAAAAFAAAAAEAAAAAAAAAZAAAAGQAAAAAAAAAZAAAAGQAAAAVAAAAYAAAAAAAAAAAAAAADwAAACADAAAAAAAAAAAAAAEAAACgMgAAVgcAAKr4//8BAAAAf39/AAEAAABkAAAAAAAAABQAAABAHwAAAAAAACYAAAAAAAAAwOD//wAAAAAmAAAAZAAAABYAAABMAAAAAAAAAAAAAAAEAAAAAAAAAAEAAABXiZEKAAAAACgAAAAoAAAAZAAAAGQAAAAAAAAAzMzMAAAAAABQAAAAUAAAAGQAAABkAAAAAAAAABcAAAAUAAAAAAAAAAAAAAD/fwAA/38AAAAAAAAJAAAABAAAANw7IAEeAAAAaAAAAAAAAAAAAAAAAAAAAAAAAAAAAAAAECcAABAnAAAAAAAAAAAAAAAAAAAAAAAAAAAAAAAAAAAAAAAAAAAAABQAAAAAAAAAwMD/AAAAAABkAAAAMgAAAAAAAABkAAAAAAAAAH9/fwAKAAAAIgAAABgAAAAAAAAAAAAAAAAAAAAAAAAAAAAAAAAAAAAkAAAAJAAAAAAAAAAHAAAAAAAAAAAAAAAAAAAAAAAAAAAAAAAAAAAAf39/ACUAAABYAAAAAAAAAAAAAAAAAAAAAAAAAAAAAAAAAAAAAAAAAAAAAAAAAAAAAAAAAAAAAAA/AAAAAAAAAKCGAQAAAAAAAAAAAAAAAAAMAAAAAQAAAAAAAAAAAAAAAAAAAB8AAABUAAAAAAAABQAAAAEAAAAAAAAAAAAAAAAAAAAAAAAAAAAAAAAAAAAAAAAAAAAAAAJ/f38AAAAAA8zMzADAwP8Af39/AAAAAAAAAAAAAAAAAAAAAAAAAAAAIQAAABgAAAAUAAAAwAMAALABAABARwAAuAgAABAAAAAmAAAACAAAAAAAAAAAAAAA"/>
+                <pr:smNativeData xmlns:pr="smNativeData" xmlns="smNativeData" val="SMDATA_15_bXy5YxMAAAAlAAAAZAAAAA8BAAAAkAAAAEgAAACQAAAASAAAAAAAAAABAAAAAAAAAAEAAABQAAAAAAAAAAAA4D8AAAAAAADgPwAAAAAAAOA/AAAAAAAA4D8AAAAAAADgPwAAAAAAAOA/AAAAAAAA4D8AAAAAAADgPwAAAAAAAOA/AAAAAAAA4D8CAAAAjAAAAAAAAAAAAAAAM2bMDANPhAgAAAAAAAAAAAAAAAAAAAAAAAAAAAAAAAAAAAAAZAAAAAEAAABAAAAAAAAAAAAAAAAAAAAAAAAAAAAAAAAAAAAAAAAAAAAAAAAAAAAAAAAAAAAAAAAAAAAAAAAAAAAAAAAAAAAAAAAAAAAAAAAAAAAAAAAAAAAAAAAAAAAAFAAAADwAAAAAAAAAAAAAAP///wkUAAAAAQAAABQAAAAUAAAAFAAAAAEAAAAAAAAAZAAAAGQAAAAAAAAAZAAAAGQAAAAVAAAAYAAAAAAAAAAAAAAADwAAACADAAAAAAAAAAAAAAEAAACgMgAAVgcAAKr4//8BAAAAf39/AAEAAABkAAAAAAAAABQAAABAHwAAAAAAACYAAAAAAAAAwOD//wAAAAAmAAAAZAAAABYAAABMAAAAAAAAAAAAAAAEAAAAAAAAAAEAAABXiZEKAAAAACgAAAAoAAAAZAAAAGQAAAAAAAAAzMzMAAAAAABQAAAAUAAAAGQAAABkAAAAAAAAABcAAAAUAAAAAAAAAAAAAAD/fwAA/38AAAAAAAAJAAAABAAAANw7IAEeAAAAaAAAAAAAAAAAAAAAAAAAAAAAAAAAAAAAECcAABAnAAAAAAAAAAAAAAAAAAAAAAAAAAAAAAAAAAAAAAAAAAAAABQAAAAAAAAAwMD/AAAAAABkAAAAMgAAAAAAAABkAAAAAAAAAH9/fwAKAAAAIgAAABgAAAAAAAAAAAAAAAAAAAAAAAAAAAAAAAAAAAAkAAAAJAAAAAAAAAAHAAAAAAAAAAAAAAAAAAAAAAAAAAAAAAAAAAAAf39/ACUAAABYAAAAAAAAAAAAAAAAAAAAAAAAAAAAAAAAAAAAAAAAAAAAAAAAAAAAAAAAAAAAAAA/AAAAAAAAAKCGAQAAAAAAAAAAAAAAAAAMAAAAAQAAAAAAAAAAAAAAAAAAAB8AAABUAAAAAAAABQAAAAEAAAAAAAAAAAAAAAAAAAAAAAAAAAAAAAAAAAAAAAAAAAAAAAJ/f38AAAAAA8zMzADAwP8Af39/AAAAAAAAAAAAAAAAAAAAAAAAAAAAIQAAABgAAAAUAAAAwAMAALABAABARwAAuAgAABAAAAAmAAAACAAAAAAAAAAAAAAA"/>
               </a:ext>
             </a:extLst>
           </p:cNvSpPr>
@@ -1248,7 +1248,7 @@
             <a:spLocks noGrp="1" noChangeArrowheads="1"/>
             <a:extLst>
               <a:ext uri="smNativeData">
-                <pr:smNativeData xmlns:pr="smNativeData" xmlns="smNativeData" val="SMDATA_15_k0e5YxMAAAAlAAAAZAAAAA8BAAAAkAAAAEgAAACQAAAASAAAAAAAAAAAAAAAAAAAAAEAAABQAAAAAAAAAAAA4D8AAAAAAADgPwAAAAAAAOA/AAAAAAAA4D8AAAAAAADgPwAAAAAAAOA/AAAAAAAA4D8AAAAAAADgPwAAAAAAAOA/AAAAAAAA4D8CAAAAjAAAAAAAAAAAAAAAM2bMDANPhAgAAAAAAAAAAAAAAAAAAAAAAAAAAAAAAAAAAAAAZAAAAAEAAABAAAAAAAAAAAAAAAAAAAAAAAAAAAAAAAAAAAAAAAAAAAAAAAAAAAAAAAAAAAAAAAAAAAAAAAAAAAAAAAAAAAAAAAAAAAAAAAAAAAAAAAAAAAAAAAAAAAAAFAAAADwAAAAAAAAAAAAAAP///wkUAAAAAQAAABQAAAAUAAAAFAAAAAEAAAAAAAAAZAAAAGQAAAAAAAAAZAAAAGQAAAAVAAAAYAAAAAAAAAAAAAAADwAAACADAAAAAAAAAAAAAAEAAACgMgAAVgcAAKr4//8BAAAAf39/AAEAAABkAAAAAAAAABQAAABAHwAAAAAAACYAAAAAAAAAwOD//wAAAAAmAAAAZAAAABYAAABMAAAAAAAAAAAAAAAEAAAAAAAAAAEAAABXiZEKAAAAACgAAAAoAAAAZAAAAGQAAAAAAAAAzMzMAAAAAABQAAAAUAAAAGQAAABkAAAAAAAAABcAAAAUAAAAAAAAAAAAAAD/fwAA/38AAAAAAAAJAAAABAAAANw7IAEeAAAAaAAAAAAAAAAAAAAAAAAAAAAAAAAAAAAAECcAABAnAAAAAAAAAAAAAAAAAAAAAAAAAAAAAAAAAAAAAAAAAAAAABQAAAAAAAAAwMD/AAAAAABkAAAAMgAAAAAAAABkAAAAAAAAAH9/fwAKAAAAIgAAABgAAAAAAAAAAAAAAAAAAAAAAAAAAAAAAAAAAAAkAAAAJAAAAAAAAAAHAAAAAAAAAAAAAAAAAAAAAAAAAAAAAAAAAAAAf39/ACUAAABYAAAAAAAAAAAAAAAAAAAAAAAAAAAAAAAAAAAAAAAAAAAAAAAAAAAAAAAAAAAAAAA/AAAAAAAAAKCGAQAAAAAAAAAAAAAAAAAMAAAAAQAAAAAAAAAAAAAAAAAAAB8AAABUAAAAAAAABQAAAAEAAAAAAAAAAAAAAAAAAAAAAAAAAAAAAAAAAAAAAAAAAAAAAAJ/f38AAAAAA8zMzADAwP8Af39/AAAAAAAAAAAAAAAAAAAAAAAAAAAAIQAAABgAAAAUAAAAwAMAANgJAADhJAAAsCUAABAAAAAmAAAACAAAAAGAAAAAAAAA"/>
+                <pr:smNativeData xmlns:pr="smNativeData" xmlns="smNativeData" val="SMDATA_15_bXy5YxMAAAAlAAAAZAAAAA8BAAAAkAAAAEgAAACQAAAASAAAAAAAAAAAAAAAAAAAAAEAAABQAAAAAAAAAAAA4D8AAAAAAADgPwAAAAAAAOA/AAAAAAAA4D8AAAAAAADgPwAAAAAAAOA/AAAAAAAA4D8AAAAAAADgPwAAAAAAAOA/AAAAAAAA4D8CAAAAjAAAAAAAAAAAAAAAM2bMDANPhAgAAAAAAAAAAAAAAAAAAAAAAAAAAAAAAAAAAAAAZAAAAAEAAABAAAAAAAAAAAAAAAAAAAAAAAAAAAAAAAAAAAAAAAAAAAAAAAAAAAAAAAAAAAAAAAAAAAAAAAAAAAAAAAAAAAAAAAAAAAAAAAAAAAAAAAAAAAAAAAAAAAAAFAAAADwAAAAAAAAAAAAAAP///wkUAAAAAQAAABQAAAAUAAAAFAAAAAEAAAAAAAAAZAAAAGQAAAAAAAAAZAAAAGQAAAAVAAAAYAAAAAAAAAAAAAAADwAAACADAAAAAAAAAAAAAAEAAACgMgAAVgcAAKr4//8BAAAAf39/AAEAAABkAAAAAAAAABQAAABAHwAAAAAAACYAAAAAAAAAwOD//wAAAAAmAAAAZAAAABYAAABMAAAAAAAAAAAAAAAEAAAAAAAAAAEAAABXiZEKAAAAACgAAAAoAAAAZAAAAGQAAAAAAAAAzMzMAAAAAABQAAAAUAAAAGQAAABkAAAAAAAAABcAAAAUAAAAAAAAAAAAAAD/fwAA/38AAAAAAAAJAAAABAAAANw7IAEeAAAAaAAAAAAAAAAAAAAAAAAAAAAAAAAAAAAAECcAABAnAAAAAAAAAAAAAAAAAAAAAAAAAAAAAAAAAAAAAAAAAAAAABQAAAAAAAAAwMD/AAAAAABkAAAAMgAAAAAAAABkAAAAAAAAAH9/fwAKAAAAIgAAABgAAAAAAAAAAAAAAAAAAAAAAAAAAAAAAAAAAAAkAAAAJAAAAAAAAAAHAAAAAAAAAAAAAAAAAAAAAAAAAAAAAAAAAAAAf39/ACUAAABYAAAAAAAAAAAAAAAAAAAAAAAAAAAAAAAAAAAAAAAAAAAAAAAAAAAAAAAAAAAAAAA/AAAAAAAAAKCGAQAAAAAAAAAAAAAAAAAMAAAAAQAAAAAAAAAAAAAAAAAAAB8AAABUAAAAAAAABQAAAAEAAAAAAAAAAAAAAAAAAAAAAAAAAAAAAAAAAAAAAAAAAAAAAAJ/f38AAAAAA8zMzADAwP8Af39/AAAAAAAAAAAAAAAAAAAAAAAAAAAAIQAAABgAAAAUAAAAwAMAANgJAADhJAAAsCUAABAAAAAmAAAACAAAAAGAAAAAAAAA"/>
               </a:ext>
             </a:extLst>
           </p:cNvSpPr>
@@ -1332,7 +1332,7 @@
             <a:spLocks noGrp="1" noChangeArrowheads="1"/>
             <a:extLst>
               <a:ext uri="smNativeData">
-                <pr:smNativeData xmlns:pr="smNativeData" xmlns="smNativeData" val="SMDATA_15_k0e5YxMAAAAlAAAAZAAAAA8BAAAAkAAAAEgAAACQAAAASAAAAAAAAAAAAAAAAAAAAAEAAABQAAAAAAAAAAAA4D8AAAAAAADgPwAAAAAAAOA/AAAAAAAA4D8AAAAAAADgPwAAAAAAAOA/AAAAAAAA4D8AAAAAAADgPwAAAAAAAOA/AAAAAAAA4D8CAAAAjAAAAAAAAAAAAAAAM2bMDANPhAgAAAAAAAAAAAAAAAAAAAAAAAAAAAAAAAAAAAAAZAAAAAEAAABAAAAAAAAAAAAAAAAAAAAAAAAAAAAAAAAAAAAAAAAAAAAAAAAAAAAAAAAAAAAAAAAAAAAAAAAAAAAAAAAAAAAAAAAAAAAAAAAAAAAAAAAAAAAAAAAAAAAAFAAAADwAAAAAAAAAAAAAAP///wkUAAAAAQAAABQAAAAUAAAAFAAAAAEAAAAAAAAAZAAAAGQAAAAAAAAAZAAAAGQAAAAVAAAAYAAAAAAAAAAAAAAADwAAACADAAAAAAAAAAAAAAEAAACgMgAAVgcAAKr4//8BAAAAf39/AAEAAABkAAAAAAAAABQAAABAHwAAAAAAACYAAAAAAAAAwOD//wAAAAAmAAAAZAAAABYAAABMAAAAAAAAAAAAAAAEAAAAAAAAAAEAAABXiZEKAAAAACgAAAAoAAAAZAAAAGQAAAAAAAAAzMzMAAAAAABQAAAAUAAAAGQAAABkAAAAAAAAABcAAAAUAAAAAAAAAAAAAAD/fwAA/38AAAAAAAAJAAAABAAAANw7IAEeAAAAaAAAAAAAAAAAAAAAAAAAAAAAAAAAAAAAECcAABAnAAAAAAAAAAAAAAAAAAAAAAAAAAAAAAAAAAAAAAAAAAAAABQAAAAAAAAAwMD/AAAAAABkAAAAMgAAAAAAAABkAAAAAAAAAH9/fwAKAAAAIgAAABgAAAAAAAAAAAAAAAAAAAAAAAAAAAAAAAAAAAAkAAAAJAAAAAAAAAAHAAAAAAAAAAAAAAAAAAAAAAAAAAAAAAAAAAAAf39/ACUAAABYAAAAAAAAAAAAAAAAAAAAAAAAAAAAAAAAAAAAAAAAAAAAAAAAAAAAAAAAAAAAAAA/AAAAAAAAAKCGAQAAAAAAAAAAAAAAAAAMAAAAAQAAAAAAAAAAAAAAAAAAAB8AAABUAAAAAAAABQAAAAEAAAAAAAAAAAAAAAAAAAAAAAAAAAAAAAAAAAAAAAAAAAAAAAJ/f38AAAAAA8zMzADAwP8Af39/AAAAAAAAAAAAAAAAAAAAAAAAAAAAIQAAABgAAAAUAAAAHyYAANgJAABARwAAsCUAABAAAAAmAAAACAAAAAGAAAAAAAAA"/>
+                <pr:smNativeData xmlns:pr="smNativeData" xmlns="smNativeData" val="SMDATA_15_bXy5YxMAAAAlAAAAZAAAAA8BAAAAkAAAAEgAAACQAAAASAAAAAAAAAAAAAAAAAAAAAEAAABQAAAAAAAAAAAA4D8AAAAAAADgPwAAAAAAAOA/AAAAAAAA4D8AAAAAAADgPwAAAAAAAOA/AAAAAAAA4D8AAAAAAADgPwAAAAAAAOA/AAAAAAAA4D8CAAAAjAAAAAAAAAAAAAAAM2bMDANPhAgAAAAAAAAAAAAAAAAAAAAAAAAAAAAAAAAAAAAAZAAAAAEAAABAAAAAAAAAAAAAAAAAAAAAAAAAAAAAAAAAAAAAAAAAAAAAAAAAAAAAAAAAAAAAAAAAAAAAAAAAAAAAAAAAAAAAAAAAAAAAAAAAAAAAAAAAAAAAAAAAAAAAFAAAADwAAAAAAAAAAAAAAP///wkUAAAAAQAAABQAAAAUAAAAFAAAAAEAAAAAAAAAZAAAAGQAAAAAAAAAZAAAAGQAAAAVAAAAYAAAAAAAAAAAAAAADwAAACADAAAAAAAAAAAAAAEAAACgMgAAVgcAAKr4//8BAAAAf39/AAEAAABkAAAAAAAAABQAAABAHwAAAAAAACYAAAAAAAAAwOD//wAAAAAmAAAAZAAAABYAAABMAAAAAAAAAAAAAAAEAAAAAAAAAAEAAABXiZEKAAAAACgAAAAoAAAAZAAAAGQAAAAAAAAAzMzMAAAAAABQAAAAUAAAAGQAAABkAAAAAAAAABcAAAAUAAAAAAAAAAAAAAD/fwAA/38AAAAAAAAJAAAABAAAANw7IAEeAAAAaAAAAAAAAAAAAAAAAAAAAAAAAAAAAAAAECcAABAnAAAAAAAAAAAAAAAAAAAAAAAAAAAAAAAAAAAAAAAAAAAAABQAAAAAAAAAwMD/AAAAAABkAAAAMgAAAAAAAABkAAAAAAAAAH9/fwAKAAAAIgAAABgAAAAAAAAAAAAAAAAAAAAAAAAAAAAAAAAAAAAkAAAAJAAAAAAAAAAHAAAAAAAAAAAAAAAAAAAAAAAAAAAAAAAAAAAAf39/ACUAAABYAAAAAAAAAAAAAAAAAAAAAAAAAAAAAAAAAAAAAAAAAAAAAAAAAAAAAAAAAAAAAAA/AAAAAAAAAKCGAQAAAAAAAAAAAAAAAAAMAAAAAQAAAAAAAAAAAAAAAAAAAB8AAABUAAAAAAAABQAAAAEAAAAAAAAAAAAAAAAAAAAAAAAAAAAAAAAAAAAAAAAAAAAAAAJ/f38AAAAAA8zMzADAwP8Af39/AAAAAAAAAAAAAAAAAAAAAAAAAAAAIQAAABgAAAAUAAAAHyYAANgJAABARwAAsCUAABAAAAAmAAAACAAAAAGAAAAAAAAA"/>
               </a:ext>
             </a:extLst>
           </p:cNvSpPr>
@@ -1416,7 +1416,7 @@
             <a:spLocks noGrp="1" noChangeArrowheads="1"/>
             <a:extLst>
               <a:ext uri="smNativeData">
-                <pr:smNativeData xmlns:pr="smNativeData" xmlns="smNativeData" val="SMDATA_15_k0e5YxMAAAAlAAAAZAAAAA8BAAAAkAAAAEgAAACQAAAASAAAAAAAAAABAAAAAAAAAAEAAABQAAAAAAAAAAAA4D8AAAAAAADgPwAAAAAAAOA/AAAAAAAA4D8AAAAAAADgPwAAAAAAAOA/AAAAAAAA4D8AAAAAAADgPwAAAAAAAOA/AAAAAAAA4D8CAAAAjAAAAAAAAAAAAAAAM2bMDANPhAgAAAAAAAAAAAAAAAAAAAAAAAAAAAAAAAAAAAAAZAAAAAEAAABAAAAAAAAAAAAAAAAAAAAAAAAAAAAAAAAAAAAAAAAAAAAAAAAAAAAAAAAAAAAAAAAAAAAAAAAAAAAAAAAAAAAAAAAAAAAAAAAAAAAAAAAAAAAAAAAAAAAAFAAAADwAAAAAAAAAAAAAAP///wkUAAAAAQAAABQAAAAUAAAAFAAAAAEAAAAAAAAAZAAAAGQAAAAAAAAAZAAAAGQAAAAVAAAAYAAAAAAAAAAAAAAADwAAACADAAAAAAAAAAAAAAEAAACgMgAAVgcAAKr4//8BAAAAf39/AAEAAABkAAAAAAAAABQAAABAHwAAAAAAACYAAAAAAAAAwOD//wAAAAAmAAAAZAAAABYAAABMAAAAAAAAAAAAAAAEAAAAAAAAAAEAAABXiZEKAAAAACgAAAAoAAAAZAAAAGQAAAAAAAAAzMzMAAAAAABQAAAAUAAAAGQAAABkAAAAAAAAABcAAAAUAAAAAAAAAAAAAAD/fwAA/38AAAAAAAAJAAAABAAAANw7IAEeAAAAaAAAAAAAAAAAAAAAAAAAAAAAAAAAAAAAECcAABAnAAAAAAAAAAAAAAAAAAAAAAAAAAAAAAAAAAAAAAAAAAAAABQAAAAAAAAAwMD/AAAAAABkAAAAMgAAAAAAAABkAAAAAAAAAH9/fwAKAAAAIgAAABgAAAAAAAAAAAAAAAAAAAAAAAAAAAAAAAAAAAAkAAAAJAAAAAAAAAAHAAAAAAAAAAAAAAAAAAAAAAAAAAAAAAAAAAAAf39/ACUAAABYAAAAAAAAAAAAAAAAAAAAAAAAAAAAAAAAAAAAAAAAAAAAAAAAAAAAAAAAAAAAAAA/AAAAAAAAAKCGAQAAAAAAAAAAAAAAAAAMAAAAAQAAAAAAAAAAAAAAAAAAAB8AAABUAAAAAAAABQAAAAEAAAAAAAAAAAAAAAAAAAAAAAAAAAAAAAAAAAAAAAAAAAAAAAJ/f38AAAAAA8zMzADAwP8Af39/AAAAAAAAAAAAAAAAAAAAAAAAAAAAIQAAABgAAAAUAAAAwAMAABsnAAA/FQAAWSkAABAAAAAmAAAACAAAAAAAAAAAAAAA"/>
+                <pr:smNativeData xmlns:pr="smNativeData" xmlns="smNativeData" val="SMDATA_15_bXy5YxMAAAAlAAAAZAAAAA8BAAAAkAAAAEgAAACQAAAASAAAAAAAAAABAAAAAAAAAAEAAABQAAAAAAAAAAAA4D8AAAAAAADgPwAAAAAAAOA/AAAAAAAA4D8AAAAAAADgPwAAAAAAAOA/AAAAAAAA4D8AAAAAAADgPwAAAAAAAOA/AAAAAAAA4D8CAAAAjAAAAAAAAAAAAAAAM2bMDANPhAgAAAAAAAAAAAAAAAAAAAAAAAAAAAAAAAAAAAAAZAAAAAEAAABAAAAAAAAAAAAAAAAAAAAAAAAAAAAAAAAAAAAAAAAAAAAAAAAAAAAAAAAAAAAAAAAAAAAAAAAAAAAAAAAAAAAAAAAAAAAAAAAAAAAAAAAAAAAAAAAAAAAAFAAAADwAAAAAAAAAAAAAAP///wkUAAAAAQAAABQAAAAUAAAAFAAAAAEAAAAAAAAAZAAAAGQAAAAAAAAAZAAAAGQAAAAVAAAAYAAAAAAAAAAAAAAADwAAACADAAAAAAAAAAAAAAEAAACgMgAAVgcAAKr4//8BAAAAf39/AAEAAABkAAAAAAAAABQAAABAHwAAAAAAACYAAAAAAAAAwOD//wAAAAAmAAAAZAAAABYAAABMAAAAAAAAAAAAAAAEAAAAAAAAAAEAAABXiZEKAAAAACgAAAAoAAAAZAAAAGQAAAAAAAAAzMzMAAAAAABQAAAAUAAAAGQAAABkAAAAAAAAABcAAAAUAAAAAAAAAAAAAAD/fwAA/38AAAAAAAAJAAAABAAAANw7IAEeAAAAaAAAAAAAAAAAAAAAAAAAAAAAAAAAAAAAECcAABAnAAAAAAAAAAAAAAAAAAAAAAAAAAAAAAAAAAAAAAAAAAAAABQAAAAAAAAAwMD/AAAAAABkAAAAMgAAAAAAAABkAAAAAAAAAH9/fwAKAAAAIgAAABgAAAAAAAAAAAAAAAAAAAAAAAAAAAAAAAAAAAAkAAAAJAAAAAAAAAAHAAAAAAAAAAAAAAAAAAAAAAAAAAAAAAAAAAAAf39/ACUAAABYAAAAAAAAAAAAAAAAAAAAAAAAAAAAAAAAAAAAAAAAAAAAAAAAAAAAAAAAAAAAAAA/AAAAAAAAAKCGAQAAAAAAAAAAAAAAAAAMAAAAAQAAAAAAAAAAAAAAAAAAAB8AAABUAAAAAAAABQAAAAEAAAAAAAAAAAAAAAAAAAAAAAAAAAAAAAAAAAAAAAAAAAAAAAJ/f38AAAAAA8zMzADAwP8Af39/AAAAAAAAAAAAAAAAAAAAAAAAAAAAIQAAABgAAAAUAAAAwAMAABsnAAA/FQAAWSkAABAAAAAmAAAACAAAAAAAAAAAAAAA"/>
               </a:ext>
             </a:extLst>
           </p:cNvSpPr>
@@ -1430,7 +1430,7 @@
           <a:lstStyle/>
           <a:p>
             <a:pPr/>
-            <a:fld id="{2C5FDAA2-ECC1-0A2C-8FE7-1A7994A9794F}" type="datetime1">
+            <a:fld id="{642B3C84-CA89-7ECA-C793-3C9F72DD3169}" type="datetime1">
               <a:t/>
             </a:fld>
           </a:p>
@@ -1443,7 +1443,7 @@
             <a:spLocks noGrp="1" noChangeArrowheads="1"/>
             <a:extLst>
               <a:ext uri="smNativeData">
-                <pr:smNativeData xmlns:pr="smNativeData" xmlns="smNativeData" val="SMDATA_15_k0e5YxMAAAAlAAAAZAAAAA8BAAAAkAAAAEgAAACQAAAASAAAAAAAAAABAAAAAAAAAAEAAABQAAAAAAAAAAAA4D8AAAAAAADgPwAAAAAAAOA/AAAAAAAA4D8AAAAAAADgPwAAAAAAAOA/AAAAAAAA4D8AAAAAAADgPwAAAAAAAOA/AAAAAAAA4D8CAAAAjAAAAAAAAAAAAAAAM2bMDANPhAgAAAAAAAAAAAAAAAAAAAAAAAAAAAAAAAAAAAAAZAAAAAEAAABAAAAAAAAAAAAAAAAAAAAAAAAAAAAAAAAAAAAAAAAAAAAAAAAAAAAAAAAAAAAAAAAAAAAAAAAAAAAAAAAAAAAAAAAAAAAAAAAAAAAAAAAAAAAAAAAAAAAAFAAAADwAAAAAAAAAAAAAAP///wkUAAAAAQAAABQAAAAUAAAAFAAAAAEAAAAAAAAAZAAAAGQAAAAAAAAAZAAAAGQAAAAVAAAAYAAAAAAAAAAAAAAADwAAACADAAAAAAAAAAAAAAEAAACgMgAAVgcAAKr4//8BAAAAf39/AAEAAABkAAAAAAAAABQAAABAHwAAAAAAACYAAAAAAAAAwOD//wAAAAAmAAAAZAAAABYAAABMAAAAAAAAAAAAAAAEAAAAAAAAAAEAAABXiZEKAAAAACgAAAAoAAAAZAAAAGQAAAAAAAAAzMzMAAAAAABQAAAAUAAAAGQAAABkAAAAAAAAABcAAAAUAAAAAAAAAAAAAAD/fwAA/38AAAAAAAAJAAAABAAAANw7IAEeAAAAaAAAAAAAAAAAAAAAAAAAAAAAAAAAAAAAECcAABAnAAAAAAAAAAAAAAAAAAAAAAAAAAAAAAAAAAAAAAAAAAAAABQAAAAAAAAAwMD/AAAAAABkAAAAMgAAAAAAAABkAAAAAAAAAH9/fwAKAAAAIgAAABgAAAAAAAAAAAAAAAAAAAAAAAAAAAAAAAAAAAAkAAAAJAAAAAAAAAAHAAAAAAAAAAAAAAAAAAAAAAAAAAAAAAAAAAAAf39/ACUAAABYAAAAAAAAAAAAAAAAAAAAAAAAAAAAAAAAAAAAAAAAAAAAAAAAAAAAAAAAAAAAAAA/AAAAAAAAAKCGAQAAAAAAAAAAAAAAAAAMAAAAAQAAAAAAAAAAAAAAAAAAAB8AAABUAAAAAAAABQAAAAEAAAAAAAAAAAAAAAAAAAAAAAAAAAAAAAAAAAAAAAAAAAAAAAJ/f38AAAAAA8zMzADAwP8Af39/AAAAAAAAAAAAAAAAAAAAAAAAAAAAIQAAABgAAAAUAAAAoRkAABsnAABfMQAAWSkAABAAAAAmAAAACAAAAAAAAAAAAAAA"/>
+                <pr:smNativeData xmlns:pr="smNativeData" xmlns="smNativeData" val="SMDATA_15_bXy5YxMAAAAlAAAAZAAAAA8BAAAAkAAAAEgAAACQAAAASAAAAAAAAAABAAAAAAAAAAEAAABQAAAAAAAAAAAA4D8AAAAAAADgPwAAAAAAAOA/AAAAAAAA4D8AAAAAAADgPwAAAAAAAOA/AAAAAAAA4D8AAAAAAADgPwAAAAAAAOA/AAAAAAAA4D8CAAAAjAAAAAAAAAAAAAAAM2bMDANPhAgAAAAAAAAAAAAAAAAAAAAAAAAAAAAAAAAAAAAAZAAAAAEAAABAAAAAAAAAAAAAAAAAAAAAAAAAAAAAAAAAAAAAAAAAAAAAAAAAAAAAAAAAAAAAAAAAAAAAAAAAAAAAAAAAAAAAAAAAAAAAAAAAAAAAAAAAAAAAAAAAAAAAFAAAADwAAAAAAAAAAAAAAP///wkUAAAAAQAAABQAAAAUAAAAFAAAAAEAAAAAAAAAZAAAAGQAAAAAAAAAZAAAAGQAAAAVAAAAYAAAAAAAAAAAAAAADwAAACADAAAAAAAAAAAAAAEAAACgMgAAVgcAAKr4//8BAAAAf39/AAEAAABkAAAAAAAAABQAAABAHwAAAAAAACYAAAAAAAAAwOD//wAAAAAmAAAAZAAAABYAAABMAAAAAAAAAAAAAAAEAAAAAAAAAAEAAABXiZEKAAAAACgAAAAoAAAAZAAAAGQAAAAAAAAAzMzMAAAAAABQAAAAUAAAAGQAAABkAAAAAAAAABcAAAAUAAAAAAAAAAAAAAD/fwAA/38AAAAAAAAJAAAABAAAANw7IAEeAAAAaAAAAAAAAAAAAAAAAAAAAAAAAAAAAAAAECcAABAnAAAAAAAAAAAAAAAAAAAAAAAAAAAAAAAAAAAAAAAAAAAAABQAAAAAAAAAwMD/AAAAAABkAAAAMgAAAAAAAABkAAAAAAAAAH9/fwAKAAAAIgAAABgAAAAAAAAAAAAAAAAAAAAAAAAAAAAAAAAAAAAkAAAAJAAAAAAAAAAHAAAAAAAAAAAAAAAAAAAAAAAAAAAAAAAAAAAAf39/ACUAAABYAAAAAAAAAAAAAAAAAAAAAAAAAAAAAAAAAAAAAAAAAAAAAAAAAAAAAAAAAAAAAAA/AAAAAAAAAKCGAQAAAAAAAAAAAAAAAAAMAAAAAQAAAAAAAAAAAAAAAAAAAB8AAABUAAAAAAAABQAAAAEAAAAAAAAAAAAAAAAAAAAAAAAAAAAAAAAAAAAAAAAAAAAAAAJ/f38AAAAAA8zMzADAwP8Af39/AAAAAAAAAAAAAAAAAAAAAAAAAAAAIQAAABgAAAAUAAAAoRkAABsnAABfMQAAWSkAABAAAAAmAAAACAAAAAAAAAAAAAAA"/>
               </a:ext>
             </a:extLst>
           </p:cNvSpPr>
@@ -1467,7 +1467,7 @@
             <a:spLocks noGrp="1" noChangeArrowheads="1"/>
             <a:extLst>
               <a:ext uri="smNativeData">
-                <pr:smNativeData xmlns:pr="smNativeData" xmlns="smNativeData" val="SMDATA_15_k0e5YxMAAAAlAAAAZAAAAA8BAAAAkAAAAEgAAACQAAAASAAAAAAAAAABAAAAAAAAAAEAAABQAAAAAAAAAAAA4D8AAAAAAADgPwAAAAAAAOA/AAAAAAAA4D8AAAAAAADgPwAAAAAAAOA/AAAAAAAA4D8AAAAAAADgPwAAAAAAAOA/AAAAAAAA4D8CAAAAjAAAAAAAAAAAAAAAM2bMDANPhAgAAAAAAAAAAAAAAAAAAAAAAAAAAAAAAAAAAAAAZAAAAAEAAABAAAAAAAAAAAAAAAAAAAAAAAAAAAAAAAAAAAAAAAAAAAAAAAAAAAAAAAAAAAAAAAAAAAAAAAAAAAAAAAAAAAAAAAAAAAAAAAAAAAAAAAAAAAAAAAAAAAAAFAAAADwAAAAAAAAAAAAAAP///wkUAAAAAQAAABQAAAAUAAAAFAAAAAEAAAAAAAAAZAAAAGQAAAAAAAAAZAAAAGQAAAAVAAAAYAAAAAAAAAAAAAAADwAAACADAAAAAAAAAAAAAAEAAACgMgAAVgcAAKr4//8BAAAAf39/AAEAAABkAAAAAAAAABQAAABAHwAAAAAAACYAAAAAAAAAwOD//wAAAAAmAAAAZAAAABYAAABMAAAAAAAAAAAAAAAEAAAAAAAAAAEAAABXiZEKAAAAACgAAAAoAAAAZAAAAGQAAAAAAAAAzMzMAAAAAABQAAAAUAAAAGQAAABkAAAAAAAAABcAAAAUAAAAAAAAAAAAAAD/fwAA/38AAAAAAAAJAAAABAAAANw7IAEeAAAAaAAAAAAAAAAAAAAAAAAAAAAAAAAAAAAAECcAABAnAAAAAAAAAAAAAAAAAAAAAAAAAAAAAAAAAAAAAAAAAAAAABQAAAAAAAAAwMD/AAAAAABkAAAAMgAAAAAAAABkAAAAAAAAAH9/fwAKAAAAIgAAABgAAAAAAAAAAAAAAAAAAAAAAAAAAAAAAAAAAAAkAAAAJAAAAAAAAAAHAAAAAAAAAAAAAAAAAAAAAAAAAAAAAAAAAAAAf39/ACUAAABYAAAAAAAAAAAAAAAAAAAAAAAAAAAAAAAAAAAAAAAAAAAAAAAAAAAAAAAAAAAAAAA/AAAAAAAAAKCGAQAAAAAAAAAAAAAAAAAMAAAAAQAAAAAAAAAAAAAAAAAAAB8AAABUAAAAAAAABQAAAAEAAAAAAAAAAAAAAAAAAAAAAAAAAAAAAAAAAAAAAAAAAAAAAAJ/f38AAAAAA8zMzADAwP8Af39/AAAAAAAAAAAAAAAAAAAAAAAAAAAAIQAAABgAAAAUAAAAwTUAABsnAABARwAAWSkAABAAAAAmAAAACAAAAAAAAAAAAAAA"/>
+                <pr:smNativeData xmlns:pr="smNativeData" xmlns="smNativeData" val="SMDATA_15_bXy5YxMAAAAlAAAAZAAAAA8BAAAAkAAAAEgAAACQAAAASAAAAAAAAAABAAAAAAAAAAEAAABQAAAAAAAAAAAA4D8AAAAAAADgPwAAAAAAAOA/AAAAAAAA4D8AAAAAAADgPwAAAAAAAOA/AAAAAAAA4D8AAAAAAADgPwAAAAAAAOA/AAAAAAAA4D8CAAAAjAAAAAAAAAAAAAAAM2bMDANPhAgAAAAAAAAAAAAAAAAAAAAAAAAAAAAAAAAAAAAAZAAAAAEAAABAAAAAAAAAAAAAAAAAAAAAAAAAAAAAAAAAAAAAAAAAAAAAAAAAAAAAAAAAAAAAAAAAAAAAAAAAAAAAAAAAAAAAAAAAAAAAAAAAAAAAAAAAAAAAAAAAAAAAFAAAADwAAAAAAAAAAAAAAP///wkUAAAAAQAAABQAAAAUAAAAFAAAAAEAAAAAAAAAZAAAAGQAAAAAAAAAZAAAAGQAAAAVAAAAYAAAAAAAAAAAAAAADwAAACADAAAAAAAAAAAAAAEAAACgMgAAVgcAAKr4//8BAAAAf39/AAEAAABkAAAAAAAAABQAAABAHwAAAAAAACYAAAAAAAAAwOD//wAAAAAmAAAAZAAAABYAAABMAAAAAAAAAAAAAAAEAAAAAAAAAAEAAABXiZEKAAAAACgAAAAoAAAAZAAAAGQAAAAAAAAAzMzMAAAAAABQAAAAUAAAAGQAAABkAAAAAAAAABcAAAAUAAAAAAAAAAAAAAD/fwAA/38AAAAAAAAJAAAABAAAANw7IAEeAAAAaAAAAAAAAAAAAAAAAAAAAAAAAAAAAAAAECcAABAnAAAAAAAAAAAAAAAAAAAAAAAAAAAAAAAAAAAAAAAAAAAAABQAAAAAAAAAwMD/AAAAAABkAAAAMgAAAAAAAABkAAAAAAAAAH9/fwAKAAAAIgAAABgAAAAAAAAAAAAAAAAAAAAAAAAAAAAAAAAAAAAkAAAAJAAAAAAAAAAHAAAAAAAAAAAAAAAAAAAAAAAAAAAAAAAAAAAAf39/ACUAAABYAAAAAAAAAAAAAAAAAAAAAAAAAAAAAAAAAAAAAAAAAAAAAAAAAAAAAAAAAAAAAAA/AAAAAAAAAKCGAQAAAAAAAAAAAAAAAAAMAAAAAQAAAAAAAAAAAAAAAAAAAB8AAABUAAAAAAAABQAAAAEAAAAAAAAAAAAAAAAAAAAAAAAAAAAAAAAAAAAAAAAAAAAAAAJ/f38AAAAAA8zMzADAwP8Af39/AAAAAAAAAAAAAAAAAAAAAAAAAAAAIQAAABgAAAAUAAAAwTUAABsnAABARwAAWSkAABAAAAAmAAAACAAAAAAAAAAAAAAA"/>
               </a:ext>
             </a:extLst>
           </p:cNvSpPr>
@@ -1481,7 +1481,7 @@
           <a:lstStyle/>
           <a:p>
             <a:pPr/>
-            <a:fld id="{2C5FBD67-29C1-0A4B-8FE7-DF1EF3A9798A}" type="slidenum">
+            <a:fld id="{50E6E14D-03BD-B317-F35E-F542AF1005A0}" type="slidenum">
               <a:t/>
             </a:fld>
           </a:p>
@@ -1520,7 +1520,7 @@
             <a:spLocks noGrp="1" noChangeArrowheads="1"/>
             <a:extLst>
               <a:ext uri="smNativeData">
-                <pr:smNativeData xmlns:pr="smNativeData" xmlns="smNativeData" val="SMDATA_15_k0e5YxMAAAAlAAAAZAAAAA8BAAAAkAAAAEgAAACQAAAASAAAAAAAAAABAAAAAAAAAAEAAABQAAAAAAAAAAAA4D8AAAAAAADgPwAAAAAAAOA/AAAAAAAA4D8AAAAAAADgPwAAAAAAAOA/AAAAAAAA4D8AAAAAAADgPwAAAAAAAOA/AAAAAAAA4D8CAAAAjAAAAAAAAAAAAAAAM2bMDANPhAgAAAAAAAAAAAAAAAAAAAAAAAAAAAAAAAAAAAAAZAAAAAEAAABAAAAAAAAAAAAAAAAAAAAAAAAAAAAAAAAAAAAAAAAAAAAAAAAAAAAAAAAAAAAAAAAAAAAAAAAAAAAAAAAAAAAAAAAAAAAAAAAAAAAAAAAAAAAAAAAAAAAAFAAAADwAAAAAAAAAAAAAAP///wkUAAAAAQAAABQAAAAUAAAAFAAAAAEAAAAAAAAAZAAAAGQAAAAAAAAAZAAAAGQAAAAVAAAAYAAAAAAAAAAAAAAADwAAACADAAAAAAAAAAAAAAEAAACgMgAAVgcAAKr4//8BAAAAf39/AAEAAABkAAAAAAAAABQAAABAHwAAAAAAACYAAAAAAAAAwOD//wAAAAAmAAAAZAAAABYAAABMAAAAAAAAAAAAAAAEAAAAAAAAAAEAAABXiZEKAAAAACgAAAAoAAAAZAAAAGQAAAAAAAAAzMzMAAAAAABQAAAAUAAAAGQAAABkAAAAAAAAABcAAAAUAAAAAAAAAAAAAAD/fwAA/38AAAAAAAAJAAAABAAAANw7IAEeAAAAaAAAAAAAAAAAAAAAAAAAAAAAAAAAAAAAECcAABAnAAAAAAAAAAAAAAAAAAAAAAAAAAAAAAAAAAAAAAAAAAAAABQAAAAAAAAAwMD/AAAAAABkAAAAMgAAAAAAAABkAAAAAAAAAH9/fwAKAAAAIgAAABgAAAAAAAAAAAAAAAAAAAAAAAAAAAAAAAAAAAAkAAAAJAAAAAAAAAAHAAAAAAAAAAAAAAAAAAAAAAAAAAAAAAAAAAAAf39/ACUAAABYAAAAAAAAAAAAAAAAAAAAAAAAAAAAAAAAAAAAAAAAAAAAAAAAAAAAAAAAAAAAAAA/AAAAAAAAAKCGAQAAAAAAAAAAAAAAAAAMAAAAAQAAAAAAAAAAAAAAAAAAAB8AAABUAAAAAAAABQAAAAEAAAAAAAAAAAAAAAAAAAAAAAAAAAAAAAAAAAAAAAAAAAAAAAJ/f38AAAAAA8zMzADAwP8Af39/AAAAAAAAAAAAAAAAAAAAAAAAAAAAIQAAABgAAAAUAAAAwAMAALABAABARwAAuAgAABAAAAAmAAAACAAAAAAAAAAAAAAA"/>
+                <pr:smNativeData xmlns:pr="smNativeData" xmlns="smNativeData" val="SMDATA_15_bXy5YxMAAAAlAAAAZAAAAA8BAAAAkAAAAEgAAACQAAAASAAAAAAAAAABAAAAAAAAAAEAAABQAAAAAAAAAAAA4D8AAAAAAADgPwAAAAAAAOA/AAAAAAAA4D8AAAAAAADgPwAAAAAAAOA/AAAAAAAA4D8AAAAAAADgPwAAAAAAAOA/AAAAAAAA4D8CAAAAjAAAAAAAAAAAAAAAM2bMDANPhAgAAAAAAAAAAAAAAAAAAAAAAAAAAAAAAAAAAAAAZAAAAAEAAABAAAAAAAAAAAAAAAAAAAAAAAAAAAAAAAAAAAAAAAAAAAAAAAAAAAAAAAAAAAAAAAAAAAAAAAAAAAAAAAAAAAAAAAAAAAAAAAAAAAAAAAAAAAAAAAAAAAAAFAAAADwAAAAAAAAAAAAAAP///wkUAAAAAQAAABQAAAAUAAAAFAAAAAEAAAAAAAAAZAAAAGQAAAAAAAAAZAAAAGQAAAAVAAAAYAAAAAAAAAAAAAAADwAAACADAAAAAAAAAAAAAAEAAACgMgAAVgcAAKr4//8BAAAAf39/AAEAAABkAAAAAAAAABQAAABAHwAAAAAAACYAAAAAAAAAwOD//wAAAAAmAAAAZAAAABYAAABMAAAAAAAAAAAAAAAEAAAAAAAAAAEAAABXiZEKAAAAACgAAAAoAAAAZAAAAGQAAAAAAAAAzMzMAAAAAABQAAAAUAAAAGQAAABkAAAAAAAAABcAAAAUAAAAAAAAAAAAAAD/fwAA/38AAAAAAAAJAAAABAAAANw7IAEeAAAAaAAAAAAAAAAAAAAAAAAAAAAAAAAAAAAAECcAABAnAAAAAAAAAAAAAAAAAAAAAAAAAAAAAAAAAAAAAAAAAAAAABQAAAAAAAAAwMD/AAAAAABkAAAAMgAAAAAAAABkAAAAAAAAAH9/fwAKAAAAIgAAABgAAAAAAAAAAAAAAAAAAAAAAAAAAAAAAAAAAAAkAAAAJAAAAAAAAAAHAAAAAAAAAAAAAAAAAAAAAAAAAAAAAAAAAAAAf39/ACUAAABYAAAAAAAAAAAAAAAAAAAAAAAAAAAAAAAAAAAAAAAAAAAAAAAAAAAAAAAAAAAAAAA/AAAAAAAAAKCGAQAAAAAAAAAAAAAAAAAMAAAAAQAAAAAAAAAAAAAAAAAAAB8AAABUAAAAAAAABQAAAAEAAAAAAAAAAAAAAAAAAAAAAAAAAAAAAAAAAAAAAAAAAAAAAAJ/f38AAAAAA8zMzADAwP8Af39/AAAAAAAAAAAAAAAAAAAAAAAAAAAAIQAAABgAAAAUAAAAwAMAALABAABARwAAuAgAABAAAAAmAAAACAAAAAAAAAAAAAAA"/>
               </a:ext>
             </a:extLst>
           </p:cNvSpPr>
@@ -1547,7 +1547,7 @@
             <a:spLocks noGrp="1" noChangeArrowheads="1"/>
             <a:extLst>
               <a:ext uri="smNativeData">
-                <pr:smNativeData xmlns:pr="smNativeData" xmlns="smNativeData" val="SMDATA_15_k0e5YxMAAAAlAAAAZAAAAA8BAAAAkAAAAEgAAACQAAAASAAAAAAAAAACAAAAAAAAAAEAAABQAAAAAAAAAAAA4D8AAAAAAADgPwAAAAAAAOA/AAAAAAAA4D8AAAAAAADgPwAAAAAAAOA/AAAAAAAA4D8AAAAAAADgPwAAAAAAAOA/AAAAAAAA4D8CAAAAjAAAAAAAAAAAAAAAM2bMDANPhAgAAAAAAAAAAAAAAAAAAAAAAAAAAAAAAAAAAAAAZAAAAAEAAABAAAAAAAAAAAAAAAAAAAAAAAAAAAAAAAAAAAAAAAAAAAAAAAAAAAAAAAAAAAAAAAAAAAAAAAAAAAAAAAAAAAAAAAAAAAAAAAAAAAAAAAAAAAAAAAAAAAAAFAAAADwAAAAAAAAAAAAAAP///wkUAAAAAQAAABQAAAAUAAAAFAAAAAEAAAAAAAAAZAAAAGQAAAAAAAAAZAAAAGQAAAAVAAAAYAAAAAAAAAAAAAAADwAAACADAAAAAAAAAAAAAAEAAACgMgAAVgcAAKr4//8BAAAAf39/AAEAAABkAAAAAAAAABQAAABAHwAAAAAAACYAAAAAAAAAwOD//wAAAAAmAAAAZAAAABYAAABMAAAAAAAAAAAAAAAEAAAAAAAAAAEAAABXiZEKAAAAACgAAAAoAAAAZAAAAGQAAAAAAAAAzMzMAAAAAABQAAAAUAAAAGQAAABkAAAAAAAAABcAAAAUAAAAAAAAAAAAAAD/fwAA/38AAAAAAAAJAAAABAAAANw7IAEeAAAAaAAAAAAAAAAAAAAAAAAAAAAAAAAAAAAAECcAABAnAAAAAAAAAAAAAAAAAAAAAAAAAAAAAAAAAAAAAAAAAAAAABQAAAAAAAAAwMD/AAAAAABkAAAAMgAAAAAAAABkAAAAAAAAAH9/fwAKAAAAIgAAABgAAAAAAAAAAAAAAAAAAAAAAAAAAAAAAAAAAAAkAAAAJAAAAAAAAAAHAAAAAAAAAAAAAAAAAAAAAAAAAAAAAAAAAAAAf39/ACUAAABYAAAAAAAAAAAAAAAAAAAAAAAAAAAAAAAAAAAAAAAAAAAAAAAAAAAAAAAAAAAAAAA/AAAAAAAAAKCGAQAAAAAAAAAAAAAAAAAMAAAAAQAAAAAAAAAAAAAAAAAAAB8AAABUAAAAAAAABQAAAAEAAAAAAAAAAAAAAAAAAAAAAAAAAAAAAAAAAAAAAAAAAAAAAAJ/f38AAAAAA8zMzADAwP8Af39/AAAAAAAAAAAAAAAAAAAAAAAAAAAAIQAAABgAAAAUAAAAwAMAAHEJAADjJAAAYQ0AABAAAAAmAAAACAAAAIGAAAAAAAAA"/>
+                <pr:smNativeData xmlns:pr="smNativeData" xmlns="smNativeData" val="SMDATA_15_bXy5YxMAAAAlAAAAZAAAAA8BAAAAkAAAAEgAAACQAAAASAAAAAAAAAACAAAAAAAAAAEAAABQAAAAAAAAAAAA4D8AAAAAAADgPwAAAAAAAOA/AAAAAAAA4D8AAAAAAADgPwAAAAAAAOA/AAAAAAAA4D8AAAAAAADgPwAAAAAAAOA/AAAAAAAA4D8CAAAAjAAAAAAAAAAAAAAAM2bMDANPhAgAAAAAAAAAAAAAAAAAAAAAAAAAAAAAAAAAAAAAZAAAAAEAAABAAAAAAAAAAAAAAAAAAAAAAAAAAAAAAAAAAAAAAAAAAAAAAAAAAAAAAAAAAAAAAAAAAAAAAAAAAAAAAAAAAAAAAAAAAAAAAAAAAAAAAAAAAAAAAAAAAAAAFAAAADwAAAAAAAAAAAAAAP///wkUAAAAAQAAABQAAAAUAAAAFAAAAAEAAAAAAAAAZAAAAGQAAAAAAAAAZAAAAGQAAAAVAAAAYAAAAAAAAAAAAAAADwAAACADAAAAAAAAAAAAAAEAAACgMgAAVgcAAKr4//8BAAAAf39/AAEAAABkAAAAAAAAABQAAABAHwAAAAAAACYAAAAAAAAAwOD//wAAAAAmAAAAZAAAABYAAABMAAAAAAAAAAAAAAAEAAAAAAAAAAEAAABXiZEKAAAAACgAAAAoAAAAZAAAAGQAAAAAAAAAzMzMAAAAAABQAAAAUAAAAGQAAABkAAAAAAAAABcAAAAUAAAAAAAAAAAAAAD/fwAA/38AAAAAAAAJAAAABAAAANw7IAEeAAAAaAAAAAAAAAAAAAAAAAAAAAAAAAAAAAAAECcAABAnAAAAAAAAAAAAAAAAAAAAAAAAAAAAAAAAAAAAAAAAAAAAABQAAAAAAAAAwMD/AAAAAABkAAAAMgAAAAAAAABkAAAAAAAAAH9/fwAKAAAAIgAAABgAAAAAAAAAAAAAAAAAAAAAAAAAAAAAAAAAAAAkAAAAJAAAAAAAAAAHAAAAAAAAAAAAAAAAAAAAAAAAAAAAAAAAAAAAf39/ACUAAABYAAAAAAAAAAAAAAAAAAAAAAAAAAAAAAAAAAAAAAAAAAAAAAAAAAAAAAAAAAAAAAA/AAAAAAAAAKCGAQAAAAAAAAAAAAAAAAAMAAAAAQAAAAAAAAAAAAAAAAAAAB8AAABUAAAAAAAABQAAAAEAAAAAAAAAAAAAAAAAAAAAAAAAAAAAAAAAAAAAAAAAAAAAAAJ/f38AAAAAA8zMzADAwP8Af39/AAAAAAAAAAAAAAAAAAAAAAAAAAAAIQAAABgAAAAUAAAAwAMAAHEJAADjJAAAYQ0AABAAAAAmAAAACAAAAIGAAAAAAAAA"/>
               </a:ext>
             </a:extLst>
           </p:cNvSpPr>
@@ -1620,7 +1620,7 @@
             <a:spLocks noGrp="1" noChangeArrowheads="1"/>
             <a:extLst>
               <a:ext uri="smNativeData">
-                <pr:smNativeData xmlns:pr="smNativeData" xmlns="smNativeData" val="SMDATA_15_k0e5YxMAAAAlAAAAZAAAAA8BAAAAkAAAAEgAAACQAAAASAAAAAAAAAAAAAAAAAAAAAEAAABQAAAAAAAAAAAA4D8AAAAAAADgPwAAAAAAAOA/AAAAAAAA4D8AAAAAAADgPwAAAAAAAOA/AAAAAAAA4D8AAAAAAADgPwAAAAAAAOA/AAAAAAAA4D8CAAAAjAAAAAAAAAAAAAAAM2bMDANPhAgAAAAAAAAAAAAAAAAAAAAAAAAAAAAAAAAAAAAAZAAAAAEAAABAAAAAAAAAAAAAAAAAAAAAAAAAAAAAAAAAAAAAAAAAAAAAAAAAAAAAAAAAAAAAAAAAAAAAAAAAAAAAAAAAAAAAAAAAAAAAAAAAAAAAAAAAAAAAAAAAAAAAFAAAADwAAAAAAAAAAAAAAP///wkUAAAAAQAAABQAAAAUAAAAFAAAAAEAAAAAAAAAZAAAAGQAAAAAAAAAZAAAAGQAAAAVAAAAYAAAAAAAAAAAAAAADwAAACADAAAAAAAAAAAAAAEAAACgMgAAVgcAAKr4//8BAAAAf39/AAEAAABkAAAAAAAAABQAAABAHwAAAAAAACYAAAAAAAAAwOD//wAAAAAmAAAAZAAAABYAAABMAAAAAAAAAAAAAAAEAAAAAAAAAAEAAABXiZEKAAAAACgAAAAoAAAAZAAAAGQAAAAAAAAAzMzMAAAAAABQAAAAUAAAAGQAAABkAAAAAAAAABcAAAAUAAAAAAAAAAAAAAD/fwAA/38AAAAAAAAJAAAABAAAANw7IAEeAAAAaAAAAAAAAAAAAAAAAAAAAAAAAAAAAAAAECcAABAnAAAAAAAAAAAAAAAAAAAAAAAAAAAAAAAAAAAAAAAAAAAAABQAAAAAAAAAwMD/AAAAAABkAAAAMgAAAAAAAABkAAAAAAAAAH9/fwAKAAAAIgAAABgAAAAAAAAAAAAAAAAAAAAAAAAAAAAAAAAAAAAkAAAAJAAAAAAAAAAHAAAAAAAAAAAAAAAAAAAAAAAAAAAAAAAAAAAAf39/ACUAAABYAAAAAAAAAAAAAAAAAAAAAAAAAAAAAAAAAAAAAAAAAAAAAAAAAAAAAAAAAAAAAAA/AAAAAAAAAKCGAQAAAAAAAAAAAAAAAAAMAAAAAQAAAAAAAAAAAAAAAAAAAB8AAABUAAAAAAAABQAAAAEAAAAAAAAAAAAAAAAAAAAAAAAAAAAAAAAAAAAAAAAAAAAAAAJ/f38AAAAAA8zMzADAwP8Af39/AAAAAAAAAAAAAAAAAAAAAAAAAAAAIQAAABgAAAAUAAAAwAMAAGENAADjJAAAsCUAABAAAAAmAAAACAAAAAGAAAAAAAAA"/>
+                <pr:smNativeData xmlns:pr="smNativeData" xmlns="smNativeData" val="SMDATA_15_bXy5YxMAAAAlAAAAZAAAAA8BAAAAkAAAAEgAAACQAAAASAAAAAAAAAAAAAAAAAAAAAEAAABQAAAAAAAAAAAA4D8AAAAAAADgPwAAAAAAAOA/AAAAAAAA4D8AAAAAAADgPwAAAAAAAOA/AAAAAAAA4D8AAAAAAADgPwAAAAAAAOA/AAAAAAAA4D8CAAAAjAAAAAAAAAAAAAAAM2bMDANPhAgAAAAAAAAAAAAAAAAAAAAAAAAAAAAAAAAAAAAAZAAAAAEAAABAAAAAAAAAAAAAAAAAAAAAAAAAAAAAAAAAAAAAAAAAAAAAAAAAAAAAAAAAAAAAAAAAAAAAAAAAAAAAAAAAAAAAAAAAAAAAAAAAAAAAAAAAAAAAAAAAAAAAFAAAADwAAAAAAAAAAAAAAP///wkUAAAAAQAAABQAAAAUAAAAFAAAAAEAAAAAAAAAZAAAAGQAAAAAAAAAZAAAAGQAAAAVAAAAYAAAAAAAAAAAAAAADwAAACADAAAAAAAAAAAAAAEAAACgMgAAVgcAAKr4//8BAAAAf39/AAEAAABkAAAAAAAAABQAAABAHwAAAAAAACYAAAAAAAAAwOD//wAAAAAmAAAAZAAAABYAAABMAAAAAAAAAAAAAAAEAAAAAAAAAAEAAABXiZEKAAAAACgAAAAoAAAAZAAAAGQAAAAAAAAAzMzMAAAAAABQAAAAUAAAAGQAAABkAAAAAAAAABcAAAAUAAAAAAAAAAAAAAD/fwAA/38AAAAAAAAJAAAABAAAANw7IAEeAAAAaAAAAAAAAAAAAAAAAAAAAAAAAAAAAAAAECcAABAnAAAAAAAAAAAAAAAAAAAAAAAAAAAAAAAAAAAAAAAAAAAAABQAAAAAAAAAwMD/AAAAAABkAAAAMgAAAAAAAABkAAAAAAAAAH9/fwAKAAAAIgAAABgAAAAAAAAAAAAAAAAAAAAAAAAAAAAAAAAAAAAkAAAAJAAAAAAAAAAHAAAAAAAAAAAAAAAAAAAAAAAAAAAAAAAAAAAAf39/ACUAAABYAAAAAAAAAAAAAAAAAAAAAAAAAAAAAAAAAAAAAAAAAAAAAAAAAAAAAAAAAAAAAAA/AAAAAAAAAKCGAQAAAAAAAAAAAAAAAAAMAAAAAQAAAAAAAAAAAAAAAAAAAB8AAABUAAAAAAAABQAAAAEAAAAAAAAAAAAAAAAAAAAAAAAAAAAAAAAAAAAAAAAAAAAAAAJ/f38AAAAAA8zMzADAwP8Af39/AAAAAAAAAAAAAAAAAAAAAAAAAAAAIQAAABgAAAAUAAAAwAMAAGENAADjJAAAsCUAABAAAAAmAAAACAAAAAGAAAAAAAAA"/>
               </a:ext>
             </a:extLst>
           </p:cNvSpPr>
@@ -1704,7 +1704,7 @@
             <a:spLocks noGrp="1" noChangeArrowheads="1"/>
             <a:extLst>
               <a:ext uri="smNativeData">
-                <pr:smNativeData xmlns:pr="smNativeData" xmlns="smNativeData" val="SMDATA_15_k0e5YxMAAAAlAAAAZAAAAA8BAAAAkAAAAEgAAACQAAAASAAAAAAAAAACAAAAAAAAAAEAAABQAAAAAAAAAAAA4D8AAAAAAADgPwAAAAAAAOA/AAAAAAAA4D8AAAAAAADgPwAAAAAAAOA/AAAAAAAA4D8AAAAAAADgPwAAAAAAAOA/AAAAAAAA4D8CAAAAjAAAAAAAAAAAAAAAM2bMDANPhAgAAAAAAAAAAAAAAAAAAAAAAAAAAAAAAAAAAAAAZAAAAAEAAABAAAAAAAAAAAAAAAAAAAAAAAAAAAAAAAAAAAAAAAAAAAAAAAAAAAAAAAAAAAAAAAAAAAAAAAAAAAAAAAAAAAAAAAAAAAAAAAAAAAAAAAAAAAAAAAAAAAAAFAAAADwAAAAAAAAAAAAAAP///wkUAAAAAQAAABQAAAAUAAAAFAAAAAEAAAAAAAAAZAAAAGQAAAAAAAAAZAAAAGQAAAAVAAAAYAAAAAAAAAAAAAAADwAAACADAAAAAAAAAAAAAAEAAACgMgAAVgcAAKr4//8BAAAAf39/AAEAAABkAAAAAAAAABQAAABAHwAAAAAAACYAAAAAAAAAwOD//wAAAAAmAAAAZAAAABYAAABMAAAAAAAAAAAAAAAEAAAAAAAAAAEAAABXiZEKAAAAACgAAAAoAAAAZAAAAGQAAAAAAAAAzMzMAAAAAABQAAAAUAAAAGQAAABkAAAAAAAAABcAAAAUAAAAAAAAAAAAAAD/fwAA/38AAAAAAAAJAAAABAAAANw7IAEeAAAAaAAAAAAAAAAAAAAAAAAAAAAAAAAAAAAAECcAABAnAAAAAAAAAAAAAAAAAAAAAAAAAAAAAAAAAAAAAAAAAAAAABQAAAAAAAAAwMD/AAAAAABkAAAAMgAAAAAAAABkAAAAAAAAAH9/fwAKAAAAIgAAABgAAAAAAAAAAAAAAAAAAAAAAAAAAAAAAAAAAAAkAAAAJAAAAAAAAAAHAAAAAAAAAAAAAAAAAAAAAAAAAAAAAAAAAAAAf39/ACUAAABYAAAAAAAAAAAAAAAAAAAAAAAAAAAAAAAAAAAAAAAAAAAAAAAAAAAAAAAAAAAAAAA/AAAAAAAAAKCGAQAAAAAAAAAAAAAAAAAMAAAAAQAAAAAAAAAAAAAAAAAAAB8AAABUAAAAAAAABQAAAAEAAAAAAAAAAAAAAAAAAAAAAAAAAAAAAAAAAAAAAAAAAAAAAAJ/f38AAAAAA8zMzADAwP8Af39/AAAAAAAAAAAAAAAAAAAAAAAAAAAAIQAAABgAAAAUAAAAHSYAAHEJAABARwAAYQ0AABAAAAAmAAAACAAAAIGAAAAAAAAA"/>
+                <pr:smNativeData xmlns:pr="smNativeData" xmlns="smNativeData" val="SMDATA_15_bXy5YxMAAAAlAAAAZAAAAA8BAAAAkAAAAEgAAACQAAAASAAAAAAAAAACAAAAAAAAAAEAAABQAAAAAAAAAAAA4D8AAAAAAADgPwAAAAAAAOA/AAAAAAAA4D8AAAAAAADgPwAAAAAAAOA/AAAAAAAA4D8AAAAAAADgPwAAAAAAAOA/AAAAAAAA4D8CAAAAjAAAAAAAAAAAAAAAM2bMDANPhAgAAAAAAAAAAAAAAAAAAAAAAAAAAAAAAAAAAAAAZAAAAAEAAABAAAAAAAAAAAAAAAAAAAAAAAAAAAAAAAAAAAAAAAAAAAAAAAAAAAAAAAAAAAAAAAAAAAAAAAAAAAAAAAAAAAAAAAAAAAAAAAAAAAAAAAAAAAAAAAAAAAAAFAAAADwAAAAAAAAAAAAAAP///wkUAAAAAQAAABQAAAAUAAAAFAAAAAEAAAAAAAAAZAAAAGQAAAAAAAAAZAAAAGQAAAAVAAAAYAAAAAAAAAAAAAAADwAAACADAAAAAAAAAAAAAAEAAACgMgAAVgcAAKr4//8BAAAAf39/AAEAAABkAAAAAAAAABQAAABAHwAAAAAAACYAAAAAAAAAwOD//wAAAAAmAAAAZAAAABYAAABMAAAAAAAAAAAAAAAEAAAAAAAAAAEAAABXiZEKAAAAACgAAAAoAAAAZAAAAGQAAAAAAAAAzMzMAAAAAABQAAAAUAAAAGQAAABkAAAAAAAAABcAAAAUAAAAAAAAAAAAAAD/fwAA/38AAAAAAAAJAAAABAAAANw7IAEeAAAAaAAAAAAAAAAAAAAAAAAAAAAAAAAAAAAAECcAABAnAAAAAAAAAAAAAAAAAAAAAAAAAAAAAAAAAAAAAAAAAAAAABQAAAAAAAAAwMD/AAAAAABkAAAAMgAAAAAAAABkAAAAAAAAAH9/fwAKAAAAIgAAABgAAAAAAAAAAAAAAAAAAAAAAAAAAAAAAAAAAAAkAAAAJAAAAAAAAAAHAAAAAAAAAAAAAAAAAAAAAAAAAAAAAAAAAAAAf39/ACUAAABYAAAAAAAAAAAAAAAAAAAAAAAAAAAAAAAAAAAAAAAAAAAAAAAAAAAAAAAAAAAAAAA/AAAAAAAAAKCGAQAAAAAAAAAAAAAAAAAMAAAAAQAAAAAAAAAAAAAAAAAAAB8AAABUAAAAAAAABQAAAAEAAAAAAAAAAAAAAAAAAAAAAAAAAAAAAAAAAAAAAAAAAAAAAAJ/f38AAAAAA8zMzADAwP8Af39/AAAAAAAAAAAAAAAAAAAAAAAAAAAAIQAAABgAAAAUAAAAHSYAAHEJAABARwAAYQ0AABAAAAAmAAAACAAAAIGAAAAAAAAA"/>
               </a:ext>
             </a:extLst>
           </p:cNvSpPr>
@@ -1777,7 +1777,7 @@
             <a:spLocks noGrp="1" noChangeArrowheads="1"/>
             <a:extLst>
               <a:ext uri="smNativeData">
-                <pr:smNativeData xmlns:pr="smNativeData" xmlns="smNativeData" val="SMDATA_15_k0e5YxMAAAAlAAAAZAAAAA8BAAAAkAAAAEgAAACQAAAASAAAAAAAAAAAAAAAAAAAAAEAAABQAAAAAAAAAAAA4D8AAAAAAADgPwAAAAAAAOA/AAAAAAAA4D8AAAAAAADgPwAAAAAAAOA/AAAAAAAA4D8AAAAAAADgPwAAAAAAAOA/AAAAAAAA4D8CAAAAjAAAAAAAAAAAAAAAM2bMDANPhAgAAAAAAAAAAAAAAAAAAAAAAAAAAAAAAAAAAAAAZAAAAAEAAABAAAAAAAAAAAAAAAAAAAAAAAAAAAAAAAAAAAAAAAAAAAAAAAAAAAAAAAAAAAAAAAAAAAAAAAAAAAAAAAAAAAAAAAAAAAAAAAAAAAAAAAAAAAAAAAAAAAAAFAAAADwAAAAAAAAAAAAAAP///wkUAAAAAQAAABQAAAAUAAAAFAAAAAEAAAAAAAAAZAAAAGQAAAAAAAAAZAAAAGQAAAAVAAAAYAAAAAAAAAAAAAAADwAAACADAAAAAAAAAAAAAAEAAACgMgAAVgcAAKr4//8BAAAAf39/AAEAAABkAAAAAAAAABQAAABAHwAAAAAAACYAAAAAAAAAwOD//wAAAAAmAAAAZAAAABYAAABMAAAAAAAAAAAAAAAEAAAAAAAAAAEAAABXiZEKAAAAACgAAAAoAAAAZAAAAGQAAAAAAAAAzMzMAAAAAABQAAAAUAAAAGQAAABkAAAAAAAAABcAAAAUAAAAAAAAAAAAAAD/fwAA/38AAAAAAAAJAAAABAAAANw7IAEeAAAAaAAAAAAAAAAAAAAAAAAAAAAAAAAAAAAAECcAABAnAAAAAAAAAAAAAAAAAAAAAAAAAAAAAAAAAAAAAAAAAAAAABQAAAAAAAAAwMD/AAAAAABkAAAAMgAAAAAAAABkAAAAAAAAAH9/fwAKAAAAIgAAABgAAAAAAAAAAAAAAAAAAAAAAAAAAAAAAAAAAAAkAAAAJAAAAAAAAAAHAAAAAAAAAAAAAAAAAAAAAAAAAAAAAAAAAAAAf39/ACUAAABYAAAAAAAAAAAAAAAAAAAAAAAAAAAAAAAAAAAAAAAAAAAAAAAAAAAAAAAAAAAAAAA/AAAAAAAAAKCGAQAAAAAAAAAAAAAAAAAMAAAAAQAAAAAAAAAAAAAAAAAAAB8AAABUAAAAAAAABQAAAAEAAAAAAAAAAAAAAAAAAAAAAAAAAAAAAAAAAAAAAAAAAAAAAAJ/f38AAAAAA8zMzADAwP8Af39/AAAAAAAAAAAAAAAAAAAAAAAAAAAAIQAAABgAAAAUAAAAHSYAAGENAABARwAAsCUAABAAAAAmAAAACAAAAAGAAAAAAAAA"/>
+                <pr:smNativeData xmlns:pr="smNativeData" xmlns="smNativeData" val="SMDATA_15_bXy5YxMAAAAlAAAAZAAAAA8BAAAAkAAAAEgAAACQAAAASAAAAAAAAAAAAAAAAAAAAAEAAABQAAAAAAAAAAAA4D8AAAAAAADgPwAAAAAAAOA/AAAAAAAA4D8AAAAAAADgPwAAAAAAAOA/AAAAAAAA4D8AAAAAAADgPwAAAAAAAOA/AAAAAAAA4D8CAAAAjAAAAAAAAAAAAAAAM2bMDANPhAgAAAAAAAAAAAAAAAAAAAAAAAAAAAAAAAAAAAAAZAAAAAEAAABAAAAAAAAAAAAAAAAAAAAAAAAAAAAAAAAAAAAAAAAAAAAAAAAAAAAAAAAAAAAAAAAAAAAAAAAAAAAAAAAAAAAAAAAAAAAAAAAAAAAAAAAAAAAAAAAAAAAAFAAAADwAAAAAAAAAAAAAAP///wkUAAAAAQAAABQAAAAUAAAAFAAAAAEAAAAAAAAAZAAAAGQAAAAAAAAAZAAAAGQAAAAVAAAAYAAAAAAAAAAAAAAADwAAACADAAAAAAAAAAAAAAEAAACgMgAAVgcAAKr4//8BAAAAf39/AAEAAABkAAAAAAAAABQAAABAHwAAAAAAACYAAAAAAAAAwOD//wAAAAAmAAAAZAAAABYAAABMAAAAAAAAAAAAAAAEAAAAAAAAAAEAAABXiZEKAAAAACgAAAAoAAAAZAAAAGQAAAAAAAAAzMzMAAAAAABQAAAAUAAAAGQAAABkAAAAAAAAABcAAAAUAAAAAAAAAAAAAAD/fwAA/38AAAAAAAAJAAAABAAAANw7IAEeAAAAaAAAAAAAAAAAAAAAAAAAAAAAAAAAAAAAECcAABAnAAAAAAAAAAAAAAAAAAAAAAAAAAAAAAAAAAAAAAAAAAAAABQAAAAAAAAAwMD/AAAAAABkAAAAMgAAAAAAAABkAAAAAAAAAH9/fwAKAAAAIgAAABgAAAAAAAAAAAAAAAAAAAAAAAAAAAAAAAAAAAAkAAAAJAAAAAAAAAAHAAAAAAAAAAAAAAAAAAAAAAAAAAAAAAAAAAAAf39/ACUAAABYAAAAAAAAAAAAAAAAAAAAAAAAAAAAAAAAAAAAAAAAAAAAAAAAAAAAAAAAAAAAAAA/AAAAAAAAAKCGAQAAAAAAAAAAAAAAAAAMAAAAAQAAAAAAAAAAAAAAAAAAAB8AAABUAAAAAAAABQAAAAEAAAAAAAAAAAAAAAAAAAAAAAAAAAAAAAAAAAAAAAAAAAAAAAJ/f38AAAAAA8zMzADAwP8Af39/AAAAAAAAAAAAAAAAAAAAAAAAAAAAIQAAABgAAAAUAAAAHSYAAGENAABARwAAsCUAABAAAAAmAAAACAAAAAGAAAAAAAAA"/>
               </a:ext>
             </a:extLst>
           </p:cNvSpPr>
@@ -1861,7 +1861,7 @@
             <a:spLocks noGrp="1" noChangeArrowheads="1"/>
             <a:extLst>
               <a:ext uri="smNativeData">
-                <pr:smNativeData xmlns:pr="smNativeData" xmlns="smNativeData" val="SMDATA_15_k0e5YxMAAAAlAAAAZAAAAA8BAAAAkAAAAEgAAACQAAAASAAAAAAAAAABAAAAAAAAAAEAAABQAAAAAAAAAAAA4D8AAAAAAADgPwAAAAAAAOA/AAAAAAAA4D8AAAAAAADgPwAAAAAAAOA/AAAAAAAA4D8AAAAAAADgPwAAAAAAAOA/AAAAAAAA4D8CAAAAjAAAAAAAAAAAAAAAM2bMDANPhAgAAAAAAAAAAAAAAAAAAAAAAAAAAAAAAAAAAAAAZAAAAAEAAABAAAAAAAAAAAAAAAAAAAAAAAAAAAAAAAAAAAAAAAAAAAAAAAAAAAAAAAAAAAAAAAAAAAAAAAAAAAAAAAAAAAAAAAAAAAAAAAAAAAAAAAAAAAAAAAAAAAAAFAAAADwAAAAAAAAAAAAAAP///wkUAAAAAQAAABQAAAAUAAAAFAAAAAEAAAAAAAAAZAAAAGQAAAAAAAAAZAAAAGQAAAAVAAAAYAAAAAAAAAAAAAAADwAAACADAAAAAAAAAAAAAAEAAACgMgAAVgcAAKr4//8BAAAAf39/AAEAAABkAAAAAAAAABQAAABAHwAAAAAAACYAAAAAAAAAwOD//wAAAAAmAAAAZAAAABYAAABMAAAAAAAAAAAAAAAEAAAAAAAAAAEAAABXiZEKAAAAACgAAAAoAAAAZAAAAGQAAAAAAAAAzMzMAAAAAABQAAAAUAAAAGQAAABkAAAAAAAAABcAAAAUAAAAAAAAAAAAAAD/fwAA/38AAAAAAAAJAAAABAAAANw7IAEeAAAAaAAAAAAAAAAAAAAAAAAAAAAAAAAAAAAAECcAABAnAAAAAAAAAAAAAAAAAAAAAAAAAAAAAAAAAAAAAAAAAAAAABQAAAAAAAAAwMD/AAAAAABkAAAAMgAAAAAAAABkAAAAAAAAAH9/fwAKAAAAIgAAABgAAAAAAAAAAAAAAAAAAAAAAAAAAAAAAAAAAAAkAAAAJAAAAAAAAAAHAAAAAAAAAAAAAAAAAAAAAAAAAAAAAAAAAAAAf39/ACUAAABYAAAAAAAAAAAAAAAAAAAAAAAAAAAAAAAAAAAAAAAAAAAAAAAAAAAAAAAAAAAAAAA/AAAAAAAAAKCGAQAAAAAAAAAAAAAAAAAMAAAAAQAAAAAAAAAAAAAAAAAAAB8AAABUAAAAAAAABQAAAAEAAAAAAAAAAAAAAAAAAAAAAAAAAAAAAAAAAAAAAAAAAAAAAAJ/f38AAAAAA8zMzADAwP8Af39/AAAAAAAAAAAAAAAAAAAAAAAAAAAAIQAAABgAAAAUAAAAwAMAABsnAAA/FQAAWSkAABAAAAAmAAAACAAAAAAAAAAAAAAA"/>
+                <pr:smNativeData xmlns:pr="smNativeData" xmlns="smNativeData" val="SMDATA_15_bXy5YxMAAAAlAAAAZAAAAA8BAAAAkAAAAEgAAACQAAAASAAAAAAAAAABAAAAAAAAAAEAAABQAAAAAAAAAAAA4D8AAAAAAADgPwAAAAAAAOA/AAAAAAAA4D8AAAAAAADgPwAAAAAAAOA/AAAAAAAA4D8AAAAAAADgPwAAAAAAAOA/AAAAAAAA4D8CAAAAjAAAAAAAAAAAAAAAM2bMDANPhAgAAAAAAAAAAAAAAAAAAAAAAAAAAAAAAAAAAAAAZAAAAAEAAABAAAAAAAAAAAAAAAAAAAAAAAAAAAAAAAAAAAAAAAAAAAAAAAAAAAAAAAAAAAAAAAAAAAAAAAAAAAAAAAAAAAAAAAAAAAAAAAAAAAAAAAAAAAAAAAAAAAAAFAAAADwAAAAAAAAAAAAAAP///wkUAAAAAQAAABQAAAAUAAAAFAAAAAEAAAAAAAAAZAAAAGQAAAAAAAAAZAAAAGQAAAAVAAAAYAAAAAAAAAAAAAAADwAAACADAAAAAAAAAAAAAAEAAACgMgAAVgcAAKr4//8BAAAAf39/AAEAAABkAAAAAAAAABQAAABAHwAAAAAAACYAAAAAAAAAwOD//wAAAAAmAAAAZAAAABYAAABMAAAAAAAAAAAAAAAEAAAAAAAAAAEAAABXiZEKAAAAACgAAAAoAAAAZAAAAGQAAAAAAAAAzMzMAAAAAABQAAAAUAAAAGQAAABkAAAAAAAAABcAAAAUAAAAAAAAAAAAAAD/fwAA/38AAAAAAAAJAAAABAAAANw7IAEeAAAAaAAAAAAAAAAAAAAAAAAAAAAAAAAAAAAAECcAABAnAAAAAAAAAAAAAAAAAAAAAAAAAAAAAAAAAAAAAAAAAAAAABQAAAAAAAAAwMD/AAAAAABkAAAAMgAAAAAAAABkAAAAAAAAAH9/fwAKAAAAIgAAABgAAAAAAAAAAAAAAAAAAAAAAAAAAAAAAAAAAAAkAAAAJAAAAAAAAAAHAAAAAAAAAAAAAAAAAAAAAAAAAAAAAAAAAAAAf39/ACUAAABYAAAAAAAAAAAAAAAAAAAAAAAAAAAAAAAAAAAAAAAAAAAAAAAAAAAAAAAAAAAAAAA/AAAAAAAAAKCGAQAAAAAAAAAAAAAAAAAMAAAAAQAAAAAAAAAAAAAAAAAAAB8AAABUAAAAAAAABQAAAAEAAAAAAAAAAAAAAAAAAAAAAAAAAAAAAAAAAAAAAAAAAAAAAAJ/f38AAAAAA8zMzADAwP8Af39/AAAAAAAAAAAAAAAAAAAAAAAAAAAAIQAAABgAAAAUAAAAwAMAABsnAAA/FQAAWSkAABAAAAAmAAAACAAAAAAAAAAAAAAA"/>
               </a:ext>
             </a:extLst>
           </p:cNvSpPr>
@@ -1875,7 +1875,7 @@
           <a:lstStyle/>
           <a:p>
             <a:pPr/>
-            <a:fld id="{2C5F9B5A-14C1-0A6D-8FE7-E238D5A979B7}" type="datetime1">
+            <a:fld id="{58320480-CEB5-67F2-FB8A-38A74AC40D6D}" type="datetime1">
               <a:t/>
             </a:fld>
           </a:p>
@@ -1888,7 +1888,7 @@
             <a:spLocks noGrp="1" noChangeArrowheads="1"/>
             <a:extLst>
               <a:ext uri="smNativeData">
-                <pr:smNativeData xmlns:pr="smNativeData" xmlns="smNativeData" val="SMDATA_15_k0e5YxMAAAAlAAAAZAAAAA8BAAAAkAAAAEgAAACQAAAASAAAAAAAAAABAAAAAAAAAAEAAABQAAAAAAAAAAAA4D8AAAAAAADgPwAAAAAAAOA/AAAAAAAA4D8AAAAAAADgPwAAAAAAAOA/AAAAAAAA4D8AAAAAAADgPwAAAAAAAOA/AAAAAAAA4D8CAAAAjAAAAAAAAAAAAAAAM2bMDANPhAgAAAAAAAAAAAAAAAAAAAAAAAAAAAAAAAAAAAAAZAAAAAEAAABAAAAAAAAAAAAAAAAAAAAAAAAAAAAAAAAAAAAAAAAAAAAAAAAAAAAAAAAAAAAAAAAAAAAAAAAAAAAAAAAAAAAAAAAAAAAAAAAAAAAAAAAAAAAAAAAAAAAAFAAAADwAAAAAAAAAAAAAAP///wkUAAAAAQAAABQAAAAUAAAAFAAAAAEAAAAAAAAAZAAAAGQAAAAAAAAAZAAAAGQAAAAVAAAAYAAAAAAAAAAAAAAADwAAACADAAAAAAAAAAAAAAEAAACgMgAAVgcAAKr4//8BAAAAf39/AAEAAABkAAAAAAAAABQAAABAHwAAAAAAACYAAAAAAAAAwOD//wAAAAAmAAAAZAAAABYAAABMAAAAAAAAAAAAAAAEAAAAAAAAAAEAAABXiZEKAAAAACgAAAAoAAAAZAAAAGQAAAAAAAAAzMzMAAAAAABQAAAAUAAAAGQAAABkAAAAAAAAABcAAAAUAAAAAAAAAAAAAAD/fwAA/38AAAAAAAAJAAAABAAAANw7IAEeAAAAaAAAAAAAAAAAAAAAAAAAAAAAAAAAAAAAECcAABAnAAAAAAAAAAAAAAAAAAAAAAAAAAAAAAAAAAAAAAAAAAAAABQAAAAAAAAAwMD/AAAAAABkAAAAMgAAAAAAAABkAAAAAAAAAH9/fwAKAAAAIgAAABgAAAAAAAAAAAAAAAAAAAAAAAAAAAAAAAAAAAAkAAAAJAAAAAAAAAAHAAAAAAAAAAAAAAAAAAAAAAAAAAAAAAAAAAAAf39/ACUAAABYAAAAAAAAAAAAAAAAAAAAAAAAAAAAAAAAAAAAAAAAAAAAAAAAAAAAAAAAAAAAAAA/AAAAAAAAAKCGAQAAAAAAAAAAAAAAAAAMAAAAAQAAAAAAAAAAAAAAAAAAAB8AAABUAAAAAAAABQAAAAEAAAAAAAAAAAAAAAAAAAAAAAAAAAAAAAAAAAAAAAAAAAAAAAJ/f38AAAAAA8zMzADAwP8Af39/AAAAAAAAAAAAAAAAAAAAAAAAAAAAIQAAABgAAAAUAAAAoRkAABsnAABfMQAAWSkAABAAAAAmAAAACAAAAAAAAAAAAAAA"/>
+                <pr:smNativeData xmlns:pr="smNativeData" xmlns="smNativeData" val="SMDATA_15_bXy5YxMAAAAlAAAAZAAAAA8BAAAAkAAAAEgAAACQAAAASAAAAAAAAAABAAAAAAAAAAEAAABQAAAAAAAAAAAA4D8AAAAAAADgPwAAAAAAAOA/AAAAAAAA4D8AAAAAAADgPwAAAAAAAOA/AAAAAAAA4D8AAAAAAADgPwAAAAAAAOA/AAAAAAAA4D8CAAAAjAAAAAAAAAAAAAAAM2bMDANPhAgAAAAAAAAAAAAAAAAAAAAAAAAAAAAAAAAAAAAAZAAAAAEAAABAAAAAAAAAAAAAAAAAAAAAAAAAAAAAAAAAAAAAAAAAAAAAAAAAAAAAAAAAAAAAAAAAAAAAAAAAAAAAAAAAAAAAAAAAAAAAAAAAAAAAAAAAAAAAAAAAAAAAFAAAADwAAAAAAAAAAAAAAP///wkUAAAAAQAAABQAAAAUAAAAFAAAAAEAAAAAAAAAZAAAAGQAAAAAAAAAZAAAAGQAAAAVAAAAYAAAAAAAAAAAAAAADwAAACADAAAAAAAAAAAAAAEAAACgMgAAVgcAAKr4//8BAAAAf39/AAEAAABkAAAAAAAAABQAAABAHwAAAAAAACYAAAAAAAAAwOD//wAAAAAmAAAAZAAAABYAAABMAAAAAAAAAAAAAAAEAAAAAAAAAAEAAABXiZEKAAAAACgAAAAoAAAAZAAAAGQAAAAAAAAAzMzMAAAAAABQAAAAUAAAAGQAAABkAAAAAAAAABcAAAAUAAAAAAAAAAAAAAD/fwAA/38AAAAAAAAJAAAABAAAANw7IAEeAAAAaAAAAAAAAAAAAAAAAAAAAAAAAAAAAAAAECcAABAnAAAAAAAAAAAAAAAAAAAAAAAAAAAAAAAAAAAAAAAAAAAAABQAAAAAAAAAwMD/AAAAAABkAAAAMgAAAAAAAABkAAAAAAAAAH9/fwAKAAAAIgAAABgAAAAAAAAAAAAAAAAAAAAAAAAAAAAAAAAAAAAkAAAAJAAAAAAAAAAHAAAAAAAAAAAAAAAAAAAAAAAAAAAAAAAAAAAAf39/ACUAAABYAAAAAAAAAAAAAAAAAAAAAAAAAAAAAAAAAAAAAAAAAAAAAAAAAAAAAAAAAAAAAAA/AAAAAAAAAKCGAQAAAAAAAAAAAAAAAAAMAAAAAQAAAAAAAAAAAAAAAAAAAB8AAABUAAAAAAAABQAAAAEAAAAAAAAAAAAAAAAAAAAAAAAAAAAAAAAAAAAAAAAAAAAAAAJ/f38AAAAAA8zMzADAwP8Af39/AAAAAAAAAAAAAAAAAAAAAAAAAAAAIQAAABgAAAAUAAAAoRkAABsnAABfMQAAWSkAABAAAAAmAAAACAAAAAAAAAAAAAAA"/>
               </a:ext>
             </a:extLst>
           </p:cNvSpPr>
@@ -1912,7 +1912,7 @@
             <a:spLocks noGrp="1" noChangeArrowheads="1"/>
             <a:extLst>
               <a:ext uri="smNativeData">
-                <pr:smNativeData xmlns:pr="smNativeData" xmlns="smNativeData" val="SMDATA_15_k0e5YxMAAAAlAAAAZAAAAA8BAAAAkAAAAEgAAACQAAAASAAAAAAAAAABAAAAAAAAAAEAAABQAAAAAAAAAAAA4D8AAAAAAADgPwAAAAAAAOA/AAAAAAAA4D8AAAAAAADgPwAAAAAAAOA/AAAAAAAA4D8AAAAAAADgPwAAAAAAAOA/AAAAAAAA4D8CAAAAjAAAAAAAAAAAAAAAM2bMDANPhAgAAAAAAAAAAAAAAAAAAAAAAAAAAAAAAAAAAAAAZAAAAAEAAABAAAAAAAAAAAAAAAAAAAAAAAAAAAAAAAAAAAAAAAAAAAAAAAAAAAAAAAAAAAAAAAAAAAAAAAAAAAAAAAAAAAAAAAAAAAAAAAAAAAAAAAAAAAAAAAAAAAAAFAAAADwAAAAAAAAAAAAAAP///wkUAAAAAQAAABQAAAAUAAAAFAAAAAEAAAAAAAAAZAAAAGQAAAAAAAAAZAAAAGQAAAAVAAAAYAAAAAAAAAAAAAAADwAAACADAAAAAAAAAAAAAAEAAACgMgAAVgcAAKr4//8BAAAAf39/AAEAAABkAAAAAAAAABQAAABAHwAAAAAAACYAAAAAAAAAwOD//wAAAAAmAAAAZAAAABYAAABMAAAAAAAAAAAAAAAEAAAAAAAAAAEAAABXiZEKAAAAACgAAAAoAAAAZAAAAGQAAAAAAAAAzMzMAAAAAABQAAAAUAAAAGQAAABkAAAAAAAAABcAAAAUAAAAAAAAAAAAAAD/fwAA/38AAAAAAAAJAAAABAAAANw7IAEeAAAAaAAAAAAAAAAAAAAAAAAAAAAAAAAAAAAAECcAABAnAAAAAAAAAAAAAAAAAAAAAAAAAAAAAAAAAAAAAAAAAAAAABQAAAAAAAAAwMD/AAAAAABkAAAAMgAAAAAAAABkAAAAAAAAAH9/fwAKAAAAIgAAABgAAAAAAAAAAAAAAAAAAAAAAAAAAAAAAAAAAAAkAAAAJAAAAAAAAAAHAAAAAAAAAAAAAAAAAAAAAAAAAAAAAAAAAAAAf39/ACUAAABYAAAAAAAAAAAAAAAAAAAAAAAAAAAAAAAAAAAAAAAAAAAAAAAAAAAAAAAAAAAAAAA/AAAAAAAAAKCGAQAAAAAAAAAAAAAAAAAMAAAAAQAAAAAAAAAAAAAAAAAAAB8AAABUAAAAAAAABQAAAAEAAAAAAAAAAAAAAAAAAAAAAAAAAAAAAAAAAAAAAAAAAAAAAAJ/f38AAAAAA8zMzADAwP8Af39/AAAAAAAAAAAAAAAAAAAAAAAAAAAAIQAAABgAAAAUAAAAwTUAABsnAABARwAAWSkAABAAAAAmAAAACAAAAAAAAAAAAAAA"/>
+                <pr:smNativeData xmlns:pr="smNativeData" xmlns="smNativeData" val="SMDATA_15_bXy5YxMAAAAlAAAAZAAAAA8BAAAAkAAAAEgAAACQAAAASAAAAAAAAAABAAAAAAAAAAEAAABQAAAAAAAAAAAA4D8AAAAAAADgPwAAAAAAAOA/AAAAAAAA4D8AAAAAAADgPwAAAAAAAOA/AAAAAAAA4D8AAAAAAADgPwAAAAAAAOA/AAAAAAAA4D8CAAAAjAAAAAAAAAAAAAAAM2bMDANPhAgAAAAAAAAAAAAAAAAAAAAAAAAAAAAAAAAAAAAAZAAAAAEAAABAAAAAAAAAAAAAAAAAAAAAAAAAAAAAAAAAAAAAAAAAAAAAAAAAAAAAAAAAAAAAAAAAAAAAAAAAAAAAAAAAAAAAAAAAAAAAAAAAAAAAAAAAAAAAAAAAAAAAFAAAADwAAAAAAAAAAAAAAP///wkUAAAAAQAAABQAAAAUAAAAFAAAAAEAAAAAAAAAZAAAAGQAAAAAAAAAZAAAAGQAAAAVAAAAYAAAAAAAAAAAAAAADwAAACADAAAAAAAAAAAAAAEAAACgMgAAVgcAAKr4//8BAAAAf39/AAEAAABkAAAAAAAAABQAAABAHwAAAAAAACYAAAAAAAAAwOD//wAAAAAmAAAAZAAAABYAAABMAAAAAAAAAAAAAAAEAAAAAAAAAAEAAABXiZEKAAAAACgAAAAoAAAAZAAAAGQAAAAAAAAAzMzMAAAAAABQAAAAUAAAAGQAAABkAAAAAAAAABcAAAAUAAAAAAAAAAAAAAD/fwAA/38AAAAAAAAJAAAABAAAANw7IAEeAAAAaAAAAAAAAAAAAAAAAAAAAAAAAAAAAAAAECcAABAnAAAAAAAAAAAAAAAAAAAAAAAAAAAAAAAAAAAAAAAAAAAAABQAAAAAAAAAwMD/AAAAAABkAAAAMgAAAAAAAABkAAAAAAAAAH9/fwAKAAAAIgAAABgAAAAAAAAAAAAAAAAAAAAAAAAAAAAAAAAAAAAkAAAAJAAAAAAAAAAHAAAAAAAAAAAAAAAAAAAAAAAAAAAAAAAAAAAAf39/ACUAAABYAAAAAAAAAAAAAAAAAAAAAAAAAAAAAAAAAAAAAAAAAAAAAAAAAAAAAAAAAAAAAAA/AAAAAAAAAKCGAQAAAAAAAAAAAAAAAAAMAAAAAQAAAAAAAAAAAAAAAAAAAB8AAABUAAAAAAAABQAAAAEAAAAAAAAAAAAAAAAAAAAAAAAAAAAAAAAAAAAAAAAAAAAAAAJ/f38AAAAAA8zMzADAwP8Af39/AAAAAAAAAAAAAAAAAAAAAAAAAAAAIQAAABgAAAAUAAAAwTUAABsnAABARwAAWSkAABAAAAAmAAAACAAAAAAAAAAAAAAA"/>
               </a:ext>
             </a:extLst>
           </p:cNvSpPr>
@@ -1926,7 +1926,7 @@
           <a:lstStyle/>
           <a:p>
             <a:pPr/>
-            <a:fld id="{2C5FCC2C-62C1-0A3A-8FE7-946F82A979C1}" type="slidenum">
+            <a:fld id="{56CBE239-77BB-9E14-F573-8141AC3D03D4}" type="slidenum">
               <a:t/>
             </a:fld>
           </a:p>
@@ -1965,7 +1965,7 @@
             <a:spLocks noGrp="1" noChangeArrowheads="1"/>
             <a:extLst>
               <a:ext uri="smNativeData">
-                <pr:smNativeData xmlns:pr="smNativeData" xmlns="smNativeData" val="SMDATA_15_k0e5YxMAAAAlAAAAZAAAAA8BAAAAkAAAAEgAAACQAAAASAAAAAAAAAABAAAAAAAAAAEAAABQAAAAAAAAAAAA4D8AAAAAAADgPwAAAAAAAOA/AAAAAAAA4D8AAAAAAADgPwAAAAAAAOA/AAAAAAAA4D8AAAAAAADgPwAAAAAAAOA/AAAAAAAA4D8CAAAAjAAAAAAAAAAAAAAAM2bMDANPhAgAAAAAAAAAAAAAAAAAAAAAAAAAAAAAAAAAAAAAZAAAAAEAAABAAAAAAAAAAAAAAAAAAAAAAAAAAAAAAAAAAAAAAAAAAAAAAAAAAAAAAAAAAAAAAAAAAAAAAAAAAAAAAAAAAAAAAAAAAAAAAAAAAAAAAAAAAAAAAAAAAAAAFAAAADwAAAAAAAAAAAAAAP///wkUAAAAAQAAABQAAAAUAAAAFAAAAAEAAAAAAAAAZAAAAGQAAAAAAAAAZAAAAGQAAAAVAAAAYAAAAAAAAAAAAAAADwAAACADAAAAAAAAAAAAAAEAAACgMgAAVgcAAKr4//8BAAAAf39/AAEAAABkAAAAAAAAABQAAABAHwAAAAAAACYAAAAAAAAAwOD//wAAAAAmAAAAZAAAABYAAABMAAAAAAAAAAAAAAAEAAAAAAAAAAEAAABXiZEKAAAAACgAAAAoAAAAZAAAAGQAAAAAAAAAzMzMAAAAAABQAAAAUAAAAGQAAABkAAAAAAAAABcAAAAUAAAAAAAAAAAAAAD/fwAA/38AAAAAAAAJAAAABAAAANw7IAEeAAAAaAAAAAAAAAAAAAAAAAAAAAAAAAAAAAAAECcAABAnAAAAAAAAAAAAAAAAAAAAAAAAAAAAAAAAAAAAAAAAAAAAABQAAAAAAAAAwMD/AAAAAABkAAAAMgAAAAAAAABkAAAAAAAAAH9/fwAKAAAAIgAAABgAAAAAAAAAAAAAAAAAAAAAAAAAAAAAAAAAAAAkAAAAJAAAAAAAAAAHAAAAAAAAAAAAAAAAAAAAAAAAAAAAAAAAAAAAf39/ACUAAABYAAAAAAAAAAAAAAAAAAAAAAAAAAAAAAAAAAAAAAAAAAAAAAAAAAAAAAAAAAAAAAA/AAAAAAAAAKCGAQAAAAAAAAAAAAAAAAAMAAAAAQAAAAAAAAAAAAAAAAAAAB8AAABUAAAAAAAABQAAAAEAAAAAAAAAAAAAAAAAAAAAAAAAAAAAAAAAAAAAAAAAAAAAAAJ/f38AAAAAA8zMzADAwP8Af39/AAAAAAAAAAAAAAAAAAAAAAAAAAAAIQAAABgAAAAUAAAAwAMAALABAABARwAAuAgAABAAAAAmAAAACAAAAAAAAAAAAAAA"/>
+                <pr:smNativeData xmlns:pr="smNativeData" xmlns="smNativeData" val="SMDATA_15_bXy5YxMAAAAlAAAAZAAAAA8BAAAAkAAAAEgAAACQAAAASAAAAAAAAAABAAAAAAAAAAEAAABQAAAAAAAAAAAA4D8AAAAAAADgPwAAAAAAAOA/AAAAAAAA4D8AAAAAAADgPwAAAAAAAOA/AAAAAAAA4D8AAAAAAADgPwAAAAAAAOA/AAAAAAAA4D8CAAAAjAAAAAAAAAAAAAAAM2bMDANPhAgAAAAAAAAAAAAAAAAAAAAAAAAAAAAAAAAAAAAAZAAAAAEAAABAAAAAAAAAAAAAAAAAAAAAAAAAAAAAAAAAAAAAAAAAAAAAAAAAAAAAAAAAAAAAAAAAAAAAAAAAAAAAAAAAAAAAAAAAAAAAAAAAAAAAAAAAAAAAAAAAAAAAFAAAADwAAAAAAAAAAAAAAP///wkUAAAAAQAAABQAAAAUAAAAFAAAAAEAAAAAAAAAZAAAAGQAAAAAAAAAZAAAAGQAAAAVAAAAYAAAAAAAAAAAAAAADwAAACADAAAAAAAAAAAAAAEAAACgMgAAVgcAAKr4//8BAAAAf39/AAEAAABkAAAAAAAAABQAAABAHwAAAAAAACYAAAAAAAAAwOD//wAAAAAmAAAAZAAAABYAAABMAAAAAAAAAAAAAAAEAAAAAAAAAAEAAABXiZEKAAAAACgAAAAoAAAAZAAAAGQAAAAAAAAAzMzMAAAAAABQAAAAUAAAAGQAAABkAAAAAAAAABcAAAAUAAAAAAAAAAAAAAD/fwAA/38AAAAAAAAJAAAABAAAANw7IAEeAAAAaAAAAAAAAAAAAAAAAAAAAAAAAAAAAAAAECcAABAnAAAAAAAAAAAAAAAAAAAAAAAAAAAAAAAAAAAAAAAAAAAAABQAAAAAAAAAwMD/AAAAAABkAAAAMgAAAAAAAABkAAAAAAAAAH9/fwAKAAAAIgAAABgAAAAAAAAAAAAAAAAAAAAAAAAAAAAAAAAAAAAkAAAAJAAAAAAAAAAHAAAAAAAAAAAAAAAAAAAAAAAAAAAAAAAAAAAAf39/ACUAAABYAAAAAAAAAAAAAAAAAAAAAAAAAAAAAAAAAAAAAAAAAAAAAAAAAAAAAAAAAAAAAAA/AAAAAAAAAKCGAQAAAAAAAAAAAAAAAAAMAAAAAQAAAAAAAAAAAAAAAAAAAB8AAABUAAAAAAAABQAAAAEAAAAAAAAAAAAAAAAAAAAAAAAAAAAAAAAAAAAAAAAAAAAAAAJ/f38AAAAAA8zMzADAwP8Af39/AAAAAAAAAAAAAAAAAAAAAAAAAAAAIQAAABgAAAAUAAAAwAMAALABAABARwAAuAgAABAAAAAmAAAACAAAAAAAAAAAAAAA"/>
               </a:ext>
             </a:extLst>
           </p:cNvSpPr>
@@ -1992,7 +1992,7 @@
             <a:spLocks noGrp="1" noChangeArrowheads="1"/>
             <a:extLst>
               <a:ext uri="smNativeData">
-                <pr:smNativeData xmlns:pr="smNativeData" xmlns="smNativeData" val="SMDATA_15_k0e5YxMAAAAlAAAAZAAAAA8BAAAAkAAAAEgAAACQAAAASAAAAAAAAAABAAAAAAAAAAEAAABQAAAAAAAAAAAA4D8AAAAAAADgPwAAAAAAAOA/AAAAAAAA4D8AAAAAAADgPwAAAAAAAOA/AAAAAAAA4D8AAAAAAADgPwAAAAAAAOA/AAAAAAAA4D8CAAAAjAAAAAAAAAAAAAAAM2bMDANPhAgAAAAAAAAAAAAAAAAAAAAAAAAAAAAAAAAAAAAAZAAAAAEAAABAAAAAAAAAAAAAAAAAAAAAAAAAAAAAAAAAAAAAAAAAAAAAAAAAAAAAAAAAAAAAAAAAAAAAAAAAAAAAAAAAAAAAAAAAAAAAAAAAAAAAAAAAAAAAAAAAAAAAFAAAADwAAAAAAAAAAAAAAP///wkUAAAAAQAAABQAAAAUAAAAFAAAAAEAAAAAAAAAZAAAAGQAAAAAAAAAZAAAAGQAAAAVAAAAYAAAAAAAAAAAAAAADwAAACADAAAAAAAAAAAAAAEAAACgMgAAVgcAAKr4//8BAAAAf39/AAEAAABkAAAAAAAAABQAAABAHwAAAAAAACYAAAAAAAAAwOD//wAAAAAmAAAAZAAAABYAAABMAAAAAAAAAAAAAAAEAAAAAAAAAAEAAABXiZEKAAAAACgAAAAoAAAAZAAAAGQAAAAAAAAAzMzMAAAAAABQAAAAUAAAAGQAAABkAAAAAAAAABcAAAAUAAAAAAAAAAAAAAD/fwAA/38AAAAAAAAJAAAABAAAANw7IAEeAAAAaAAAAAAAAAAAAAAAAAAAAAAAAAAAAAAAECcAABAnAAAAAAAAAAAAAAAAAAAAAAAAAAAAAAAAAAAAAAAAAAAAABQAAAAAAAAAwMD/AAAAAABkAAAAMgAAAAAAAABkAAAAAAAAAH9/fwAKAAAAIgAAABgAAAAAAAAAAAAAAAAAAAAAAAAAAAAAAAAAAAAkAAAAJAAAAAAAAAAHAAAAAAAAAAAAAAAAAAAAAAAAAAAAAAAAAAAAf39/ACUAAABYAAAAAAAAAAAAAAAAAAAAAAAAAAAAAAAAAAAAAAAAAAAAAAAAAAAAAAAAAAAAAAA/AAAAAAAAAKCGAQAAAAAAAAAAAAAAAAAMAAAAAQAAAAAAAAAAAAAAAAAAAB8AAABUAAAAAAAABQAAAAEAAAAAAAAAAAAAAAAAAAAAAAAAAAAAAAAAAAAAAAAAAAAAAAJ/f38AAAAAA8zMzADAwP8Af39/AAAAAAAAAAAAAAAAAAAAAAAAAAAAIQAAABgAAAAUAAAAwAMAABsnAAA/FQAAWSkAABAAAAAmAAAACAAAAAAAAAAAAAAA"/>
+                <pr:smNativeData xmlns:pr="smNativeData" xmlns="smNativeData" val="SMDATA_15_bXy5YxMAAAAlAAAAZAAAAA8BAAAAkAAAAEgAAACQAAAASAAAAAAAAAABAAAAAAAAAAEAAABQAAAAAAAAAAAA4D8AAAAAAADgPwAAAAAAAOA/AAAAAAAA4D8AAAAAAADgPwAAAAAAAOA/AAAAAAAA4D8AAAAAAADgPwAAAAAAAOA/AAAAAAAA4D8CAAAAjAAAAAAAAAAAAAAAM2bMDANPhAgAAAAAAAAAAAAAAAAAAAAAAAAAAAAAAAAAAAAAZAAAAAEAAABAAAAAAAAAAAAAAAAAAAAAAAAAAAAAAAAAAAAAAAAAAAAAAAAAAAAAAAAAAAAAAAAAAAAAAAAAAAAAAAAAAAAAAAAAAAAAAAAAAAAAAAAAAAAAAAAAAAAAFAAAADwAAAAAAAAAAAAAAP///wkUAAAAAQAAABQAAAAUAAAAFAAAAAEAAAAAAAAAZAAAAGQAAAAAAAAAZAAAAGQAAAAVAAAAYAAAAAAAAAAAAAAADwAAACADAAAAAAAAAAAAAAEAAACgMgAAVgcAAKr4//8BAAAAf39/AAEAAABkAAAAAAAAABQAAABAHwAAAAAAACYAAAAAAAAAwOD//wAAAAAmAAAAZAAAABYAAABMAAAAAAAAAAAAAAAEAAAAAAAAAAEAAABXiZEKAAAAACgAAAAoAAAAZAAAAGQAAAAAAAAAzMzMAAAAAABQAAAAUAAAAGQAAABkAAAAAAAAABcAAAAUAAAAAAAAAAAAAAD/fwAA/38AAAAAAAAJAAAABAAAANw7IAEeAAAAaAAAAAAAAAAAAAAAAAAAAAAAAAAAAAAAECcAABAnAAAAAAAAAAAAAAAAAAAAAAAAAAAAAAAAAAAAAAAAAAAAABQAAAAAAAAAwMD/AAAAAABkAAAAMgAAAAAAAABkAAAAAAAAAH9/fwAKAAAAIgAAABgAAAAAAAAAAAAAAAAAAAAAAAAAAAAAAAAAAAAkAAAAJAAAAAAAAAAHAAAAAAAAAAAAAAAAAAAAAAAAAAAAAAAAAAAAf39/ACUAAABYAAAAAAAAAAAAAAAAAAAAAAAAAAAAAAAAAAAAAAAAAAAAAAAAAAAAAAAAAAAAAAA/AAAAAAAAAKCGAQAAAAAAAAAAAAAAAAAMAAAAAQAAAAAAAAAAAAAAAAAAAB8AAABUAAAAAAAABQAAAAEAAAAAAAAAAAAAAAAAAAAAAAAAAAAAAAAAAAAAAAAAAAAAAAJ/f38AAAAAA8zMzADAwP8Af39/AAAAAAAAAAAAAAAAAAAAAAAAAAAAIQAAABgAAAAUAAAAwAMAABsnAAA/FQAAWSkAABAAAAAmAAAACAAAAAAAAAAAAAAA"/>
               </a:ext>
             </a:extLst>
           </p:cNvSpPr>
@@ -2006,7 +2006,7 @@
           <a:lstStyle/>
           <a:p>
             <a:pPr/>
-            <a:fld id="{2C5FEAAF-E1C1-0A1C-8FE7-1749A4A97942}" type="datetime1">
+            <a:fld id="{6277E45C-128F-2212-C1CF-E447AA8137B1}" type="datetime1">
               <a:t/>
             </a:fld>
           </a:p>
@@ -2019,7 +2019,7 @@
             <a:spLocks noGrp="1" noChangeArrowheads="1"/>
             <a:extLst>
               <a:ext uri="smNativeData">
-                <pr:smNativeData xmlns:pr="smNativeData" xmlns="smNativeData" val="SMDATA_15_k0e5YxMAAAAlAAAAZAAAAA8BAAAAkAAAAEgAAACQAAAASAAAAAAAAAABAAAAAAAAAAEAAABQAAAAAAAAAAAA4D8AAAAAAADgPwAAAAAAAOA/AAAAAAAA4D8AAAAAAADgPwAAAAAAAOA/AAAAAAAA4D8AAAAAAADgPwAAAAAAAOA/AAAAAAAA4D8CAAAAjAAAAAAAAAAAAAAAM2bMDANPhAgAAAAAAAAAAAAAAAAAAAAAAAAAAAAAAAAAAAAAZAAAAAEAAABAAAAAAAAAAAAAAAAAAAAAAAAAAAAAAAAAAAAAAAAAAAAAAAAAAAAAAAAAAAAAAAAAAAAAAAAAAAAAAAAAAAAAAAAAAAAAAAAAAAAAAAAAAAAAAAAAAAAAFAAAADwAAAAAAAAAAAAAAP///wkUAAAAAQAAABQAAAAUAAAAFAAAAAEAAAAAAAAAZAAAAGQAAAAAAAAAZAAAAGQAAAAVAAAAYAAAAAAAAAAAAAAADwAAACADAAAAAAAAAAAAAAEAAACgMgAAVgcAAKr4//8BAAAAf39/AAEAAABkAAAAAAAAABQAAABAHwAAAAAAACYAAAAAAAAAwOD//wAAAAAmAAAAZAAAABYAAABMAAAAAAAAAAAAAAAEAAAAAAAAAAEAAABXiZEKAAAAACgAAAAoAAAAZAAAAGQAAAAAAAAAzMzMAAAAAABQAAAAUAAAAGQAAABkAAAAAAAAABcAAAAUAAAAAAAAAAAAAAD/fwAA/38AAAAAAAAJAAAABAAAANw7IAEeAAAAaAAAAAAAAAAAAAAAAAAAAAAAAAAAAAAAECcAABAnAAAAAAAAAAAAAAAAAAAAAAAAAAAAAAAAAAAAAAAAAAAAABQAAAAAAAAAwMD/AAAAAABkAAAAMgAAAAAAAABkAAAAAAAAAH9/fwAKAAAAIgAAABgAAAAAAAAAAAAAAAAAAAAAAAAAAAAAAAAAAAAkAAAAJAAAAAAAAAAHAAAAAAAAAAAAAAAAAAAAAAAAAAAAAAAAAAAAf39/ACUAAABYAAAAAAAAAAAAAAAAAAAAAAAAAAAAAAAAAAAAAAAAAAAAAAAAAAAAAAAAAAAAAAA/AAAAAAAAAKCGAQAAAAAAAAAAAAAAAAAMAAAAAQAAAAAAAAAAAAAAAAAAAB8AAABUAAAAAAAABQAAAAEAAAAAAAAAAAAAAAAAAAAAAAAAAAAAAAAAAAAAAAAAAAAAAAJ/f38AAAAAA8zMzADAwP8Af39/AAAAAAAAAAAAAAAAAAAAAAAAAAAAIQAAABgAAAAUAAAAoRkAABsnAABfMQAAWSkAABAAAAAmAAAACAAAAAAAAAAAAAAA"/>
+                <pr:smNativeData xmlns:pr="smNativeData" xmlns="smNativeData" val="SMDATA_15_bXy5YxMAAAAlAAAAZAAAAA8BAAAAkAAAAEgAAACQAAAASAAAAAAAAAABAAAAAAAAAAEAAABQAAAAAAAAAAAA4D8AAAAAAADgPwAAAAAAAOA/AAAAAAAA4D8AAAAAAADgPwAAAAAAAOA/AAAAAAAA4D8AAAAAAADgPwAAAAAAAOA/AAAAAAAA4D8CAAAAjAAAAAAAAAAAAAAAM2bMDANPhAgAAAAAAAAAAAAAAAAAAAAAAAAAAAAAAAAAAAAAZAAAAAEAAABAAAAAAAAAAAAAAAAAAAAAAAAAAAAAAAAAAAAAAAAAAAAAAAAAAAAAAAAAAAAAAAAAAAAAAAAAAAAAAAAAAAAAAAAAAAAAAAAAAAAAAAAAAAAAAAAAAAAAFAAAADwAAAAAAAAAAAAAAP///wkUAAAAAQAAABQAAAAUAAAAFAAAAAEAAAAAAAAAZAAAAGQAAAAAAAAAZAAAAGQAAAAVAAAAYAAAAAAAAAAAAAAADwAAACADAAAAAAAAAAAAAAEAAACgMgAAVgcAAKr4//8BAAAAf39/AAEAAABkAAAAAAAAABQAAABAHwAAAAAAACYAAAAAAAAAwOD//wAAAAAmAAAAZAAAABYAAABMAAAAAAAAAAAAAAAEAAAAAAAAAAEAAABXiZEKAAAAACgAAAAoAAAAZAAAAGQAAAAAAAAAzMzMAAAAAABQAAAAUAAAAGQAAABkAAAAAAAAABcAAAAUAAAAAAAAAAAAAAD/fwAA/38AAAAAAAAJAAAABAAAANw7IAEeAAAAaAAAAAAAAAAAAAAAAAAAAAAAAAAAAAAAECcAABAnAAAAAAAAAAAAAAAAAAAAAAAAAAAAAAAAAAAAAAAAAAAAABQAAAAAAAAAwMD/AAAAAABkAAAAMgAAAAAAAABkAAAAAAAAAH9/fwAKAAAAIgAAABgAAAAAAAAAAAAAAAAAAAAAAAAAAAAAAAAAAAAkAAAAJAAAAAAAAAAHAAAAAAAAAAAAAAAAAAAAAAAAAAAAAAAAAAAAf39/ACUAAABYAAAAAAAAAAAAAAAAAAAAAAAAAAAAAAAAAAAAAAAAAAAAAAAAAAAAAAAAAAAAAAA/AAAAAAAAAKCGAQAAAAAAAAAAAAAAAAAMAAAAAQAAAAAAAAAAAAAAAAAAAB8AAABUAAAAAAAABQAAAAEAAAAAAAAAAAAAAAAAAAAAAAAAAAAAAAAAAAAAAAAAAAAAAAJ/f38AAAAAA8zMzADAwP8Af39/AAAAAAAAAAAAAAAAAAAAAAAAAAAAIQAAABgAAAAUAAAAoRkAABsnAABfMQAAWSkAABAAAAAmAAAACAAAAAAAAAAAAAAA"/>
               </a:ext>
             </a:extLst>
           </p:cNvSpPr>
@@ -2043,7 +2043,7 @@
             <a:spLocks noGrp="1" noChangeArrowheads="1"/>
             <a:extLst>
               <a:ext uri="smNativeData">
-                <pr:smNativeData xmlns:pr="smNativeData" xmlns="smNativeData" val="SMDATA_15_k0e5YxMAAAAlAAAAZAAAAA8BAAAAkAAAAEgAAACQAAAASAAAAAAAAAABAAAAAAAAAAEAAABQAAAAAAAAAAAA4D8AAAAAAADgPwAAAAAAAOA/AAAAAAAA4D8AAAAAAADgPwAAAAAAAOA/AAAAAAAA4D8AAAAAAADgPwAAAAAAAOA/AAAAAAAA4D8CAAAAjAAAAAAAAAAAAAAAM2bMDANPhAgAAAAAAAAAAAAAAAAAAAAAAAAAAAAAAAAAAAAAZAAAAAEAAABAAAAAAAAAAAAAAAAAAAAAAAAAAAAAAAAAAAAAAAAAAAAAAAAAAAAAAAAAAAAAAAAAAAAAAAAAAAAAAAAAAAAAAAAAAAAAAAAAAAAAAAAAAAAAAAAAAAAAFAAAADwAAAAAAAAAAAAAAP///wkUAAAAAQAAABQAAAAUAAAAFAAAAAEAAAAAAAAAZAAAAGQAAAAAAAAAZAAAAGQAAAAVAAAAYAAAAAAAAAAAAAAADwAAACADAAAAAAAAAAAAAAEAAACgMgAAVgcAAKr4//8BAAAAf39/AAEAAABkAAAAAAAAABQAAABAHwAAAAAAACYAAAAAAAAAwOD//wAAAAAmAAAAZAAAABYAAABMAAAAAAAAAAAAAAAEAAAAAAAAAAEAAABXiZEKAAAAACgAAAAoAAAAZAAAAGQAAAAAAAAAzMzMAAAAAABQAAAAUAAAAGQAAABkAAAAAAAAABcAAAAUAAAAAAAAAAAAAAD/fwAA/38AAAAAAAAJAAAABAAAANw7IAEeAAAAaAAAAAAAAAAAAAAAAAAAAAAAAAAAAAAAECcAABAnAAAAAAAAAAAAAAAAAAAAAAAAAAAAAAAAAAAAAAAAAAAAABQAAAAAAAAAwMD/AAAAAABkAAAAMgAAAAAAAABkAAAAAAAAAH9/fwAKAAAAIgAAABgAAAAAAAAAAAAAAAAAAAAAAAAAAAAAAAAAAAAkAAAAJAAAAAAAAAAHAAAAAAAAAAAAAAAAAAAAAAAAAAAAAAAAAAAAf39/ACUAAABYAAAAAAAAAAAAAAAAAAAAAAAAAAAAAAAAAAAAAAAAAAAAAAAAAAAAAAAAAAAAAAA/AAAAAAAAAKCGAQAAAAAAAAAAAAAAAAAMAAAAAQAAAAAAAAAAAAAAAAAAAB8AAABUAAAAAAAABQAAAAEAAAAAAAAAAAAAAAAAAAAAAAAAAAAAAAAAAAAAAAAAAAAAAAJ/f38AAAAAA8zMzADAwP8Af39/AAAAAAAAAAAAAAAAAAAAAAAAAAAAIQAAABgAAAAUAAAAwTUAABsnAABARwAAWSkAABAAAAAmAAAACAAAAAAAAAAAAAAA"/>
+                <pr:smNativeData xmlns:pr="smNativeData" xmlns="smNativeData" val="SMDATA_15_bXy5YxMAAAAlAAAAZAAAAA8BAAAAkAAAAEgAAACQAAAASAAAAAAAAAABAAAAAAAAAAEAAABQAAAAAAAAAAAA4D8AAAAAAADgPwAAAAAAAOA/AAAAAAAA4D8AAAAAAADgPwAAAAAAAOA/AAAAAAAA4D8AAAAAAADgPwAAAAAAAOA/AAAAAAAA4D8CAAAAjAAAAAAAAAAAAAAAM2bMDANPhAgAAAAAAAAAAAAAAAAAAAAAAAAAAAAAAAAAAAAAZAAAAAEAAABAAAAAAAAAAAAAAAAAAAAAAAAAAAAAAAAAAAAAAAAAAAAAAAAAAAAAAAAAAAAAAAAAAAAAAAAAAAAAAAAAAAAAAAAAAAAAAAAAAAAAAAAAAAAAAAAAAAAAFAAAADwAAAAAAAAAAAAAAP///wkUAAAAAQAAABQAAAAUAAAAFAAAAAEAAAAAAAAAZAAAAGQAAAAAAAAAZAAAAGQAAAAVAAAAYAAAAAAAAAAAAAAADwAAACADAAAAAAAAAAAAAAEAAACgMgAAVgcAAKr4//8BAAAAf39/AAEAAABkAAAAAAAAABQAAABAHwAAAAAAACYAAAAAAAAAwOD//wAAAAAmAAAAZAAAABYAAABMAAAAAAAAAAAAAAAEAAAAAAAAAAEAAABXiZEKAAAAACgAAAAoAAAAZAAAAGQAAAAAAAAAzMzMAAAAAABQAAAAUAAAAGQAAABkAAAAAAAAABcAAAAUAAAAAAAAAAAAAAD/fwAA/38AAAAAAAAJAAAABAAAANw7IAEeAAAAaAAAAAAAAAAAAAAAAAAAAAAAAAAAAAAAECcAABAnAAAAAAAAAAAAAAAAAAAAAAAAAAAAAAAAAAAAAAAAAAAAABQAAAAAAAAAwMD/AAAAAABkAAAAMgAAAAAAAABkAAAAAAAAAH9/fwAKAAAAIgAAABgAAAAAAAAAAAAAAAAAAAAAAAAAAAAAAAAAAAAkAAAAJAAAAAAAAAAHAAAAAAAAAAAAAAAAAAAAAAAAAAAAAAAAAAAAf39/ACUAAABYAAAAAAAAAAAAAAAAAAAAAAAAAAAAAAAAAAAAAAAAAAAAAAAAAAAAAAAAAAAAAAA/AAAAAAAAAKCGAQAAAAAAAAAAAAAAAAAMAAAAAQAAAAAAAAAAAAAAAAAAAB8AAABUAAAAAAAABQAAAAEAAAAAAAAAAAAAAAAAAAAAAAAAAAAAAAAAAAAAAAAAAAAAAAJ/f38AAAAAA8zMzADAwP8Af39/AAAAAAAAAAAAAAAAAAAAAAAAAAAAIQAAABgAAAAUAAAAwTUAABsnAABARwAAWSkAABAAAAAmAAAACAAAAAAAAAAAAAAA"/>
               </a:ext>
             </a:extLst>
           </p:cNvSpPr>
@@ -2057,7 +2057,7 @@
           <a:lstStyle/>
           <a:p>
             <a:pPr/>
-            <a:fld id="{2C5F9C4F-01C1-0A6A-8FE7-F73FD2A979A2}" type="slidenum">
+            <a:fld id="{47168842-0CAA-437E-E4AE-FA2BC6E012AF}" type="slidenum">
               <a:t/>
             </a:fld>
           </a:p>
@@ -2096,7 +2096,7 @@
             <a:spLocks noGrp="1" noChangeArrowheads="1"/>
             <a:extLst>
               <a:ext uri="smNativeData">
-                <pr:smNativeData xmlns:pr="smNativeData" xmlns="smNativeData" val="SMDATA_15_k0e5YxMAAAAlAAAAZAAAAA8BAAAAkAAAAEgAAACQAAAASAAAAAAAAAABAAAAAAAAAAEAAABQAAAAAAAAAAAA4D8AAAAAAADgPwAAAAAAAOA/AAAAAAAA4D8AAAAAAADgPwAAAAAAAOA/AAAAAAAA4D8AAAAAAADgPwAAAAAAAOA/AAAAAAAA4D8CAAAAjAAAAAAAAAAAAAAAM2bMDANPhAgAAAAAAAAAAAAAAAAAAAAAAAAAAAAAAAAAAAAAZAAAAAEAAABAAAAAAAAAAAAAAAAAAAAAAAAAAAAAAAAAAAAAAAAAAAAAAAAAAAAAAAAAAAAAAAAAAAAAAAAAAAAAAAAAAAAAAAAAAAAAAAAAAAAAAAAAAAAAAAAAAAAAFAAAADwAAAAAAAAAAAAAAP///wkUAAAAAQAAABQAAAAUAAAAFAAAAAEAAAAAAAAAZAAAAGQAAAAAAAAAZAAAAGQAAAAVAAAAYAAAAAAAAAAAAAAADwAAACADAAAAAAAAAAAAAAEAAACgMgAAVgcAAKr4//8BAAAAf39/AAEAAABkAAAAAAAAABQAAABAHwAAAAAAACYAAAAAAAAAwOD//wAAAAAmAAAAZAAAABYAAABMAAAAAAAAAAAAAAAEAAAAAAAAAAEAAABXiZEKAAAAACgAAAAoAAAAZAAAAGQAAAAAAAAAzMzMAAAAAABQAAAAUAAAAGQAAABkAAAAAAAAABcAAAAUAAAAAAAAAAAAAAD/fwAA/38AAAAAAAAJAAAABAAAANw7IAEeAAAAaAAAAAAAAAAAAAAAAAAAAAAAAAAAAAAAECcAABAnAAAAAAAAAAAAAAAAAAAAAAAAAAAAAAAAAAAAAAAAAAAAABQAAAAAAAAAwMD/AAAAAABkAAAAMgAAAAAAAABkAAAAAAAAAH9/fwAKAAAAIgAAABgAAAAAAAAAAAAAAAAAAAAAAAAAAAAAAAAAAAAkAAAAJAAAAAAAAAAHAAAAAAAAAAAAAAAAAAAAAAAAAAAAAAAAAAAAf39/ACUAAABYAAAAAAAAAAAAAAAAAAAAAAAAAAAAAAAAAAAAAAAAAAAAAAAAAAAAAAAAAAAAAAA/AAAAAAAAAKCGAQAAAAAAAAAAAAAAAAAMAAAAAQAAAAAAAAAAAAAAAAAAAB8AAABUAAAAAAAABQAAAAEAAAAAAAAAAAAAAAAAAAAAAAAAAAAAAAAAAAAAAAAAAAAAAAJ/f38AAAAAA8zMzADAwP8Af39/AAAAAAAAAAAAAAAAAAAAAAAAAAAAIQAAABgAAAAUAAAAwAMAABsnAAA/FQAAWSkAABAAAAAmAAAACAAAAAAAAAAAAAAA"/>
+                <pr:smNativeData xmlns:pr="smNativeData" xmlns="smNativeData" val="SMDATA_15_bXy5YxMAAAAlAAAAZAAAAA8BAAAAkAAAAEgAAACQAAAASAAAAAAAAAABAAAAAAAAAAEAAABQAAAAAAAAAAAA4D8AAAAAAADgPwAAAAAAAOA/AAAAAAAA4D8AAAAAAADgPwAAAAAAAOA/AAAAAAAA4D8AAAAAAADgPwAAAAAAAOA/AAAAAAAA4D8CAAAAjAAAAAAAAAAAAAAAM2bMDANPhAgAAAAAAAAAAAAAAAAAAAAAAAAAAAAAAAAAAAAAZAAAAAEAAABAAAAAAAAAAAAAAAAAAAAAAAAAAAAAAAAAAAAAAAAAAAAAAAAAAAAAAAAAAAAAAAAAAAAAAAAAAAAAAAAAAAAAAAAAAAAAAAAAAAAAAAAAAAAAAAAAAAAAFAAAADwAAAAAAAAAAAAAAP///wkUAAAAAQAAABQAAAAUAAAAFAAAAAEAAAAAAAAAZAAAAGQAAAAAAAAAZAAAAGQAAAAVAAAAYAAAAAAAAAAAAAAADwAAACADAAAAAAAAAAAAAAEAAACgMgAAVgcAAKr4//8BAAAAf39/AAEAAABkAAAAAAAAABQAAABAHwAAAAAAACYAAAAAAAAAwOD//wAAAAAmAAAAZAAAABYAAABMAAAAAAAAAAAAAAAEAAAAAAAAAAEAAABXiZEKAAAAACgAAAAoAAAAZAAAAGQAAAAAAAAAzMzMAAAAAABQAAAAUAAAAGQAAABkAAAAAAAAABcAAAAUAAAAAAAAAAAAAAD/fwAA/38AAAAAAAAJAAAABAAAANw7IAEeAAAAaAAAAAAAAAAAAAAAAAAAAAAAAAAAAAAAECcAABAnAAAAAAAAAAAAAAAAAAAAAAAAAAAAAAAAAAAAAAAAAAAAABQAAAAAAAAAwMD/AAAAAABkAAAAMgAAAAAAAABkAAAAAAAAAH9/fwAKAAAAIgAAABgAAAAAAAAAAAAAAAAAAAAAAAAAAAAAAAAAAAAkAAAAJAAAAAAAAAAHAAAAAAAAAAAAAAAAAAAAAAAAAAAAAAAAAAAAf39/ACUAAABYAAAAAAAAAAAAAAAAAAAAAAAAAAAAAAAAAAAAAAAAAAAAAAAAAAAAAAAAAAAAAAA/AAAAAAAAAKCGAQAAAAAAAAAAAAAAAAAMAAAAAQAAAAAAAAAAAAAAAAAAAB8AAABUAAAAAAAABQAAAAEAAAAAAAAAAAAAAAAAAAAAAAAAAAAAAAAAAAAAAAAAAAAAAAJ/f38AAAAAA8zMzADAwP8Af39/AAAAAAAAAAAAAAAAAAAAAAAAAAAAIQAAABgAAAAUAAAAwAMAABsnAAA/FQAAWSkAABAAAAAmAAAACAAAAAAAAAAAAAAA"/>
               </a:ext>
             </a:extLst>
           </p:cNvSpPr>
@@ -2110,7 +2110,7 @@
           <a:lstStyle/>
           <a:p>
             <a:pPr/>
-            <a:fld id="{2C5FDF07-49C1-0A29-8FE7-BF7C91A979EA}" type="datetime1">
+            <a:fld id="{5F5E76B6-F8B2-0B80-FCE6-0ED538A80A5B}" type="datetime1">
               <a:t/>
             </a:fld>
           </a:p>
@@ -2123,7 +2123,7 @@
             <a:spLocks noGrp="1" noChangeArrowheads="1"/>
             <a:extLst>
               <a:ext uri="smNativeData">
-                <pr:smNativeData xmlns:pr="smNativeData" xmlns="smNativeData" val="SMDATA_15_k0e5YxMAAAAlAAAAZAAAAA8BAAAAkAAAAEgAAACQAAAASAAAAAAAAAABAAAAAAAAAAEAAABQAAAAAAAAAAAA4D8AAAAAAADgPwAAAAAAAOA/AAAAAAAA4D8AAAAAAADgPwAAAAAAAOA/AAAAAAAA4D8AAAAAAADgPwAAAAAAAOA/AAAAAAAA4D8CAAAAjAAAAAAAAAAAAAAAM2bMDANPhAgAAAAAAAAAAAAAAAAAAAAAAAAAAAAAAAAAAAAAZAAAAAEAAABAAAAAAAAAAAAAAAAAAAAAAAAAAAAAAAAAAAAAAAAAAAAAAAAAAAAAAAAAAAAAAAAAAAAAAAAAAAAAAAAAAAAAAAAAAAAAAAAAAAAAAAAAAAAAAAAAAAAAFAAAADwAAAAAAAAAAAAAAP///wkUAAAAAQAAABQAAAAUAAAAFAAAAAEAAAAAAAAAZAAAAGQAAAAAAAAAZAAAAGQAAAAVAAAAYAAAAAAAAAAAAAAADwAAACADAAAAAAAAAAAAAAEAAACgMgAAVgcAAKr4//8BAAAAf39/AAEAAABkAAAAAAAAABQAAABAHwAAAAAAACYAAAAAAAAAwOD//wAAAAAmAAAAZAAAABYAAABMAAAAAAAAAAAAAAAEAAAAAAAAAAEAAABXiZEKAAAAACgAAAAoAAAAZAAAAGQAAAAAAAAAzMzMAAAAAABQAAAAUAAAAGQAAABkAAAAAAAAABcAAAAUAAAAAAAAAAAAAAD/fwAA/38AAAAAAAAJAAAABAAAAAAAAAAeAAAAaAAAAAAAAAAAAAAAAAAAAAAAAAAAAAAAECcAABAnAAAAAAAAAAAAAAAAAAAAAAAAAAAAAAAAAAAAAAAAAAAAABQAAAAAAAAAwMD/AAAAAABkAAAAMgAAAAAAAABkAAAAAAAAAH9/fwAKAAAAIgAAABgAAAAAAAAAAAAAAAAAAAAAAAAAAAAAAAAAAAAkAAAAJAAAAAAAAAAHAAAAAAAAAAAAAAAAAAAAAAAAAAAAAAAAAAAAf39/ACUAAABYAAAAAAAAAAAAAAAAAAAAAAAAAAAAAAAAAAAAAAAAAAAAAAAAAAAAAAAAAAAAAAA/AAAAAAAAAKCGAQAAAAAAAAAAAAAAAAAMAAAAAQAAAAAAAAAAAAAAAAAAAB8AAABUAAAAAAAABQAAAAEAAAAAAAAAAAAAAAAAAAAAAAAAAAAAAAAAAAAAAAAAAAAAAAJ/f38AAAAAA8zMzADAwP8Af39/AAAAAAAAAAAAAAAAAAAAAAAAAAAAIQAAABgAAAAUAAAAoRkAABsnAABfMQAAWSkAABAAAAAmAAAACAAAAAAAAAAAAAAA"/>
+                <pr:smNativeData xmlns:pr="smNativeData" xmlns="smNativeData" val="SMDATA_15_bXy5YxMAAAAlAAAAZAAAAA8BAAAAkAAAAEgAAACQAAAASAAAAAAAAAABAAAAAAAAAAEAAABQAAAAAAAAAAAA4D8AAAAAAADgPwAAAAAAAOA/AAAAAAAA4D8AAAAAAADgPwAAAAAAAOA/AAAAAAAA4D8AAAAAAADgPwAAAAAAAOA/AAAAAAAA4D8CAAAAjAAAAAAAAAAAAAAAM2bMDANPhAgAAAAAAAAAAAAAAAAAAAAAAAAAAAAAAAAAAAAAZAAAAAEAAABAAAAAAAAAAAAAAAAAAAAAAAAAAAAAAAAAAAAAAAAAAAAAAAAAAAAAAAAAAAAAAAAAAAAAAAAAAAAAAAAAAAAAAAAAAAAAAAAAAAAAAAAAAAAAAAAAAAAAFAAAADwAAAAAAAAAAAAAAP///wkUAAAAAQAAABQAAAAUAAAAFAAAAAEAAAAAAAAAZAAAAGQAAAAAAAAAZAAAAGQAAAAVAAAAYAAAAAAAAAAAAAAADwAAACADAAAAAAAAAAAAAAEAAACgMgAAVgcAAKr4//8BAAAAf39/AAEAAABkAAAAAAAAABQAAABAHwAAAAAAACYAAAAAAAAAwOD//wAAAAAmAAAAZAAAABYAAABMAAAAAAAAAAAAAAAEAAAAAAAAAAEAAABXiZEKAAAAACgAAAAoAAAAZAAAAGQAAAAAAAAAzMzMAAAAAABQAAAAUAAAAGQAAABkAAAAAAAAABcAAAAUAAAAAAAAAAAAAAD/fwAA/38AAAAAAAAJAAAABAAAAAAAAAAeAAAAaAAAAAAAAAAAAAAAAAAAAAAAAAAAAAAAECcAABAnAAAAAAAAAAAAAAAAAAAAAAAAAAAAAAAAAAAAAAAAAAAAABQAAAAAAAAAwMD/AAAAAABkAAAAMgAAAAAAAABkAAAAAAAAAH9/fwAKAAAAIgAAABgAAAAAAAAAAAAAAAAAAAAAAAAAAAAAAAAAAAAkAAAAJAAAAAAAAAAHAAAAAAAAAAAAAAAAAAAAAAAAAAAAAAAAAAAAf39/ACUAAABYAAAAAAAAAAAAAAAAAAAAAAAAAAAAAAAAAAAAAAAAAAAAAAAAAAAAAAAAAAAAAAA/AAAAAAAAAKCGAQAAAAAAAAAAAAAAAAAMAAAAAQAAAAAAAAAAAAAAAAAAAB8AAABUAAAAAAAABQAAAAEAAAAAAAAAAAAAAAAAAAAAAAAAAAAAAAAAAAAAAAAAAAAAAAJ/f38AAAAAA8zMzADAwP8Af39/AAAAAAAAAAAAAAAAAAAAAAAAAAAAIQAAABgAAAAUAAAAoRkAABsnAABfMQAAWSkAABAAAAAmAAAACAAAAAAAAAAAAAAA"/>
               </a:ext>
             </a:extLst>
           </p:cNvSpPr>
@@ -2147,7 +2147,7 @@
             <a:spLocks noGrp="1" noChangeArrowheads="1"/>
             <a:extLst>
               <a:ext uri="smNativeData">
-                <pr:smNativeData xmlns:pr="smNativeData" xmlns="smNativeData" val="SMDATA_15_k0e5YxMAAAAlAAAAZAAAAA8BAAAAkAAAAEgAAACQAAAASAAAAAAAAAABAAAAAAAAAAEAAABQAAAAAAAAAAAA4D8AAAAAAADgPwAAAAAAAOA/AAAAAAAA4D8AAAAAAADgPwAAAAAAAOA/AAAAAAAA4D8AAAAAAADgPwAAAAAAAOA/AAAAAAAA4D8CAAAAjAAAAAAAAAAAAAAAM2bMDANPhAgAAAAAAAAAAAAAAAAAAAAAAAAAAAAAAAAAAAAAZAAAAAEAAABAAAAAAAAAAAAAAAAAAAAAAAAAAAAAAAAAAAAAAAAAAAAAAAAAAAAAAAAAAAAAAAAAAAAAAAAAAAAAAAAAAAAAAAAAAAAAAAAAAAAAAAAAAAAAAAAAAAAAFAAAADwAAAAAAAAAAAAAAP///wkUAAAAAQAAABQAAAAUAAAAFAAAAAEAAAAAAAAAZAAAAGQAAAAAAAAAZAAAAGQAAAAVAAAAYAAAAAAAAAAAAAAADwAAACADAAAAAAAAAAAAAAEAAACgMgAAVgcAAKr4//8BAAAAf39/AAEAAABkAAAAAAAAABQAAABAHwAAAAAAACYAAAAAAAAAwOD//wAAAAAmAAAAZAAAABYAAABMAAAAAAAAAAAAAAAEAAAAAAAAAAEAAABXiZEKAAAAACgAAAAoAAAAZAAAAGQAAAAAAAAAzMzMAAAAAABQAAAAUAAAAGQAAABkAAAAAAAAABcAAAAUAAAAAAAAAAAAAAD/fwAA/38AAAAAAAAJAAAABAAAAAAAAAAeAAAAaAAAAAAAAAAAAAAAAAAAAAAAAAAAAAAAECcAABAnAAAAAAAAAAAAAAAAAAAAAAAAAAAAAAAAAAAAAAAAAAAAABQAAAAAAAAAwMD/AAAAAABkAAAAMgAAAAAAAABkAAAAAAAAAH9/fwAKAAAAIgAAABgAAAAAAAAAAAAAAAAAAAAAAAAAAAAAAAAAAAAkAAAAJAAAAAAAAAAHAAAAAAAAAAAAAAAAAAAAAAAAAAAAAAAAAAAAf39/ACUAAABYAAAAAAAAAAAAAAAAAAAAAAAAAAAAAAAAAAAAAAAAAAAAAAAAAAAAAAAAAAAAAAA/AAAAAAAAAKCGAQAAAAAAAAAAAAAAAAAMAAAAAQAAAAAAAAAAAAAAAAAAAB8AAABUAAAAAAAABQAAAAEAAAAAAAAAAAAAAAAAAAAAAAAAAAAAAAAAAAAAAAAAAAAAAAJ/f38AAAAAA8zMzADAwP8Af39/AAAAAAAAAAAAAAAAAAAAAAAAAAAAIQAAABgAAAAUAAAAwTUAABsnAABARwAAWSkAABAAAAAmAAAACAAAAAAAAAAAAAAA"/>
+                <pr:smNativeData xmlns:pr="smNativeData" xmlns="smNativeData" val="SMDATA_15_bXy5YxMAAAAlAAAAZAAAAA8BAAAAkAAAAEgAAACQAAAASAAAAAAAAAABAAAAAAAAAAEAAABQAAAAAAAAAAAA4D8AAAAAAADgPwAAAAAAAOA/AAAAAAAA4D8AAAAAAADgPwAAAAAAAOA/AAAAAAAA4D8AAAAAAADgPwAAAAAAAOA/AAAAAAAA4D8CAAAAjAAAAAAAAAAAAAAAM2bMDANPhAgAAAAAAAAAAAAAAAAAAAAAAAAAAAAAAAAAAAAAZAAAAAEAAABAAAAAAAAAAAAAAAAAAAAAAAAAAAAAAAAAAAAAAAAAAAAAAAAAAAAAAAAAAAAAAAAAAAAAAAAAAAAAAAAAAAAAAAAAAAAAAAAAAAAAAAAAAAAAAAAAAAAAFAAAADwAAAAAAAAAAAAAAP///wkUAAAAAQAAABQAAAAUAAAAFAAAAAEAAAAAAAAAZAAAAGQAAAAAAAAAZAAAAGQAAAAVAAAAYAAAAAAAAAAAAAAADwAAACADAAAAAAAAAAAAAAEAAACgMgAAVgcAAKr4//8BAAAAf39/AAEAAABkAAAAAAAAABQAAABAHwAAAAAAACYAAAAAAAAAwOD//wAAAAAmAAAAZAAAABYAAABMAAAAAAAAAAAAAAAEAAAAAAAAAAEAAABXiZEKAAAAACgAAAAoAAAAZAAAAGQAAAAAAAAAzMzMAAAAAABQAAAAUAAAAGQAAABkAAAAAAAAABcAAAAUAAAAAAAAAAAAAAD/fwAA/38AAAAAAAAJAAAABAAAAAAAAAAeAAAAaAAAAAAAAAAAAAAAAAAAAAAAAAAAAAAAECcAABAnAAAAAAAAAAAAAAAAAAAAAAAAAAAAAAAAAAAAAAAAAAAAABQAAAAAAAAAwMD/AAAAAABkAAAAMgAAAAAAAABkAAAAAAAAAH9/fwAKAAAAIgAAABgAAAAAAAAAAAAAAAAAAAAAAAAAAAAAAAAAAAAkAAAAJAAAAAAAAAAHAAAAAAAAAAAAAAAAAAAAAAAAAAAAAAAAAAAAf39/ACUAAABYAAAAAAAAAAAAAAAAAAAAAAAAAAAAAAAAAAAAAAAAAAAAAAAAAAAAAAAAAAAAAAA/AAAAAAAAAKCGAQAAAAAAAAAAAAAAAAAMAAAAAQAAAAAAAAAAAAAAAAAAAB8AAABUAAAAAAAABQAAAAEAAAAAAAAAAAAAAAAAAAAAAAAAAAAAAAAAAAAAAAAAAAAAAAJ/f38AAAAAA8zMzADAwP8Af39/AAAAAAAAAAAAAAAAAAAAAAAAAAAAIQAAABgAAAAUAAAAwTUAABsnAABARwAAWSkAABAAAAAmAAAACAAAAAAAAAAAAAAA"/>
               </a:ext>
             </a:extLst>
           </p:cNvSpPr>
@@ -2161,7 +2161,7 @@
           <a:lstStyle/>
           <a:p>
             <a:pPr/>
-            <a:fld id="{2C5FBC65-2BC1-0A4A-8FE7-DD1FF2A97988}" type="slidenum">
+            <a:fld id="{050458FE-B0E8-51AE-A6BC-46FB16F25013}" type="slidenum">
               <a:t/>
             </a:fld>
           </a:p>
@@ -2200,7 +2200,7 @@
             <a:spLocks noGrp="1" noChangeArrowheads="1"/>
             <a:extLst>
               <a:ext uri="smNativeData">
-                <pr:smNativeData xmlns:pr="smNativeData" xmlns="smNativeData" val="SMDATA_15_k0e5YxMAAAAlAAAAZAAAAA8BAAAAkAAAAEgAAACQAAAASAAAAAAAAAACAAAAAAAAAAEAAABQAAAAAAAAAAAA4D8AAAAAAADgPwAAAAAAAOA/AAAAAAAA4D8AAAAAAADgPwAAAAAAAOA/AAAAAAAA4D8AAAAAAADgPwAAAAAAAOA/AAAAAAAA4D8CAAAAjAAAAAAAAAAAAAAAM2bMDANPhAgAAAAAAAAAAAAAAAAAAAAAAAAAAAAAAAAAAAAAZAAAAAEAAABAAAAAAAAAAAAAAAAAAAAAAAAAAAAAAAAAAAAAAAAAAAAAAAAAAAAAAAAAAAAAAAAAAAAAAAAAAAAAAAAAAAAAAAAAAAAAAAAAAAAAAAAAAAAAAAAAAAAAFAAAADwAAAAAAAAAAAAAAP///wkUAAAAAQAAABQAAAAUAAAAFAAAAAEAAAAAAAAAZAAAAGQAAAAAAAAAZAAAAGQAAAAVAAAAYAAAAAAAAAAAAAAADwAAACADAAAAAAAAAAAAAAEAAACgMgAAVgcAAKr4//8BAAAAf39/AAEAAABkAAAAAAAAABQAAABAHwAAAAAAACYAAAAAAAAAwOD//wAAAAAmAAAAZAAAABYAAABMAAAAAAAAAAAAAAAEAAAAAAAAAAEAAABXiZEKAAAAACgAAAAoAAAAZAAAAGQAAAAAAAAAzMzMAAAAAABQAAAAUAAAAGQAAABkAAAAAAAAABcAAAAUAAAAAAAAAAAAAAD/fwAA/38AAAAAAAAJAAAABAAAAAAAAAAeAAAAaAAAAAAAAAAAAAAAAAAAAAAAAAAAAAAAECcAABAnAAAAAAAAAAAAAAAAAAAAAAAAAAAAAAAAAAAAAAAAAAAAABQAAAAAAAAAwMD/AAAAAABkAAAAMgAAAAAAAABkAAAAAAAAAH9/fwAKAAAAIgAAABgAAAAAAAAAAAAAAAAAAAAAAAAAAAAAAAAAAAAkAAAAJAAAAAAAAAAHAAAAAAAAAAAAAAAAAAAAAAAAAAAAAAAAAAAAf39/ACUAAABYAAAAAAAAAAAAAAAAAAAAAAAAAAAAAAAAAAAAAAAAAAAAAAAAAAAAAAAAAAAAAAA/AAAAAAAAAKCGAQAAAAAAAAAAAAAAAAAMAAAAAQAAAAAAAAAAAAAAAAAAAB8AAABUAAAAAAAABQAAAAEAAAAAAAAAAAAAAAAAAAAAAAAAAAAAAAAAAAAAAAAAAAAAAAJ/f38AAAAAA8zMzADAwP8Af39/AAAAAAAAAAAAAAAAAAAAAAAAAAAAIQAAABgAAAAUAAAAwAMAAK4BAABtHAAA1AgAABAAAAAmAAAACAAAAIGAAAAAAAAA"/>
+                <pr:smNativeData xmlns:pr="smNativeData" xmlns="smNativeData" val="SMDATA_15_bXy5YxMAAAAlAAAAZAAAAA8BAAAAkAAAAEgAAACQAAAASAAAAAAAAAACAAAAAAAAAAEAAABQAAAAAAAAAAAA4D8AAAAAAADgPwAAAAAAAOA/AAAAAAAA4D8AAAAAAADgPwAAAAAAAOA/AAAAAAAA4D8AAAAAAADgPwAAAAAAAOA/AAAAAAAA4D8CAAAAjAAAAAAAAAAAAAAAM2bMDANPhAgAAAAAAAAAAAAAAAAAAAAAAAAAAAAAAAAAAAAAZAAAAAEAAABAAAAAAAAAAAAAAAAAAAAAAAAAAAAAAAAAAAAAAAAAAAAAAAAAAAAAAAAAAAAAAAAAAAAAAAAAAAAAAAAAAAAAAAAAAAAAAAAAAAAAAAAAAAAAAAAAAAAAFAAAADwAAAAAAAAAAAAAAP///wkUAAAAAQAAABQAAAAUAAAAFAAAAAEAAAAAAAAAZAAAAGQAAAAAAAAAZAAAAGQAAAAVAAAAYAAAAAAAAAAAAAAADwAAACADAAAAAAAAAAAAAAEAAACgMgAAVgcAAKr4//8BAAAAf39/AAEAAABkAAAAAAAAABQAAABAHwAAAAAAACYAAAAAAAAAwOD//wAAAAAmAAAAZAAAABYAAABMAAAAAAAAAAAAAAAEAAAAAAAAAAEAAABXiZEKAAAAACgAAAAoAAAAZAAAAGQAAAAAAAAAzMzMAAAAAABQAAAAUAAAAGQAAABkAAAAAAAAABcAAAAUAAAAAAAAAAAAAAD/fwAA/38AAAAAAAAJAAAABAAAAAAAAAAeAAAAaAAAAAAAAAAAAAAAAAAAAAAAAAAAAAAAECcAABAnAAAAAAAAAAAAAAAAAAAAAAAAAAAAAAAAAAAAAAAAAAAAABQAAAAAAAAAwMD/AAAAAABkAAAAMgAAAAAAAABkAAAAAAAAAH9/fwAKAAAAIgAAABgAAAAAAAAAAAAAAAAAAAAAAAAAAAAAAAAAAAAkAAAAJAAAAAAAAAAHAAAAAAAAAAAAAAAAAAAAAAAAAAAAAAAAAAAAf39/ACUAAABYAAAAAAAAAAAAAAAAAAAAAAAAAAAAAAAAAAAAAAAAAAAAAAAAAAAAAAAAAAAAAAA/AAAAAAAAAKCGAQAAAAAAAAAAAAAAAAAMAAAAAQAAAAAAAAAAAAAAAAAAAB8AAABUAAAAAAAABQAAAAEAAAAAAAAAAAAAAAAAAAAAAAAAAAAAAAAAAAAAAAAAAAAAAAJ/f38AAAAAA8zMzADAwP8Af39/AAAAAAAAAAAAAAAAAAAAAAAAAAAAIQAAABgAAAAUAAAAwAMAAK4BAABtHAAA1AgAABAAAAAmAAAACAAAAIGAAAAAAAAA"/>
               </a:ext>
             </a:extLst>
           </p:cNvSpPr>
@@ -2240,7 +2240,7 @@
             <a:spLocks noGrp="1" noChangeArrowheads="1"/>
             <a:extLst>
               <a:ext uri="smNativeData">
-                <pr:smNativeData xmlns:pr="smNativeData" xmlns="smNativeData" val="SMDATA_15_k0e5YxMAAAAlAAAAZAAAAA8BAAAAkAAAAEgAAACQAAAASAAAAAAAAAAAAAAAAAAAAAEAAABQAAAAAAAAAAAA4D8AAAAAAADgPwAAAAAAAOA/AAAAAAAA4D8AAAAAAADgPwAAAAAAAOA/AAAAAAAA4D8AAAAAAADgPwAAAAAAAOA/AAAAAAAA4D8CAAAAjAAAAAAAAAAAAAAAM2bMDANPhAgAAAAAAAAAAAAAAAAAAAAAAAAAAAAAAAAAAAAAZAAAAAEAAABAAAAAAAAAAAAAAAAAAAAAAAAAAAAAAAAAAAAAAAAAAAAAAAAAAAAAAAAAAAAAAAAAAAAAAAAAAAAAAAAAAAAAAAAAAAAAAAAAAAAAAAAAAAAAAAAAAAAAFAAAADwAAAAAAAAAAAAAAP///wkUAAAAAQAAABQAAAAUAAAAFAAAAAEAAAAAAAAAZAAAAGQAAAAAAAAAZAAAAGQAAAAVAAAAYAAAAAAAAAAAAAAADwAAACADAAAAAAAAAAAAAAEAAACgMgAAVgcAAKr4//8BAAAAf39/AAEAAABkAAAAAAAAABQAAABAHwAAAAAAACYAAAAAAAAAwOD//wAAAAAmAAAAZAAAABYAAABMAAAAAAAAAAAAAAAEAAAAAAAAAAEAAABXiZEKAAAAACgAAAAoAAAAZAAAAGQAAAAAAAAAzMzMAAAAAABQAAAAUAAAAGQAAABkAAAAAAAAABcAAAAUAAAAAAAAAAAAAAD/fwAA/38AAAAAAAAJAAAABAAAAAAAAAAeAAAAaAAAAAAAAAAAAAAAAAAAAAAAAAAAAAAAECcAABAnAAAAAAAAAAAAAAAAAAAAAAAAAAAAAAAAAAAAAAAAAAAAABQAAAAAAAAAwMD/AAAAAABkAAAAMgAAAAAAAABkAAAAAAAAAH9/fwAKAAAAIgAAABgAAAAAAAAAAAAAAAAAAAAAAAAAAAAAAAAAAAAkAAAAJAAAAAAAAAAHAAAAAAAAAAAAAAAAAAAAAAAAAAAAAAAAAAAAf39/ACUAAABYAAAAAAAAAAAAAAAAAAAAAAAAAAAAAAAAAAAAAAAAAAAAAAAAAAAAAAAAAAAAAAA/AAAAAAAAAKCGAQAAAAAAAAAAAAAAAAAMAAAAAQAAAAAAAAAAAAAAAAAAAB8AAABUAAAAAAAABQAAAAEAAAAAAAAAAAAAAAAAAAAAAAAAAAAAAAAAAAAAAAAAAAAAAAJ/f38AAAAAA8zMzADAwP8Af39/AAAAAAAAAAAAAAAAAAAAAAAAAAAAIQAAABgAAAAUAAAAUx0AAK4BAABARwAAsCUAABAAAAAmAAAACAAAAAGAAAAAAAAA"/>
+                <pr:smNativeData xmlns:pr="smNativeData" xmlns="smNativeData" val="SMDATA_15_bXy5YxMAAAAlAAAAZAAAAA8BAAAAkAAAAEgAAACQAAAASAAAAAAAAAAAAAAAAAAAAAEAAABQAAAAAAAAAAAA4D8AAAAAAADgPwAAAAAAAOA/AAAAAAAA4D8AAAAAAADgPwAAAAAAAOA/AAAAAAAA4D8AAAAAAADgPwAAAAAAAOA/AAAAAAAA4D8CAAAAjAAAAAAAAAAAAAAAM2bMDANPhAgAAAAAAAAAAAAAAAAAAAAAAAAAAAAAAAAAAAAAZAAAAAEAAABAAAAAAAAAAAAAAAAAAAAAAAAAAAAAAAAAAAAAAAAAAAAAAAAAAAAAAAAAAAAAAAAAAAAAAAAAAAAAAAAAAAAAAAAAAAAAAAAAAAAAAAAAAAAAAAAAAAAAFAAAADwAAAAAAAAAAAAAAP///wkUAAAAAQAAABQAAAAUAAAAFAAAAAEAAAAAAAAAZAAAAGQAAAAAAAAAZAAAAGQAAAAVAAAAYAAAAAAAAAAAAAAADwAAACADAAAAAAAAAAAAAAEAAACgMgAAVgcAAKr4//8BAAAAf39/AAEAAABkAAAAAAAAABQAAABAHwAAAAAAACYAAAAAAAAAwOD//wAAAAAmAAAAZAAAABYAAABMAAAAAAAAAAAAAAAEAAAAAAAAAAEAAABXiZEKAAAAACgAAAAoAAAAZAAAAGQAAAAAAAAAzMzMAAAAAABQAAAAUAAAAGQAAABkAAAAAAAAABcAAAAUAAAAAAAAAAAAAAD/fwAA/38AAAAAAAAJAAAABAAAAAAAAAAeAAAAaAAAAAAAAAAAAAAAAAAAAAAAAAAAAAAAECcAABAnAAAAAAAAAAAAAAAAAAAAAAAAAAAAAAAAAAAAAAAAAAAAABQAAAAAAAAAwMD/AAAAAABkAAAAMgAAAAAAAABkAAAAAAAAAH9/fwAKAAAAIgAAABgAAAAAAAAAAAAAAAAAAAAAAAAAAAAAAAAAAAAkAAAAJAAAAAAAAAAHAAAAAAAAAAAAAAAAAAAAAAAAAAAAAAAAAAAAf39/ACUAAABYAAAAAAAAAAAAAAAAAAAAAAAAAAAAAAAAAAAAAAAAAAAAAAAAAAAAAAAAAAAAAAA/AAAAAAAAAKCGAQAAAAAAAAAAAAAAAAAMAAAAAQAAAAAAAAAAAAAAAAAAAB8AAABUAAAAAAAABQAAAAEAAAAAAAAAAAAAAAAAAAAAAAAAAAAAAAAAAAAAAAAAAAAAAAJ/f38AAAAAA8zMzADAwP8Af39/AAAAAAAAAAAAAAAAAAAAAAAAAAAAIQAAABgAAAAUAAAAUx0AAK4BAABARwAAsCUAABAAAAAmAAAACAAAAAGAAAAAAAAA"/>
               </a:ext>
             </a:extLst>
           </p:cNvSpPr>
@@ -2324,7 +2324,7 @@
             <a:spLocks noGrp="1" noChangeArrowheads="1"/>
             <a:extLst>
               <a:ext uri="smNativeData">
-                <pr:smNativeData xmlns:pr="smNativeData" xmlns="smNativeData" val="SMDATA_15_k0e5YxMAAAAlAAAAZAAAAA8BAAAAkAAAAEgAAACQAAAASAAAAAAAAAAAAAAAAAAAAAEAAABQAAAAAAAAAAAA4D8AAAAAAADgPwAAAAAAAOA/AAAAAAAA4D8AAAAAAADgPwAAAAAAAOA/AAAAAAAA4D8AAAAAAADgPwAAAAAAAOA/AAAAAAAA4D8CAAAAjAAAAAAAAAAAAAAAM2bMDANPhAgAAAAAAAAAAAAAAAAAAAAAAAAAAAAAAAAAAAAAZAAAAAEAAABAAAAAAAAAAAAAAAAAAAAAAAAAAAAAAAAAAAAAAAAAAAAAAAAAAAAAAAAAAAAAAAAAAAAAAAAAAAAAAAAAAAAAAAAAAAAAAAAAAAAAAAAAAAAAAAAAAAAAFAAAADwAAAAAAAAAAAAAAP///wkUAAAAAQAAABQAAAAUAAAAFAAAAAEAAAAAAAAAZAAAAGQAAAAAAAAAZAAAAGQAAAAVAAAAYAAAAAAAAAAAAAAADwAAACADAAAAAAAAAAAAAAEAAACgMgAAVgcAAKr4//8BAAAAf39/AAEAAABkAAAAAAAAABQAAABAHwAAAAAAACYAAAAAAAAAwOD//wAAAAAmAAAAZAAAABYAAABMAAAAAAAAAAAAAAAEAAAAAAAAAAEAAABXiZEKAAAAACgAAAAoAAAAZAAAAGQAAAAAAAAAzMzMAAAAAABQAAAAUAAAAGQAAABkAAAAAAAAABcAAAAUAAAAAAAAAAAAAAD/fwAA/38AAAAAAAAJAAAABAAAAAAAAAAeAAAAaAAAAAAAAAAAAAAAAAAAAAAAAAAAAAAAECcAABAnAAAAAAAAAAAAAAAAAAAAAAAAAAAAAAAAAAAAAAAAAAAAABQAAAAAAAAAwMD/AAAAAABkAAAAMgAAAAAAAABkAAAAAAAAAH9/fwAKAAAAIgAAABgAAAAAAAAAAAAAAAAAAAAAAAAAAAAAAAAAAAAkAAAAJAAAAAAAAAAHAAAAAAAAAAAAAAAAAAAAAAAAAAAAAAAAAAAAf39/ACUAAABYAAAAAAAAAAAAAAAAAAAAAAAAAAAAAAAAAAAAAAAAAAAAAAAAAAAAAAAAAAAAAAA/AAAAAAAAAKCGAQAAAAAAAAAAAAAAAAAMAAAAAQAAAAAAAAAAAAAAAAAAAB8AAABUAAAAAAAABQAAAAEAAAAAAAAAAAAAAAAAAAAAAAAAAAAAAAAAAAAAAAAAAAAAAAJ/f38AAAAAA8zMzADAwP8Af39/AAAAAAAAAAAAAAAAAAAAAAAAAAAAIQAAABgAAAAUAAAAwAMAANQIAABtHAAAsCUAABAAAAAmAAAACAAAAAGAAAAAAAAA"/>
+                <pr:smNativeData xmlns:pr="smNativeData" xmlns="smNativeData" val="SMDATA_15_bXy5YxMAAAAlAAAAZAAAAA8BAAAAkAAAAEgAAACQAAAASAAAAAAAAAAAAAAAAAAAAAEAAABQAAAAAAAAAAAA4D8AAAAAAADgPwAAAAAAAOA/AAAAAAAA4D8AAAAAAADgPwAAAAAAAOA/AAAAAAAA4D8AAAAAAADgPwAAAAAAAOA/AAAAAAAA4D8CAAAAjAAAAAAAAAAAAAAAM2bMDANPhAgAAAAAAAAAAAAAAAAAAAAAAAAAAAAAAAAAAAAAZAAAAAEAAABAAAAAAAAAAAAAAAAAAAAAAAAAAAAAAAAAAAAAAAAAAAAAAAAAAAAAAAAAAAAAAAAAAAAAAAAAAAAAAAAAAAAAAAAAAAAAAAAAAAAAAAAAAAAAAAAAAAAAFAAAADwAAAAAAAAAAAAAAP///wkUAAAAAQAAABQAAAAUAAAAFAAAAAEAAAAAAAAAZAAAAGQAAAAAAAAAZAAAAGQAAAAVAAAAYAAAAAAAAAAAAAAADwAAACADAAAAAAAAAAAAAAEAAACgMgAAVgcAAKr4//8BAAAAf39/AAEAAABkAAAAAAAAABQAAABAHwAAAAAAACYAAAAAAAAAwOD//wAAAAAmAAAAZAAAABYAAABMAAAAAAAAAAAAAAAEAAAAAAAAAAEAAABXiZEKAAAAACgAAAAoAAAAZAAAAGQAAAAAAAAAzMzMAAAAAABQAAAAUAAAAGQAAABkAAAAAAAAABcAAAAUAAAAAAAAAAAAAAD/fwAA/38AAAAAAAAJAAAABAAAAAAAAAAeAAAAaAAAAAAAAAAAAAAAAAAAAAAAAAAAAAAAECcAABAnAAAAAAAAAAAAAAAAAAAAAAAAAAAAAAAAAAAAAAAAAAAAABQAAAAAAAAAwMD/AAAAAABkAAAAMgAAAAAAAABkAAAAAAAAAH9/fwAKAAAAIgAAABgAAAAAAAAAAAAAAAAAAAAAAAAAAAAAAAAAAAAkAAAAJAAAAAAAAAAHAAAAAAAAAAAAAAAAAAAAAAAAAAAAAAAAAAAAf39/ACUAAABYAAAAAAAAAAAAAAAAAAAAAAAAAAAAAAAAAAAAAAAAAAAAAAAAAAAAAAAAAAAAAAA/AAAAAAAAAKCGAQAAAAAAAAAAAAAAAAAMAAAAAQAAAAAAAAAAAAAAAAAAAB8AAABUAAAAAAAABQAAAAEAAAAAAAAAAAAAAAAAAAAAAAAAAAAAAAAAAAAAAAAAAAAAAAJ/f38AAAAAA8zMzADAwP8Af39/AAAAAAAAAAAAAAAAAAAAAAAAAAAAIQAAABgAAAAUAAAAwAMAANQIAABtHAAAsCUAABAAAAAmAAAACAAAAAGAAAAAAAAA"/>
               </a:ext>
             </a:extLst>
           </p:cNvSpPr>
@@ -2393,7 +2393,7 @@
             <a:spLocks noGrp="1" noChangeArrowheads="1"/>
             <a:extLst>
               <a:ext uri="smNativeData">
-                <pr:smNativeData xmlns:pr="smNativeData" xmlns="smNativeData" val="SMDATA_15_k0e5YxMAAAAlAAAAZAAAAA8BAAAAkAAAAEgAAACQAAAASAAAAAAAAAABAAAAAAAAAAEAAABQAAAAAAAAAAAA4D8AAAAAAADgPwAAAAAAAOA/AAAAAAAA4D8AAAAAAADgPwAAAAAAAOA/AAAAAAAA4D8AAAAAAADgPwAAAAAAAOA/AAAAAAAA4D8CAAAAjAAAAAAAAAAAAAAAM2bMDANPhAgAAAAAAAAAAAAAAAAAAAAAAAAAAAAAAAAAAAAAZAAAAAEAAABAAAAAAAAAAAAAAAAAAAAAAAAAAAAAAAAAAAAAAAAAAAAAAAAAAAAAAAAAAAAAAAAAAAAAAAAAAAAAAAAAAAAAAAAAAAAAAAAAAAAAAAAAAAAAAAAAAAAAFAAAADwAAAAAAAAAAAAAAP///wkUAAAAAQAAABQAAAAUAAAAFAAAAAEAAAAAAAAAZAAAAGQAAAAAAAAAZAAAAGQAAAAVAAAAYAAAAAAAAAAAAAAADwAAACADAAAAAAAAAAAAAAEAAACgMgAAVgcAAKr4//8BAAAAf39/AAEAAABkAAAAAAAAABQAAABAHwAAAAAAACYAAAAAAAAAwOD//wAAAAAmAAAAZAAAABYAAABMAAAAAAAAAAAAAAAEAAAAAAAAAAEAAABXiZEKAAAAACgAAAAoAAAAZAAAAGQAAAAAAAAAzMzMAAAAAABQAAAAUAAAAGQAAABkAAAAAAAAABcAAAAUAAAAAAAAAAAAAAD/fwAA/38AAAAAAAAJAAAABAAAAAAAAAAeAAAAaAAAAAAAAAAAAAAAAAAAAAAAAAAAAAAAECcAABAnAAAAAAAAAAAAAAAAAAAAAAAAAAAAAAAAAAAAAAAAAAAAABQAAAAAAAAAwMD/AAAAAABkAAAAMgAAAAAAAABkAAAAAAAAAH9/fwAKAAAAIgAAABgAAAAAAAAAAAAAAAAAAAAAAAAAAAAAAAAAAAAkAAAAJAAAAAAAAAAHAAAAAAAAAAAAAAAAAAAAAAAAAAAAAAAAAAAAf39/ACUAAABYAAAAAAAAAAAAAAAAAAAAAAAAAAAAAAAAAAAAAAAAAAAAAAAAAAAAAAAAAAAAAAA/AAAAAAAAAKCGAQAAAAAAAAAAAAAAAAAMAAAAAQAAAAAAAAAAAAAAAAAAAB8AAABUAAAAAAAABQAAAAEAAAAAAAAAAAAAAAAAAAAAAAAAAAAAAAAAAAAAAAAAAAAAAAJ/f38AAAAAA8zMzADAwP8Af39/AAAAAAAAAAAAAAAAAAAAAAAAAAAAIQAAABgAAAAUAAAAwAMAABsnAAA/FQAAWSkAABAAAAAmAAAACAAAAAAAAAAAAAAA"/>
+                <pr:smNativeData xmlns:pr="smNativeData" xmlns="smNativeData" val="SMDATA_15_bXy5YxMAAAAlAAAAZAAAAA8BAAAAkAAAAEgAAACQAAAASAAAAAAAAAABAAAAAAAAAAEAAABQAAAAAAAAAAAA4D8AAAAAAADgPwAAAAAAAOA/AAAAAAAA4D8AAAAAAADgPwAAAAAAAOA/AAAAAAAA4D8AAAAAAADgPwAAAAAAAOA/AAAAAAAA4D8CAAAAjAAAAAAAAAAAAAAAM2bMDANPhAgAAAAAAAAAAAAAAAAAAAAAAAAAAAAAAAAAAAAAZAAAAAEAAABAAAAAAAAAAAAAAAAAAAAAAAAAAAAAAAAAAAAAAAAAAAAAAAAAAAAAAAAAAAAAAAAAAAAAAAAAAAAAAAAAAAAAAAAAAAAAAAAAAAAAAAAAAAAAAAAAAAAAFAAAADwAAAAAAAAAAAAAAP///wkUAAAAAQAAABQAAAAUAAAAFAAAAAEAAAAAAAAAZAAAAGQAAAAAAAAAZAAAAGQAAAAVAAAAYAAAAAAAAAAAAAAADwAAACADAAAAAAAAAAAAAAEAAACgMgAAVgcAAKr4//8BAAAAf39/AAEAAABkAAAAAAAAABQAAABAHwAAAAAAACYAAAAAAAAAwOD//wAAAAAmAAAAZAAAABYAAABMAAAAAAAAAAAAAAAEAAAAAAAAAAEAAABXiZEKAAAAACgAAAAoAAAAZAAAAGQAAAAAAAAAzMzMAAAAAABQAAAAUAAAAGQAAABkAAAAAAAAABcAAAAUAAAAAAAAAAAAAAD/fwAA/38AAAAAAAAJAAAABAAAAAAAAAAeAAAAaAAAAAAAAAAAAAAAAAAAAAAAAAAAAAAAECcAABAnAAAAAAAAAAAAAAAAAAAAAAAAAAAAAAAAAAAAAAAAAAAAABQAAAAAAAAAwMD/AAAAAABkAAAAMgAAAAAAAABkAAAAAAAAAH9/fwAKAAAAIgAAABgAAAAAAAAAAAAAAAAAAAAAAAAAAAAAAAAAAAAkAAAAJAAAAAAAAAAHAAAAAAAAAAAAAAAAAAAAAAAAAAAAAAAAAAAAf39/ACUAAABYAAAAAAAAAAAAAAAAAAAAAAAAAAAAAAAAAAAAAAAAAAAAAAAAAAAAAAAAAAAAAAA/AAAAAAAAAKCGAQAAAAAAAAAAAAAAAAAMAAAAAQAAAAAAAAAAAAAAAAAAAB8AAABUAAAAAAAABQAAAAEAAAAAAAAAAAAAAAAAAAAAAAAAAAAAAAAAAAAAAAAAAAAAAAJ/f38AAAAAA8zMzADAwP8Af39/AAAAAAAAAAAAAAAAAAAAAAAAAAAAIQAAABgAAAAUAAAAwAMAABsnAAA/FQAAWSkAABAAAAAmAAAACAAAAAAAAAAAAAAA"/>
               </a:ext>
             </a:extLst>
           </p:cNvSpPr>
@@ -2407,7 +2407,7 @@
           <a:lstStyle/>
           <a:p>
             <a:pPr/>
-            <a:fld id="{2C5FA357-19C1-0A55-8FE7-EF00EDA979BA}" type="datetime1">
+            <a:fld id="{40057327-69AD-5085-E3BD-9FD03DF315CA}" type="datetime1">
               <a:t/>
             </a:fld>
           </a:p>
@@ -2420,7 +2420,7 @@
             <a:spLocks noGrp="1" noChangeArrowheads="1"/>
             <a:extLst>
               <a:ext uri="smNativeData">
-                <pr:smNativeData xmlns:pr="smNativeData" xmlns="smNativeData" val="SMDATA_15_k0e5YxMAAAAlAAAAZAAAAA8BAAAAkAAAAEgAAACQAAAASAAAAAAAAAABAAAAAAAAAAEAAABQAAAAAAAAAAAA4D8AAAAAAADgPwAAAAAAAOA/AAAAAAAA4D8AAAAAAADgPwAAAAAAAOA/AAAAAAAA4D8AAAAAAADgPwAAAAAAAOA/AAAAAAAA4D8CAAAAjAAAAAAAAAAAAAAAM2bMDANPhAgAAAAAAAAAAAAAAAAAAAAAAAAAAAAAAAAAAAAAZAAAAAEAAABAAAAAAAAAAAAAAAAAAAAAAAAAAAAAAAAAAAAAAAAAAAAAAAAAAAAAAAAAAAAAAAAAAAAAAAAAAAAAAAAAAAAAAAAAAAAAAAAAAAAAAAAAAAAAAAAAAAAAFAAAADwAAAAAAAAAAAAAAP///wkUAAAAAQAAABQAAAAUAAAAFAAAAAEAAAAAAAAAZAAAAGQAAAAAAAAAZAAAAGQAAAAVAAAAYAAAAAAAAAAAAAAADwAAACADAAAAAAAAAAAAAAEAAACgMgAAVgcAAKr4//8BAAAAf39/AAEAAABkAAAAAAAAABQAAABAHwAAAAAAACYAAAAAAAAAwOD//wAAAAAmAAAAZAAAABYAAABMAAAAAAAAAAAAAAAEAAAAAAAAAAEAAABXiZEKAAAAACgAAAAoAAAAZAAAAGQAAAAAAAAAzMzMAAAAAABQAAAAUAAAAGQAAABkAAAAAAAAABcAAAAUAAAAAAAAAAAAAAD/fwAA/38AAAAAAAAJAAAABAAAAHNwY0IeAAAAaAAAAAAAAAAAAAAAAAAAAAAAAAAAAAAAECcAABAnAAAAAAAAAAAAAAAAAAAAAAAAAAAAAAAAAAAAAAAAAAAAABQAAAAAAAAAwMD/AAAAAABkAAAAMgAAAAAAAABkAAAAAAAAAH9/fwAKAAAAIgAAABgAAAAAAAAAAAAAAAAAAAAAAAAAAAAAAAAAAAAkAAAAJAAAAAAAAAAHAAAAAAAAAAAAAAAAAAAAAAAAAAAAAAAAAAAAf39/ACUAAABYAAAAAAAAAAAAAAAAAAAAAAAAAAAAAAAAAAAAAAAAAAAAAAAAAAAAAAAAAAAAAAA/AAAAAAAAAKCGAQAAAAAAAAAAAAAAAAAMAAAAAQAAAAAAAAAAAAAAAAAAAB8AAABUAAAAAAAABQAAAAEAAAAAAAAAAAAAAAAAAAAAAAAAAAAAAAAAAAAAAAAAAAAAAAJ/f38AAAAAA8zMzADAwP8Af39/AAAAAAAAAAAAAAAAAAAAAAAAAAAAIQAAABgAAAAUAAAAoRkAABsnAABfMQAAWSkAABAAAAAmAAAACAAAAAAAAAAAAAAA"/>
+                <pr:smNativeData xmlns:pr="smNativeData" xmlns="smNativeData" val="SMDATA_15_bXy5YxMAAAAlAAAAZAAAAA8BAAAAkAAAAEgAAACQAAAASAAAAAAAAAABAAAAAAAAAAEAAABQAAAAAAAAAAAA4D8AAAAAAADgPwAAAAAAAOA/AAAAAAAA4D8AAAAAAADgPwAAAAAAAOA/AAAAAAAA4D8AAAAAAADgPwAAAAAAAOA/AAAAAAAA4D8CAAAAjAAAAAAAAAAAAAAAM2bMDANPhAgAAAAAAAAAAAAAAAAAAAAAAAAAAAAAAAAAAAAAZAAAAAEAAABAAAAAAAAAAAAAAAAAAAAAAAAAAAAAAAAAAAAAAAAAAAAAAAAAAAAAAAAAAAAAAAAAAAAAAAAAAAAAAAAAAAAAAAAAAAAAAAAAAAAAAAAAAAAAAAAAAAAAFAAAADwAAAAAAAAAAAAAAP///wkUAAAAAQAAABQAAAAUAAAAFAAAAAEAAAAAAAAAZAAAAGQAAAAAAAAAZAAAAGQAAAAVAAAAYAAAAAAAAAAAAAAADwAAACADAAAAAAAAAAAAAAEAAACgMgAAVgcAAKr4//8BAAAAf39/AAEAAABkAAAAAAAAABQAAABAHwAAAAAAACYAAAAAAAAAwOD//wAAAAAmAAAAZAAAABYAAABMAAAAAAAAAAAAAAAEAAAAAAAAAAEAAABXiZEKAAAAACgAAAAoAAAAZAAAAGQAAAAAAAAAzMzMAAAAAABQAAAAUAAAAGQAAABkAAAAAAAAABcAAAAUAAAAAAAAAAAAAAD/fwAA/38AAAAAAAAJAAAABAAAAHNwY0IeAAAAaAAAAAAAAAAAAAAAAAAAAAAAAAAAAAAAECcAABAnAAAAAAAAAAAAAAAAAAAAAAAAAAAAAAAAAAAAAAAAAAAAABQAAAAAAAAAwMD/AAAAAABkAAAAMgAAAAAAAABkAAAAAAAAAH9/fwAKAAAAIgAAABgAAAAAAAAAAAAAAAAAAAAAAAAAAAAAAAAAAAAkAAAAJAAAAAAAAAAHAAAAAAAAAAAAAAAAAAAAAAAAAAAAAAAAAAAAf39/ACUAAABYAAAAAAAAAAAAAAAAAAAAAAAAAAAAAAAAAAAAAAAAAAAAAAAAAAAAAAAAAAAAAAA/AAAAAAAAAKCGAQAAAAAAAAAAAAAAAAAMAAAAAQAAAAAAAAAAAAAAAAAAAB8AAABUAAAAAAAABQAAAAEAAAAAAAAAAAAAAAAAAAAAAAAAAAAAAAAAAAAAAAAAAAAAAAJ/f38AAAAAA8zMzADAwP8Af39/AAAAAAAAAAAAAAAAAAAAAAAAAAAAIQAAABgAAAAUAAAAoRkAABsnAABfMQAAWSkAABAAAAAmAAAACAAAAAAAAAAAAAAA"/>
               </a:ext>
             </a:extLst>
           </p:cNvSpPr>
@@ -2444,7 +2444,7 @@
             <a:spLocks noGrp="1" noChangeArrowheads="1"/>
             <a:extLst>
               <a:ext uri="smNativeData">
-                <pr:smNativeData xmlns:pr="smNativeData" xmlns="smNativeData" val="SMDATA_15_k0e5YxMAAAAlAAAAZAAAAA8BAAAAkAAAAEgAAACQAAAASAAAAAAAAAABAAAAAAAAAAEAAABQAAAAAAAAAAAA4D8AAAAAAADgPwAAAAAAAOA/AAAAAAAA4D8AAAAAAADgPwAAAAAAAOA/AAAAAAAA4D8AAAAAAADgPwAAAAAAAOA/AAAAAAAA4D8CAAAAjAAAAAAAAAAAAAAAM2bMDANPhAgAAAAAAAAAAAAAAAAAAAAAAAAAAAAAAAAAAAAAZAAAAAEAAABAAAAAAAAAAAAAAAAAAAAAAAAAAAAAAAAAAAAAAAAAAAAAAAAAAAAAAAAAAAAAAAAAAAAAAAAAAAAAAAAAAAAAAAAAAAAAAAAAAAAAAAAAAAAAAAAAAAAAFAAAADwAAAAAAAAAAAAAAP///wkUAAAAAQAAABQAAAAUAAAAFAAAAAEAAAAAAAAAZAAAAGQAAAAAAAAAZAAAAGQAAAAVAAAAYAAAAAAAAAAAAAAADwAAACADAAAAAAAAAAAAAAEAAACgMgAAVgcAAKr4//8BAAAAf39/AAEAAABkAAAAAAAAABQAAABAHwAAAAAAACYAAAAAAAAAwOD//wAAAAAmAAAAZAAAABYAAABMAAAAAAAAAAAAAAAEAAAAAAAAAAEAAABXiZEKAAAAACgAAAAoAAAAZAAAAGQAAAAAAAAAzMzMAAAAAABQAAAAUAAAAGQAAABkAAAAAAAAABcAAAAUAAAAAAAAAAAAAAD/fwAA/38AAAAAAAAJAAAABAAAAAAAAAAeAAAAaAAAAAAAAAAAAAAAAAAAAAAAAAAAAAAAECcAABAnAAAAAAAAAAAAAAAAAAAAAAAAAAAAAAAAAAAAAAAAAAAAABQAAAAAAAAAwMD/AAAAAABkAAAAMgAAAAAAAABkAAAAAAAAAH9/fwAKAAAAIgAAABgAAAAAAAAAAAAAAAAAAAAAAAAAAAAAAAAAAAAkAAAAJAAAAAAAAAAHAAAAAAAAAAAAAAAAAAAAAAAAAAAAAAAAAAAAf39/ACUAAABYAAAAAAAAAAAAAAAAAAAAAAAAAAAAAAAAAAAAAAAAAAAAAAAAAAAAAAAAAAAAAAA/AAAAAAAAAKCGAQAAAAAAAAAAAAAAAAAMAAAAAQAAAAAAAAAAAAAAAAAAAB8AAABUAAAAAAAABQAAAAEAAAAAAAAAAAAAAAAAAAAAAAAAAAAAAAAAAAAAAAAAAAAAAAJ/f38AAAAAA8zMzADAwP8Af39/AAAAAAAAAAAAAAAAAAAAAAAAAAAAIQAAABgAAAAUAAAAwTUAABsnAABARwAAWSkAABAAAAAmAAAACAAAAAAAAAAAAAAA"/>
+                <pr:smNativeData xmlns:pr="smNativeData" xmlns="smNativeData" val="SMDATA_15_bXy5YxMAAAAlAAAAZAAAAA8BAAAAkAAAAEgAAACQAAAASAAAAAAAAAABAAAAAAAAAAEAAABQAAAAAAAAAAAA4D8AAAAAAADgPwAAAAAAAOA/AAAAAAAA4D8AAAAAAADgPwAAAAAAAOA/AAAAAAAA4D8AAAAAAADgPwAAAAAAAOA/AAAAAAAA4D8CAAAAjAAAAAAAAAAAAAAAM2bMDANPhAgAAAAAAAAAAAAAAAAAAAAAAAAAAAAAAAAAAAAAZAAAAAEAAABAAAAAAAAAAAAAAAAAAAAAAAAAAAAAAAAAAAAAAAAAAAAAAAAAAAAAAAAAAAAAAAAAAAAAAAAAAAAAAAAAAAAAAAAAAAAAAAAAAAAAAAAAAAAAAAAAAAAAFAAAADwAAAAAAAAAAAAAAP///wkUAAAAAQAAABQAAAAUAAAAFAAAAAEAAAAAAAAAZAAAAGQAAAAAAAAAZAAAAGQAAAAVAAAAYAAAAAAAAAAAAAAADwAAACADAAAAAAAAAAAAAAEAAACgMgAAVgcAAKr4//8BAAAAf39/AAEAAABkAAAAAAAAABQAAABAHwAAAAAAACYAAAAAAAAAwOD//wAAAAAmAAAAZAAAABYAAABMAAAAAAAAAAAAAAAEAAAAAAAAAAEAAABXiZEKAAAAACgAAAAoAAAAZAAAAGQAAAAAAAAAzMzMAAAAAABQAAAAUAAAAGQAAABkAAAAAAAAABcAAAAUAAAAAAAAAAAAAAD/fwAA/38AAAAAAAAJAAAABAAAAAAAAAAeAAAAaAAAAAAAAAAAAAAAAAAAAAAAAAAAAAAAECcAABAnAAAAAAAAAAAAAAAAAAAAAAAAAAAAAAAAAAAAAAAAAAAAABQAAAAAAAAAwMD/AAAAAABkAAAAMgAAAAAAAABkAAAAAAAAAH9/fwAKAAAAIgAAABgAAAAAAAAAAAAAAAAAAAAAAAAAAAAAAAAAAAAkAAAAJAAAAAAAAAAHAAAAAAAAAAAAAAAAAAAAAAAAAAAAAAAAAAAAf39/ACUAAABYAAAAAAAAAAAAAAAAAAAAAAAAAAAAAAAAAAAAAAAAAAAAAAAAAAAAAAAAAAAAAAA/AAAAAAAAAKCGAQAAAAAAAAAAAAAAAAAMAAAAAQAAAAAAAAAAAAAAAAAAAB8AAABUAAAAAAAABQAAAAEAAAAAAAAAAAAAAAAAAAAAAAAAAAAAAAAAAAAAAAAAAAAAAAJ/f38AAAAAA8zMzADAwP8Af39/AAAAAAAAAAAAAAAAAAAAAAAAAAAAIQAAABgAAAAUAAAAwTUAABsnAABARwAAWSkAABAAAAAmAAAACAAAAAAAAAAAAAAA"/>
               </a:ext>
             </a:extLst>
           </p:cNvSpPr>
@@ -2458,7 +2458,7 @@
           <a:lstStyle/>
           <a:p>
             <a:pPr/>
-            <a:fld id="{2C5FC6EA-A4C1-0A30-8FE7-526588A97907}" type="slidenum">
+            <a:fld id="{78886C90-DE95-DD9A-DB30-28CF227E2D7D}" type="slidenum">
               <a:t/>
             </a:fld>
           </a:p>
@@ -2497,7 +2497,7 @@
             <a:spLocks noGrp="1" noChangeArrowheads="1"/>
             <a:extLst>
               <a:ext uri="smNativeData">
-                <pr:smNativeData xmlns:pr="smNativeData" xmlns="smNativeData" val="SMDATA_15_k0e5YxMAAAAlAAAAZAAAAA8BAAAAkAAAAEgAAACQAAAASAAAAAAAAAACAAAAAAAAAAEAAABQAAAAAAAAAAAA4D8AAAAAAADgPwAAAAAAAOA/AAAAAAAA4D8AAAAAAADgPwAAAAAAAOA/AAAAAAAA4D8AAAAAAADgPwAAAAAAAOA/AAAAAAAA4D8CAAAAjAAAAAAAAAAAAAAAM2bMDANPhAgAAAAAAAAAAAAAAAAAAAAAAAAAAAAAAAAAAAAAZAAAAAEAAABAAAAAAAAAAAAAAAAAAAAAAAAAAAAAAAAAAAAAAAAAAAAAAAAAAAAAAAAAAAAAAAAAAAAAAAAAAAAAAAAAAAAAAAAAAAAAAAAAAAAAAAAAAAAAAAAAAAAAFAAAADwAAAAAAAAAAAAAAP///wkUAAAAAQAAABQAAAAUAAAAFAAAAAEAAAAAAAAAZAAAAGQAAAAAAAAAZAAAAGQAAAAVAAAAYAAAAAAAAAAAAAAADwAAACADAAAAAAAAAAAAAAEAAACgMgAAVgcAAKr4//8BAAAAf39/AAEAAABkAAAAAAAAABQAAABAHwAAAAAAACYAAAAAAAAAwOD//wAAAAAmAAAAZAAAABYAAABMAAAAAAAAAAAAAAAEAAAAAAAAAAEAAABXiZEKAAAAACgAAAAoAAAAZAAAAGQAAAAAAAAAzMzMAAAAAABQAAAAUAAAAGQAAABkAAAAAAAAABcAAAAUAAAAAAAAAAAAAAD/fwAA/38AAAAAAAAJAAAABAAAAAAAAAAeAAAAaAAAAAAAAAAAAAAAAAAAAAAAAAAAAAAAECcAABAnAAAAAAAAAAAAAAAAAAAAAAAAAAAAAAAAAAAAAAAAAAAAABQAAAAAAAAAwMD/AAAAAABkAAAAMgAAAAAAAABkAAAAAAAAAH9/fwAKAAAAIgAAABgAAAAAAAAAAAAAAAAAAAAAAAAAAAAAAAAAAAAkAAAAJAAAAAAAAAAHAAAAAAAAAAAAAAAAAAAAAAAAAAAAAAAAAAAAf39/ACUAAABYAAAAAAAAAAAAAAAAAAAAAAAAAAAAAAAAAAAAAAAAAAAAAAAAAAAAAAAAAAAAAAA/AAAAAAAAAKCGAQAAAAAAAAAAAAAAAAAMAAAAAQAAAAAAAAAAAAAAAAAAAB8AAABUAAAAAAAABQAAAAEAAAAAAAAAAAAAAAAAAAAAAAAAAAAAAAAAAAAAAAAAAAAAAAJ/f38AAAAAA8zMzADAwP8Af39/AAAAAAAAAAAAAAAAAAAAAAAAAAAAIQAAABgAAAAUAAAAsw4AAIgdAACzOwAABCEAABAAAAAmAAAACAAAAIGAAAAAAAAA"/>
+                <pr:smNativeData xmlns:pr="smNativeData" xmlns="smNativeData" val="SMDATA_15_bXy5YxMAAAAlAAAAZAAAAA8BAAAAkAAAAEgAAACQAAAASAAAAAAAAAACAAAAAAAAAAEAAABQAAAAAAAAAAAA4D8AAAAAAADgPwAAAAAAAOA/AAAAAAAA4D8AAAAAAADgPwAAAAAAAOA/AAAAAAAA4D8AAAAAAADgPwAAAAAAAOA/AAAAAAAA4D8CAAAAjAAAAAAAAAAAAAAAM2bMDANPhAgAAAAAAAAAAAAAAAAAAAAAAAAAAAAAAAAAAAAAZAAAAAEAAABAAAAAAAAAAAAAAAAAAAAAAAAAAAAAAAAAAAAAAAAAAAAAAAAAAAAAAAAAAAAAAAAAAAAAAAAAAAAAAAAAAAAAAAAAAAAAAAAAAAAAAAAAAAAAAAAAAAAAFAAAADwAAAAAAAAAAAAAAP///wkUAAAAAQAAABQAAAAUAAAAFAAAAAEAAAAAAAAAZAAAAGQAAAAAAAAAZAAAAGQAAAAVAAAAYAAAAAAAAAAAAAAADwAAACADAAAAAAAAAAAAAAEAAACgMgAAVgcAAKr4//8BAAAAf39/AAEAAABkAAAAAAAAABQAAABAHwAAAAAAACYAAAAAAAAAwOD//wAAAAAmAAAAZAAAABYAAABMAAAAAAAAAAAAAAAEAAAAAAAAAAEAAABXiZEKAAAAACgAAAAoAAAAZAAAAGQAAAAAAAAAzMzMAAAAAABQAAAAUAAAAGQAAABkAAAAAAAAABcAAAAUAAAAAAAAAAAAAAD/fwAA/38AAAAAAAAJAAAABAAAAAAAAAAeAAAAaAAAAAAAAAAAAAAAAAAAAAAAAAAAAAAAECcAABAnAAAAAAAAAAAAAAAAAAAAAAAAAAAAAAAAAAAAAAAAAAAAABQAAAAAAAAAwMD/AAAAAABkAAAAMgAAAAAAAABkAAAAAAAAAH9/fwAKAAAAIgAAABgAAAAAAAAAAAAAAAAAAAAAAAAAAAAAAAAAAAAkAAAAJAAAAAAAAAAHAAAAAAAAAAAAAAAAAAAAAAAAAAAAAAAAAAAAf39/ACUAAABYAAAAAAAAAAAAAAAAAAAAAAAAAAAAAAAAAAAAAAAAAAAAAAAAAAAAAAAAAAAAAAA/AAAAAAAAAKCGAQAAAAAAAAAAAAAAAAAMAAAAAQAAAAAAAAAAAAAAAAAAAB8AAABUAAAAAAAABQAAAAEAAAAAAAAAAAAAAAAAAAAAAAAAAAAAAAAAAAAAAAAAAAAAAAJ/f38AAAAAA8zMzADAwP8Af39/AAAAAAAAAAAAAAAAAAAAAAAAAAAAIQAAABgAAAAUAAAAsw4AAIgdAACzOwAABCEAABAAAAAmAAAACAAAAIGAAAAAAAAA"/>
               </a:ext>
             </a:extLst>
           </p:cNvSpPr>
@@ -2537,7 +2537,7 @@
             <a:spLocks noGrp="1" noChangeArrowheads="1"/>
             <a:extLst>
               <a:ext uri="smNativeData">
-                <pr:smNativeData xmlns:pr="smNativeData" xmlns="smNativeData" val="SMDATA_15_k0e5YxMAAAAlAAAAZAAAAA8BAAAAkAAAAEgAAACQAAAASAAAAAAAAAAAAAAAAAAAAAEAAABQAAAAAAAAAAAA4D8AAAAAAADgPwAAAAAAAOA/AAAAAAAA4D8AAAAAAADgPwAAAAAAAOA/AAAAAAAA4D8AAAAAAADgPwAAAAAAAOA/AAAAAAAA4D8CAAAAjAAAAAAAAAAAAAAAM2bMDANPhAgAAAAAAAAAAAAAAAAAAAAAAAAAAAAAAAAAAAAAZAAAAAEAAABAAAAAAAAAAAAAAAAAAAAAAAAAAAAAAAAAAAAAAAAAAAAAAAAAAAAAAAAAAAAAAAAAAAAAAAAAAAAAAAAAAAAAAAAAAAAAAAAAAAAAAAAAAAAAAAAAAAAAFAAAADwAAAAAAAAAAAAAAP///wkUAAAAAQAAABQAAAAUAAAAFAAAAAEAAAAAAAAAZAAAAGQAAAAAAAAAZAAAAGQAAAAVAAAAYAAAAAAAAAAAAAAADwAAACADAAAAAAAAAAAAAAEAAACgMgAAVgcAAKr4//8BAAAAf39/AAEAAABkAAAAAAAAABQAAABAHwAAAAAAACYAAAAAAAAAwOD//wAAAAAmAAAAZAAAABYAAABMAAAAAAAAAAAAAAAEAAAAAAAAAAEAAABXiZEKAAAAACgAAAAoAAAAZAAAAGQAAAAAAAAAzMzMAAAAAABQAAAAUAAAAGQAAABkAAAAAAAAABcAAAAUAAAAAAAAAAAAAAD/fwAA/38AAAAAAAAJAAAABAAAAAAAAAAeAAAAaAAAAAAAAAAAAAAAAAAAAAAAAAAAAAAAECcAABAnAAAAAAAAAAAAAAAAAAAAAAAAAAAAAAAAAAAAAAAAAAAAABQAAAAAAAAAwMD/AAAAAABkAAAAMgAAAAAAAABkAAAAAAAAAH9/fwAKAAAAIgAAABgAAAAAAAAAAAAAAAAAAAAAAAAAAAAAAAAAAAAkAAAAJAAAAAAAAAAHAAAAAAAAAAAAAAAAAAAAAAAAAAAAAAAAAAAAf39/ACUAAABYAAAAAAAAAAAAAAAAAAAAAAAAAAAAAAAAAAAAAAAAAAAAAAAAAAAAAAAAAAAAAAA/AAAAAAAAAKCGAQAAAAAAAAAAAAAAAAAMAAAAAQAAAAAAAAAAAAAAAAAAAB8AAABUAAAAAAAABQAAAAEAAAAAAAAAAAAAAAAAAAAAAAAAAAAAAAAAAAAAAAAAAAAAAAJ/f38AAAAAA8zMzADAwP8Af39/AAAAAAAAAAAAAAAAAAAAAAAAAAAAIQAAABgAAAAUAAAAsw4AAMYDAACzOwAAFh0AABAAAAAmAAAACAAAAAGAAAAAAAAA"/>
+                <pr:smNativeData xmlns:pr="smNativeData" xmlns="smNativeData" val="SMDATA_15_bXy5YxMAAAAlAAAAZAAAAA8BAAAAkAAAAEgAAACQAAAASAAAAAAAAAAAAAAAAAAAAAEAAABQAAAAAAAAAAAA4D8AAAAAAADgPwAAAAAAAOA/AAAAAAAA4D8AAAAAAADgPwAAAAAAAOA/AAAAAAAA4D8AAAAAAADgPwAAAAAAAOA/AAAAAAAA4D8CAAAAjAAAAAAAAAAAAAAAM2bMDANPhAgAAAAAAAAAAAAAAAAAAAAAAAAAAAAAAAAAAAAAZAAAAAEAAABAAAAAAAAAAAAAAAAAAAAAAAAAAAAAAAAAAAAAAAAAAAAAAAAAAAAAAAAAAAAAAAAAAAAAAAAAAAAAAAAAAAAAAAAAAAAAAAAAAAAAAAAAAAAAAAAAAAAAFAAAADwAAAAAAAAAAAAAAP///wkUAAAAAQAAABQAAAAUAAAAFAAAAAEAAAAAAAAAZAAAAGQAAAAAAAAAZAAAAGQAAAAVAAAAYAAAAAAAAAAAAAAADwAAACADAAAAAAAAAAAAAAEAAACgMgAAVgcAAKr4//8BAAAAf39/AAEAAABkAAAAAAAAABQAAABAHwAAAAAAACYAAAAAAAAAwOD//wAAAAAmAAAAZAAAABYAAABMAAAAAAAAAAAAAAAEAAAAAAAAAAEAAABXiZEKAAAAACgAAAAoAAAAZAAAAGQAAAAAAAAAzMzMAAAAAABQAAAAUAAAAGQAAABkAAAAAAAAABcAAAAUAAAAAAAAAAAAAAD/fwAA/38AAAAAAAAJAAAABAAAAAAAAAAeAAAAaAAAAAAAAAAAAAAAAAAAAAAAAAAAAAAAECcAABAnAAAAAAAAAAAAAAAAAAAAAAAAAAAAAAAAAAAAAAAAAAAAABQAAAAAAAAAwMD/AAAAAABkAAAAMgAAAAAAAABkAAAAAAAAAH9/fwAKAAAAIgAAABgAAAAAAAAAAAAAAAAAAAAAAAAAAAAAAAAAAAAkAAAAJAAAAAAAAAAHAAAAAAAAAAAAAAAAAAAAAAAAAAAAAAAAAAAAf39/ACUAAABYAAAAAAAAAAAAAAAAAAAAAAAAAAAAAAAAAAAAAAAAAAAAAAAAAAAAAAAAAAAAAAA/AAAAAAAAAKCGAQAAAAAAAAAAAAAAAAAMAAAAAQAAAAAAAAAAAAAAAAAAAB8AAABUAAAAAAAABQAAAAEAAAAAAAAAAAAAAAAAAAAAAAAAAAAAAAAAAAAAAAAAAAAAAAJ/f38AAAAAA8zMzADAwP8Af39/AAAAAAAAAAAAAAAAAAAAAAAAAAAAIQAAABgAAAAUAAAAsw4AAMYDAACzOwAAFh0AABAAAAAmAAAACAAAAAGAAAAAAAAA"/>
               </a:ext>
             </a:extLst>
           </p:cNvSpPr>
@@ -2606,7 +2606,7 @@
             <a:spLocks noGrp="1" noChangeArrowheads="1"/>
             <a:extLst>
               <a:ext uri="smNativeData">
-                <pr:smNativeData xmlns:pr="smNativeData" xmlns="smNativeData" val="SMDATA_15_k0e5YxMAAAAlAAAAZAAAAA8BAAAAkAAAAEgAAACQAAAASAAAAAAAAAAAAAAAAAAAAAEAAABQAAAAAAAAAAAA4D8AAAAAAADgPwAAAAAAAOA/AAAAAAAA4D8AAAAAAADgPwAAAAAAAOA/AAAAAAAA4D8AAAAAAADgPwAAAAAAAOA/AAAAAAAA4D8CAAAAjAAAAAAAAAAAAAAAM2bMDANPhAgAAAAAAAAAAAAAAAAAAAAAAAAAAAAAAAAAAAAAZAAAAAEAAABAAAAAAAAAAAAAAAAAAAAAAAAAAAAAAAAAAAAAAAAAAAAAAAAAAAAAAAAAAAAAAAAAAAAAAAAAAAAAAAAAAAAAAAAAAAAAAAAAAAAAAAAAAAAAAAAAAAAAFAAAADwAAAAAAAAAAAAAAP///wkUAAAAAQAAABQAAAAUAAAAFAAAAAEAAAAAAAAAZAAAAGQAAAAAAAAAZAAAAGQAAAAVAAAAYAAAAAAAAAAAAAAADwAAACADAAAAAAAAAAAAAAEAAACgMgAAVgcAAKr4//8BAAAAf39/AAEAAABkAAAAAAAAABQAAABAHwAAAAAAACYAAAAAAAAAwOD//wAAAAAmAAAAZAAAABYAAABMAAAAAAAAAAAAAAAEAAAAAAAAAAEAAABXiZEKAAAAACgAAAAoAAAAZAAAAGQAAAAAAAAAzMzMAAAAAABQAAAAUAAAAGQAAABkAAAAAAAAABcAAAAUAAAAAAAAAAAAAAD/fwAA/38AAAAAAAAJAAAABAAAAAAAAAAeAAAAaAAAAAAAAAAAAAAAAAAAAAAAAAAAAAAAECcAABAnAAAAAAAAAAAAAAAAAAAAAAAAAAAAAAAAAAAAAAAAAAAAABQAAAAAAAAAwMD/AAAAAABkAAAAMgAAAAAAAABkAAAAAAAAAH9/fwAKAAAAIgAAABgAAAAAAAAAAAAAAAAAAAAAAAAAAAAAAAAAAAAkAAAAJAAAAAAAAAAHAAAAAAAAAAAAAAAAAAAAAAAAAAAAAAAAAAAAf39/ACUAAABYAAAAAAAAAAAAAAAAAAAAAAAAAAAAAAAAAAAAAAAAAAAAAAAAAAAAAAAAAAAAAAA/AAAAAAAAAKCGAQAAAAAAAAAAAAAAAAAMAAAAAQAAAAAAAAAAAAAAAAAAAB8AAABUAAAAAAAABQAAAAEAAAAAAAAAAAAAAAAAAAAAAAAAAAAAAAAAAAAAAAAAAAAAAAJ/f38AAAAAA8zMzADAwP8Af39/AAAAAAAAAAAAAAAAAAAAAAAAAAAAIQAAABgAAAAUAAAAsw4AAAQhAACzOwAA+CUAABAAAAAmAAAACAAAAAGAAAAAAAAA"/>
+                <pr:smNativeData xmlns:pr="smNativeData" xmlns="smNativeData" val="SMDATA_15_bXy5YxMAAAAlAAAAZAAAAA8BAAAAkAAAAEgAAACQAAAASAAAAAAAAAAAAAAAAAAAAAEAAABQAAAAAAAAAAAA4D8AAAAAAADgPwAAAAAAAOA/AAAAAAAA4D8AAAAAAADgPwAAAAAAAOA/AAAAAAAA4D8AAAAAAADgPwAAAAAAAOA/AAAAAAAA4D8CAAAAjAAAAAAAAAAAAAAAM2bMDANPhAgAAAAAAAAAAAAAAAAAAAAAAAAAAAAAAAAAAAAAZAAAAAEAAABAAAAAAAAAAAAAAAAAAAAAAAAAAAAAAAAAAAAAAAAAAAAAAAAAAAAAAAAAAAAAAAAAAAAAAAAAAAAAAAAAAAAAAAAAAAAAAAAAAAAAAAAAAAAAAAAAAAAAFAAAADwAAAAAAAAAAAAAAP///wkUAAAAAQAAABQAAAAUAAAAFAAAAAEAAAAAAAAAZAAAAGQAAAAAAAAAZAAAAGQAAAAVAAAAYAAAAAAAAAAAAAAADwAAACADAAAAAAAAAAAAAAEAAACgMgAAVgcAAKr4//8BAAAAf39/AAEAAABkAAAAAAAAABQAAABAHwAAAAAAACYAAAAAAAAAwOD//wAAAAAmAAAAZAAAABYAAABMAAAAAAAAAAAAAAAEAAAAAAAAAAEAAABXiZEKAAAAACgAAAAoAAAAZAAAAGQAAAAAAAAAzMzMAAAAAABQAAAAUAAAAGQAAABkAAAAAAAAABcAAAAUAAAAAAAAAAAAAAD/fwAA/38AAAAAAAAJAAAABAAAAAAAAAAeAAAAaAAAAAAAAAAAAAAAAAAAAAAAAAAAAAAAECcAABAnAAAAAAAAAAAAAAAAAAAAAAAAAAAAAAAAAAAAAAAAAAAAABQAAAAAAAAAwMD/AAAAAABkAAAAMgAAAAAAAABkAAAAAAAAAH9/fwAKAAAAIgAAABgAAAAAAAAAAAAAAAAAAAAAAAAAAAAAAAAAAAAkAAAAJAAAAAAAAAAHAAAAAAAAAAAAAAAAAAAAAAAAAAAAAAAAAAAAf39/ACUAAABYAAAAAAAAAAAAAAAAAAAAAAAAAAAAAAAAAAAAAAAAAAAAAAAAAAAAAAAAAAAAAAA/AAAAAAAAAKCGAQAAAAAAAAAAAAAAAAAMAAAAAQAAAAAAAAAAAAAAAAAAAB8AAABUAAAAAAAABQAAAAEAAAAAAAAAAAAAAAAAAAAAAAAAAAAAAAAAAAAAAAAAAAAAAAJ/f38AAAAAA8zMzADAwP8Af39/AAAAAAAAAAAAAAAAAAAAAAAAAAAAIQAAABgAAAAUAAAAsw4AAAQhAACzOwAA+CUAABAAAAAmAAAACAAAAAGAAAAAAAAA"/>
               </a:ext>
             </a:extLst>
           </p:cNvSpPr>
@@ -2675,7 +2675,7 @@
             <a:spLocks noGrp="1" noChangeArrowheads="1"/>
             <a:extLst>
               <a:ext uri="smNativeData">
-                <pr:smNativeData xmlns:pr="smNativeData" xmlns="smNativeData" val="SMDATA_15_k0e5YxMAAAAlAAAAZAAAAA8BAAAAkAAAAEgAAACQAAAASAAAAAAAAAABAAAAAAAAAAEAAABQAAAAAAAAAAAA4D8AAAAAAADgPwAAAAAAAOA/AAAAAAAA4D8AAAAAAADgPwAAAAAAAOA/AAAAAAAA4D8AAAAAAADgPwAAAAAAAOA/AAAAAAAA4D8CAAAAjAAAAAAAAAAAAAAAM2bMDANPhAgAAAAAAAAAAAAAAAAAAAAAAAAAAAAAAAAAAAAAZAAAAAEAAABAAAAAAAAAAAAAAAAAAAAAAAAAAAAAAAAAAAAAAAAAAAAAAAAAAAAAAAAAAAAAAAAAAAAAAAAAAAAAAAAAAAAAAAAAAAAAAAAAAAAAAAAAAAAAAAAAAAAAFAAAADwAAAAAAAAAAAAAAP///wkUAAAAAQAAABQAAAAUAAAAFAAAAAEAAAAAAAAAZAAAAGQAAAAAAAAAZAAAAGQAAAAVAAAAYAAAAAAAAAAAAAAADwAAACADAAAAAAAAAAAAAAEAAACgMgAAVgcAAKr4//8BAAAAf39/AAEAAABkAAAAAAAAABQAAABAHwAAAAAAACYAAAAAAAAAwOD//wAAAAAmAAAAZAAAABYAAABMAAAAAAAAAAAAAAAEAAAAAAAAAAEAAABXiZEKAAAAACgAAAAoAAAAZAAAAGQAAAAAAAAAzMzMAAAAAABQAAAAUAAAAGQAAABkAAAAAAAAABcAAAAUAAAAAAAAAAAAAAD/fwAA/38AAAAAAAAJAAAABAAAAAAAAAAeAAAAaAAAAAAAAAAAAAAAAAAAAAAAAAAAAAAAECcAABAnAAAAAAAAAAAAAAAAAAAAAAAAAAAAAAAAAAAAAAAAAAAAABQAAAAAAAAAwMD/AAAAAABkAAAAMgAAAAAAAABkAAAAAAAAAH9/fwAKAAAAIgAAABgAAAAAAAAAAAAAAAAAAAAAAAAAAAAAAAAAAAAkAAAAJAAAAAAAAAAHAAAAAAAAAAAAAAAAAAAAAAAAAAAAAAAAAAAAf39/ACUAAABYAAAAAAAAAAAAAAAAAAAAAAAAAAAAAAAAAAAAAAAAAAAAAAAAAAAAAAAAAAAAAAA/AAAAAAAAAKCGAQAAAAAAAAAAAAAAAAAMAAAAAQAAAAAAAAAAAAAAAAAAAB8AAABUAAAAAAAABQAAAAEAAAAAAAAAAAAAAAAAAAAAAAAAAAAAAAAAAAAAAAAAAAAAAAJ/f38AAAAAA8zMzADAwP8Af39/AAAAAAAAAAAAAAAAAAAAAAAAAAAAIQAAABgAAAAUAAAAwAMAABsnAAA/FQAAWSkAABAAAAAmAAAACAAAAAAAAAAAAAAA"/>
+                <pr:smNativeData xmlns:pr="smNativeData" xmlns="smNativeData" val="SMDATA_15_bXy5YxMAAAAlAAAAZAAAAA8BAAAAkAAAAEgAAACQAAAASAAAAAAAAAABAAAAAAAAAAEAAABQAAAAAAAAAAAA4D8AAAAAAADgPwAAAAAAAOA/AAAAAAAA4D8AAAAAAADgPwAAAAAAAOA/AAAAAAAA4D8AAAAAAADgPwAAAAAAAOA/AAAAAAAA4D8CAAAAjAAAAAAAAAAAAAAAM2bMDANPhAgAAAAAAAAAAAAAAAAAAAAAAAAAAAAAAAAAAAAAZAAAAAEAAABAAAAAAAAAAAAAAAAAAAAAAAAAAAAAAAAAAAAAAAAAAAAAAAAAAAAAAAAAAAAAAAAAAAAAAAAAAAAAAAAAAAAAAAAAAAAAAAAAAAAAAAAAAAAAAAAAAAAAFAAAADwAAAAAAAAAAAAAAP///wkUAAAAAQAAABQAAAAUAAAAFAAAAAEAAAAAAAAAZAAAAGQAAAAAAAAAZAAAAGQAAAAVAAAAYAAAAAAAAAAAAAAADwAAACADAAAAAAAAAAAAAAEAAACgMgAAVgcAAKr4//8BAAAAf39/AAEAAABkAAAAAAAAABQAAABAHwAAAAAAACYAAAAAAAAAwOD//wAAAAAmAAAAZAAAABYAAABMAAAAAAAAAAAAAAAEAAAAAAAAAAEAAABXiZEKAAAAACgAAAAoAAAAZAAAAGQAAAAAAAAAzMzMAAAAAABQAAAAUAAAAGQAAABkAAAAAAAAABcAAAAUAAAAAAAAAAAAAAD/fwAA/38AAAAAAAAJAAAABAAAAAAAAAAeAAAAaAAAAAAAAAAAAAAAAAAAAAAAAAAAAAAAECcAABAnAAAAAAAAAAAAAAAAAAAAAAAAAAAAAAAAAAAAAAAAAAAAABQAAAAAAAAAwMD/AAAAAABkAAAAMgAAAAAAAABkAAAAAAAAAH9/fwAKAAAAIgAAABgAAAAAAAAAAAAAAAAAAAAAAAAAAAAAAAAAAAAkAAAAJAAAAAAAAAAHAAAAAAAAAAAAAAAAAAAAAAAAAAAAAAAAAAAAf39/ACUAAABYAAAAAAAAAAAAAAAAAAAAAAAAAAAAAAAAAAAAAAAAAAAAAAAAAAAAAAAAAAAAAAA/AAAAAAAAAKCGAQAAAAAAAAAAAAAAAAAMAAAAAQAAAAAAAAAAAAAAAAAAAB8AAABUAAAAAAAABQAAAAEAAAAAAAAAAAAAAAAAAAAAAAAAAAAAAAAAAAAAAAAAAAAAAAJ/f38AAAAAA8zMzADAwP8Af39/AAAAAAAAAAAAAAAAAAAAAAAAAAAAIQAAABgAAAAUAAAAwAMAABsnAAA/FQAAWSkAABAAAAAmAAAACAAAAAAAAAAAAAAA"/>
               </a:ext>
             </a:extLst>
           </p:cNvSpPr>
@@ -2689,7 +2689,7 @@
           <a:lstStyle/>
           <a:p>
             <a:pPr/>
-            <a:fld id="{2C5F8FAF-E1C1-0A79-8FE7-172CC1A97942}" type="datetime1">
+            <a:fld id="{023C8A86-C8EF-697C-A184-3E29C4CA576B}" type="datetime1">
               <a:t/>
             </a:fld>
           </a:p>
@@ -2702,7 +2702,7 @@
             <a:spLocks noGrp="1" noChangeArrowheads="1"/>
             <a:extLst>
               <a:ext uri="smNativeData">
-                <pr:smNativeData xmlns:pr="smNativeData" xmlns="smNativeData" val="SMDATA_15_k0e5YxMAAAAlAAAAZAAAAA8BAAAAkAAAAEgAAACQAAAASAAAAAAAAAABAAAAAAAAAAEAAABQAAAAAAAAAAAA4D8AAAAAAADgPwAAAAAAAOA/AAAAAAAA4D8AAAAAAADgPwAAAAAAAOA/AAAAAAAA4D8AAAAAAADgPwAAAAAAAOA/AAAAAAAA4D8CAAAAjAAAAAAAAAAAAAAAM2bMDANPhAgAAAAAAAAAAAAAAAAAAAAAAAAAAAAAAAAAAAAAZAAAAAEAAABAAAAAAAAAAAAAAAAAAAAAAAAAAAAAAAAAAAAAAAAAAAAAAAAAAAAAAAAAAAAAAAAAAAAAAAAAAAAAAAAAAAAAAAAAAAAAAAAAAAAAAAAAAAAAAAAAAAAAFAAAADwAAAAAAAAAAAAAAP///wkUAAAAAQAAABQAAAAUAAAAFAAAAAEAAAAAAAAAZAAAAGQAAAAAAAAAZAAAAGQAAAAVAAAAYAAAAAAAAAAAAAAADwAAACADAAAAAAAAAAAAAAEAAACgMgAAVgcAAKr4//8BAAAAf39/AAEAAABkAAAAAAAAABQAAABAHwAAAAAAACYAAAAAAAAAwOD//wAAAAAmAAAAZAAAABYAAABMAAAAAAAAAAAAAAAEAAAAAAAAAAEAAABXiZEKAAAAACgAAAAoAAAAZAAAAGQAAAAAAAAAzMzMAAAAAABQAAAAUAAAAGQAAABkAAAAAAAAABcAAAAUAAAAAAAAAAAAAAD/fwAA/38AAAAAAAAJAAAABAAAAAAAAAAeAAAAaAAAAAAAAAAAAAAAAAAAAAAAAAAAAAAAECcAABAnAAAAAAAAAAAAAAAAAAAAAAAAAAAAAAAAAAAAAAAAAAAAABQAAAAAAAAAwMD/AAAAAABkAAAAMgAAAAAAAABkAAAAAAAAAH9/fwAKAAAAIgAAABgAAAAAAAAAAAAAAAAAAAAAAAAAAAAAAAAAAAAkAAAAJAAAAAAAAAAHAAAAAAAAAAAAAAAAAAAAAAAAAAAAAAAAAAAAf39/ACUAAABYAAAAAAAAAAAAAAAAAAAAAAAAAAAAAAAAAAAAAAAAAAAAAAAAAAAAAAAAAAAAAAA/AAAAAAAAAKCGAQAAAAAAAAAAAAAAAAAMAAAAAQAAAAAAAAAAAAAAAAAAAB8AAABUAAAAAAAABQAAAAEAAAAAAAAAAAAAAAAAAAAAAAAAAAAAAAAAAAAAAAAAAAAAAAJ/f38AAAAAA8zMzADAwP8Af39/AAAAAAAAAAAAAAAAAAAAAAAAAAAAIQAAABgAAAAUAAAAoRkAABsnAABfMQAAWSkAABAAAAAmAAAACAAAAAAAAAAAAAAA"/>
+                <pr:smNativeData xmlns:pr="smNativeData" xmlns="smNativeData" val="SMDATA_15_bXy5YxMAAAAlAAAAZAAAAA8BAAAAkAAAAEgAAACQAAAASAAAAAAAAAABAAAAAAAAAAEAAABQAAAAAAAAAAAA4D8AAAAAAADgPwAAAAAAAOA/AAAAAAAA4D8AAAAAAADgPwAAAAAAAOA/AAAAAAAA4D8AAAAAAADgPwAAAAAAAOA/AAAAAAAA4D8CAAAAjAAAAAAAAAAAAAAAM2bMDANPhAgAAAAAAAAAAAAAAAAAAAAAAAAAAAAAAAAAAAAAZAAAAAEAAABAAAAAAAAAAAAAAAAAAAAAAAAAAAAAAAAAAAAAAAAAAAAAAAAAAAAAAAAAAAAAAAAAAAAAAAAAAAAAAAAAAAAAAAAAAAAAAAAAAAAAAAAAAAAAAAAAAAAAFAAAADwAAAAAAAAAAAAAAP///wkUAAAAAQAAABQAAAAUAAAAFAAAAAEAAAAAAAAAZAAAAGQAAAAAAAAAZAAAAGQAAAAVAAAAYAAAAAAAAAAAAAAADwAAACADAAAAAAAAAAAAAAEAAACgMgAAVgcAAKr4//8BAAAAf39/AAEAAABkAAAAAAAAABQAAABAHwAAAAAAACYAAAAAAAAAwOD//wAAAAAmAAAAZAAAABYAAABMAAAAAAAAAAAAAAAEAAAAAAAAAAEAAABXiZEKAAAAACgAAAAoAAAAZAAAAGQAAAAAAAAAzMzMAAAAAABQAAAAUAAAAGQAAABkAAAAAAAAABcAAAAUAAAAAAAAAAAAAAD/fwAA/38AAAAAAAAJAAAABAAAAAAAAAAeAAAAaAAAAAAAAAAAAAAAAAAAAAAAAAAAAAAAECcAABAnAAAAAAAAAAAAAAAAAAAAAAAAAAAAAAAAAAAAAAAAAAAAABQAAAAAAAAAwMD/AAAAAABkAAAAMgAAAAAAAABkAAAAAAAAAH9/fwAKAAAAIgAAABgAAAAAAAAAAAAAAAAAAAAAAAAAAAAAAAAAAAAkAAAAJAAAAAAAAAAHAAAAAAAAAAAAAAAAAAAAAAAAAAAAAAAAAAAAf39/ACUAAABYAAAAAAAAAAAAAAAAAAAAAAAAAAAAAAAAAAAAAAAAAAAAAAAAAAAAAAAAAAAAAAA/AAAAAAAAAKCGAQAAAAAAAAAAAAAAAAAMAAAAAQAAAAAAAAAAAAAAAAAAAB8AAABUAAAAAAAABQAAAAEAAAAAAAAAAAAAAAAAAAAAAAAAAAAAAAAAAAAAAAAAAAAAAAJ/f38AAAAAA8zMzADAwP8Af39/AAAAAAAAAAAAAAAAAAAAAAAAAAAAIQAAABgAAAAUAAAAoRkAABsnAABfMQAAWSkAABAAAAAmAAAACAAAAAAAAAAAAAAA"/>
               </a:ext>
             </a:extLst>
           </p:cNvSpPr>
@@ -2726,7 +2726,7 @@
             <a:spLocks noGrp="1" noChangeArrowheads="1"/>
             <a:extLst>
               <a:ext uri="smNativeData">
-                <pr:smNativeData xmlns:pr="smNativeData" xmlns="smNativeData" val="SMDATA_15_k0e5YxMAAAAlAAAAZAAAAA8BAAAAkAAAAEgAAACQAAAASAAAAAAAAAABAAAAAAAAAAEAAABQAAAAAAAAAAAA4D8AAAAAAADgPwAAAAAAAOA/AAAAAAAA4D8AAAAAAADgPwAAAAAAAOA/AAAAAAAA4D8AAAAAAADgPwAAAAAAAOA/AAAAAAAA4D8CAAAAjAAAAAAAAAAAAAAAM2bMDANPhAgAAAAAAAAAAAAAAAAAAAAAAAAAAAAAAAAAAAAAZAAAAAEAAABAAAAAAAAAAAAAAAAAAAAAAAAAAAAAAAAAAAAAAAAAAAAAAAAAAAAAAAAAAAAAAAAAAAAAAAAAAAAAAAAAAAAAAAAAAAAAAAAAAAAAAAAAAAAAAAAAAAAAFAAAADwAAAAAAAAAAAAAAP///wkUAAAAAQAAABQAAAAUAAAAFAAAAAEAAAAAAAAAZAAAAGQAAAAAAAAAZAAAAGQAAAAVAAAAYAAAAAAAAAAAAAAADwAAACADAAAAAAAAAAAAAAEAAACgMgAAVgcAAKr4//8BAAAAf39/AAEAAABkAAAAAAAAABQAAABAHwAAAAAAACYAAAAAAAAAwOD//wAAAAAmAAAAZAAAABYAAABMAAAAAAAAAAAAAAAEAAAAAAAAAAEAAABXiZEKAAAAACgAAAAoAAAAZAAAAGQAAAAAAAAAzMzMAAAAAABQAAAAUAAAAGQAAABkAAAAAAAAABcAAAAUAAAAAAAAAAAAAAD/fwAA/38AAAAAAAAJAAAABAAAAAAAAAAeAAAAaAAAAAAAAAAAAAAAAAAAAAAAAAAAAAAAECcAABAnAAAAAAAAAAAAAAAAAAAAAAAAAAAAAAAAAAAAAAAAAAAAABQAAAAAAAAAwMD/AAAAAABkAAAAMgAAAAAAAABkAAAAAAAAAH9/fwAKAAAAIgAAABgAAAAAAAAAAAAAAAAAAAAAAAAAAAAAAAAAAAAkAAAAJAAAAAAAAAAHAAAAAAAAAAAAAAAAAAAAAAAAAAAAAAAAAAAAf39/ACUAAABYAAAAAAAAAAAAAAAAAAAAAAAAAAAAAAAAAAAAAAAAAAAAAAAAAAAAAAAAAAAAAAA/AAAAAAAAAKCGAQAAAAAAAAAAAAAAAAAMAAAAAQAAAAAAAAAAAAAAAAAAAB8AAABUAAAAAAAABQAAAAEAAAAAAAAAAAAAAAAAAAAAAAAAAAAAAAAAAAAAAAAAAAAAAAJ/f38AAAAAA8zMzADAwP8Af39/AAAAAAAAAAAAAAAAAAAAAAAAAAAAIQAAABgAAAAUAAAAwTUAABsnAABARwAAWSkAABAAAAAmAAAACAAAAAAAAAAAAAAA"/>
+                <pr:smNativeData xmlns:pr="smNativeData" xmlns="smNativeData" val="SMDATA_15_bXy5YxMAAAAlAAAAZAAAAA8BAAAAkAAAAEgAAACQAAAASAAAAAAAAAABAAAAAAAAAAEAAABQAAAAAAAAAAAA4D8AAAAAAADgPwAAAAAAAOA/AAAAAAAA4D8AAAAAAADgPwAAAAAAAOA/AAAAAAAA4D8AAAAAAADgPwAAAAAAAOA/AAAAAAAA4D8CAAAAjAAAAAAAAAAAAAAAM2bMDANPhAgAAAAAAAAAAAAAAAAAAAAAAAAAAAAAAAAAAAAAZAAAAAEAAABAAAAAAAAAAAAAAAAAAAAAAAAAAAAAAAAAAAAAAAAAAAAAAAAAAAAAAAAAAAAAAAAAAAAAAAAAAAAAAAAAAAAAAAAAAAAAAAAAAAAAAAAAAAAAAAAAAAAAFAAAADwAAAAAAAAAAAAAAP///wkUAAAAAQAAABQAAAAUAAAAFAAAAAEAAAAAAAAAZAAAAGQAAAAAAAAAZAAAAGQAAAAVAAAAYAAAAAAAAAAAAAAADwAAACADAAAAAAAAAAAAAAEAAACgMgAAVgcAAKr4//8BAAAAf39/AAEAAABkAAAAAAAAABQAAABAHwAAAAAAACYAAAAAAAAAwOD//wAAAAAmAAAAZAAAABYAAABMAAAAAAAAAAAAAAAEAAAAAAAAAAEAAABXiZEKAAAAACgAAAAoAAAAZAAAAGQAAAAAAAAAzMzMAAAAAABQAAAAUAAAAGQAAABkAAAAAAAAABcAAAAUAAAAAAAAAAAAAAD/fwAA/38AAAAAAAAJAAAABAAAAAAAAAAeAAAAaAAAAAAAAAAAAAAAAAAAAAAAAAAAAAAAECcAABAnAAAAAAAAAAAAAAAAAAAAAAAAAAAAAAAAAAAAAAAAAAAAABQAAAAAAAAAwMD/AAAAAABkAAAAMgAAAAAAAABkAAAAAAAAAH9/fwAKAAAAIgAAABgAAAAAAAAAAAAAAAAAAAAAAAAAAAAAAAAAAAAkAAAAJAAAAAAAAAAHAAAAAAAAAAAAAAAAAAAAAAAAAAAAAAAAAAAAf39/ACUAAABYAAAAAAAAAAAAAAAAAAAAAAAAAAAAAAAAAAAAAAAAAAAAAAAAAAAAAAAAAAAAAAA/AAAAAAAAAKCGAQAAAAAAAAAAAAAAAAAMAAAAAQAAAAAAAAAAAAAAAAAAAB8AAABUAAAAAAAABQAAAAEAAAAAAAAAAAAAAAAAAAAAAAAAAAAAAAAAAAAAAAAAAAAAAAJ/f38AAAAAA8zMzADAwP8Af39/AAAAAAAAAAAAAAAAAAAAAAAAAAAAIQAAABgAAAAUAAAAwTUAABsnAABARwAAWSkAABAAAAAmAAAACAAAAAAAAAAAAAAA"/>
               </a:ext>
             </a:extLst>
           </p:cNvSpPr>
@@ -2740,7 +2740,7 @@
           <a:lstStyle/>
           <a:p>
             <a:pPr/>
-            <a:fld id="{2C5FC217-59C1-0A34-8FE7-AF618CA979FA}" type="slidenum">
+            <a:fld id="{1BAB073E-70F6-FEF1-B813-86A4495D4ED3}" type="slidenum">
               <a:t/>
             </a:fld>
           </a:p>
@@ -2787,7 +2787,7 @@
             <a:spLocks noGrp="1" noChangeArrowheads="1"/>
             <a:extLst>
               <a:ext uri="smNativeData">
-                <pr:smNativeData xmlns:pr="smNativeData" xmlns="smNativeData" val="SMDATA_15_k0e5YxMAAAAlAAAAZAAAAA8BAAAAkAAAAEgAAACQAAAASAAAAAAAAAABAAAAAAAAAAEAAABQAAAAAAAAAAAA4D8AAAAAAADgPwAAAAAAAOA/AAAAAAAA4D8AAAAAAADgPwAAAAAAAOA/AAAAAAAA4D8AAAAAAADgPwAAAAAAAOA/AAAAAAAA4D8CAAAAjAAAAAAAAAAAAAAAM2bMDANPhAgAAAAAAAAAAAAAAAAAAAAAAAAAAAAAAAAAAAAAZAAAAAEAAABAAAAAAAAAAAAAAAAAAAAAAAAAAAAAAAAAAAAAAAAAAAAAAAAAAAAAAAAAAAAAAAAAAAAAAAAAAAAAAAAAAAAAAAAAAAAAAAAAAAAAAAAAAAAAAAAAAAAAFAAAADwAAAAAAAAAAAAAAP///wkUAAAAAQAAABQAAAAUAAAAFAAAAAEAAAAAAAAAZAAAAGQAAAAAAAAAZAAAAGQAAAAVAAAAYAAAAAAAAAAAAAAADwAAACADAAAAAAAAAAAAAAEAAACgMgAAVgcAAKr4//8BAAAAf39/AAEAAABkAAAAAAAAABQAAABAHwAAAAAAACYAAAAAAAAAwOD//wAAAAAmAAAAZAAAABYAAABMAAAAAAAAAAAAAAAEAAAAAAAAAAEAAABXiZEKAAAAACgAAAAoAAAAZAAAAGQAAAAAAAAAzMzMAAAAAABQAAAAUAAAAGQAAABkAAAAAAAAABcAAAAUAAAAAAAAAAAAAAD/fwAA/38AAAAAAAAJAAAABAAAAHsAfAAeAAAAaAAAAAAAAAAAAAAAAAAAAAAAAAAAAAAAECcAABAnAAAAAAAAAAAAAAAAAAAAAAAAAAAAAAAAAAAAAAAAAAAAABQAAAAAAAAAwMD/AAAAAABkAAAAMgAAAAAAAABkAAAAAAAAAH9/fwAKAAAAIgAAABgAAAAAAAAAAAAAAAAAAAAAAAAAAAAAAAAAAAAkAAAAJAAAAAAAAAAHAAAAAAAAAAAAAAAAAAAAAAAAAAAAAAAAAAAAf39/ACUAAABYAAAAAAAAAAAAAAAAAAAAAAAAAAAAAAAAAAAAAAAAAAAAAAAAAAAAAAAAAAAAAAA/AAAAAAAAAKCGAQAAAAAAAAAAAAAAAAAMAAAAAQAAAAAAAAAAAAAAAAAAAB8AAABUAAAAAAAABQAAAAEAAAAAAAAAAAAAAAAAAAAAAAAAAAAAAAAAAAAAAAAAAAAAAAJ/f38AAAAAA8zMzADAwP8Af39/AAAAAAAAAAAAAAAAAAAAAAAAAAAAIQAAABgAAAAUAAAAwAMAALABAABARwAAuAgAABAAAAAmAAAACAAAAP//////////"/>
+                <pr:smNativeData xmlns:pr="smNativeData" xmlns="smNativeData" val="SMDATA_15_bXy5YxMAAAAlAAAAZAAAAA8BAAAAkAAAAEgAAACQAAAASAAAAAAAAAABAAAAAAAAAAEAAABQAAAAAAAAAAAA4D8AAAAAAADgPwAAAAAAAOA/AAAAAAAA4D8AAAAAAADgPwAAAAAAAOA/AAAAAAAA4D8AAAAAAADgPwAAAAAAAOA/AAAAAAAA4D8CAAAAjAAAAAAAAAAAAAAAM2bMDANPhAgAAAAAAAAAAAAAAAAAAAAAAAAAAAAAAAAAAAAAZAAAAAEAAABAAAAAAAAAAAAAAAAAAAAAAAAAAAAAAAAAAAAAAAAAAAAAAAAAAAAAAAAAAAAAAAAAAAAAAAAAAAAAAAAAAAAAAAAAAAAAAAAAAAAAAAAAAAAAAAAAAAAAFAAAADwAAAAAAAAAAAAAAP///wkUAAAAAQAAABQAAAAUAAAAFAAAAAEAAAAAAAAAZAAAAGQAAAAAAAAAZAAAAGQAAAAVAAAAYAAAAAAAAAAAAAAADwAAACADAAAAAAAAAAAAAAEAAACgMgAAVgcAAKr4//8BAAAAf39/AAEAAABkAAAAAAAAABQAAABAHwAAAAAAACYAAAAAAAAAwOD//wAAAAAmAAAAZAAAABYAAABMAAAAAAAAAAAAAAAEAAAAAAAAAAEAAABXiZEKAAAAACgAAAAoAAAAZAAAAGQAAAAAAAAAzMzMAAAAAABQAAAAUAAAAGQAAABkAAAAAAAAABcAAAAUAAAAAAAAAAAAAAD/fwAA/38AAAAAAAAJAAAABAAAAHsAfAAeAAAAaAAAAAAAAAAAAAAAAAAAAAAAAAAAAAAAECcAABAnAAAAAAAAAAAAAAAAAAAAAAAAAAAAAAAAAAAAAAAAAAAAABQAAAAAAAAAwMD/AAAAAABkAAAAMgAAAAAAAABkAAAAAAAAAH9/fwAKAAAAIgAAABgAAAAAAAAAAAAAAAAAAAAAAAAAAAAAAAAAAAAkAAAAJAAAAAAAAAAHAAAAAAAAAAAAAAAAAAAAAAAAAAAAAAAAAAAAf39/ACUAAABYAAAAAAAAAAAAAAAAAAAAAAAAAAAAAAAAAAAAAAAAAAAAAAAAAAAAAAAAAAAAAAA/AAAAAAAAAKCGAQAAAAAAAAAAAAAAAAAMAAAAAQAAAAAAAAAAAAAAAAAAAB8AAABUAAAAAAAABQAAAAEAAAAAAAAAAAAAAAAAAAAAAAAAAAAAAAAAAAAAAAAAAAAAAAJ/f38AAAAAA8zMzADAwP8Af39/AAAAAAAAAAAAAAAAAAAAAAAAAAAAIQAAABgAAAAUAAAAwAMAALABAABARwAAuAgAABAAAAAmAAAACAAAAP//////////"/>
               </a:ext>
             </a:extLst>
           </p:cNvSpPr>
@@ -2831,7 +2831,7 @@
             <a:spLocks noGrp="1" noChangeArrowheads="1"/>
             <a:extLst>
               <a:ext uri="smNativeData">
-                <pr:smNativeData xmlns:pr="smNativeData" xmlns="smNativeData" val="SMDATA_15_k0e5YxMAAAAlAAAAZAAAAA8BAAAAkAAAAEgAAACQAAAASAAAAAAAAAAAAAAAAAAAAAEAAABQAAAAAAAAAAAA4D8AAAAAAADgPwAAAAAAAOA/AAAAAAAA4D8AAAAAAADgPwAAAAAAAOA/AAAAAAAA4D8AAAAAAADgPwAAAAAAAOA/AAAAAAAA4D8CAAAAjAAAAAAAAAAAAAAAM2bMDANPhAgAAAAAAAAAAAAAAAAAAAAAAAAAAAAAAAAAAAAAZAAAAAEAAABAAAAAAAAAAAAAAAAAAAAAAAAAAAAAAAAAAAAAAAAAAAAAAAAAAAAAAAAAAAAAAAAAAAAAAAAAAAAAAAAAAAAAAAAAAAAAAAAAAAAAAAAAAAAAAAAAAAAAFAAAADwAAAAAAAAAAAAAAP///wkUAAAAAQAAABQAAAAUAAAAFAAAAAEAAAAAAAAAZAAAAGQAAAAAAAAAZAAAAGQAAAAVAAAAYAAAAAAAAAAAAAAADwAAACADAAAAAAAAAAAAAAEAAACgMgAAVgcAAKr4//8BAAAAf39/AAEAAABkAAAAAAAAABQAAABAHwAAAAAAACYAAAAAAAAAwOD//wAAAAAmAAAAZAAAABYAAABMAAAAAAAAAAAAAAAEAAAAAAAAAAEAAABXiZEKAAAAACgAAAAoAAAAZAAAAGQAAAAAAAAAzMzMAAAAAABQAAAAUAAAAGQAAABkAAAAAAAAABcAAAAUAAAAAAAAAAAAAAD/fwAA/38AAAAAAAAJAAAABAAAAHsAfAAeAAAAaAAAAAAAAAAAAAAAAAAAAAAAAAAAAAAAECcAABAnAAAAAAAAAAAAAAAAAAAAAAAAAAAAAAAAAAAAAAAAAAAAABQAAAAAAAAAwMD/AAAAAABkAAAAMgAAAAAAAABkAAAAAAAAAH9/fwAKAAAAIgAAABgAAAAAAAAAAAAAAAAAAAAAAAAAAAAAAAAAAAAkAAAAJAAAAAAAAAAHAAAAAAAAAAAAAAAAAAAAAAAAAAAAAAAAAAAAf39/ACUAAABYAAAAAAAAAAAAAAAAAAAAAAAAAAAAAAAAAAAAAAAAAAAAAAAAAAAAAAAAAAAAAAA/AAAAAAAAAKCGAQAAAAAAAAAAAAAAAAAMAAAAAQAAAAAAAAAAAAAAAAAAAB8AAABUAAAAAAAABQAAAAEAAAAAAAAAAAAAAAAAAAAAAAAAAAAAAAAAAAAAAAAAAAAAAAJ/f38AAAAAA8zMzADAwP8Af39/AAAAAAAAAAAAAAAAAAAAAAAAAAAAIQAAABgAAAAUAAAAwAMAANgJAABARwAAsCUAABAAAAAmAAAACAAAAP//////////"/>
+                <pr:smNativeData xmlns:pr="smNativeData" xmlns="smNativeData" val="SMDATA_15_bXy5YxMAAAAlAAAAZAAAAA8BAAAAkAAAAEgAAACQAAAASAAAAAAAAAAAAAAAAAAAAAEAAABQAAAAAAAAAAAA4D8AAAAAAADgPwAAAAAAAOA/AAAAAAAA4D8AAAAAAADgPwAAAAAAAOA/AAAAAAAA4D8AAAAAAADgPwAAAAAAAOA/AAAAAAAA4D8CAAAAjAAAAAAAAAAAAAAAM2bMDANPhAgAAAAAAAAAAAAAAAAAAAAAAAAAAAAAAAAAAAAAZAAAAAEAAABAAAAAAAAAAAAAAAAAAAAAAAAAAAAAAAAAAAAAAAAAAAAAAAAAAAAAAAAAAAAAAAAAAAAAAAAAAAAAAAAAAAAAAAAAAAAAAAAAAAAAAAAAAAAAAAAAAAAAFAAAADwAAAAAAAAAAAAAAP///wkUAAAAAQAAABQAAAAUAAAAFAAAAAEAAAAAAAAAZAAAAGQAAAAAAAAAZAAAAGQAAAAVAAAAYAAAAAAAAAAAAAAADwAAACADAAAAAAAAAAAAAAEAAACgMgAAVgcAAKr4//8BAAAAf39/AAEAAABkAAAAAAAAABQAAABAHwAAAAAAACYAAAAAAAAAwOD//wAAAAAmAAAAZAAAABYAAABMAAAAAAAAAAAAAAAEAAAAAAAAAAEAAABXiZEKAAAAACgAAAAoAAAAZAAAAGQAAAAAAAAAzMzMAAAAAABQAAAAUAAAAGQAAABkAAAAAAAAABcAAAAUAAAAAAAAAAAAAAD/fwAA/38AAAAAAAAJAAAABAAAAHsAfAAeAAAAaAAAAAAAAAAAAAAAAAAAAAAAAAAAAAAAECcAABAnAAAAAAAAAAAAAAAAAAAAAAAAAAAAAAAAAAAAAAAAAAAAABQAAAAAAAAAwMD/AAAAAABkAAAAMgAAAAAAAABkAAAAAAAAAH9/fwAKAAAAIgAAABgAAAAAAAAAAAAAAAAAAAAAAAAAAAAAAAAAAAAkAAAAJAAAAAAAAAAHAAAAAAAAAAAAAAAAAAAAAAAAAAAAAAAAAAAAf39/ACUAAABYAAAAAAAAAAAAAAAAAAAAAAAAAAAAAAAAAAAAAAAAAAAAAAAAAAAAAAAAAAAAAAA/AAAAAAAAAKCGAQAAAAAAAAAAAAAAAAAMAAAAAQAAAAAAAAAAAAAAAAAAAB8AAABUAAAAAAAABQAAAAEAAAAAAAAAAAAAAAAAAAAAAAAAAAAAAAAAAAAAAAAAAAAAAAJ/f38AAAAAA8zMzADAwP8Af39/AAAAAAAAAAAAAAAAAAAAAAAAAAAAIQAAABgAAAAUAAAAwAMAANgJAABARwAAsCUAABAAAAAmAAAACAAAAP//////////"/>
               </a:ext>
             </a:extLst>
           </p:cNvSpPr>
@@ -2899,7 +2899,7 @@
             <a:spLocks noGrp="1" noChangeArrowheads="1"/>
             <a:extLst>
               <a:ext uri="smNativeData">
-                <pr:smNativeData xmlns:pr="smNativeData" xmlns="smNativeData" val="SMDATA_15_k0e5YxMAAAAlAAAAZAAAAA8BAAAAkAAAAEgAAACQAAAASAAAAAAAAAABAAAAAAAAAAEAAABQAAAAAAAAAAAA4D8AAAAAAADgPwAAAAAAAOA/AAAAAAAA4D8AAAAAAADgPwAAAAAAAOA/AAAAAAAA4D8AAAAAAADgPwAAAAAAAOA/AAAAAAAA4D8CAAAAjAAAAAAAAAAAAAAAM2bMDANPhAgAAAAAAAAAAAAAAAAAAAAAAAAAAAAAAAAAAAAAZAAAAAEAAABAAAAAAAAAAAAAAAAAAAAAAAAAAAAAAAAAAAAAAAAAAAAAAAAAAAAAAAAAAAAAAAAAAAAAAAAAAAAAAAAAAAAAAAAAAAAAAAAAAAAAAAAAAAAAAAAAAAAAFAAAADwAAAAAAAAAAAAAAP///wkUAAAAAQAAABQAAAAUAAAAFAAAAAEAAAAAAAAAZAAAAGQAAAAAAAAAZAAAAGQAAAAVAAAAYAAAAAAAAAAAAAAADwAAACADAAAAAAAAAAAAAAEAAACgMgAAVgcAAKr4//8BAAAAf39/AAEAAABkAAAAAAAAABQAAABAHwAAAAAAACYAAAAAAAAAwOD//wAAAAAmAAAAZAAAABYAAABMAAAAAAAAAAAAAAAEAAAAAAAAAAEAAABXiZEKAAAAACgAAAAoAAAAZAAAAGQAAAAAAAAAzMzMAAAAAABQAAAAUAAAAGQAAABkAAAAAAAAABcAAAAUAAAAAAAAAAAAAAD/fwAA/38AAAAAAAAJAAAABAAAAHsAfAAeAAAAaAAAAAAAAAAAAAAAAAAAAAAAAAAAAAAAECcAABAnAAAAAAAAAAAAAAAAAAAAAAAAAAAAAAAAAAAAAAAAAAAAABQAAAAAAAAAwMD/AAAAAABkAAAAMgAAAAAAAABkAAAAAAAAAH9/fwAKAAAAIgAAABgAAAAAAAAAAAAAAAAAAAAAAAAAAAAAAAAAAAAkAAAAJAAAAAAAAAAHAAAAAAAAAAAAAAAAAAAAAAAAAAAAAAAAAAAAf39/ACUAAABYAAAAAAAAAAAAAAAAAAAAAAAAAAAAAAAAAAAAAAAAAAAAAAAAAAAAAAAAAAAAAAA/AAAAAAAAAKCGAQAAAAAAAAAAAAAAAAAMAAAAAQAAAAAAAAAAAAAAAAAAAB8AAABUAAAAAAAABQAAAAEAAAAAAAAAAAAAAAAAAAAAAAAAAAAAAAAAAAAAAAAAAAAAAAJ/f38AAAAAA8zMzADAwP8Af39/AAAAAAAAAAAAAAAAAAAAAAAAAAAAIQAAABgAAAAUAAAAwAMAABsnAAA/FQAAWSkAABAAAAAmAAAACAAAAP//////////"/>
+                <pr:smNativeData xmlns:pr="smNativeData" xmlns="smNativeData" val="SMDATA_15_bXy5YxMAAAAlAAAAZAAAAA8BAAAAkAAAAEgAAACQAAAASAAAAAAAAAABAAAAAAAAAAEAAABQAAAAAAAAAAAA4D8AAAAAAADgPwAAAAAAAOA/AAAAAAAA4D8AAAAAAADgPwAAAAAAAOA/AAAAAAAA4D8AAAAAAADgPwAAAAAAAOA/AAAAAAAA4D8CAAAAjAAAAAAAAAAAAAAAM2bMDANPhAgAAAAAAAAAAAAAAAAAAAAAAAAAAAAAAAAAAAAAZAAAAAEAAABAAAAAAAAAAAAAAAAAAAAAAAAAAAAAAAAAAAAAAAAAAAAAAAAAAAAAAAAAAAAAAAAAAAAAAAAAAAAAAAAAAAAAAAAAAAAAAAAAAAAAAAAAAAAAAAAAAAAAFAAAADwAAAAAAAAAAAAAAP///wkUAAAAAQAAABQAAAAUAAAAFAAAAAEAAAAAAAAAZAAAAGQAAAAAAAAAZAAAAGQAAAAVAAAAYAAAAAAAAAAAAAAADwAAACADAAAAAAAAAAAAAAEAAACgMgAAVgcAAKr4//8BAAAAf39/AAEAAABkAAAAAAAAABQAAABAHwAAAAAAACYAAAAAAAAAwOD//wAAAAAmAAAAZAAAABYAAABMAAAAAAAAAAAAAAAEAAAAAAAAAAEAAABXiZEKAAAAACgAAAAoAAAAZAAAAGQAAAAAAAAAzMzMAAAAAABQAAAAUAAAAGQAAABkAAAAAAAAABcAAAAUAAAAAAAAAAAAAAD/fwAA/38AAAAAAAAJAAAABAAAAHsAfAAeAAAAaAAAAAAAAAAAAAAAAAAAAAAAAAAAAAAAECcAABAnAAAAAAAAAAAAAAAAAAAAAAAAAAAAAAAAAAAAAAAAAAAAABQAAAAAAAAAwMD/AAAAAABkAAAAMgAAAAAAAABkAAAAAAAAAH9/fwAKAAAAIgAAABgAAAAAAAAAAAAAAAAAAAAAAAAAAAAAAAAAAAAkAAAAJAAAAAAAAAAHAAAAAAAAAAAAAAAAAAAAAAAAAAAAAAAAAAAAf39/ACUAAABYAAAAAAAAAAAAAAAAAAAAAAAAAAAAAAAAAAAAAAAAAAAAAAAAAAAAAAAAAAAAAAA/AAAAAAAAAKCGAQAAAAAAAAAAAAAAAAAMAAAAAQAAAAAAAAAAAAAAAAAAAB8AAABUAAAAAAAABQAAAAEAAAAAAAAAAAAAAAAAAAAAAAAAAAAAAAAAAAAAAAAAAAAAAAJ/f38AAAAAA8zMzADAwP8Af39/AAAAAAAAAAAAAAAAAAAAAAAAAAAAIQAAABgAAAAUAAAAwAMAABsnAAA/FQAAWSkAABAAAAAmAAAACAAAAP//////////"/>
               </a:ext>
             </a:extLst>
           </p:cNvSpPr>
@@ -2934,7 +2934,7 @@
           </a:lstStyle>
           <a:p>
             <a:pPr/>
-            <a:fld id="{2C5FA33B-75C1-0A55-8FE7-8300EDA979D6}" type="datetime1">
+            <a:fld id="{62421BC5-8B8F-17ED-C1FA-7DB855B43728}" type="datetime1">
               <a:t/>
             </a:fld>
           </a:p>
@@ -2947,7 +2947,7 @@
             <a:spLocks noGrp="1" noChangeArrowheads="1"/>
             <a:extLst>
               <a:ext uri="smNativeData">
-                <pr:smNativeData xmlns:pr="smNativeData" xmlns="smNativeData" val="SMDATA_15_k0e5YxMAAAAlAAAAZAAAAA8BAAAAkAAAAEgAAACQAAAASAAAAAAAAAABAAAAAAAAAAEAAABQAAAAAAAAAAAA4D8AAAAAAADgPwAAAAAAAOA/AAAAAAAA4D8AAAAAAADgPwAAAAAAAOA/AAAAAAAA4D8AAAAAAADgPwAAAAAAAOA/AAAAAAAA4D8CAAAAjAAAAAAAAAAAAAAAM2bMDANPhAgAAAAAAAAAAAAAAAAAAAAAAAAAAAAAAAAAAAAAZAAAAAEAAABAAAAAAAAAAAAAAAAAAAAAAAAAAAAAAAAAAAAAAAAAAAAAAAAAAAAAAAAAAAAAAAAAAAAAAAAAAAAAAAAAAAAAAAAAAAAAAAAAAAAAAAAAAAAAAAAAAAAAFAAAADwAAAAAAAAAAAAAAP///wkUAAAAAQAAABQAAAAUAAAAFAAAAAEAAAAAAAAAZAAAAGQAAAAAAAAAZAAAAGQAAAAVAAAAYAAAAAAAAAAAAAAADwAAACADAAAAAAAAAAAAAAEAAACgMgAAVgcAAKr4//8BAAAAf39/AAEAAABkAAAAAAAAABQAAABAHwAAAAAAACYAAAAAAAAAwOD//wAAAAAmAAAAZAAAABYAAABMAAAAAAAAAAAAAAAEAAAAAAAAAAEAAABXiZEKAAAAACgAAAAoAAAAZAAAAGQAAAAAAAAAzMzMAAAAAABQAAAAUAAAAGQAAABkAAAAAAAAABcAAAAUAAAAAAAAAAAAAAD/fwAA/38AAAAAAAAJAAAABAAAAAAAAAAeAAAAaAAAAAAAAAAAAAAAAAAAAAAAAAAAAAAAECcAABAnAAAAAAAAAAAAAAAAAAAAAAAAAAAAAAAAAAAAAAAAAAAAABQAAAAAAAAAwMD/AAAAAABkAAAAMgAAAAAAAABkAAAAAAAAAH9/fwAKAAAAIgAAABgAAAAAAAAAAAAAAAAAAAAAAAAAAAAAAAAAAAAkAAAAJAAAAAAAAAAHAAAAAAAAAAAAAAAAAAAAAAAAAAAAAAAAAAAAf39/ACUAAABYAAAAAAAAAAAAAAAAAAAAAAAAAAAAAAAAAAAAAAAAAAAAAAAAAAAAAAAAAAAAAAA/AAAAAAAAAKCGAQAAAAAAAAAAAAAAAAAMAAAAAQAAAAAAAAAAAAAAAAAAAB8AAABUAAAAAAAABQAAAAEAAAAAAAAAAAAAAAAAAAAAAAAAAAAAAAAAAAAAAAAAAAAAAAJ/f38AAAAAA8zMzADAwP8Af39/AAAAAAAAAAAAAAAAAAAAAAAAAAAAIQAAABgAAAAUAAAAoRkAABsnAABfMQAAWSkAABAAAAAmAAAACAAAAP//////////"/>
+                <pr:smNativeData xmlns:pr="smNativeData" xmlns="smNativeData" val="SMDATA_15_bXy5YxMAAAAlAAAAZAAAAA8BAAAAkAAAAEgAAACQAAAASAAAAAAAAAABAAAAAAAAAAEAAABQAAAAAAAAAAAA4D8AAAAAAADgPwAAAAAAAOA/AAAAAAAA4D8AAAAAAADgPwAAAAAAAOA/AAAAAAAA4D8AAAAAAADgPwAAAAAAAOA/AAAAAAAA4D8CAAAAjAAAAAAAAAAAAAAAM2bMDANPhAgAAAAAAAAAAAAAAAAAAAAAAAAAAAAAAAAAAAAAZAAAAAEAAABAAAAAAAAAAAAAAAAAAAAAAAAAAAAAAAAAAAAAAAAAAAAAAAAAAAAAAAAAAAAAAAAAAAAAAAAAAAAAAAAAAAAAAAAAAAAAAAAAAAAAAAAAAAAAAAAAAAAAFAAAADwAAAAAAAAAAAAAAP///wkUAAAAAQAAABQAAAAUAAAAFAAAAAEAAAAAAAAAZAAAAGQAAAAAAAAAZAAAAGQAAAAVAAAAYAAAAAAAAAAAAAAADwAAACADAAAAAAAAAAAAAAEAAACgMgAAVgcAAKr4//8BAAAAf39/AAEAAABkAAAAAAAAABQAAABAHwAAAAAAACYAAAAAAAAAwOD//wAAAAAmAAAAZAAAABYAAABMAAAAAAAAAAAAAAAEAAAAAAAAAAEAAABXiZEKAAAAACgAAAAoAAAAZAAAAGQAAAAAAAAAzMzMAAAAAABQAAAAUAAAAGQAAABkAAAAAAAAABcAAAAUAAAAAAAAAAAAAAD/fwAA/38AAAAAAAAJAAAABAAAAAAAAAAeAAAAaAAAAAAAAAAAAAAAAAAAAAAAAAAAAAAAECcAABAnAAAAAAAAAAAAAAAAAAAAAAAAAAAAAAAAAAAAAAAAAAAAABQAAAAAAAAAwMD/AAAAAABkAAAAMgAAAAAAAABkAAAAAAAAAH9/fwAKAAAAIgAAABgAAAAAAAAAAAAAAAAAAAAAAAAAAAAAAAAAAAAkAAAAJAAAAAAAAAAHAAAAAAAAAAAAAAAAAAAAAAAAAAAAAAAAAAAAf39/ACUAAABYAAAAAAAAAAAAAAAAAAAAAAAAAAAAAAAAAAAAAAAAAAAAAAAAAAAAAAAAAAAAAAA/AAAAAAAAAKCGAQAAAAAAAAAAAAAAAAAMAAAAAQAAAAAAAAAAAAAAAAAAAB8AAABUAAAAAAAABQAAAAEAAAAAAAAAAAAAAAAAAAAAAAAAAAAAAAAAAAAAAAAAAAAAAAJ/f38AAAAAA8zMzADAwP8Af39/AAAAAAAAAAAAAAAAAAAAAAAAAAAAIQAAABgAAAAUAAAAoRkAABsnAABfMQAAWSkAABAAAAAmAAAACAAAAP//////////"/>
               </a:ext>
             </a:extLst>
           </p:cNvSpPr>
@@ -2992,7 +2992,7 @@
             <a:spLocks noGrp="1" noChangeArrowheads="1"/>
             <a:extLst>
               <a:ext uri="smNativeData">
-                <pr:smNativeData xmlns:pr="smNativeData" xmlns="smNativeData" val="SMDATA_15_k0e5YxMAAAAlAAAAZAAAAA8BAAAAkAAAAEgAAACQAAAASAAAAAAAAAABAAAAAAAAAAEAAABQAAAAAAAAAAAA4D8AAAAAAADgPwAAAAAAAOA/AAAAAAAA4D8AAAAAAADgPwAAAAAAAOA/AAAAAAAA4D8AAAAAAADgPwAAAAAAAOA/AAAAAAAA4D8CAAAAjAAAAAAAAAAAAAAAM2bMDANPhAgAAAAAAAAAAAAAAAAAAAAAAAAAAAAAAAAAAAAAZAAAAAEAAABAAAAAAAAAAAAAAAAAAAAAAAAAAAAAAAAAAAAAAAAAAAAAAAAAAAAAAAAAAAAAAAAAAAAAAAAAAAAAAAAAAAAAAAAAAAAAAAAAAAAAAAAAAAAAAAAAAAAAFAAAADwAAAAAAAAAAAAAAP///wkUAAAAAQAAABQAAAAUAAAAFAAAAAEAAAAAAAAAZAAAAGQAAAAAAAAAZAAAAGQAAAAVAAAAYAAAAAAAAAAAAAAADwAAACADAAAAAAAAAAAAAAEAAACgMgAAVgcAAKr4//8BAAAAf39/AAEAAABkAAAAAAAAABQAAABAHwAAAAAAACYAAAAAAAAAwOD//wAAAAAmAAAAZAAAABYAAABMAAAAAAAAAAAAAAAEAAAAAAAAAAEAAABXiZEKAAAAACgAAAAoAAAAZAAAAGQAAAAAAAAAzMzMAAAAAABQAAAAUAAAAGQAAABkAAAAAAAAABcAAAAUAAAAAAAAAAAAAAD/fwAA/38AAAAAAAAJAAAABAAAAP////8eAAAAaAAAAAAAAAAAAAAAAAAAAAAAAAAAAAAAECcAABAnAAAAAAAAAAAAAAAAAAAAAAAAAAAAAAAAAAAAAAAAAAAAABQAAAAAAAAAwMD/AAAAAABkAAAAMgAAAAAAAABkAAAAAAAAAH9/fwAKAAAAIgAAABgAAAAAAAAAAAAAAAAAAAAAAAAAAAAAAAAAAAAkAAAAJAAAAAAAAAAHAAAAAAAAAAAAAAAAAAAAAAAAAAAAAAAAAAAAf39/ACUAAABYAAAAAAAAAAAAAAAAAAAAAAAAAAAAAAAAAAAAAAAAAAAAAAAAAAAAAAAAAAAAAAA/AAAAAAAAAKCGAQAAAAAAAAAAAAAAAAAMAAAAAQAAAAAAAAAAAAAAAAAAAB8AAABUAAAAAAAABQAAAAEAAAAAAAAAAAAAAAAAAAAAAAAAAAAAAAAAAAAAAAAAAAAAAAJ/f38AAAAAA8zMzADAwP8Af39/AAAAAAAAAAAAAAAAAAAAAAAAAAAAIQAAABgAAAAUAAAAwTUAABsnAABARwAAWSkAABAAAAAmAAAACAAAAP//////////"/>
+                <pr:smNativeData xmlns:pr="smNativeData" xmlns="smNativeData" val="SMDATA_15_bXy5YxMAAAAlAAAAZAAAAA8BAAAAkAAAAEgAAACQAAAASAAAAAAAAAABAAAAAAAAAAEAAABQAAAAAAAAAAAA4D8AAAAAAADgPwAAAAAAAOA/AAAAAAAA4D8AAAAAAADgPwAAAAAAAOA/AAAAAAAA4D8AAAAAAADgPwAAAAAAAOA/AAAAAAAA4D8CAAAAjAAAAAAAAAAAAAAAM2bMDANPhAgAAAAAAAAAAAAAAAAAAAAAAAAAAAAAAAAAAAAAZAAAAAEAAABAAAAAAAAAAAAAAAAAAAAAAAAAAAAAAAAAAAAAAAAAAAAAAAAAAAAAAAAAAAAAAAAAAAAAAAAAAAAAAAAAAAAAAAAAAAAAAAAAAAAAAAAAAAAAAAAAAAAAFAAAADwAAAAAAAAAAAAAAP///wkUAAAAAQAAABQAAAAUAAAAFAAAAAEAAAAAAAAAZAAAAGQAAAAAAAAAZAAAAGQAAAAVAAAAYAAAAAAAAAAAAAAADwAAACADAAAAAAAAAAAAAAEAAACgMgAAVgcAAKr4//8BAAAAf39/AAEAAABkAAAAAAAAABQAAABAHwAAAAAAACYAAAAAAAAAwOD//wAAAAAmAAAAZAAAABYAAABMAAAAAAAAAAAAAAAEAAAAAAAAAAEAAABXiZEKAAAAACgAAAAoAAAAZAAAAGQAAAAAAAAAzMzMAAAAAABQAAAAUAAAAGQAAABkAAAAAAAAABcAAAAUAAAAAAAAAAAAAAD/fwAA/38AAAAAAAAJAAAABAAAAP////8eAAAAaAAAAAAAAAAAAAAAAAAAAAAAAAAAAAAAECcAABAnAAAAAAAAAAAAAAAAAAAAAAAAAAAAAAAAAAAAAAAAAAAAABQAAAAAAAAAwMD/AAAAAABkAAAAMgAAAAAAAABkAAAAAAAAAH9/fwAKAAAAIgAAABgAAAAAAAAAAAAAAAAAAAAAAAAAAAAAAAAAAAAkAAAAJAAAAAAAAAAHAAAAAAAAAAAAAAAAAAAAAAAAAAAAAAAAAAAAf39/ACUAAABYAAAAAAAAAAAAAAAAAAAAAAAAAAAAAAAAAAAAAAAAAAAAAAAAAAAAAAAAAAAAAAA/AAAAAAAAAKCGAQAAAAAAAAAAAAAAAAAMAAAAAQAAAAAAAAAAAAAAAAAAAB8AAABUAAAAAAAABQAAAAEAAAAAAAAAAAAAAAAAAAAAAAAAAAAAAAAAAAAAAAAAAAAAAAJ/f38AAAAAA8zMzADAwP8Af39/AAAAAAAAAAAAAAAAAAAAAAAAAAAAIQAAABgAAAAUAAAAwTUAABsnAABARwAAWSkAABAAAAAmAAAACAAAAP//////////"/>
               </a:ext>
             </a:extLst>
           </p:cNvSpPr>
@@ -3027,7 +3027,7 @@
           </a:lstStyle>
           <a:p>
             <a:pPr/>
-            <a:fld id="{2C5F90F2-BCC1-0A66-8FE7-4A33DEA9791F}" type="slidenum">
+            <a:fld id="{6E5F30A2-EC83-0AC6-CDE7-1A937EA93B4F}" type="slidenum">
               <a:t/>
             </a:fld>
           </a:p>
@@ -3069,8 +3069,8 @@
             <a:schemeClr val="tx2"/>
           </a:solidFill>
           <a:effectLst/>
-          <a:latin typeface="Calibri" pitchFamily="2" charset="0"/>
-          <a:ea typeface="SimSun" pitchFamily="0" charset="0"/>
+          <a:latin typeface="Calibri" pitchFamily="1" charset="0"/>
+          <a:ea typeface="SimSun" pitchFamily="1" charset="0"/>
           <a:cs typeface="Times New Roman" pitchFamily="1" charset="0"/>
         </a:defRPr>
       </a:lvl1pPr>
@@ -3091,8 +3091,8 @@
             <a:schemeClr val="tx1"/>
           </a:solidFill>
           <a:effectLst/>
-          <a:latin typeface="Calibri" pitchFamily="2" charset="0"/>
-          <a:ea typeface="SimSun" pitchFamily="0" charset="0"/>
+          <a:latin typeface="Calibri" pitchFamily="1" charset="0"/>
+          <a:ea typeface="SimSun" pitchFamily="1" charset="0"/>
           <a:cs typeface="Times New Roman" pitchFamily="1" charset="0"/>
         </a:defRPr>
       </a:lvl2pPr>
@@ -3113,8 +3113,8 @@
             <a:schemeClr val="tx1"/>
           </a:solidFill>
           <a:effectLst/>
-          <a:latin typeface="Calibri" pitchFamily="2" charset="0"/>
-          <a:ea typeface="SimSun" pitchFamily="0" charset="0"/>
+          <a:latin typeface="Calibri" pitchFamily="1" charset="0"/>
+          <a:ea typeface="SimSun" pitchFamily="1" charset="0"/>
           <a:cs typeface="Times New Roman" pitchFamily="1" charset="0"/>
         </a:defRPr>
       </a:lvl3pPr>
@@ -3135,8 +3135,8 @@
             <a:schemeClr val="tx1"/>
           </a:solidFill>
           <a:effectLst/>
-          <a:latin typeface="Calibri" pitchFamily="2" charset="0"/>
-          <a:ea typeface="SimSun" pitchFamily="0" charset="0"/>
+          <a:latin typeface="Calibri" pitchFamily="1" charset="0"/>
+          <a:ea typeface="SimSun" pitchFamily="1" charset="0"/>
           <a:cs typeface="Times New Roman" pitchFamily="1" charset="0"/>
         </a:defRPr>
       </a:lvl4pPr>
@@ -3157,8 +3157,8 @@
             <a:schemeClr val="tx1"/>
           </a:solidFill>
           <a:effectLst/>
-          <a:latin typeface="Calibri" pitchFamily="2" charset="0"/>
-          <a:ea typeface="SimSun" pitchFamily="0" charset="0"/>
+          <a:latin typeface="Calibri" pitchFamily="1" charset="0"/>
+          <a:ea typeface="SimSun" pitchFamily="1" charset="0"/>
           <a:cs typeface="Times New Roman" pitchFamily="1" charset="0"/>
         </a:defRPr>
       </a:lvl5pPr>
@@ -3179,8 +3179,8 @@
             <a:schemeClr val="tx1"/>
           </a:solidFill>
           <a:effectLst/>
-          <a:latin typeface="Calibri" pitchFamily="2" charset="0"/>
-          <a:ea typeface="SimSun" pitchFamily="0" charset="0"/>
+          <a:latin typeface="Calibri" pitchFamily="1" charset="0"/>
+          <a:ea typeface="SimSun" pitchFamily="1" charset="0"/>
           <a:cs typeface="Times New Roman" pitchFamily="1" charset="0"/>
         </a:defRPr>
       </a:lvl6pPr>
@@ -3201,8 +3201,8 @@
             <a:schemeClr val="tx1"/>
           </a:solidFill>
           <a:effectLst/>
-          <a:latin typeface="Calibri" pitchFamily="2" charset="0"/>
-          <a:ea typeface="SimSun" pitchFamily="0" charset="0"/>
+          <a:latin typeface="Calibri" pitchFamily="1" charset="0"/>
+          <a:ea typeface="SimSun" pitchFamily="1" charset="0"/>
           <a:cs typeface="Times New Roman" pitchFamily="1" charset="0"/>
         </a:defRPr>
       </a:lvl7pPr>
@@ -3223,8 +3223,8 @@
             <a:schemeClr val="tx1"/>
           </a:solidFill>
           <a:effectLst/>
-          <a:latin typeface="Calibri" pitchFamily="2" charset="0"/>
-          <a:ea typeface="SimSun" pitchFamily="0" charset="0"/>
+          <a:latin typeface="Calibri" pitchFamily="1" charset="0"/>
+          <a:ea typeface="SimSun" pitchFamily="1" charset="0"/>
           <a:cs typeface="Times New Roman" pitchFamily="1" charset="0"/>
         </a:defRPr>
       </a:lvl8pPr>
@@ -3245,8 +3245,8 @@
             <a:schemeClr val="tx1"/>
           </a:solidFill>
           <a:effectLst/>
-          <a:latin typeface="Calibri" pitchFamily="2" charset="0"/>
-          <a:ea typeface="SimSun" pitchFamily="0" charset="0"/>
+          <a:latin typeface="Calibri" pitchFamily="1" charset="0"/>
+          <a:ea typeface="SimSun" pitchFamily="1" charset="0"/>
           <a:cs typeface="Times New Roman" pitchFamily="1" charset="0"/>
         </a:defRPr>
       </a:lvl9pPr>
@@ -3272,8 +3272,8 @@
             <a:schemeClr val="tx1"/>
           </a:solidFill>
           <a:effectLst/>
-          <a:latin typeface="Calibri" pitchFamily="2" charset="0"/>
-          <a:ea typeface="SimSun" pitchFamily="0" charset="0"/>
+          <a:latin typeface="Calibri" pitchFamily="1" charset="0"/>
+          <a:ea typeface="SimSun" pitchFamily="1" charset="0"/>
           <a:cs typeface="Times New Roman" pitchFamily="1" charset="0"/>
         </a:defRPr>
       </a:lvl1pPr>
@@ -3297,8 +3297,8 @@
             <a:schemeClr val="tx1"/>
           </a:solidFill>
           <a:effectLst/>
-          <a:latin typeface="Calibri" pitchFamily="2" charset="0"/>
-          <a:ea typeface="SimSun" pitchFamily="0" charset="0"/>
+          <a:latin typeface="Calibri" pitchFamily="1" charset="0"/>
+          <a:ea typeface="SimSun" pitchFamily="1" charset="0"/>
           <a:cs typeface="Times New Roman" pitchFamily="1" charset="0"/>
         </a:defRPr>
       </a:lvl2pPr>
@@ -3322,8 +3322,8 @@
             <a:schemeClr val="tx1"/>
           </a:solidFill>
           <a:effectLst/>
-          <a:latin typeface="Calibri" pitchFamily="2" charset="0"/>
-          <a:ea typeface="SimSun" pitchFamily="0" charset="0"/>
+          <a:latin typeface="Calibri" pitchFamily="1" charset="0"/>
+          <a:ea typeface="SimSun" pitchFamily="1" charset="0"/>
           <a:cs typeface="Times New Roman" pitchFamily="1" charset="0"/>
         </a:defRPr>
       </a:lvl3pPr>
@@ -3347,8 +3347,8 @@
             <a:schemeClr val="tx1"/>
           </a:solidFill>
           <a:effectLst/>
-          <a:latin typeface="Calibri" pitchFamily="2" charset="0"/>
-          <a:ea typeface="SimSun" pitchFamily="0" charset="0"/>
+          <a:latin typeface="Calibri" pitchFamily="1" charset="0"/>
+          <a:ea typeface="SimSun" pitchFamily="1" charset="0"/>
           <a:cs typeface="Times New Roman" pitchFamily="1" charset="0"/>
         </a:defRPr>
       </a:lvl4pPr>
@@ -3372,8 +3372,8 @@
             <a:schemeClr val="tx1"/>
           </a:solidFill>
           <a:effectLst/>
-          <a:latin typeface="Calibri" pitchFamily="2" charset="0"/>
-          <a:ea typeface="SimSun" pitchFamily="0" charset="0"/>
+          <a:latin typeface="Calibri" pitchFamily="1" charset="0"/>
+          <a:ea typeface="SimSun" pitchFamily="1" charset="0"/>
           <a:cs typeface="Times New Roman" pitchFamily="1" charset="0"/>
         </a:defRPr>
       </a:lvl5pPr>
@@ -3397,8 +3397,8 @@
             <a:schemeClr val="tx1"/>
           </a:solidFill>
           <a:effectLst/>
-          <a:latin typeface="Calibri" pitchFamily="2" charset="0"/>
-          <a:ea typeface="SimSun" pitchFamily="0" charset="0"/>
+          <a:latin typeface="Calibri" pitchFamily="1" charset="0"/>
+          <a:ea typeface="SimSun" pitchFamily="1" charset="0"/>
           <a:cs typeface="Times New Roman" pitchFamily="1" charset="0"/>
         </a:defRPr>
       </a:lvl6pPr>
@@ -3422,8 +3422,8 @@
             <a:schemeClr val="tx1"/>
           </a:solidFill>
           <a:effectLst/>
-          <a:latin typeface="Calibri" pitchFamily="2" charset="0"/>
-          <a:ea typeface="SimSun" pitchFamily="0" charset="0"/>
+          <a:latin typeface="Calibri" pitchFamily="1" charset="0"/>
+          <a:ea typeface="SimSun" pitchFamily="1" charset="0"/>
           <a:cs typeface="Times New Roman" pitchFamily="1" charset="0"/>
         </a:defRPr>
       </a:lvl7pPr>
@@ -3447,8 +3447,8 @@
             <a:schemeClr val="tx1"/>
           </a:solidFill>
           <a:effectLst/>
-          <a:latin typeface="Calibri" pitchFamily="2" charset="0"/>
-          <a:ea typeface="SimSun" pitchFamily="0" charset="0"/>
+          <a:latin typeface="Calibri" pitchFamily="1" charset="0"/>
+          <a:ea typeface="SimSun" pitchFamily="1" charset="0"/>
           <a:cs typeface="Times New Roman" pitchFamily="1" charset="0"/>
         </a:defRPr>
       </a:lvl8pPr>
@@ -3472,8 +3472,8 @@
             <a:schemeClr val="tx1"/>
           </a:solidFill>
           <a:effectLst/>
-          <a:latin typeface="Calibri" pitchFamily="2" charset="0"/>
-          <a:ea typeface="SimSun" pitchFamily="0" charset="0"/>
+          <a:latin typeface="Calibri" pitchFamily="1" charset="0"/>
+          <a:ea typeface="SimSun" pitchFamily="1" charset="0"/>
           <a:cs typeface="Times New Roman" pitchFamily="1" charset="0"/>
         </a:defRPr>
       </a:lvl9pPr>
@@ -3496,8 +3496,8 @@
             <a:schemeClr val="tx1"/>
           </a:solidFill>
           <a:effectLst/>
-          <a:latin typeface="Calibri" pitchFamily="2" charset="0"/>
-          <a:ea typeface="SimSun" pitchFamily="0" charset="0"/>
+          <a:latin typeface="Calibri" pitchFamily="1" charset="0"/>
+          <a:ea typeface="SimSun" pitchFamily="1" charset="0"/>
           <a:cs typeface="Times New Roman" pitchFamily="1" charset="0"/>
         </a:defRPr>
       </a:lvl1pPr>
@@ -3518,8 +3518,8 @@
             <a:schemeClr val="tx1"/>
           </a:solidFill>
           <a:effectLst/>
-          <a:latin typeface="Calibri" pitchFamily="2" charset="0"/>
-          <a:ea typeface="SimSun" pitchFamily="0" charset="0"/>
+          <a:latin typeface="Calibri" pitchFamily="1" charset="0"/>
+          <a:ea typeface="SimSun" pitchFamily="1" charset="0"/>
           <a:cs typeface="Times New Roman" pitchFamily="1" charset="0"/>
         </a:defRPr>
       </a:lvl2pPr>
@@ -3540,8 +3540,8 @@
             <a:schemeClr val="tx1"/>
           </a:solidFill>
           <a:effectLst/>
-          <a:latin typeface="Calibri" pitchFamily="2" charset="0"/>
-          <a:ea typeface="SimSun" pitchFamily="0" charset="0"/>
+          <a:latin typeface="Calibri" pitchFamily="1" charset="0"/>
+          <a:ea typeface="SimSun" pitchFamily="1" charset="0"/>
           <a:cs typeface="Times New Roman" pitchFamily="1" charset="0"/>
         </a:defRPr>
       </a:lvl3pPr>
@@ -3562,8 +3562,8 @@
             <a:schemeClr val="tx1"/>
           </a:solidFill>
           <a:effectLst/>
-          <a:latin typeface="Calibri" pitchFamily="2" charset="0"/>
-          <a:ea typeface="SimSun" pitchFamily="0" charset="0"/>
+          <a:latin typeface="Calibri" pitchFamily="1" charset="0"/>
+          <a:ea typeface="SimSun" pitchFamily="1" charset="0"/>
           <a:cs typeface="Times New Roman" pitchFamily="1" charset="0"/>
         </a:defRPr>
       </a:lvl4pPr>
@@ -3584,8 +3584,8 @@
             <a:schemeClr val="tx1"/>
           </a:solidFill>
           <a:effectLst/>
-          <a:latin typeface="Calibri" pitchFamily="2" charset="0"/>
-          <a:ea typeface="SimSun" pitchFamily="0" charset="0"/>
+          <a:latin typeface="Calibri" pitchFamily="1" charset="0"/>
+          <a:ea typeface="SimSun" pitchFamily="1" charset="0"/>
           <a:cs typeface="Times New Roman" pitchFamily="1" charset="0"/>
         </a:defRPr>
       </a:lvl5pPr>
@@ -3606,8 +3606,8 @@
             <a:schemeClr val="tx1"/>
           </a:solidFill>
           <a:effectLst/>
-          <a:latin typeface="Calibri" pitchFamily="2" charset="0"/>
-          <a:ea typeface="SimSun" pitchFamily="0" charset="0"/>
+          <a:latin typeface="Calibri" pitchFamily="1" charset="0"/>
+          <a:ea typeface="SimSun" pitchFamily="1" charset="0"/>
           <a:cs typeface="Times New Roman" pitchFamily="1" charset="0"/>
         </a:defRPr>
       </a:lvl6pPr>
@@ -3628,8 +3628,8 @@
             <a:schemeClr val="tx1"/>
           </a:solidFill>
           <a:effectLst/>
-          <a:latin typeface="Calibri" pitchFamily="2" charset="0"/>
-          <a:ea typeface="SimSun" pitchFamily="0" charset="0"/>
+          <a:latin typeface="Calibri" pitchFamily="1" charset="0"/>
+          <a:ea typeface="SimSun" pitchFamily="1" charset="0"/>
           <a:cs typeface="Times New Roman" pitchFamily="1" charset="0"/>
         </a:defRPr>
       </a:lvl7pPr>
@@ -3650,8 +3650,8 @@
             <a:schemeClr val="tx1"/>
           </a:solidFill>
           <a:effectLst/>
-          <a:latin typeface="Calibri" pitchFamily="2" charset="0"/>
-          <a:ea typeface="SimSun" pitchFamily="0" charset="0"/>
+          <a:latin typeface="Calibri" pitchFamily="1" charset="0"/>
+          <a:ea typeface="SimSun" pitchFamily="1" charset="0"/>
           <a:cs typeface="Times New Roman" pitchFamily="1" charset="0"/>
         </a:defRPr>
       </a:lvl8pPr>
@@ -3672,8 +3672,8 @@
             <a:schemeClr val="tx1"/>
           </a:solidFill>
           <a:effectLst/>
-          <a:latin typeface="Calibri" pitchFamily="2" charset="0"/>
-          <a:ea typeface="SimSun" pitchFamily="0" charset="0"/>
+          <a:latin typeface="Calibri" pitchFamily="1" charset="0"/>
+          <a:ea typeface="SimSun" pitchFamily="1" charset="0"/>
           <a:cs typeface="Times New Roman" pitchFamily="1" charset="0"/>
         </a:defRPr>
       </a:lvl9pPr>
@@ -3706,7 +3706,7 @@
             <a:spLocks noGrp="1" noChangeArrowheads="1"/>
             <a:extLst>
               <a:ext uri="smNativeData">
-                <pr:smNativeData xmlns:pr="smNativeData" xmlns="smNativeData" val="SMDATA_15_k0e5YxMAAAAlAAAAZAAAAA8BAAAAkAAAAEgAAACQAAAASAAAAAAAAAABAAAAAAAAAAEAAABQAAAAAAAAAAAA4D8AAAAAAADgPwAAAAAAAOA/AAAAAAAA4D8AAAAAAADgPwAAAAAAAOA/AAAAAAAA4D8AAAAAAADgPwAAAAAAAOA/AAAAAAAA4D8CAAAAjAAAAAAAAAAAAAAAM2bMDANPhAgAAAAAAAAAAAAAAAAAAAAAAAAAAAAAAAAAAAAAZAAAAAEAAABAAAAAAAAAAAAAAAAAAAAAAAAAAAAAAAAAAAAAAAAAAAAAAAAAAAAAAAAAAAAAAAAAAAAAAAAAAAAAAAAAAAAAAAAAAAAAAAAAAAAAAAAAAAAAAAAAAAAAFAAAADwAAAAAAAAAAAAAAP///wkUAAAAAQAAABQAAAAUAAAAFAAAAAEAAAAAAAAAZAAAAGQAAAAAAAAAZAAAAGQAAAAVAAAAYAAAAAAAAAAAAAAADwAAACADAAAAAAAAAAAAAAEAAACgMgAAVgcAAKr4//8BAAAAf39/AAEAAABkAAAAAAAAABQAAABAHwAAAAAAACYAAAAAAAAAwOD//wAAAAAmAAAAZAAAABYAAABMAAAAAAAAAAAAAAAEAAAAAAAAAAEAAABXiZEKAAAAACgAAAAoAAAAZAAAAGQAAAAAAAAAzMzMAAAAAABQAAAAUAAAAGQAAABkAAAAAAAAABcAAAAUAAAAAAAAAAAAAAD/fwAA/38AAAAAAAAJAAAABAAAAP8AnQAeAAAAaAAAAAAAAAAAAAAAAAAAAAAAAAAAAAAAECcAABAnAAAAAAAAAAAAAAAAAAAAAAAAAAAAAAAAAAAAAAAAAAAAABQAAAAAAAAAwMD/AAAAAABkAAAAMgAAAAAAAABkAAAAAAAAAH9/fwAKAAAAIgAAABgAAAAAAAAAAAAAAAAAAAAAAAAAAAAAAAAAAAAkAAAAJAAAAAAAAAAHAAAAAAAAAAAAAAAAAAAAAAAAAAAAAAAAAAAAf39/ACUAAABYAAAAAAAAAAAAAAAAAAAAAAAAAAAAAAAAAAAAAAAAAAAAAAAAAAAAAAAAAAAAAAA/AAAAAAAAAKCGAQAAAAAAAAAAAAAAAAAMAAAAAQAAAAAAAAAAAAAAAAAAAB8AAABUAAAAAAAABQAAAAEAAAAAAAAAAAAAAAAAAAAAAAAAAAAAAAAAAAAAAAAAAAAAAAJ/f38AAAAAA8zMzADAwP8Af39/AAAAAAAAAAAAAAAAAAAAAAAAAAAAIQAAABgAAAAUAAAAoAUAABoNAABgRQAAJhYAABAAAAAmAAAACAAAAAAAAAAAAAAA"/>
+                <pr:smNativeData xmlns:pr="smNativeData" xmlns="smNativeData" val="SMDATA_15_bXy5YxMAAAAlAAAAZAAAAA8BAAAAkAAAAEgAAACQAAAASAAAAAAAAAABAAAAAAAAAAEAAABQAAAAAAAAAAAA4D8AAAAAAADgPwAAAAAAAOA/AAAAAAAA4D8AAAAAAADgPwAAAAAAAOA/AAAAAAAA4D8AAAAAAADgPwAAAAAAAOA/AAAAAAAA4D8CAAAAjAAAAAAAAAAAAAAAM2bMDANPhAgAAAAAAAAAAAAAAAAAAAAAAAAAAAAAAAAAAAAAZAAAAAEAAABAAAAAAAAAAAAAAAAAAAAAAAAAAAAAAAAAAAAAAAAAAAAAAAAAAAAAAAAAAAAAAAAAAAAAAAAAAAAAAAAAAAAAAAAAAAAAAAAAAAAAAAAAAAAAAAAAAAAAFAAAADwAAAAAAAAAAAAAAP///wkUAAAAAQAAABQAAAAUAAAAFAAAAAEAAAAAAAAAZAAAAGQAAAAAAAAAZAAAAGQAAAAVAAAAYAAAAAAAAAAAAAAADwAAACADAAAAAAAAAAAAAAEAAACgMgAAVgcAAKr4//8BAAAAf39/AAEAAABkAAAAAAAAABQAAABAHwAAAAAAACYAAAAAAAAAwOD//wAAAAAmAAAAZAAAABYAAABMAAAAAAAAAAAAAAAEAAAAAAAAAAEAAABXiZEKAAAAACgAAAAoAAAAZAAAAGQAAAAAAAAAzMzMAAAAAABQAAAAUAAAAGQAAABkAAAAAAAAABcAAAAUAAAAAAAAAAAAAAD/fwAA/38AAAAAAAAJAAAABAAAAP8AnQAeAAAAaAAAAAAAAAAAAAAAAAAAAAAAAAAAAAAAECcAABAnAAAAAAAAAAAAAAAAAAAAAAAAAAAAAAAAAAAAAAAAAAAAABQAAAAAAAAAwMD/AAAAAABkAAAAMgAAAAAAAABkAAAAAAAAAH9/fwAKAAAAIgAAABgAAAAAAAAAAAAAAAAAAAAAAAAAAAAAAAAAAAAkAAAAJAAAAAAAAAAHAAAAAAAAAAAAAAAAAAAAAAAAAAAAAAAAAAAAf39/ACUAAABYAAAAAAAAAAAAAAAAAAAAAAAAAAAAAAAAAAAAAAAAAAAAAAAAAAAAAAAAAAAAAAA/AAAAAAAAAKCGAQAAAAAAAAAAAAAAAAAMAAAAAQAAAAAAAAAAAAAAAAAAAB8AAABUAAAAAAAABQAAAAEAAAAAAAAAAAAAAAAAAAAAAAAAAAAAAAAAAAAAAAAAAAAAAAJ/f38AAAAAA8zMzADAwP8Af39/AAAAAAAAAAAAAAAAAAAAAAAAAAAAIQAAABgAAAAUAAAAoAUAABoNAABgRQAAJhYAAAAAAAAmAAAACAAAAAEAAAAAAAAA"/>
               </a:ext>
             </a:extLst>
           </p:cNvSpPr>
@@ -3714,34 +3714,12 @@
             <p:ph type="ctrTitle"/>
           </p:nvPr>
         </p:nvSpPr>
-        <p:spPr/>
-        <p:txBody>
-          <a:bodyPr/>
-          <a:lstStyle/>
-          <a:p>
-            <a:pPr/>
-            <a:r>
-              <a:t>PSUG Presentation</a:t>
-            </a:r>
-          </a:p>
-        </p:txBody>
-      </p:sp>
-      <p:sp>
-        <p:nvSpPr>
-          <p:cNvPr id="3" name="SlideSubtitle1"/>
-          <p:cNvSpPr>
-            <a:spLocks noGrp="1" noChangeArrowheads="1"/>
-            <a:extLst>
-              <a:ext uri="smNativeData">
-                <pr:smNativeData xmlns:pr="smNativeData" xmlns="smNativeData" val="SMDATA_15_k0e5YxMAAAAlAAAAZAAAAA8BAAAAkAAAAEgAAACQAAAASAAAAAAAAAAAAAAAAAAAAAEAAABQAAAAAAAAAAAA4D8AAAAAAADgPwAAAAAAAOA/AAAAAAAA4D8AAAAAAADgPwAAAAAAAOA/AAAAAAAA4D8AAAAAAADgPwAAAAAAAOA/AAAAAAAA4D8CAAAAjAAAAAAAAAAAAAAAM2bMDANPhAgAAAAAAAAAAAAAAAAAAAAAAAAAAAAAAAAAAAAAZAAAAAEAAABAAAAAAAAAAAAAAAAAAAAAAAAAAAAAAAAAAAAAAAAAAAAAAAAAAAAAAAAAAAAAAAAAAAAAAAAAAAAAAAAAAAAAAAAAAAAAAAAAAAAAAAAAAAAAAAAAAAAAFAAAADwAAAAAAAAAAAAAAP///wkUAAAAAQAAABQAAAAUAAAAFAAAAAEAAAAAAAAAZAAAAGQAAAAAAAAAZAAAAGQAAAAVAAAAYAAAAAAAAAAAAAAADwAAACADAAAAAAAAAAAAAAEAAACgMgAAVgcAAKr4//8BAAAAf39/AAEAAABkAAAAAAAAABQAAABAHwAAAAAAACYAAAAAAAAAwOD//wAAAAAmAAAAZAAAABYAAABMAAAAAAAAAAAAAAAEAAAAAAAAAAEAAABXiZEKAAAAACgAAAAoAAAAZAAAAGQAAAAAAAAAzMzMAAAAAABQAAAAUAAAAGQAAABkAAAAAAAAABcAAAAUAAAAAAAAAAAAAAD/fwAA/38AAAAAAAAJAAAABAAAAP8A/wAeAAAAaAAAAAAAAAAAAAAAAAAAAAAAAAAAAAAAECcAABAnAAAAAAAAAAAAAAAAAAAAAAAAAAAAAAAAAAAAAAAAAAAAABQAAAAAAAAAwMD/AAAAAABkAAAAMgAAAAAAAABkAAAAAAAAAH9/fwAKAAAAIgAAABgAAAAAAAAAAAAAAAAAAAAAAAAAAAAAAAAAAAAkAAAAJAAAAAAAAAAHAAAAAAAAAAAAAAAAAAAAAAAAAAAAAAAAAAAAf39/ACUAAABYAAAAAAAAAAAAAAAAAAAAAAAAAAAAAAAAAAAAAAAAAAAAAAAAAAAAAAAAAAAAAAA/AAAAAAAAAKCGAQAAAAAAAAAAAAAAAAAMAAAAAQAAAAAAAAAAAAAAAAAAAB8AAABUAAAAAAAABQAAAAEAAAAAAAAAAAAAAAAAAAAAAAAAAAAAAAAAAAAAAAAAAAAAAAJ/f38AAAAAA8zMzADAwP8Af39/AAAAAAAAAAAAAAAAAAAAAAAAAAAAIQAAABgAAAAUAAAAQAsAAOgXAADAPwAAsCIAABAAAAAmAAAACAAAAAAAAAAAAAAA"/>
-              </a:ext>
-            </a:extLst>
-          </p:cNvSpPr>
-          <p:nvPr>
-            <p:ph type="subTitle" idx="1"/>
-          </p:nvPr>
-        </p:nvSpPr>
-        <p:spPr/>
+        <p:spPr>
+          <a:xfrm>
+            <a:off x="914400" y="2129790"/>
+            <a:ext cx="10363200" cy="1470660"/>
+          </a:xfrm>
+        </p:spPr>
         <p:txBody>
           <a:bodyPr/>
           <a:lstStyle/>
@@ -3753,6 +3731,32 @@
               <a:t>#PSXiDiag</a:t>
             </a:r>
           </a:p>
+        </p:txBody>
+      </p:sp>
+      <p:sp>
+        <p:nvSpPr>
+          <p:cNvPr id="3" name="SlideSubtitle1"/>
+          <p:cNvSpPr>
+            <a:spLocks noGrp="1" noChangeArrowheads="1"/>
+            <a:extLst>
+              <a:ext uri="smNativeData">
+                <pr:smNativeData xmlns:pr="smNativeData" xmlns="smNativeData" val="SMDATA_15_bXy5YxMAAAAlAAAAZAAAAA8BAAAAkAAAAEgAAACQAAAASAAAAAAAAAAAAAAAAAAAAAEAAABQAAAAAAAAAAAA4D8AAAAAAADgPwAAAAAAAOA/AAAAAAAA4D8AAAAAAADgPwAAAAAAAOA/AAAAAAAA4D8AAAAAAADgPwAAAAAAAOA/AAAAAAAA4D8CAAAAjAAAAAAAAAAAAAAAM2bMDANPhAgAAAAAAAAAAAAAAAAAAAAAAAAAAAAAAAAAAAAAZAAAAAEAAABAAAAAAAAAAAAAAAAAAAAAAAAAAAAAAAAAAAAAAAAAAAAAAAAAAAAAAAAAAAAAAAAAAAAAAAAAAAAAAAAAAAAAAAAAAAAAAAAAAAAAAAAAAAAAAAAAAAAAFAAAADwAAAAAAAAAAAAAAP///wkUAAAAAQAAABQAAAAUAAAAFAAAAAEAAAAAAAAAZAAAAGQAAAAAAAAAZAAAAGQAAAAVAAAAYAAAAAAAAAAAAAAADwAAACADAAAAAAAAAAAAAAEAAACgMgAAVgcAAKr4//8BAAAAf39/AAEAAABkAAAAAAAAABQAAABAHwAAAAAAACYAAAAAAAAAwOD//wAAAAAmAAAAZAAAABYAAABMAAAAAAAAAAAAAAAEAAAAAAAAAAEAAABXiZEKAAAAACgAAAAoAAAAZAAAAGQAAAAAAAAAzMzMAAAAAABQAAAAUAAAAGQAAABkAAAAAAAAABcAAAAUAAAAAAAAAAAAAAD/fwAA/38AAAAAAAAJAAAABAAAAP8A/wAeAAAAaAAAAAAAAAAAAAAAAAAAAAAAAAAAAAAAECcAABAnAAAAAAAAAAAAAAAAAAAAAAAAAAAAAAAAAAAAAAAAAAAAABQAAAAAAAAAwMD/AAAAAABkAAAAMgAAAAAAAABkAAAAAAAAAH9/fwAKAAAAIgAAABgAAAAAAAAAAAAAAAAAAAAAAAAAAAAAAAAAAAAkAAAAJAAAAAAAAAAHAAAAAAAAAAAAAAAAAAAAAAAAAAAAAAAAAAAAf39/ACUAAABYAAAAAAAAAAAAAAAAAAAAAAAAAAAAAAAAAAAAAAAAAAAAAAAAAAAAAAAAAAAAAAA/AAAAAAAAAKCGAQAAAAAAAAAAAAAAAAAMAAAAAQAAAAAAAAAAAAAAAAAAAB8AAABUAAAAAAAABQAAAAEAAAAAAAAAAAAAAAAAAAAAAAAAAAAAAAAAAAAAAAAAAAAAAAJ/f38AAAAAA8zMzADAwP8Af39/AAAAAAAAAAAAAAAAAAAAAAAAAAAAIQAAABgAAAAUAAAAQAsAAOgXAADAPwAAsCIAAAAAAAAmAAAACAAAAAEAAAAAAAAA"/>
+              </a:ext>
+            </a:extLst>
+          </p:cNvSpPr>
+          <p:nvPr>
+            <p:ph type="subTitle" idx="1"/>
+          </p:nvPr>
+        </p:nvSpPr>
+        <p:spPr>
+          <a:xfrm>
+            <a:off x="1828800" y="3886200"/>
+            <a:ext cx="8534400" cy="1752600"/>
+          </a:xfrm>
+        </p:spPr>
+        <p:txBody>
+          <a:bodyPr/>
+          <a:lstStyle/>
           <a:p>
             <a:pPr/>
             <a:r>
@@ -3762,7 +3766,13 @@
           <a:p>
             <a:pPr/>
             <a:r>
-              <a:t>Mermaid-Markdown/-HTML, Draw.IO-CSV</a:t>
+              <a:t>Mermaid-Markdown or -HTML-Report,</a:t>
+            </a:r>
+          </a:p>
+          <a:p>
+            <a:pPr/>
+            <a:r>
+              <a:t>CSV-file for import to Draw.IO</a:t>
             </a:r>
           </a:p>
         </p:txBody>
@@ -3806,7 +3816,7 @@
             <a:spLocks noGrp="1" noChangeArrowheads="1"/>
             <a:extLst>
               <a:ext uri="smNativeData">
-                <pr:smNativeData xmlns:pr="smNativeData" xmlns="smNativeData" val="SMDATA_15_k0e5YxMAAAAlAAAAZAAAAA8BAAAAkAAAAEgAAACQAAAASAAAAAAAAAABAAAAAAAAAAEAAABQAAAAAAAAAAAA4D8AAAAAAADgPwAAAAAAAOA/AAAAAAAA4D8AAAAAAADgPwAAAAAAAOA/AAAAAAAA4D8AAAAAAADgPwAAAAAAAOA/AAAAAAAA4D8CAAAAjAAAAAAAAAAAAAAAM2bMDANPhAgAAAAAAAAAAAAAAAAAAAAAAAAAAAAAAAAAAAAAZAAAAAEAAABAAAAAAAAAAAAAAAAAAAAAAAAAAAAAAAAAAAAAAAAAAAAAAAAAAAAAAAAAAAAAAAAAAAAAAAAAAAAAAAAAAAAAAAAAAAAAAAAAAAAAAAAAAAAAAAAAAAAAFAAAADwAAAAAAAAAAAAAAP///wkUAAAAAQAAABQAAAAUAAAAFAAAAAEAAAAAAAAAZAAAAGQAAAAAAAAAZAAAAGQAAAAVAAAAYAAAAAAAAAAAAAAADwAAACADAAAAAAAAAAAAAAEAAACgMgAAVgcAAKr4//8BAAAAf39/AAEAAABkAAAAAAAAABQAAABAHwAAAAAAACYAAAAAAAAAwOD//wAAAAAmAAAAZAAAABYAAABMAAAAAAAAAAAAAAAEAAAAAAAAAAEAAABXiZEKAAAAACgAAAAoAAAAZAAAAGQAAAAAAAAAzMzMAAAAAABQAAAAUAAAAGQAAABkAAAAAAAAABcAAAAUAAAAAAAAAAAAAAD/fwAA/38AAAAAAAAJAAAABAAAAAAAAAAeAAAAaAAAAAAAAAAAAAAAAAAAAAAAAAAAAAAAECcAABAnAAAAAAAAAAAAAAAAAAAAAAAAAAAAAAAAAAAAAAAAAAAAABQAAAAAAAAAwMD/AAAAAABkAAAAMgAAAAAAAABkAAAAAAAAAH9/fwAKAAAAIgAAABgAAAAAAAAAAAAAAAAAAAAAAAAAAAAAAAAAAAAkAAAAJAAAAAAAAAAHAAAAAAAAAAAAAAAAAAAAAAAAAAAAAAAAAAAAf39/ACUAAABYAAAAAAAAAAAAAAAAAAAAAAAAAAAAAAAAAAAAAAAAAAAAAAAAAAAAAAAAAAAAAAA/AAAAAAAAAKCGAQAAAAAAAAAAAAAAAAAMAAAAAQAAAAAAAAAAAAAAAAAAAB8AAABUAAAAAAAABQAAAAEAAAAAAAAAAAAAAAAAAAAAAAAAAAAAAAAAAAAAAAAAAAAAAAJ/f38AAAAAA8zMzADAwP8Af39/AAAAAAAAAAAAAAAAAAAAAAAAAAAAIQAAABgAAAAUAAAAwAMAALABAABARwAAuAgAABAAAAAmAAAACAAAAAAAAAAAAAAA"/>
+                <pr:smNativeData xmlns:pr="smNativeData" xmlns="smNativeData" val="SMDATA_15_bXy5YxMAAAAlAAAAZAAAAA8BAAAAkAAAAEgAAACQAAAASAAAAAAAAAABAAAAAAAAAAEAAABQAAAAAAAAAAAA4D8AAAAAAADgPwAAAAAAAOA/AAAAAAAA4D8AAAAAAADgPwAAAAAAAOA/AAAAAAAA4D8AAAAAAADgPwAAAAAAAOA/AAAAAAAA4D8CAAAAjAAAAAAAAAAAAAAAM2bMDANPhAgAAAAAAAAAAAAAAAAAAAAAAAAAAAAAAAAAAAAAZAAAAAEAAABAAAAAAAAAAAAAAAAAAAAAAAAAAAAAAAAAAAAAAAAAAAAAAAAAAAAAAAAAAAAAAAAAAAAAAAAAAAAAAAAAAAAAAAAAAAAAAAAAAAAAAAAAAAAAAAAAAAAAFAAAADwAAAAAAAAAAAAAAP///wkUAAAAAQAAABQAAAAUAAAAFAAAAAEAAAAAAAAAZAAAAGQAAAAAAAAAZAAAAGQAAAAVAAAAYAAAAAAAAAAAAAAADwAAACADAAAAAAAAAAAAAAEAAACgMgAAVgcAAKr4//8BAAAAf39/AAEAAABkAAAAAAAAABQAAABAHwAAAAAAACYAAAAAAAAAwOD//wAAAAAmAAAAZAAAABYAAABMAAAAAAAAAAAAAAAEAAAAAAAAAAEAAABXiZEKAAAAACgAAAAoAAAAZAAAAGQAAAAAAAAAzMzMAAAAAABQAAAAUAAAAGQAAABkAAAAAAAAABcAAAAUAAAAAAAAAAAAAAD/fwAA/38AAAAAAAAJAAAABAAAAAAAAAAeAAAAaAAAAAAAAAAAAAAAAAAAAAAAAAAAAAAAECcAABAnAAAAAAAAAAAAAAAAAAAAAAAAAAAAAAAAAAAAAAAAAAAAABQAAAAAAAAAwMD/AAAAAABkAAAAMgAAAAAAAABkAAAAAAAAAH9/fwAKAAAAIgAAABgAAAAAAAAAAAAAAAAAAAAAAAAAAAAAAAAAAAAkAAAAJAAAAAAAAAAHAAAAAAAAAAAAAAAAAAAAAAAAAAAAAAAAAAAAf39/ACUAAABYAAAAAAAAAAAAAAAAAAAAAAAAAAAAAAAAAAAAAAAAAAAAAAAAAAAAAAAAAAAAAAA/AAAAAAAAAKCGAQAAAAAAAAAAAAAAAAAMAAAAAQAAAAAAAAAAAAAAAAAAAB8AAABUAAAAAAAABQAAAAEAAAAAAAAAAAAAAAAAAAAAAAAAAAAAAAAAAAAAAAAAAAAAAAJ/f38AAAAAA8zMzADAwP8Af39/AAAAAAAAAAAAAAAAAAAAAAAAAAAAIQAAABgAAAAUAAAAwAMAALABAABARwAAuAgAABAAAAAmAAAACAAAAAAAAAAAAAAA"/>
               </a:ext>
             </a:extLst>
           </p:cNvSpPr>
@@ -3833,7 +3843,7 @@
             <a:spLocks noGrp="1" noChangeArrowheads="1"/>
             <a:extLst>
               <a:ext uri="smNativeData">
-                <pr:smNativeData xmlns:pr="smNativeData" xmlns="smNativeData" val="SMDATA_15_k0e5YxMAAAAlAAAAZAAAAA8BAAAAkAAAAEgAAACQAAAASAAAAAAAAAACAAAAAAAAAAEAAABQAAAAAAAAAAAA4D8AAAAAAADgPwAAAAAAAOA/AAAAAAAA4D8AAAAAAADgPwAAAAAAAOA/AAAAAAAA4D8AAAAAAADgPwAAAAAAAOA/AAAAAAAA4D8CAAAAjAAAAAAAAAAAAAAAM2bMDANPhAgAAAAAAAAAAAAAAAAAAAAAAAAAAAAAAAAAAAAAZAAAAAEAAABAAAAAAAAAAAAAAAAAAAAAAAAAAAAAAAAAAAAAAAAAAAAAAAAAAAAAAAAAAAAAAAAAAAAAAAAAAAAAAAAAAAAAAAAAAAAAAAAAAAAAAAAAAAAAAAAAAAAAFAAAADwAAAAAAAAAAAAAAP///wkUAAAAAQAAABQAAAAUAAAAFAAAAAEAAAAAAAAAZAAAAGQAAAAAAAAAZAAAAGQAAAAVAAAAYAAAAAAAAAAAAAAADwAAACADAAAAAAAAAAAAAAEAAACgMgAAVgcAAKr4//8BAAAAf39/AAEAAABkAAAAAAAAABQAAABAHwAAAAAAACYAAAAAAAAAwOD//wAAAAAmAAAAZAAAABYAAABMAAAAAAAAAAAAAAAEAAAAAAAAAAEAAABXiZEKAAAAACgAAAAoAAAAZAAAAGQAAAAAAAAAzMzMAAAAAABQAAAAUAAAAGQAAABkAAAAAAAAABcAAAAUAAAAAAAAAAAAAAD/fwAA/38AAAAAAAAJAAAABAAAAF8AYAAeAAAAaAAAAAAAAAAAAAAAAAAAAAAAAAAAAAAAECcAABAnAAAAAAAAAAAAAAAAAAAAAAAAAAAAAAAAAAAAAAAAAAAAABQAAAAAAAAAwMD/AAAAAABkAAAAMgAAAAAAAABkAAAAAAAAAH9/fwAKAAAAIgAAABgAAAAAAAAAAAAAAAAAAAAAAAAAAAAAAAAAAAAkAAAAJAAAAAAAAAAHAAAAAAAAAAAAAAAAAAAAAAAAAAAAAAAAAAAAf39/ACUAAABYAAAAAAAAAAAAAAAAAAAAAAAAAAAAAAAAAAAAAAAAAAAAAAAAAAAAAAAAAAAAAAA/AAAAAAAAAKCGAQAAAAAAAAAAAAAAAAAMAAAAAQAAAAAAAAAAAAAAAAAAAB8AAABUAAAAAAAABQAAAAEAAAAAAAAAAAAAAAAAAAAAAAAAAAAAAAAAAAAAAAAAAAAAAAJ/f38AAAAAA8zMzADAwP8Af39/AAAAAAAAAAAAAAAAAAAAAAAAAAAAIQAAABgAAAAUAAAAwAMAAHEJAADjJAAAYQ0AABAAAAAmAAAACAAAAIGAAAAAAAAA"/>
+                <pr:smNativeData xmlns:pr="smNativeData" xmlns="smNativeData" val="SMDATA_15_bXy5YxMAAAAlAAAAZAAAAA8BAAAAkAAAAEgAAACQAAAASAAAAAAAAAACAAAAAAAAAAEAAABQAAAAAAAAAAAA4D8AAAAAAADgPwAAAAAAAOA/AAAAAAAA4D8AAAAAAADgPwAAAAAAAOA/AAAAAAAA4D8AAAAAAADgPwAAAAAAAOA/AAAAAAAA4D8CAAAAjAAAAAAAAAAAAAAAM2bMDANPhAgAAAAAAAAAAAAAAAAAAAAAAAAAAAAAAAAAAAAAZAAAAAEAAABAAAAAAAAAAAAAAAAAAAAAAAAAAAAAAAAAAAAAAAAAAAAAAAAAAAAAAAAAAAAAAAAAAAAAAAAAAAAAAAAAAAAAAAAAAAAAAAAAAAAAAAAAAAAAAAAAAAAAFAAAADwAAAAAAAAAAAAAAP///wkUAAAAAQAAABQAAAAUAAAAFAAAAAEAAAAAAAAAZAAAAGQAAAAAAAAAZAAAAGQAAAAVAAAAYAAAAAAAAAAAAAAADwAAACADAAAAAAAAAAAAAAEAAACgMgAAVgcAAKr4//8BAAAAf39/AAEAAABkAAAAAAAAABQAAABAHwAAAAAAACYAAAAAAAAAwOD//wAAAAAmAAAAZAAAABYAAABMAAAAAAAAAAAAAAAEAAAAAAAAAAEAAABXiZEKAAAAACgAAAAoAAAAZAAAAGQAAAAAAAAAzMzMAAAAAABQAAAAUAAAAGQAAABkAAAAAAAAABcAAAAUAAAAAAAAAAAAAAD/fwAA/38AAAAAAAAJAAAABAAAAF8AYAAeAAAAaAAAAAAAAAAAAAAAAAAAAAAAAAAAAAAAECcAABAnAAAAAAAAAAAAAAAAAAAAAAAAAAAAAAAAAAAAAAAAAAAAABQAAAAAAAAAwMD/AAAAAABkAAAAMgAAAAAAAABkAAAAAAAAAH9/fwAKAAAAIgAAABgAAAAAAAAAAAAAAAAAAAAAAAAAAAAAAAAAAAAkAAAAJAAAAAAAAAAHAAAAAAAAAAAAAAAAAAAAAAAAAAAAAAAAAAAAf39/ACUAAABYAAAAAAAAAAAAAAAAAAAAAAAAAAAAAAAAAAAAAAAAAAAAAAAAAAAAAAAAAAAAAAA/AAAAAAAAAKCGAQAAAAAAAAAAAAAAAAAMAAAAAQAAAAAAAAAAAAAAAAAAAB8AAABUAAAAAAAABQAAAAEAAAAAAAAAAAAAAAAAAAAAAAAAAAAAAAAAAAAAAAAAAAAAAAJ/f38AAAAAA8zMzADAwP8Af39/AAAAAAAAAAAAAAAAAAAAAAAAAAAAIQAAABgAAAAUAAAAwAMAAHEJAADjJAAAYQ0AABAAAAAmAAAACAAAAIGAAAAAAAAA"/>
               </a:ext>
             </a:extLst>
           </p:cNvSpPr>
@@ -3906,7 +3916,7 @@
             <a:spLocks noGrp="1" noChangeArrowheads="1"/>
             <a:extLst>
               <a:ext uri="smNativeData">
-                <pr:smNativeData xmlns:pr="smNativeData" xmlns="smNativeData" val="SMDATA_15_k0e5YxMAAAAlAAAAZAAAAA8BAAAAkAAAAEgAAACQAAAASAAAAAAAAAAAAAAAAAAAAAEAAABQAAAAAAAAAAAA4D8AAAAAAADgPwAAAAAAAOA/AAAAAAAA4D8AAAAAAADgPwAAAAAAAOA/AAAAAAAA4D8AAAAAAADgPwAAAAAAAOA/AAAAAAAA4D8CAAAAjAAAAAAAAAAAAAAAM2bMDANPhAgAAAAAAAAAAAAAAAAAAAAAAAAAAAAAAAAAAAAAZAAAAAEAAABAAAAAAAAAAAAAAAAAAAAAAAAAAAAAAAAAAAAAAAAAAAAAAAAAAAAAAAAAAAAAAAAAAAAAAAAAAAAAAAAAAAAAAAAAAAAAAAAAAAAAAAAAAAAAAAAAAAAAFAAAADwAAAAAAAAAAAAAAP///wkUAAAAAQAAABQAAAAUAAAAFAAAAAEAAAAAAAAAZAAAAGQAAAAAAAAAZAAAAGQAAAAVAAAAYAAAAAAAAAAAAAAADwAAACADAAAAAAAAAAAAAAEAAACgMgAAVgcAAKr4//8BAAAAf39/AAEAAABkAAAAAAAAABQAAABAHwAAAAAAACYAAAAAAAAAwOD//wAAAAAmAAAAZAAAABYAAABMAAAAAAAAAAAAAAAEAAAAAAAAAAEAAABXiZEKAAAAACgAAAAoAAAAZAAAAGQAAAAAAAAAzMzMAAAAAABQAAAAUAAAAGQAAABkAAAAAAAAABcAAAAUAAAAAAAAAAAAAAD/fwAA/38AAAAAAAAJAAAABAAAAF8AYAAeAAAAaAAAAAAAAAAAAAAAAAAAAAAAAAAAAAAAECcAABAnAAAAAAAAAAAAAAAAAAAAAAAAAAAAAAAAAAAAAAAAAAAAABQAAAAAAAAAwMD/AAAAAABkAAAAMgAAAAAAAABkAAAAAAAAAH9/fwAKAAAAIgAAABgAAAAAAAAAAAAAAAAAAAAAAAAAAAAAAAAAAAAkAAAAJAAAAAAAAAAHAAAAAAAAAAAAAAAAAAAAAAAAAAAAAAAAAAAAf39/ACUAAABYAAAAAAAAAAAAAAAAAAAAAAAAAAAAAAAAAAAAAAAAAAAAAAAAAAAAAAAAAAAAAAA/AAAAAAAAAKCGAQAAAAAAAAAAAAAAAAAMAAAAAQAAAAAAAAAAAAAAAAAAAB8AAABUAAAAAAAABQAAAAEAAAAAAAAAAAAAAAAAAAAAAAAAAAAAAAAAAAAAAAAAAAAAAAJ/f38AAAAAA8zMzADAwP8Af39/AAAAAAAAAAAAAAAAAAAAAAAAAAAAIQAAABgAAAAUAAAAwAMAAGENAADjJAAAsCUAABAAAAAmAAAACAAAAAEAAAAAAAAA"/>
+                <pr:smNativeData xmlns:pr="smNativeData" xmlns="smNativeData" val="SMDATA_15_bXy5YxMAAAAlAAAAZAAAAA8BAAAAkAAAAEgAAACQAAAASAAAAAAAAAAAAAAAAAAAAAEAAABQAAAAAAAAAAAA4D8AAAAAAADgPwAAAAAAAOA/AAAAAAAA4D8AAAAAAADgPwAAAAAAAOA/AAAAAAAA4D8AAAAAAADgPwAAAAAAAOA/AAAAAAAA4D8CAAAAjAAAAAAAAAAAAAAAM2bMDANPhAgAAAAAAAAAAAAAAAAAAAAAAAAAAAAAAAAAAAAAZAAAAAEAAABAAAAAAAAAAAAAAAAAAAAAAAAAAAAAAAAAAAAAAAAAAAAAAAAAAAAAAAAAAAAAAAAAAAAAAAAAAAAAAAAAAAAAAAAAAAAAAAAAAAAAAAAAAAAAAAAAAAAAFAAAADwAAAAAAAAAAAAAAP///wkUAAAAAQAAABQAAAAUAAAAFAAAAAEAAAAAAAAAZAAAAGQAAAAAAAAAZAAAAGQAAAAVAAAAYAAAAAAAAAAAAAAADwAAACADAAAAAAAAAAAAAAEAAACgMgAAVgcAAKr4//8BAAAAf39/AAEAAABkAAAAAAAAABQAAABAHwAAAAAAACYAAAAAAAAAwOD//wAAAAAmAAAAZAAAABYAAABMAAAAAAAAAAAAAAAEAAAAAAAAAAEAAABXiZEKAAAAACgAAAAoAAAAZAAAAGQAAAAAAAAAzMzMAAAAAABQAAAAUAAAAGQAAABkAAAAAAAAABcAAAAUAAAAAAAAAAAAAAD/fwAA/38AAAAAAAAJAAAABAAAAF8AYAAeAAAAaAAAAAAAAAAAAAAAAAAAAAAAAAAAAAAAECcAABAnAAAAAAAAAAAAAAAAAAAAAAAAAAAAAAAAAAAAAAAAAAAAABQAAAAAAAAAwMD/AAAAAABkAAAAMgAAAAAAAABkAAAAAAAAAH9/fwAKAAAAIgAAABgAAAAAAAAAAAAAAAAAAAAAAAAAAAAAAAAAAAAkAAAAJAAAAAAAAAAHAAAAAAAAAAAAAAAAAAAAAAAAAAAAAAAAAAAAf39/ACUAAABYAAAAAAAAAAAAAAAAAAAAAAAAAAAAAAAAAAAAAAAAAAAAAAAAAAAAAAAAAAAAAAA/AAAAAAAAAKCGAQAAAAAAAAAAAAAAAAAMAAAAAQAAAAAAAAAAAAAAAAAAAB8AAABUAAAAAAAABQAAAAEAAAAAAAAAAAAAAAAAAAAAAAAAAAAAAAAAAAAAAAAAAAAAAAJ/f38AAAAAA8zMzADAwP8Af39/AAAAAAAAAAAAAAAAAAAAAAAAAAAAIQAAABgAAAAUAAAAwAMAAGENAADjJAAAsCUAAAAAAAAmAAAACAAAAAEAAAAAAAAA"/>
               </a:ext>
             </a:extLst>
           </p:cNvSpPr>
@@ -3990,13 +4000,13 @@
           <a:p>
             <a:pPr lvl="1"/>
             <a:r>
-              <a:t>Twitter: @it_tinuwalther</a:t>
+              <a:t>Twitter: it_tinuwalther</a:t>
             </a:r>
           </a:p>
           <a:p>
             <a:pPr lvl="1"/>
             <a:r>
-              <a:t>Mastodon: @tinuwalther@techhub.social</a:t>
+              <a:t>Mastodon: tinuwalther@techhub.social</a:t>
             </a:r>
           </a:p>
         </p:txBody>
@@ -4008,7 +4018,7 @@
             <a:spLocks noGrp="1" noChangeArrowheads="1"/>
             <a:extLst>
               <a:ext uri="smNativeData">
-                <pr:smNativeData xmlns:pr="smNativeData" xmlns="smNativeData" val="SMDATA_15_k0e5YxMAAAAlAAAAZAAAAA8BAAAAkAAAAEgAAACQAAAASAAAAAAAAAACAAAAAAAAAAEAAABQAAAAAAAAAAAA4D8AAAAAAADgPwAAAAAAAOA/AAAAAAAA4D8AAAAAAADgPwAAAAAAAOA/AAAAAAAA4D8AAAAAAADgPwAAAAAAAOA/AAAAAAAA4D8CAAAAjAAAAAAAAAAAAAAAM2bMDANPhAgAAAAAAAAAAAAAAAAAAAAAAAAAAAAAAAAAAAAAZAAAAAEAAABAAAAAAAAAAAAAAAAAAAAAAAAAAAAAAAAAAAAAAAAAAAAAAAAAAAAAAAAAAAAAAAAAAAAAAAAAAAAAAAAAAAAAAAAAAAAAAAAAAAAAAAAAAAAAAAAAAAAAFAAAADwAAAAAAAAAAAAAAP///wkUAAAAAQAAABQAAAAUAAAAFAAAAAEAAAAAAAAAZAAAAGQAAAAAAAAAZAAAAGQAAAAVAAAAYAAAAAAAAAAAAAAADwAAACADAAAAAAAAAAAAAAEAAACgMgAAVgcAAKr4//8BAAAAf39/AAEAAABkAAAAAAAAABQAAABAHwAAAAAAACYAAAAAAAAAwOD//wAAAAAmAAAAZAAAABYAAABMAAAAAAAAAAAAAAAEAAAAAAAAAAEAAABXiZEKAAAAACgAAAAoAAAAZAAAAGQAAAAAAAAAzMzMAAAAAABQAAAAUAAAAGQAAABkAAAAAAAAABcAAAAUAAAAAAAAAAAAAAD/fwAA/38AAAAAAAAJAAAABAAAAF8AYAAeAAAAaAAAAAAAAAAAAAAAAAAAAAAAAAAAAAAAECcAABAnAAAAAAAAAAAAAAAAAAAAAAAAAAAAAAAAAAAAAAAAAAAAABQAAAAAAAAAwMD/AAAAAABkAAAAMgAAAAAAAABkAAAAAAAAAH9/fwAKAAAAIgAAABgAAAAAAAAAAAAAAAAAAAAAAAAAAAAAAAAAAAAkAAAAJAAAAAAAAAAHAAAAAAAAAAAAAAAAAAAAAAAAAAAAAAAAAAAAf39/ACUAAABYAAAAAAAAAAAAAAAAAAAAAAAAAAAAAAAAAAAAAAAAAAAAAAAAAAAAAAAAAAAAAAA/AAAAAAAAAKCGAQAAAAAAAAAAAAAAAAAMAAAAAQAAAAAAAAAAAAAAAAAAAB8AAABUAAAAAAAABQAAAAEAAAAAAAAAAAAAAAAAAAAAAAAAAAAAAAAAAAAAAAAAAAAAAAJ/f38AAAAAA8zMzADAwP8Af39/AAAAAAAAAAAAAAAAAAAAAAAAAAAAIQAAABgAAAAUAAAAHSYAAHEJAABARwAAYQ0AABAAAAAmAAAACAAAAIGAAAAAAAAA"/>
+                <pr:smNativeData xmlns:pr="smNativeData" xmlns="smNativeData" val="SMDATA_15_bXy5YxMAAAAlAAAAZAAAAA8BAAAAkAAAAEgAAACQAAAASAAAAAAAAAACAAAAAAAAAAEAAABQAAAAAAAAAAAA4D8AAAAAAADgPwAAAAAAAOA/AAAAAAAA4D8AAAAAAADgPwAAAAAAAOA/AAAAAAAA4D8AAAAAAADgPwAAAAAAAOA/AAAAAAAA4D8CAAAAjAAAAAAAAAAAAAAAM2bMDANPhAgAAAAAAAAAAAAAAAAAAAAAAAAAAAAAAAAAAAAAZAAAAAEAAABAAAAAAAAAAAAAAAAAAAAAAAAAAAAAAAAAAAAAAAAAAAAAAAAAAAAAAAAAAAAAAAAAAAAAAAAAAAAAAAAAAAAAAAAAAAAAAAAAAAAAAAAAAAAAAAAAAAAAFAAAADwAAAAAAAAAAAAAAP///wkUAAAAAQAAABQAAAAUAAAAFAAAAAEAAAAAAAAAZAAAAGQAAAAAAAAAZAAAAGQAAAAVAAAAYAAAAAAAAAAAAAAADwAAACADAAAAAAAAAAAAAAEAAACgMgAAVgcAAKr4//8BAAAAf39/AAEAAABkAAAAAAAAABQAAABAHwAAAAAAACYAAAAAAAAAwOD//wAAAAAmAAAAZAAAABYAAABMAAAAAAAAAAAAAAAEAAAAAAAAAAEAAABXiZEKAAAAACgAAAAoAAAAZAAAAGQAAAAAAAAAzMzMAAAAAABQAAAAUAAAAGQAAABkAAAAAAAAABcAAAAUAAAAAAAAAAAAAAD/fwAA/38AAAAAAAAJAAAABAAAAF8AYAAeAAAAaAAAAAAAAAAAAAAAAAAAAAAAAAAAAAAAECcAABAnAAAAAAAAAAAAAAAAAAAAAAAAAAAAAAAAAAAAAAAAAAAAABQAAAAAAAAAwMD/AAAAAABkAAAAMgAAAAAAAABkAAAAAAAAAH9/fwAKAAAAIgAAABgAAAAAAAAAAAAAAAAAAAAAAAAAAAAAAAAAAAAkAAAAJAAAAAAAAAAHAAAAAAAAAAAAAAAAAAAAAAAAAAAAAAAAAAAAf39/ACUAAABYAAAAAAAAAAAAAAAAAAAAAAAAAAAAAAAAAAAAAAAAAAAAAAAAAAAAAAAAAAAAAAA/AAAAAAAAAKCGAQAAAAAAAAAAAAAAAAAMAAAAAQAAAAAAAAAAAAAAAAAAAB8AAABUAAAAAAAABQAAAAEAAAAAAAAAAAAAAAAAAAAAAAAAAAAAAAAAAAAAAAAAAAAAAAJ/f38AAAAAA8zMzADAwP8Af39/AAAAAAAAAAAAAAAAAAAAAAAAAAAAIQAAABgAAAAUAAAAHSYAAHEJAABARwAAYQ0AABAAAAAmAAAACAAAAIGAAAAAAAAA"/>
               </a:ext>
             </a:extLst>
           </p:cNvSpPr>
@@ -4081,7 +4091,7 @@
             <a:spLocks noGrp="1" noChangeArrowheads="1"/>
             <a:extLst>
               <a:ext uri="smNativeData">
-                <pr:smNativeData xmlns:pr="smNativeData" xmlns="smNativeData" val="SMDATA_15_k0e5YxMAAAAlAAAAZAAAAA8BAAAAkAAAAEgAAACQAAAASAAAAAAAAAAAAAAAAAAAAAEAAABQAAAAAAAAAAAA4D8AAAAAAADgPwAAAAAAAOA/AAAAAAAA4D8AAAAAAADgPwAAAAAAAOA/AAAAAAAA4D8AAAAAAADgPwAAAAAAAOA/AAAAAAAA4D8CAAAAjAAAAAAAAAAAAAAAM2bMDANPhAgAAAAAAAAAAAAAAAAAAAAAAAAAAAAAAAAAAAAAZAAAAAEAAABAAAAAAAAAAAAAAAAAAAAAAAAAAAAAAAAAAAAAAAAAAAAAAAAAAAAAAAAAAAAAAAAAAAAAAAAAAAAAAAAAAAAAAAAAAAAAAAAAAAAAAAAAAAAAAAAAAAAAFAAAADwAAAAAAAAAAAAAAP///wkUAAAAAQAAABQAAAAUAAAAFAAAAAEAAAAAAAAAZAAAAGQAAAAAAAAAZAAAAGQAAAAVAAAAYAAAAAAAAAAAAAAADwAAACADAAAAAAAAAAAAAAEAAACgMgAAVgcAAKr4//8BAAAAf39/AAEAAABkAAAAAAAAABQAAABAHwAAAAAAACYAAAAAAAAAwOD//wAAAAAmAAAAZAAAABYAAABMAAAAAAAAAAAAAAAEAAAAAAAAAAEAAABXiZEKAAAAACgAAAAoAAAAZAAAAGQAAAAAAAAAzMzMAAAAAABQAAAAUAAAAGQAAABkAAAAAAAAABcAAAAUAAAAAAAAAAAAAAD/fwAA/38AAAAAAAAJAAAABAAAABAAAAAeAAAAaAAAAAAAAAAAAAAAAAAAAAAAAAAAAAAAECcAABAnAAAAAAAAAAAAAAAAAAAAAAAAAAAAAAAAAAAAAAAAAAAAABQAAAAAAAAAwMD/AAAAAABkAAAAMgAAAAAAAABkAAAAAAAAAH9/fwAKAAAAIgAAABgAAAAAAAAAAAAAAAAAAAAAAAAAAAAAAAAAAAAkAAAAJAAAAAAAAAAHAAAAAAAAAAAAAAAAAAAAAAAAAAAAAAAAAAAAf39/ACUAAABYAAAAAAAAAAAAAAAAAAAAAAAAAAAAAAAAAAAAAAAAAAAAAAAAAAAAAAAAAAAAAAA/AAAAAAAAAKCGAQAAAAAAAAAAAAAAAAAMAAAAAQAAAAAAAAAAAAAAAAAAAB8AAABUAAAAAAAABQAAAAEAAAAAAAAAAAAAAAAAAAAAAAAAAAAAAAAAAAAAAAAAAAAAAAJ/f38AAAAAA8zMzADAwP8Af39/AAAAAAAAAAAAAAAAAAAAAAAAAAAAIQAAABgAAAAUAAAAHSYAAGENAABARwAAsCUAABAAAAAmAAAACAAAAAAAAAAAAAAA"/>
+                <pr:smNativeData xmlns:pr="smNativeData" xmlns="smNativeData" val="SMDATA_15_bXy5YxMAAAAlAAAAZAAAAA8BAAAAkAAAAEgAAACQAAAASAAAAAAAAAAAAAAAAAAAAAEAAABQAAAAAAAAAAAA4D8AAAAAAADgPwAAAAAAAOA/AAAAAAAA4D8AAAAAAADgPwAAAAAAAOA/AAAAAAAA4D8AAAAAAADgPwAAAAAAAOA/AAAAAAAA4D8CAAAAjAAAAAAAAAAAAAAAM2bMDANPhAgAAAAAAAAAAAAAAAAAAAAAAAAAAAAAAAAAAAAAZAAAAAEAAABAAAAAAAAAAAAAAAAAAAAAAAAAAAAAAAAAAAAAAAAAAAAAAAAAAAAAAAAAAAAAAAAAAAAAAAAAAAAAAAAAAAAAAAAAAAAAAAAAAAAAAAAAAAAAAAAAAAAAFAAAADwAAAAAAAAAAAAAAP///wkUAAAAAQAAABQAAAAUAAAAFAAAAAEAAAAAAAAAZAAAAGQAAAAAAAAAZAAAAGQAAAAVAAAAYAAAAAAAAAAAAAAADwAAACADAAAAAAAAAAAAAAEAAACgMgAAVgcAAKr4//8BAAAAf39/AAEAAABkAAAAAAAAABQAAABAHwAAAAAAACYAAAAAAAAAwOD//wAAAAAmAAAAZAAAABYAAABMAAAAAAAAAAAAAAAEAAAAAAAAAAEAAABXiZEKAAAAACgAAAAoAAAAZAAAAGQAAAAAAAAAzMzMAAAAAABQAAAAUAAAAGQAAABkAAAAAAAAABcAAAAUAAAAAAAAAAAAAAD/fwAA/38AAAAAAAAJAAAABAAAABAAAAAeAAAAaAAAAAAAAAAAAAAAAAAAAAAAAAAAAAAAECcAABAnAAAAAAAAAAAAAAAAAAAAAAAAAAAAAAAAAAAAAAAAAAAAABQAAAAAAAAAwMD/AAAAAABkAAAAMgAAAAAAAABkAAAAAAAAAH9/fwAKAAAAIgAAABgAAAAAAAAAAAAAAAAAAAAAAAAAAAAAAAAAAAAkAAAAJAAAAAAAAAAHAAAAAAAAAAAAAAAAAAAAAAAAAAAAAAAAAAAAf39/ACUAAABYAAAAAAAAAAAAAAAAAAAAAAAAAAAAAAAAAAAAAAAAAAAAAAAAAAAAAAAAAAAAAAA/AAAAAAAAAKCGAQAAAAAAAAAAAAAAAAAMAAAAAQAAAAAAAAAAAAAAAAAAAB8AAABUAAAAAAAABQAAAAEAAAAAAAAAAAAAAAAAAAAAAAAAAAAAAAAAAAAAAAAAAAAAAAJ/f38AAAAAA8zMzADAwP8Af39/AAAAAAAAAAAAAAAAAAAAAAAAAAAAIQAAABgAAAAUAAAAHSYAAGENAABARwAAsCUAABAAAAAmAAAACAAAAAAAAAAAAAAA"/>
               </a:ext>
             </a:extLst>
           </p:cNvSpPr>
@@ -4160,12 +4170,12 @@
       </p:sp>
       <p:pic>
         <p:nvPicPr>
-          <p:cNvPr id="7" name="Grafik2"/>
+          <p:cNvPr id="7" name="Grafik1"/>
           <p:cNvPicPr>
             <a:picLocks noChangeAspect="1"/>
             <a:extLst>
               <a:ext uri="smNativeData">
-                <pr:smNativeData xmlns:pr="smNativeData" xmlns="smNativeData" val="SMDATA_17_k0e5YxMAAAAlAAAAEQAAAC8BAAAAkAAAAEgAAACQAAAASAAAAAAAAAAAAAAAAAAAAAEAAABQAAAAAAAAAAAA4D8AAAAAAADgPwAAAAAAAOA/AAAAAAAA4D8AAAAAAADgPwAAAAAAAOA/AAAAAAAA4D8AAAAAAADgPwAAAAAAAOA/AAAAAAAA4D8CAAAAjAAAAAAAAAAAAAAAM2bMDANPhAgAAAAAAAAAAAAAAAAAAAAAAAAAAAAAAAAAAAAAZAAAAAEAAABAAAAAAAAAAAAAAAAAAAAAAAAAAAAAAAAAAAAAAAAAAAAAAAAAAAAAAAAAAAAAAAAAAAAAAAAAAAAAAAAAAAAAAAAAAAAAAAAAAAAAAAAAAAAAAAAAAAAAFAAAADwAAAAAAAAAAAAAAP///wkUAAAAAQAAABQAAAAUAAAAFAAAAAEAAAAAAAAAZAAAAGQAAAAAAAAAZAAAAGQAAAAVAAAAYAAAAAAAAAAAAAAADwAAACADAAAAAAAAAAAAAAEAAACgMgAAVgcAAKr4//8BAAAAf39/AAEAAABkAAAAAAAAABQAAABAHwAAAAAAACYAAAAAAAAAwOD//wAAAAAmAAAAZAAAABYAAABMAAAAAAAAAAAAAAAEAAAAAAAAAAEAAABXiZEKAAAAACgAAAAoAAAAZAAAAGQAAAAAAAAAzMzMAAAAAABQAAAAUAAAAGQAAABkAAAAAAAAAAcAAAA4AAAAAAAAAAAAAAAAAAAA////AAAAAAAAAAAAAAAAAAAAAAAAAAAAAAAAAAAAAABkAAAAZAAAAAAAAAAjAAAABAAAAGQAAAAXAAAAFAAAAAAAAAAAAAAA/38AAP9/AAAAAAAACQAAAAQAAAAIAAAAHgAAAGgAAAAAAAAAAAAAAAAAAAAAAAAAAAAAABAnAAAQJwAAAAAAAAAAAAAAAAAAAAAAAAAAAAAAAAAAAAAAAAAAAAAUAAAAAAAAAMDA/wAAAAAAZAAAADIAAAAAAAAAZAAAAAAAAAB/f38ACgAAACIAAAAYAAAAAAAAAAAAAAAAAAAAAAAAAAAAAAAAAAAAJAAAACQAAAAAAAAABwAAAAAAAAAAAAAAAAAAAAAAAAAAAAAAAAAAAH9/fwAlAAAAWAAAAAAAAAAAAAAAAAAAAAAAAAAAAAAAAAAAAAAAAAAAAAAAAAAAAAAAAAAAAAAAPwAAAAAAAACghgEAAAAAAAAAAAAAAAAADAAAAAEAAAAAAAAAAAAAAAAAAAAfAAAAVAAAADNmzAUDT4QBAAAAAAAAAAAAAAAAAAAAAAAAAAAAAAAAAAAAAAAAAAD///8Cf39/AFeJkQPMzMwAwMD/AH9/fwAAAAAAAAAAAAAAAAD///8AAAAAACEAAAAYAAAAFAAAAPkDAAD2AQAAZgoAAGMIAAAQAAAAJgAAAAgAAAD//////////w=="/>
+                <pr:smNativeData xmlns:pr="smNativeData" xmlns="smNativeData" val="SMDATA_17_bXy5YxMAAAAlAAAAEQAAAC8BAAAAkAAAAEgAAACQAAAASAAAAAAAAAAAAAAAAAAAAAEAAABQAAAAAAAAAAAA8D8AAAAAAADwPwAAAAAAAOA/AAAAAAAA4D8AAAAAAADgPwAAAAAAAOA/AAAAAAAA4D8AAAAAAADgPwAAAAAAAOA/AAAAAAAA4D8CAAAAjAAAAAEAAAAAAAAAM2bMDANPhAgAAAAAAAAAAAAAAAAAAAAAAAAAAAAAAAAAAAAAZAAAAAEAAABAAAAAAAAAAAAAAAAAAAAAAAAAAAAAAAAAAAAAAAAAAAAAAAAAAAAAAAAAAAAAAAAAAAAAAAAAAAAAAAAAAAAAAAAAAAAAAAAAAAAAAAAAAAAAAAAAAAAAFAAAADwAAAAAAAAAAAAAAP///wkUAAAAAQAAABQAAAAUAAAAFAAAAAEAAAAAAAAAZAAAAGQAAAAAAAAAZAAAAGQAAAAVAAAAYAAAAAAAAAAAAAAADwAAACADAAAAAAAAAAAAAAEAAACgMgAAVgcAAKr4//8BAAAAf39/AAEAAABkAAAAAAAAABQAAABAHwAAAAAAACYAAAAAAAAAwOD//wAAAAAmAAAAZAAAABYAAABMAAAAAAAAAAAAAAAAAAAAAAAAAAEAAABXiZEKMgAAAGQAAABkAAAAeAAAAHgAAAAAAAAAzMzMAAAAAABQAAAAUAAAAGQAAABkAAAAAAAAAAcAAAA4AAAAAAAAAAAAAAAAAAAA////AAAAAAAAAAAAAAAAAAAAAAAAAAAAAAAAAAAAAABkAAAAZAAAAAAAAAAjAAAABAAAAGYAAAAXAAAAFAAAAAAAAAAAAAAA/38AAP9/AAAAAAAACQAAAAQAAAAAAAAAHgAAAGgAAAAAAAAAAAAAAAAAAAAAAAAAAAAAABAnAAAQJwAAAAAAAAAAAAAAAAAAAAAAAAAAAAAAAAAAAAAAAAAAAADIAAAAAAAAAMDA/wAAAAAATQAAADIAAAAAAAAAZAAAAAAAAAB/f38ACgAAACIAAAAYAAAAAAAAAAAAAAAAAAAAAAAAAAAAAAAAAAAAJAAAACQAAAAAAAAABwAAAAAAAAAAAAAAAAAAAAAAAAAAAAAAAAAAAH9/fwAlAAAAWAAAAAAAAAAAAAAAAAAAAAAAAAAAAAAAAAAAAAAAAAAAAAAAAAAAAAAAAAAAAAAAPwAAAAAAAACghgEAAAAAAAAAAAAAAAAADAAAAAEAAAAAAAAAAAAAAAAAAAAfAAAAVAAAADNmzAUDT4QBAAAAAAAAAAAAAAAAAAAAAAAAAAAAAAAAAAAAAAAAAAD///8Cf39/AFeJkQPMzMwAwMD/AH9/fwAAAAAAAAAAAAAAAAD///8AAAAAACEAAAAYAAAAFAAAAPgDAAC8AQAAJwoAAAwKAAAAAAAAJgAAAAgAAAD//////////w=="/>
               </a:ext>
             </a:extLst>
           </p:cNvPicPr>
@@ -4179,13 +4189,15 @@
         </p:blipFill>
         <p:spPr>
           <a:xfrm>
-            <a:off x="645795" y="318770"/>
-            <a:ext cx="1044575" cy="1044575"/>
+            <a:off x="645160" y="281940"/>
+            <a:ext cx="1005205" cy="1351280"/>
           </a:xfrm>
-          <a:prstGeom prst="rect">
+          <a:prstGeom prst="ellipse">
             <a:avLst/>
           </a:prstGeom>
-          <a:noFill/>
+          <a:solidFill>
+            <a:schemeClr val="accent1"/>
+          </a:solidFill>
           <a:ln>
             <a:noFill/>
           </a:ln>
@@ -4231,7 +4243,7 @@
             <a:spLocks noGrp="1" noChangeArrowheads="1"/>
             <a:extLst>
               <a:ext uri="smNativeData">
-                <pr:smNativeData xmlns:pr="smNativeData" xmlns="smNativeData" val="SMDATA_15_k0e5YxMAAAAlAAAAZAAAAA8BAAAAkAAAAEgAAACQAAAASAAAAAAAAAABAAAAAAAAAAEAAABQAAAAAAAAAAAA4D8AAAAAAADgPwAAAAAAAOA/AAAAAAAA4D8AAAAAAADgPwAAAAAAAOA/AAAAAAAA4D8AAAAAAADgPwAAAAAAAOA/AAAAAAAA4D8CAAAAjAAAAAAAAAAAAAAAM2bMDANPhAgAAAAAAAAAAAAAAAAAAAAAAAAAAAAAAAAAAAAAZAAAAAEAAABAAAAAAAAAAAAAAAAAAAAAAAAAAAAAAAAAAAAAAAAAAAAAAAAAAAAAAAAAAAAAAAAAAAAAAAAAAAAAAAAAAAAAAAAAAAAAAAAAAAAAAAAAAAAAAAAAAAAAFAAAADwAAAAAAAAAAAAAAP///wkUAAAAAQAAABQAAAAUAAAAFAAAAAEAAAAAAAAAZAAAAGQAAAAAAAAAZAAAAGQAAAAVAAAAYAAAAAAAAAAAAAAADwAAACADAAAAAAAAAAAAAAEAAACgMgAAVgcAAKr4//8BAAAAf39/AAEAAABkAAAAAAAAABQAAABAHwAAAAAAACYAAAAAAAAAwOD//wAAAAAmAAAAZAAAABYAAABMAAAAAAAAAAAAAAAEAAAAAAAAAAEAAABXiZEKAAAAACgAAAAoAAAAZAAAAGQAAAAAAAAAzMzMAAAAAABQAAAAUAAAAGQAAABkAAAAAAAAABcAAAAUAAAAAAAAAAAAAAD/fwAA/38AAAAAAAAJAAAABAAAAAAAAAAeAAAAaAAAAAAAAAAAAAAAAAAAAAAAAAAAAAAAECcAABAnAAAAAAAAAAAAAAAAAAAAAAAAAAAAAAAAAAAAAAAAAAAAABQAAAAAAAAAwMD/AAAAAABkAAAAMgAAAAAAAABkAAAAAAAAAH9/fwAKAAAAIgAAABgAAAAAAAAAAAAAAAAAAAAAAAAAAAAAAAAAAAAkAAAAJAAAAAAAAAAHAAAAAAAAAAAAAAAAAAAAAAAAAAAAAAAAAAAAf39/ACUAAABYAAAAAAAAAAAAAAAAAAAAAAAAAAAAAAAAAAAAAAAAAAAAAAAAAAAAAAAAAAAAAAA/AAAAAAAAAKCGAQAAAAAAAAAAAAAAAAAMAAAAAQAAAAAAAAAAAAAAAAAAAB8AAABUAAAAAAAABQAAAAEAAAAAAAAAAAAAAAAAAAAAAAAAAAAAAAAAAAAAAAAAAAAAAAJ/f38AAAAAA8zMzADAwP8Af39/AAAAAAAAAAAAAAAAAAAAAAAAAAAAIQAAABgAAAAUAAAAwAMAALABAABARwAAuAgAABAAAAAmAAAACAAAAAAAAAAAAAAA"/>
+                <pr:smNativeData xmlns:pr="smNativeData" xmlns="smNativeData" val="SMDATA_15_bXy5YxMAAAAlAAAAZAAAAA8BAAAAkAAAAEgAAACQAAAASAAAAAAAAAABAAAAAAAAAAEAAABQAAAAAAAAAAAA4D8AAAAAAADgPwAAAAAAAOA/AAAAAAAA4D8AAAAAAADgPwAAAAAAAOA/AAAAAAAA4D8AAAAAAADgPwAAAAAAAOA/AAAAAAAA4D8CAAAAjAAAAAAAAAAAAAAAM2bMDANPhAgAAAAAAAAAAAAAAAAAAAAAAAAAAAAAAAAAAAAAZAAAAAEAAABAAAAAAAAAAAAAAAAAAAAAAAAAAAAAAAAAAAAAAAAAAAAAAAAAAAAAAAAAAAAAAAAAAAAAAAAAAAAAAAAAAAAAAAAAAAAAAAAAAAAAAAAAAAAAAAAAAAAAFAAAADwAAAAAAAAAAAAAAP///wkUAAAAAQAAABQAAAAUAAAAFAAAAAEAAAAAAAAAZAAAAGQAAAAAAAAAZAAAAGQAAAAVAAAAYAAAAAAAAAAAAAAADwAAACADAAAAAAAAAAAAAAEAAACgMgAAVgcAAKr4//8BAAAAf39/AAEAAABkAAAAAAAAABQAAABAHwAAAAAAACYAAAAAAAAAwOD//wAAAAAmAAAAZAAAABYAAABMAAAAAAAAAAAAAAAEAAAAAAAAAAEAAABXiZEKAAAAACgAAAAoAAAAZAAAAGQAAAAAAAAAzMzMAAAAAABQAAAAUAAAAGQAAABkAAAAAAAAABcAAAAUAAAAAAAAAAAAAAD/fwAA/38AAAAAAAAJAAAABAAAAAAAAAAeAAAAaAAAAAAAAAAAAAAAAAAAAAAAAAAAAAAAECcAABAnAAAAAAAAAAAAAAAAAAAAAAAAAAAAAAAAAAAAAAAAAAAAABQAAAAAAAAAwMD/AAAAAABkAAAAMgAAAAAAAABkAAAAAAAAAH9/fwAKAAAAIgAAABgAAAAAAAAAAAAAAAAAAAAAAAAAAAAAAAAAAAAkAAAAJAAAAAAAAAAHAAAAAAAAAAAAAAAAAAAAAAAAAAAAAAAAAAAAf39/ACUAAABYAAAAAAAAAAAAAAAAAAAAAAAAAAAAAAAAAAAAAAAAAAAAAAAAAAAAAAAAAAAAAAA/AAAAAAAAAKCGAQAAAAAAAAAAAAAAAAAMAAAAAQAAAAAAAAAAAAAAAAAAAB8AAABUAAAAAAAABQAAAAEAAAAAAAAAAAAAAAAAAAAAAAAAAAAAAAAAAAAAAAAAAAAAAAJ/f38AAAAAA8zMzADAwP8Af39/AAAAAAAAAAAAAAAAAAAAAAAAAAAAIQAAABgAAAAUAAAAwAMAALABAABARwAAuAgAABAAAAAmAAAACAAAAAAAAAAAAAAA"/>
               </a:ext>
             </a:extLst>
           </p:cNvSpPr>
@@ -4258,7 +4270,7 @@
             <a:spLocks noGrp="1" noChangeArrowheads="1"/>
             <a:extLst>
               <a:ext uri="smNativeData">
-                <pr:smNativeData xmlns:pr="smNativeData" xmlns="smNativeData" val="SMDATA_15_k0e5YxMAAAAlAAAAZAAAAA8BAAAAkAAAAEgAAACQAAAASAAAAAAAAAAAAAAAAAAAAAEAAABQAAAAAAAAAAAA4D8AAAAAAADgPwAAAAAAAOA/AAAAAAAA4D8AAAAAAADgPwAAAAAAAOA/AAAAAAAA4D8AAAAAAADgPwAAAAAAAOA/AAAAAAAA4D8CAAAAjAAAAAAAAAAAAAAAM2bMDANPhAgAAAAAAAAAAAAAAAAAAAAAAAAAAAAAAAAAAAAAZAAAAAEAAABAAAAAAAAAAAAAAAAAAAAAAAAAAAAAAAAAAAAAAAAAAAAAAAAAAAAAAAAAAAAAAAAAAAAAAAAAAAAAAAAAAAAAAAAAAAAAAAAAAAAAAAAAAAAAAAAAAAAAFAAAADwAAAAAAAAAAAAAAP///wkUAAAAAQAAABQAAAAUAAAAFAAAAAEAAAAAAAAAZAAAAGQAAAAAAAAAZAAAAGQAAAAVAAAAYAAAAAAAAAAAAAAADwAAACADAAAAAAAAAAAAAAEAAACgMgAAVgcAAKr4//8BAAAAf39/AAEAAABkAAAAAAAAABQAAABAHwAAAAAAACYAAAAAAAAAwOD//wAAAAAmAAAAZAAAABYAAABMAAAAAAAAAAAAAAAEAAAAAAAAAAEAAABXiZEKAAAAACgAAAAoAAAAZAAAAGQAAAAAAAAAzMzMAAAAAABQAAAAUAAAAGQAAABkAAAAAAAAABcAAAAUAAAAAAAAAAAAAAD/fwAA/38AAAAAAAAJAAAABAAAAAAAAAAeAAAAaAAAAAAAAAAAAAAAAAAAAAAAAAAAAAAAECcAABAnAAAAAAAAAAAAAAAAAAAAAAAAAAAAAAAAAAAAAAAAAAAAABQAAAAAAAAAwMD/AAAAAABkAAAAMgAAAAAAAABkAAAAAAAAAH9/fwAKAAAAIgAAABgAAAAAAAAAAAAAAAAAAAAAAAAAAAAAAAAAAAAkAAAAJAAAAAAAAAAHAAAAAAAAAAAAAAAAAAAAAAAAAAAAAAAAAAAAf39/ACUAAABYAAAAAAAAAAAAAAAAAAAAAAAAAAAAAAAAAAAAAAAAAAAAAAAAAAAAAAAAAAAAAAA/AAAAAAAAAKCGAQAAAAAAAAAAAAAAAAAMAAAAAQAAAAAAAAAAAAAAAAAAAB8AAABUAAAAAAAABQAAAAEAAAAAAAAAAAAAAAAAAAAAAAAAAAAAAAAAAAAAAAAAAAAAAAJ/f38AAAAAA8zMzADAwP8Af39/AAAAAAAAAAAAAAAAAAAAAAAAAAAAIQAAABgAAAAUAAAAwAMAANgJAADhJAAAsCUAABAAAAAmAAAACAAAAAEAAAAAAAAA"/>
+                <pr:smNativeData xmlns:pr="smNativeData" xmlns="smNativeData" val="SMDATA_15_bXy5YxMAAAAlAAAAZAAAAA8BAAAAkAAAAEgAAACQAAAASAAAAAAAAAAAAAAAAAAAAAEAAABQAAAAAAAAAAAA4D8AAAAAAADgPwAAAAAAAOA/AAAAAAAA4D8AAAAAAADgPwAAAAAAAOA/AAAAAAAA4D8AAAAAAADgPwAAAAAAAOA/AAAAAAAA4D8CAAAAjAAAAAAAAAAAAAAAM2bMDANPhAgAAAAAAAAAAAAAAAAAAAAAAAAAAAAAAAAAAAAAZAAAAAEAAABAAAAAAAAAAAAAAAAAAAAAAAAAAAAAAAAAAAAAAAAAAAAAAAAAAAAAAAAAAAAAAAAAAAAAAAAAAAAAAAAAAAAAAAAAAAAAAAAAAAAAAAAAAAAAAAAAAAAAFAAAADwAAAAAAAAAAAAAAP///wkUAAAAAQAAABQAAAAUAAAAFAAAAAEAAAAAAAAAZAAAAGQAAAAAAAAAZAAAAGQAAAAVAAAAYAAAAAAAAAAAAAAADwAAACADAAAAAAAAAAAAAAEAAACgMgAAVgcAAKr4//8BAAAAf39/AAEAAABkAAAAAAAAABQAAABAHwAAAAAAACYAAAAAAAAAwOD//wAAAAAmAAAAZAAAABYAAABMAAAAAAAAAAAAAAAEAAAAAAAAAAEAAABXiZEKAAAAACgAAAAoAAAAZAAAAGQAAAAAAAAAzMzMAAAAAABQAAAAUAAAAGQAAABkAAAAAAAAABcAAAAUAAAAAAAAAAAAAAD/fwAA/38AAAAAAAAJAAAABAAAAAAAAAAeAAAAaAAAAAAAAAAAAAAAAAAAAAAAAAAAAAAAECcAABAnAAAAAAAAAAAAAAAAAAAAAAAAAAAAAAAAAAAAAAAAAAAAABQAAAAAAAAAwMD/AAAAAABkAAAAMgAAAAAAAABkAAAAAAAAAH9/fwAKAAAAIgAAABgAAAAAAAAAAAAAAAAAAAAAAAAAAAAAAAAAAAAkAAAAJAAAAAAAAAAHAAAAAAAAAAAAAAAAAAAAAAAAAAAAAAAAAAAAf39/ACUAAABYAAAAAAAAAAAAAAAAAAAAAAAAAAAAAAAAAAAAAAAAAAAAAAAAAAAAAAAAAAAAAAA/AAAAAAAAAKCGAQAAAAAAAAAAAAAAAAAMAAAAAQAAAAAAAAAAAAAAAAAAAB8AAABUAAAAAAAABQAAAAEAAAAAAAAAAAAAAAAAAAAAAAAAAAAAAAAAAAAAAAAAAAAAAAJ/f38AAAAAA8zMzADAwP8Af39/AAAAAAAAAAAAAAAAAAAAAAAAAAAAIQAAABgAAAAUAAAAwAMAANgJAADhJAAAsCUAABAAAAAmAAAACAAAAAEAAAAAAAAA"/>
               </a:ext>
             </a:extLst>
           </p:cNvSpPr>
@@ -4342,7 +4354,7 @@
             <a:spLocks noGrp="1" noChangeArrowheads="1"/>
             <a:extLst>
               <a:ext uri="smNativeData">
-                <pr:smNativeData xmlns:pr="smNativeData" xmlns="smNativeData" val="SMDATA_15_k0e5YxMAAAAlAAAAZAAAAA8BAAAAkAAAAEgAAACQAAAASAAAAAAAAAAAAAAAAAAAAAEAAABQAAAAAAAAAAAA4D8AAAAAAADgPwAAAAAAAOA/AAAAAAAA4D8AAAAAAADgPwAAAAAAAOA/AAAAAAAA4D8AAAAAAADgPwAAAAAAAOA/AAAAAAAA4D8CAAAAjAAAAAAAAAAAAAAAM2bMDANPhAgAAAAAAAAAAAAAAAAAAAAAAAAAAAAAAAAAAAAAZAAAAAEAAABAAAAAAAAAAAAAAAAAAAAAAAAAAAAAAAAAAAAAAAAAAAAAAAAAAAAAAAAAAAAAAAAAAAAAAAAAAAAAAAAAAAAAAAAAAAAAAAAAAAAAAAAAAAAAAAAAAAAAFAAAADwAAAAAAAAAAAAAAP///wkUAAAAAQAAABQAAAAUAAAAFAAAAAEAAAAAAAAAZAAAAGQAAAAAAAAAZAAAAGQAAAAVAAAAYAAAAAAAAAAAAAAADwAAACADAAAAAAAAAAAAAAEAAACgMgAAVgcAAKr4//8BAAAAf39/AAEAAABkAAAAAAAAABQAAABAHwAAAAAAACYAAAAAAAAAwOD//wAAAAAmAAAAZAAAABYAAABMAAAAAAAAAAAAAAAEAAAAAAAAAAEAAABXiZEKAAAAACgAAAAoAAAAZAAAAGQAAAAAAAAAzMzMAAAAAABQAAAAUAAAAGQAAABkAAAAAAAAABcAAAAUAAAAAAAAAAAAAAD/fwAA/38AAAAAAAAJAAAABAAAAAAAAAAeAAAAaAAAAAAAAAAAAAAAAAAAAAAAAAAAAAAAECcAABAnAAAAAAAAAAAAAAAAAAAAAAAAAAAAAAAAAAAAAAAAAAAAABQAAAAAAAAAwMD/AAAAAABkAAAAMgAAAAAAAABkAAAAAAAAAH9/fwAKAAAAIgAAABgAAAAAAAAAAAAAAAAAAAAAAAAAAAAAAAAAAAAkAAAAJAAAAAAAAAAHAAAAAAAAAAAAAAAAAAAAAAAAAAAAAAAAAAAAf39/ACUAAABYAAAAAAAAAAAAAAAAAAAAAAAAAAAAAAAAAAAAAAAAAAAAAAAAAAAAAAAAAAAAAAA/AAAAAAAAAKCGAQAAAAAAAAAAAAAAAAAMAAAAAQAAAAAAAAAAAAAAAAAAAB8AAABUAAAAAAAABQAAAAEAAAAAAAAAAAAAAAAAAAAAAAAAAAAAAAAAAAAAAAAAAAAAAAJ/f38AAAAAA8zMzADAwP8Af39/AAAAAAAAAAAAAAAAAAAAAAAAAAAAIQAAABgAAAAUAAAAHyYAANgJAABARwAAsCUAABAAAAAmAAAACAAAAAAAAAAAAAAA"/>
+                <pr:smNativeData xmlns:pr="smNativeData" xmlns="smNativeData" val="SMDATA_15_bXy5YxMAAAAlAAAAZAAAAA8BAAAAkAAAAEgAAACQAAAASAAAAAAAAAAAAAAAAAAAAAEAAABQAAAAAAAAAAAA4D8AAAAAAADgPwAAAAAAAOA/AAAAAAAA4D8AAAAAAADgPwAAAAAAAOA/AAAAAAAA4D8AAAAAAADgPwAAAAAAAOA/AAAAAAAA4D8CAAAAjAAAAAAAAAAAAAAAM2bMDANPhAgAAAAAAAAAAAAAAAAAAAAAAAAAAAAAAAAAAAAAZAAAAAEAAABAAAAAAAAAAAAAAAAAAAAAAAAAAAAAAAAAAAAAAAAAAAAAAAAAAAAAAAAAAAAAAAAAAAAAAAAAAAAAAAAAAAAAAAAAAAAAAAAAAAAAAAAAAAAAAAAAAAAAFAAAADwAAAAAAAAAAAAAAP///wkUAAAAAQAAABQAAAAUAAAAFAAAAAEAAAAAAAAAZAAAAGQAAAAAAAAAZAAAAGQAAAAVAAAAYAAAAAAAAAAAAAAADwAAACADAAAAAAAAAAAAAAEAAACgMgAAVgcAAKr4//8BAAAAf39/AAEAAABkAAAAAAAAABQAAABAHwAAAAAAACYAAAAAAAAAwOD//wAAAAAmAAAAZAAAABYAAABMAAAAAAAAAAAAAAAEAAAAAAAAAAEAAABXiZEKAAAAACgAAAAoAAAAZAAAAGQAAAAAAAAAzMzMAAAAAABQAAAAUAAAAGQAAABkAAAAAAAAABcAAAAUAAAAAAAAAAAAAAD/fwAA/38AAAAAAAAJAAAABAAAAAAAAAAeAAAAaAAAAAAAAAAAAAAAAAAAAAAAAAAAAAAAECcAABAnAAAAAAAAAAAAAAAAAAAAAAAAAAAAAAAAAAAAAAAAAAAAABQAAAAAAAAAwMD/AAAAAABkAAAAMgAAAAAAAABkAAAAAAAAAH9/fwAKAAAAIgAAABgAAAAAAAAAAAAAAAAAAAAAAAAAAAAAAAAAAAAkAAAAJAAAAAAAAAAHAAAAAAAAAAAAAAAAAAAAAAAAAAAAAAAAAAAAf39/ACUAAABYAAAAAAAAAAAAAAAAAAAAAAAAAAAAAAAAAAAAAAAAAAAAAAAAAAAAAAAAAAAAAAA/AAAAAAAAAKCGAQAAAAAAAAAAAAAAAAAMAAAAAQAAAAAAAAAAAAAAAAAAAB8AAABUAAAAAAAABQAAAAEAAAAAAAAAAAAAAAAAAAAAAAAAAAAAAAAAAAAAAAAAAAAAAAJ/f38AAAAAA8zMzADAwP8Af39/AAAAAAAAAAAAAAAAAAAAAAAAAAAAIQAAABgAAAAUAAAAHyYAANgJAABARwAAsCUAABAAAAAmAAAACAAAAAAAAAAAAAAA"/>
               </a:ext>
             </a:extLst>
           </p:cNvSpPr>
@@ -4371,7 +4383,7 @@
             <a:picLocks noChangeAspect="1"/>
             <a:extLst>
               <a:ext uri="smNativeData">
-                <pr:smNativeData xmlns:pr="smNativeData" xmlns="smNativeData" val="SMDATA_17_k0e5YxMAAAAlAAAAEQAAAC8BAAAAkAAAAEgAAACQAAAASAAAAAAAAAAAAAAAAAAAAAEAAABQAAAAAAAAAAAA4D8AAAAAAADgPwAAAAAAAOA/AAAAAAAA4D8AAAAAAADgPwAAAAAAAOA/AAAAAAAA4D8AAAAAAADgPwAAAAAAAOA/AAAAAAAA4D8CAAAAjAAAAAAAAAAAAAAAM2bMDANPhAgAAAAAAAAAAAAAAAAAAAAAAAAAAAAAAAAAAAAAZAAAAAEAAABAAAAAAAAAAAAAAAAAAAAAAAAAAAAAAAAAAAAAAAAAAAAAAAAAAAAAAAAAAAAAAAAAAAAAAAAAAAAAAAAAAAAAAAAAAAAAAAAAAAAAAAAAAAAAAAAAAAAAFAAAADwAAAAAAAAAAAAAAP///wkUAAAAAQAAABQAAAAUAAAAFAAAAAEAAAAAAAAAZAAAAGQAAAAAAAAAZAAAAGQAAAAVAAAAYAAAAAAAAAAAAAAADwAAACADAAAAAAAAAAAAAAEAAACgMgAAVgcAAKr4//8BAAAAf39/AAEAAABkAAAAAAAAABQAAABAHwAAAAAAACYAAAAAAAAAwOD//wAAAAAmAAAAZAAAABYAAABMAAAAAAAAAAAAAAAEAAAAAAAAAAEAAABXiZEKAAAAACgAAAAoAAAAZAAAAGQAAAAAAAAAzMzMAAAAAABQAAAAUAAAAGQAAABkAAAAAAAAAAcAAAA4AAAAAAAAAAAAAAAAAAAA////AAAAAAAAAAAAAAAAAAAAAAAAAAAAAAAAAAAAAABkAAAAZAAAAAAAAAAjAAAABAAAAGQAAAAXAAAAFAAAAAAAAAAAAAAA/38AAP9/AAAAAAAACQAAAAQAAACjAwQAHgAAAGgAAAAAAAAAAAAAAAAAAAAAAAAAAAAAABAnAAAQJwAAAAAAAAAAAAAAAAAAAAAAAAAAAAAAAAAAAAAAAAAAAAAUAAAAAAAAAMDA/wAAAAAAZAAAADIAAAAAAAAAZAAAAAAAAAB/f38ACgAAACIAAAAYAAAAAAAAAAAAAAAAAAAAAAAAAAAAAAAAAAAAJAAAACQAAAAAAAAABwAAAAAAAAAAAAAAAAAAAAAAAAAAAAAAAAAAAH9/fwAlAAAAWAAAAAAAAAAAAAAAAAAAAAAAAAAAAAAAAAAAAAAAAAAAAAAAAAAAAAAAAAAAAAAAPwAAAAAAAACghgEAAAAAAAAAAAAAAAAADAAAAAEAAAAAAAAAAAAAAAAAAAAfAAAAVAAAADNmzAUDT4QBAAAAAAAAAAAAAAAAAAAAAAAAAAAAAAAAAAAAAAAAAAD///8Cf39/AFeJkQPMzMwAwMD/AH9/fwAAAAAAAAAAAAAAAAD///8AAAAAACEAAAAYAAAAFAAAANgmAACvDQAAlUYAAEsbAAAQAAAAJgAAAAgAAAD//////////w=="/>
+                <pr:smNativeData xmlns:pr="smNativeData" xmlns="smNativeData" val="SMDATA_17_bXy5YxMAAAAlAAAAEQAAAC8BAAAAkAAAAEgAAACQAAAASAAAAAAAAAAAAAAAAAAAAAEAAABQAAAAAAAAAAAA4D8AAAAAAADgPwAAAAAAAOA/AAAAAAAA4D8AAAAAAADgPwAAAAAAAOA/AAAAAAAA4D8AAAAAAADgPwAAAAAAAOA/AAAAAAAA4D8CAAAAjAAAAAAAAAAAAAAAM2bMDANPhAgAAAAAAAAAAAAAAAAAAAAAAAAAAAAAAAAAAAAAZAAAAAEAAABAAAAAAAAAAAAAAAAAAAAAAAAAAAAAAAAAAAAAAAAAAAAAAAAAAAAAAAAAAAAAAAAAAAAAAAAAAAAAAAAAAAAAAAAAAAAAAAAAAAAAAAAAAAAAAAAAAAAAFAAAADwAAAAAAAAAAAAAAP///wkUAAAAAQAAABQAAAAUAAAAFAAAAAEAAAAAAAAAZAAAAGQAAAAAAAAAZAAAAGQAAAAVAAAAYAAAAAAAAAAAAAAADwAAACADAAAAAAAAAAAAAAEAAACgMgAAVgcAAKr4//8BAAAAf39/AAEAAABkAAAAAAAAABQAAABAHwAAAAAAACYAAAAAAAAAwOD//wAAAAAmAAAAZAAAABYAAABMAAAAAAAAAAAAAAAEAAAAAAAAAAEAAABXiZEKAAAAACgAAAAoAAAAZAAAAGQAAAAAAAAAzMzMAAAAAABQAAAAUAAAAGQAAABkAAAAAAAAAAcAAAA4AAAAAAAAAAAAAAAAAAAA////AAAAAAAAAAAAAAAAAAAAAAAAAAAAAAAAAAAAAABkAAAAZAAAAAAAAAAjAAAABAAAAGQAAAAXAAAAFAAAAAAAAAAAAAAA/38AAP9/AAAAAAAACQAAAAQAAACjAwQAHgAAAGgAAAAAAAAAAAAAAAAAAAAAAAAAAAAAABAnAAAQJwAAAAAAAAAAAAAAAAAAAAAAAAAAAAAAAAAAAAAAAAAAAAAUAAAAAAAAAMDA/wAAAAAAZAAAADIAAAAAAAAAZAAAAAAAAAB/f38ACgAAACIAAAAYAAAAAAAAAAAAAAAAAAAAAAAAAAAAAAAAAAAAJAAAACQAAAAAAAAABwAAAAAAAAAAAAAAAAAAAAAAAAAAAAAAAAAAAH9/fwAlAAAAWAAAAAAAAAAAAAAAAAAAAAAAAAAAAAAAAAAAAAAAAAAAAAAAAAAAAAAAAAAAAAAAPwAAAAAAAACghgEAAAAAAAAAAAAAAAAADAAAAAEAAAAAAAAAAAAAAAAAAAAfAAAAVAAAADNmzAUDT4QBAAAAAAAAAAAAAAAAAAAAAAAAAAAAAAAAAAAAAAAAAAD///8Cf39/AFeJkQPMzMwAwMD/AH9/fwAAAAAAAAAAAAAAAAD///8AAAAAACEAAAAYAAAAFAAAANgmAACvDQAAlUYAAEsbAAAQAAAAJgAAAAgAAAD//////////w=="/>
               </a:ext>
             </a:extLst>
           </p:cNvPicPr>
@@ -4437,7 +4449,7 @@
             <a:spLocks noGrp="1" noChangeArrowheads="1"/>
             <a:extLst>
               <a:ext uri="smNativeData">
-                <pr:smNativeData xmlns:pr="smNativeData" xmlns="smNativeData" val="SMDATA_15_k0e5YxMAAAAlAAAAZAAAAA8BAAAAkAAAAEgAAACQAAAASAAAAAAAAAABAAAAAAAAAAEAAABQAAAAAAAAAAAA4D8AAAAAAADgPwAAAAAAAOA/AAAAAAAA4D8AAAAAAADgPwAAAAAAAOA/AAAAAAAA4D8AAAAAAADgPwAAAAAAAOA/AAAAAAAA4D8CAAAAjAAAAAAAAAAAAAAAM2bMDANPhAgAAAAAAAAAAAAAAAAAAAAAAAAAAAAAAAAAAAAAZAAAAAEAAABAAAAAAAAAAAAAAAAAAAAAAAAAAAAAAAAAAAAAAAAAAAAAAAAAAAAAAAAAAAAAAAAAAAAAAAAAAAAAAAAAAAAAAAAAAAAAAAAAAAAAAAAAAAAAAAAAAAAAFAAAADwAAAAAAAAAAAAAAP///wkUAAAAAQAAABQAAAAUAAAAFAAAAAEAAAAAAAAAZAAAAGQAAAAAAAAAZAAAAGQAAAAVAAAAYAAAAAAAAAAAAAAADwAAACADAAAAAAAAAAAAAAEAAACgMgAAVgcAAKr4//8BAAAAf39/AAEAAABkAAAAAAAAABQAAABAHwAAAAAAACYAAAAAAAAAwOD//wAAAAAmAAAAZAAAABYAAABMAAAAAAAAAAAAAAAEAAAAAAAAAAEAAABXiZEKAAAAACgAAAAoAAAAZAAAAGQAAAAAAAAAzMzMAAAAAABQAAAAUAAAAGQAAABkAAAAAAAAABcAAAAUAAAAAAAAAAAAAAD/fwAA/38AAAAAAAAJAAAABAAAAF8AYAAeAAAAaAAAAAAAAAAAAAAAAAAAAAAAAAAAAAAAECcAABAnAAAAAAAAAAAAAAAAAAAAAAAAAAAAAAAAAAAAAAAAAAAAABQAAAAAAAAAwMD/AAAAAABkAAAAMgAAAAAAAABkAAAAAAAAAH9/fwAKAAAAIgAAABgAAAAAAAAAAAAAAAAAAAAAAAAAAAAAAAAAAAAkAAAAJAAAAAAAAAAHAAAAAAAAAAAAAAAAAAAAAAAAAAAAAAAAAAAAf39/ACUAAABYAAAAAAAAAAAAAAAAAAAAAAAAAAAAAAAAAAAAAAAAAAAAAAAAAAAAAAAAAAAAAAA/AAAAAAAAAKCGAQAAAAAAAAAAAAAAAAAMAAAAAQAAAAAAAAAAAAAAAAAAAB8AAABUAAAAAAAABQAAAAEAAAAAAAAAAAAAAAAAAAAAAAAAAAAAAAAAAAAAAAAAAAAAAAJ/f38AAAAAA8zMzADAwP8Af39/AAAAAAAAAAAAAAAAAAAAAAAAAAAAIQAAABgAAAAUAAAAwAMAALABAABARwAAuAgAABAAAAAmAAAACAAAAAAAAAAAAAAA"/>
+                <pr:smNativeData xmlns:pr="smNativeData" xmlns="smNativeData" val="SMDATA_15_bXy5YxMAAAAlAAAAZAAAAA8BAAAAkAAAAEgAAACQAAAASAAAAAAAAAABAAAAAAAAAAEAAABQAAAAAAAAAAAA4D8AAAAAAADgPwAAAAAAAOA/AAAAAAAA4D8AAAAAAADgPwAAAAAAAOA/AAAAAAAA4D8AAAAAAADgPwAAAAAAAOA/AAAAAAAA4D8CAAAAjAAAAAAAAAAAAAAAM2bMDANPhAgAAAAAAAAAAAAAAAAAAAAAAAAAAAAAAAAAAAAAZAAAAAEAAABAAAAAAAAAAAAAAAAAAAAAAAAAAAAAAAAAAAAAAAAAAAAAAAAAAAAAAAAAAAAAAAAAAAAAAAAAAAAAAAAAAAAAAAAAAAAAAAAAAAAAAAAAAAAAAAAAAAAAFAAAADwAAAAAAAAAAAAAAP///wkUAAAAAQAAABQAAAAUAAAAFAAAAAEAAAAAAAAAZAAAAGQAAAAAAAAAZAAAAGQAAAAVAAAAYAAAAAAAAAAAAAAADwAAACADAAAAAAAAAAAAAAEAAACgMgAAVgcAAKr4//8BAAAAf39/AAEAAABkAAAAAAAAABQAAABAHwAAAAAAACYAAAAAAAAAwOD//wAAAAAmAAAAZAAAABYAAABMAAAAAAAAAAAAAAAEAAAAAAAAAAEAAABXiZEKAAAAACgAAAAoAAAAZAAAAGQAAAAAAAAAzMzMAAAAAABQAAAAUAAAAGQAAABkAAAAAAAAABcAAAAUAAAAAAAAAAAAAAD/fwAA/38AAAAAAAAJAAAABAAAAF8AYAAeAAAAaAAAAAAAAAAAAAAAAAAAAAAAAAAAAAAAECcAABAnAAAAAAAAAAAAAAAAAAAAAAAAAAAAAAAAAAAAAAAAAAAAABQAAAAAAAAAwMD/AAAAAABkAAAAMgAAAAAAAABkAAAAAAAAAH9/fwAKAAAAIgAAABgAAAAAAAAAAAAAAAAAAAAAAAAAAAAAAAAAAAAkAAAAJAAAAAAAAAAHAAAAAAAAAAAAAAAAAAAAAAAAAAAAAAAAAAAAf39/ACUAAABYAAAAAAAAAAAAAAAAAAAAAAAAAAAAAAAAAAAAAAAAAAAAAAAAAAAAAAAAAAAAAAA/AAAAAAAAAKCGAQAAAAAAAAAAAAAAAAAMAAAAAQAAAAAAAAAAAAAAAAAAAB8AAABUAAAAAAAABQAAAAEAAAAAAAAAAAAAAAAAAAAAAAAAAAAAAAAAAAAAAAAAAAAAAAJ/f38AAAAAA8zMzADAwP8Af39/AAAAAAAAAAAAAAAAAAAAAAAAAAAAIQAAABgAAAAUAAAAwAMAALABAABARwAAuAgAABAAAAAmAAAACAAAAAAAAAAAAAAA"/>
               </a:ext>
             </a:extLst>
           </p:cNvSpPr>
@@ -4464,7 +4476,7 @@
             <a:spLocks noGrp="1" noChangeArrowheads="1"/>
             <a:extLst>
               <a:ext uri="smNativeData">
-                <pr:smNativeData xmlns:pr="smNativeData" xmlns="smNativeData" val="SMDATA_15_k0e5YxMAAAAlAAAAZAAAAA8BAAAAkAAAAEgAAACQAAAASAAAAAAAAAAAAAAAAAAAAAEAAABQAAAAAAAAAAAA4D8AAAAAAADgPwAAAAAAAOA/AAAAAAAA4D8AAAAAAADgPwAAAAAAAOA/AAAAAAAA4D8AAAAAAADgPwAAAAAAAOA/AAAAAAAA4D8CAAAAjAAAAAAAAAAAAAAAM2bMDANPhAgAAAAAAAAAAAAAAAAAAAAAAAAAAAAAAAAAAAAAZAAAAAEAAABAAAAAAAAAAAAAAAAAAAAAAAAAAAAAAAAAAAAAAAAAAAAAAAAAAAAAAAAAAAAAAAAAAAAAAAAAAAAAAAAAAAAAAAAAAAAAAAAAAAAAAAAAAAAAAAAAAAAAFAAAADwAAAAAAAAAAAAAAP///wkUAAAAAQAAABQAAAAUAAAAFAAAAAEAAAAAAAAAZAAAAGQAAAAAAAAAZAAAAGQAAAAVAAAAYAAAAAAAAAAAAAAADwAAACADAAAAAAAAAAAAAAEAAACgMgAAVgcAAKr4//8BAAAAf39/AAEAAABkAAAAAAAAABQAAABAHwAAAAAAACYAAAAAAAAAwOD//wAAAAAmAAAAZAAAABYAAABMAAAAAAAAAAAAAAAEAAAAAAAAAAEAAABXiZEKAAAAACgAAAAoAAAAZAAAAGQAAAAAAAAAzMzMAAAAAABQAAAAUAAAAGQAAABkAAAAAAAAABcAAAAUAAAAAAAAAAAAAAD/fwAA/38AAAAAAAAJAAAABAAAAAAAAAAeAAAAaAAAAAAAAAAAAAAAAAAAAAAAAAAAAAAAECcAABAnAAAAAAAAAAAAAAAAAAAAAAAAAAAAAAAAAAAAAAAAAAAAABQAAAAAAAAAwMD/AAAAAABkAAAAMgAAAAAAAABkAAAAAAAAAH9/fwAKAAAAIgAAABgAAAAAAAAAAAAAAAAAAAAAAAAAAAAAAAAAAAAkAAAAJAAAAAAAAAAHAAAAAAAAAAAAAAAAAAAAAAAAAAAAAAAAAAAAf39/ACUAAABYAAAAAAAAAAAAAAAAAAAAAAAAAAAAAAAAAAAAAAAAAAAAAAAAAAAAAAAAAAAAAAA/AAAAAAAAAKCGAQAAAAAAAAAAAAAAAAAMAAAAAQAAAAAAAAAAAAAAAAAAAB8AAABUAAAAAAAABQAAAAEAAAAAAAAAAAAAAAAAAAAAAAAAAAAAAAAAAAAAAAAAAAAAAAJ/f38AAAAAA8zMzADAwP8Af39/AAAAAAAAAAAAAAAAAAAAAAAAAAAAIQAAABgAAAAUAAAAwAMAANgJAADhJAAAsCUAABAAAAAmAAAACAAAAAEAAAAAAAAA"/>
+                <pr:smNativeData xmlns:pr="smNativeData" xmlns="smNativeData" val="SMDATA_15_bXy5YxMAAAAlAAAAZAAAAA8BAAAAkAAAAEgAAACQAAAASAAAAAAAAAAAAAAAAAAAAAEAAABQAAAAAAAAAAAA4D8AAAAAAADgPwAAAAAAAOA/AAAAAAAA4D8AAAAAAADgPwAAAAAAAOA/AAAAAAAA4D8AAAAAAADgPwAAAAAAAOA/AAAAAAAA4D8CAAAAjAAAAAAAAAAAAAAAM2bMDANPhAgAAAAAAAAAAAAAAAAAAAAAAAAAAAAAAAAAAAAAZAAAAAEAAABAAAAAAAAAAAAAAAAAAAAAAAAAAAAAAAAAAAAAAAAAAAAAAAAAAAAAAAAAAAAAAAAAAAAAAAAAAAAAAAAAAAAAAAAAAAAAAAAAAAAAAAAAAAAAAAAAAAAAFAAAADwAAAAAAAAAAAAAAP///wkUAAAAAQAAABQAAAAUAAAAFAAAAAEAAAAAAAAAZAAAAGQAAAAAAAAAZAAAAGQAAAAVAAAAYAAAAAAAAAAAAAAADwAAACADAAAAAAAAAAAAAAEAAACgMgAAVgcAAKr4//8BAAAAf39/AAEAAABkAAAAAAAAABQAAABAHwAAAAAAACYAAAAAAAAAwOD//wAAAAAmAAAAZAAAABYAAABMAAAAAAAAAAAAAAAEAAAAAAAAAAEAAABXiZEKAAAAACgAAAAoAAAAZAAAAGQAAAAAAAAAzMzMAAAAAABQAAAAUAAAAGQAAABkAAAAAAAAABcAAAAUAAAAAAAAAAAAAAD/fwAA/38AAAAAAAAJAAAABAAAAAAAAAAeAAAAaAAAAAAAAAAAAAAAAAAAAAAAAAAAAAAAECcAABAnAAAAAAAAAAAAAAAAAAAAAAAAAAAAAAAAAAAAAAAAAAAAABQAAAAAAAAAwMD/AAAAAABkAAAAMgAAAAAAAABkAAAAAAAAAH9/fwAKAAAAIgAAABgAAAAAAAAAAAAAAAAAAAAAAAAAAAAAAAAAAAAkAAAAJAAAAAAAAAAHAAAAAAAAAAAAAAAAAAAAAAAAAAAAAAAAAAAAf39/ACUAAABYAAAAAAAAAAAAAAAAAAAAAAAAAAAAAAAAAAAAAAAAAAAAAAAAAAAAAAAAAAAAAAA/AAAAAAAAAKCGAQAAAAAAAAAAAAAAAAAMAAAAAQAAAAAAAAAAAAAAAAAAAB8AAABUAAAAAAAABQAAAAEAAAAAAAAAAAAAAAAAAAAAAAAAAAAAAAAAAAAAAAAAAAAAAAJ/f38AAAAAA8zMzADAwP8Af39/AAAAAAAAAAAAAAAAAAAAAAAAAAAAIQAAABgAAAAUAAAAwAMAANgJAADhJAAAsCUAABAAAAAmAAAACAAAAAEAAAAAAAAA"/>
               </a:ext>
             </a:extLst>
           </p:cNvSpPr>
@@ -4529,8 +4541,8 @@
             </a:pPr>
             <a:r>
               <a:rPr cap="none">
-                <a:latin typeface="Calibri" pitchFamily="2" charset="0"/>
-                <a:ea typeface="SimSun" pitchFamily="0" charset="0"/>
+                <a:latin typeface="Calibri" pitchFamily="1" charset="0"/>
+                <a:ea typeface="SimSun" pitchFamily="1" charset="0"/>
                 <a:cs typeface="Times New Roman" pitchFamily="1" charset="0"/>
               </a:rPr>
               <a:t>cool... </a:t>
@@ -4548,7 +4560,7 @@
             <a:spLocks noGrp="1" noChangeArrowheads="1"/>
             <a:extLst>
               <a:ext uri="smNativeData">
-                <pr:smNativeData xmlns:pr="smNativeData" xmlns="smNativeData" val="SMDATA_15_k0e5YxMAAAAlAAAAZAAAAA8BAAAAkAAAAEgAAACQAAAASAAAAAAAAAAAAAAAAAAAAAEAAABQAAAAAAAAAAAA4D8AAAAAAADgPwAAAAAAAOA/AAAAAAAA4D8AAAAAAADgPwAAAAAAAOA/AAAAAAAA4D8AAAAAAADgPwAAAAAAAOA/AAAAAAAA4D8CAAAAjAAAAAAAAAAAAAAAM2bMDANPhAgAAAAAAAAAAAAAAAAAAAAAAAAAAAAAAAAAAAAAZAAAAAEAAABAAAAAAAAAAAAAAAAAAAAAAAAAAAAAAAAAAAAAAAAAAAAAAAAAAAAAAAAAAAAAAAAAAAAAAAAAAAAAAAAAAAAAAAAAAAAAAAAAAAAAAAAAAAAAAAAAAAAAFAAAADwAAAAAAAAAAAAAAP///wkUAAAAAQAAABQAAAAUAAAAFAAAAAEAAAAAAAAAZAAAAGQAAAAAAAAAZAAAAGQAAAAVAAAAYAAAAAAAAAAAAAAADwAAACADAAAAAAAAAAAAAAEAAACgMgAAVgcAAKr4//8BAAAAf39/AAEAAABkAAAAAAAAABQAAABAHwAAAAAAACYAAAAAAAAAwOD//wAAAAAmAAAAZAAAABYAAABMAAAAAAAAAAAAAAAEAAAAAAAAAAEAAABXiZEKAAAAACgAAAAoAAAAZAAAAGQAAAAAAAAAzMzMAAAAAABQAAAAUAAAAGQAAABkAAAAAAAAABcAAAAUAAAAAAAAAAAAAAD/fwAA/38AAAAAAAAJAAAABAAAAF8AYAAeAAAAaAAAAAAAAAAAAAAAAAAAAAAAAAAAAAAAECcAABAnAAAAAAAAAAAAAAAAAAAAAAAAAAAAAAAAAAAAAAAAAAAAABQAAAAAAAAAwMD/AAAAAABkAAAAMgAAAAAAAABkAAAAAAAAAH9/fwAKAAAAIgAAABgAAAAAAAAAAAAAAAAAAAAAAAAAAAAAAAAAAAAkAAAAJAAAAAAAAAAHAAAAAAAAAAAAAAAAAAAAAAAAAAAAAAAAAAAAf39/ACUAAABYAAAAAAAAAAAAAAAAAAAAAAAAAAAAAAAAAAAAAAAAAAAAAAAAAAAAAAAAAAAAAAA/AAAAAAAAAKCGAQAAAAAAAAAAAAAAAAAMAAAAAQAAAAAAAAAAAAAAAAAAAB8AAABUAAAAAAAABQAAAAEAAAAAAAAAAAAAAAAAAAAAAAAAAAAAAAAAAAAAAAAAAAAAAAJ/f38AAAAAA8zMzADAwP8Af39/AAAAAAAAAAAAAAAAAAAAAAAAAAAAIQAAABgAAAAUAAAAHyYAANgJAABARwAAsCUAABAAAAAmAAAACAAAAAAAAAAAAAAA"/>
+                <pr:smNativeData xmlns:pr="smNativeData" xmlns="smNativeData" val="SMDATA_15_bXy5YxMAAAAlAAAAZAAAAA8BAAAAkAAAAEgAAACQAAAASAAAAAAAAAAAAAAAAAAAAAEAAABQAAAAAAAAAAAA4D8AAAAAAADgPwAAAAAAAOA/AAAAAAAA4D8AAAAAAADgPwAAAAAAAOA/AAAAAAAA4D8AAAAAAADgPwAAAAAAAOA/AAAAAAAA4D8CAAAAjAAAAAAAAAAAAAAAM2bMDANPhAgAAAAAAAAAAAAAAAAAAAAAAAAAAAAAAAAAAAAAZAAAAAEAAABAAAAAAAAAAAAAAAAAAAAAAAAAAAAAAAAAAAAAAAAAAAAAAAAAAAAAAAAAAAAAAAAAAAAAAAAAAAAAAAAAAAAAAAAAAAAAAAAAAAAAAAAAAAAAAAAAAAAAFAAAADwAAAAAAAAAAAAAAP///wkUAAAAAQAAABQAAAAUAAAAFAAAAAEAAAAAAAAAZAAAAGQAAAAAAAAAZAAAAGQAAAAVAAAAYAAAAAAAAAAAAAAADwAAACADAAAAAAAAAAAAAAEAAACgMgAAVgcAAKr4//8BAAAAf39/AAEAAABkAAAAAAAAABQAAABAHwAAAAAAACYAAAAAAAAAwOD//wAAAAAmAAAAZAAAABYAAABMAAAAAAAAAAAAAAAEAAAAAAAAAAEAAABXiZEKAAAAACgAAAAoAAAAZAAAAGQAAAAAAAAAzMzMAAAAAABQAAAAUAAAAGQAAABkAAAAAAAAABcAAAAUAAAAAAAAAAAAAAD/fwAA/38AAAAAAAAJAAAABAAAAF8AYAAeAAAAaAAAAAAAAAAAAAAAAAAAAAAAAAAAAAAAECcAABAnAAAAAAAAAAAAAAAAAAAAAAAAAAAAAAAAAAAAAAAAAAAAABQAAAAAAAAAwMD/AAAAAABkAAAAMgAAAAAAAABkAAAAAAAAAH9/fwAKAAAAIgAAABgAAAAAAAAAAAAAAAAAAAAAAAAAAAAAAAAAAAAkAAAAJAAAAAAAAAAHAAAAAAAAAAAAAAAAAAAAAAAAAAAAAAAAAAAAf39/ACUAAABYAAAAAAAAAAAAAAAAAAAAAAAAAAAAAAAAAAAAAAAAAAAAAAAAAAAAAAAAAAAAAAA/AAAAAAAAAKCGAQAAAAAAAAAAAAAAAAAMAAAAAQAAAAAAAAAAAAAAAAAAAB8AAABUAAAAAAAABQAAAAEAAAAAAAAAAAAAAAAAAAAAAAAAAAAAAAAAAAAAAAAAAAAAAAJ/f38AAAAAA8zMzADAwP8Af39/AAAAAAAAAAAAAAAAAAAAAAAAAAAAIQAAABgAAAAUAAAAHyYAANgJAABARwAAsCUAABAAAAAmAAAACAAAAAAAAAAAAAAA"/>
               </a:ext>
             </a:extLst>
           </p:cNvSpPr>
@@ -4577,7 +4589,7 @@
             <a:picLocks noChangeAspect="1"/>
             <a:extLst>
               <a:ext uri="smNativeData">
-                <pr:smNativeData xmlns:pr="smNativeData" xmlns="smNativeData" val="SMDATA_17_k0e5YxMAAAAlAAAAEQAAAC8BAAAAkAAAAEgAAACQAAAASAAAAAAAAAAAAAAAAAAAAAEAAABQAAAAAAAAAAAA4D8AAAAAAADgPwAAAAAAAOA/AAAAAAAA4D8AAAAAAADgPwAAAAAAAOA/AAAAAAAA4D8AAAAAAADgPwAAAAAAAOA/AAAAAAAA4D8CAAAAjAAAAAAAAAAAAAAAM2bMDANPhAgAAAAAAAAAAAAAAAAAAAAAAAAAAAAAAAAAAAAAZAAAAAEAAABAAAAAAAAAAAAAAAAAAAAAAAAAAAAAAAAAAAAAAAAAAAAAAAAAAAAAAAAAAAAAAAAAAAAAAAAAAAAAAAAAAAAAAAAAAAAAAAAAAAAAAAAAAAAAAAAAAAAAFAAAADwAAAAAAAAAAAAAAP///wkUAAAAAQAAABQAAAAUAAAAFAAAAAEAAAAAAAAAZAAAAGQAAAAAAAAAZAAAAGQAAAAVAAAAYAAAAAAAAAAAAAAADwAAACADAAAAAAAAAAAAAAEAAACgMgAAVgcAAKr4//8BAAAAf39/AAEAAABkAAAAAAAAABQAAABAHwAAAAAAACYAAAAAAAAAwOD//wAAAAAmAAAAZAAAABYAAABMAAAAAAAAAAAAAAAEAAAAAAAAAAEAAABXiZEKAAAAACgAAAAoAAAAZAAAAGQAAAAAAAAAzMzMAAAAAABQAAAAUAAAAGQAAABkAAAAAAAAAAcAAAA4AAAAAAAAAAAAAAAAAAAA////AAAAAAAAAAAAAAAAAAAAAAAAAAAAAAAAAAAAAABkAAAAZAAAAAAAAAAjAAAABAAAAGQAAAAXAAAAFAAAAAAAAAAAAAAA/38AAP9/AAAAAAAACQAAAAQAAACjAwQAHgAAAGgAAAAAAAAAAAAAAAAAAAAAAAAAAAAAABAnAAAQJwAAAAAAAAAAAAAAAAAAAAAAAAAAAAAAAAAAAAAAAAAAAAAUAAAAAAAAAMDA/wAAAAAAZAAAADIAAAAAAAAAZAAAAAAAAAB/f38ACgAAACIAAAAYAAAAAAAAAAAAAAAAAAAAAAAAAAAAAAAAAAAAJAAAACQAAAAAAAAABwAAAAAAAAAAAAAAAAAAAAAAAAAAAAAAAAAAAH9/fwAlAAAAWAAAAAAAAAAAAAAAAAAAAAAAAAAAAAAAAAAAAAAAAAAAAAAAAAAAAAAAAAAAAAAAPwAAAAAAAACghgEAAAAAAAAAAAAAAAAADAAAAAEAAAAAAAAAAAAAAAAAAAAfAAAAVAAAADNmzAUDT4QBAAAAAAAAAAAAAAAAAAAAAAAAAAAAAAAAAAAAAAAAAAD///8Cf39/AFeJkQPMzMwAwMD/AH9/fwAAAAAAAAAAAAAAAAD///8AAAAAACEAAAAYAAAAFAAAANgmAACNDQAA0kUAAAQeAAAQAAAAJgAAAAgAAAD//////////w=="/>
+                <pr:smNativeData xmlns:pr="smNativeData" xmlns="smNativeData" val="SMDATA_17_bXy5YxMAAAAlAAAAEQAAAC8BAAAAkAAAAEgAAACQAAAASAAAAAAAAAAAAAAAAAAAAAEAAABQAAAAAAAAAAAA4D8AAAAAAADgPwAAAAAAAOA/AAAAAAAA4D8AAAAAAADgPwAAAAAAAOA/AAAAAAAA4D8AAAAAAADgPwAAAAAAAOA/AAAAAAAA4D8CAAAAjAAAAAAAAAAAAAAAM2bMDANPhAgAAAAAAAAAAAAAAAAAAAAAAAAAAAAAAAAAAAAAZAAAAAEAAABAAAAAAAAAAAAAAAAAAAAAAAAAAAAAAAAAAAAAAAAAAAAAAAAAAAAAAAAAAAAAAAAAAAAAAAAAAAAAAAAAAAAAAAAAAAAAAAAAAAAAAAAAAAAAAAAAAAAAFAAAADwAAAAAAAAAAAAAAP///wkUAAAAAQAAABQAAAAUAAAAFAAAAAEAAAAAAAAAZAAAAGQAAAAAAAAAZAAAAGQAAAAVAAAAYAAAAAAAAAAAAAAADwAAACADAAAAAAAAAAAAAAEAAACgMgAAVgcAAKr4//8BAAAAf39/AAEAAABkAAAAAAAAABQAAABAHwAAAAAAACYAAAAAAAAAwOD//wAAAAAmAAAAZAAAABYAAABMAAAAAAAAAAAAAAAEAAAAAAAAAAEAAABXiZEKAAAAACgAAAAoAAAAZAAAAGQAAAAAAAAAzMzMAAAAAABQAAAAUAAAAGQAAABkAAAAAAAAAAcAAAA4AAAAAAAAAAAAAAAAAAAA////AAAAAAAAAAAAAAAAAAAAAAAAAAAAAAAAAAAAAABkAAAAZAAAAAAAAAAjAAAABAAAAGQAAAAXAAAAFAAAAAAAAAAAAAAA/38AAP9/AAAAAAAACQAAAAQAAACjAwQAHgAAAGgAAAAAAAAAAAAAAAAAAAAAAAAAAAAAABAnAAAQJwAAAAAAAAAAAAAAAAAAAAAAAAAAAAAAAAAAAAAAAAAAAAAUAAAAAAAAAMDA/wAAAAAAZAAAADIAAAAAAAAAZAAAAAAAAAB/f38ACgAAACIAAAAYAAAAAAAAAAAAAAAAAAAAAAAAAAAAAAAAAAAAJAAAACQAAAAAAAAABwAAAAAAAAAAAAAAAAAAAAAAAAAAAAAAAAAAAH9/fwAlAAAAWAAAAAAAAAAAAAAAAAAAAAAAAAAAAAAAAAAAAAAAAAAAAAAAAAAAAAAAAAAAAAAAPwAAAAAAAACghgEAAAAAAAAAAAAAAAAADAAAAAEAAAAAAAAAAAAAAAAAAAAfAAAAVAAAADNmzAUDT4QBAAAAAAAAAAAAAAAAAAAAAAAAAAAAAAAAAAAAAAAAAAD///8Cf39/AFeJkQPMzMwAwMD/AH9/fwAAAAAAAAAAAAAAAAD///8AAAAAACEAAAAYAAAAFAAAANgmAACNDQAA0kUAAAQeAAAQAAAAJgAAAAgAAAD//////////w=="/>
               </a:ext>
             </a:extLst>
           </p:cNvPicPr>
@@ -4643,7 +4655,7 @@
             <a:spLocks noGrp="1" noChangeArrowheads="1"/>
             <a:extLst>
               <a:ext uri="smNativeData">
-                <pr:smNativeData xmlns:pr="smNativeData" xmlns="smNativeData" val="SMDATA_15_k0e5YxMAAAAlAAAAZAAAAA8BAAAAkAAAAEgAAACQAAAASAAAAAAAAAABAAAAAAAAAAEAAABQAAAAAAAAAAAA4D8AAAAAAADgPwAAAAAAAOA/AAAAAAAA4D8AAAAAAADgPwAAAAAAAOA/AAAAAAAA4D8AAAAAAADgPwAAAAAAAOA/AAAAAAAA4D8CAAAAjAAAAAAAAAAAAAAAM2bMDANPhAgAAAAAAAAAAAAAAAAAAAAAAAAAAAAAAAAAAAAAZAAAAAEAAABAAAAAAAAAAAAAAAAAAAAAAAAAAAAAAAAAAAAAAAAAAAAAAAAAAAAAAAAAAAAAAAAAAAAAAAAAAAAAAAAAAAAAAAAAAAAAAAAAAAAAAAAAAAAAAAAAAAAAFAAAADwAAAAAAAAAAAAAAP///wkUAAAAAQAAABQAAAAUAAAAFAAAAAEAAAAAAAAAZAAAAGQAAAAAAAAAZAAAAGQAAAAVAAAAYAAAAAAAAAAAAAAADwAAACADAAAAAAAAAAAAAAEAAACgMgAAVgcAAKr4//8BAAAAf39/AAEAAABkAAAAAAAAABQAAABAHwAAAAAAACYAAAAAAAAAwOD//wAAAAAmAAAAZAAAABYAAABMAAAAAAAAAAAAAAAEAAAAAAAAAAEAAABXiZEKAAAAACgAAAAoAAAAZAAAAGQAAAAAAAAAzMzMAAAAAABQAAAAUAAAAGQAAABkAAAAAAAAABcAAAAUAAAAAAAAAAAAAAD/fwAA/38AAAAAAAAJAAAABAAAAAAAAAAeAAAAaAAAAAAAAAAAAAAAAAAAAAAAAAAAAAAAECcAABAnAAAAAAAAAAAAAAAAAAAAAAAAAAAAAAAAAAAAAAAAAAAAABQAAAAAAAAAwMD/AAAAAABkAAAAMgAAAAAAAABkAAAAAAAAAH9/fwAKAAAAIgAAABgAAAAAAAAAAAAAAAAAAAAAAAAAAAAAAAAAAAAkAAAAJAAAAAAAAAAHAAAAAAAAAAAAAAAAAAAAAAAAAAAAAAAAAAAAf39/ACUAAABYAAAAAAAAAAAAAAAAAAAAAAAAAAAAAAAAAAAAAAAAAAAAAAAAAAAAAAAAAAAAAAA/AAAAAAAAAKCGAQAAAAAAAAAAAAAAAAAMAAAAAQAAAAAAAAAAAAAAAAAAAB8AAABUAAAAAAAABQAAAAEAAAAAAAAAAAAAAAAAAAAAAAAAAAAAAAAAAAAAAAAAAAAAAAJ/f38AAAAAA8zMzADAwP8Af39/AAAAAAAAAAAAAAAAAAAAAAAAAAAAIQAAABgAAAAUAAAAwAMAALABAABARwAAuAgAABAAAAAmAAAACAAAAAAAAAAAAAAA"/>
+                <pr:smNativeData xmlns:pr="smNativeData" xmlns="smNativeData" val="SMDATA_15_bXy5YxMAAAAlAAAAZAAAAA8BAAAAkAAAAEgAAACQAAAASAAAAAAAAAABAAAAAAAAAAEAAABQAAAAAAAAAAAA4D8AAAAAAADgPwAAAAAAAOA/AAAAAAAA4D8AAAAAAADgPwAAAAAAAOA/AAAAAAAA4D8AAAAAAADgPwAAAAAAAOA/AAAAAAAA4D8CAAAAjAAAAAAAAAAAAAAAM2bMDANPhAgAAAAAAAAAAAAAAAAAAAAAAAAAAAAAAAAAAAAAZAAAAAEAAABAAAAAAAAAAAAAAAAAAAAAAAAAAAAAAAAAAAAAAAAAAAAAAAAAAAAAAAAAAAAAAAAAAAAAAAAAAAAAAAAAAAAAAAAAAAAAAAAAAAAAAAAAAAAAAAAAAAAAFAAAADwAAAAAAAAAAAAAAP///wkUAAAAAQAAABQAAAAUAAAAFAAAAAEAAAAAAAAAZAAAAGQAAAAAAAAAZAAAAGQAAAAVAAAAYAAAAAAAAAAAAAAADwAAACADAAAAAAAAAAAAAAEAAACgMgAAVgcAAKr4//8BAAAAf39/AAEAAABkAAAAAAAAABQAAABAHwAAAAAAACYAAAAAAAAAwOD//wAAAAAmAAAAZAAAABYAAABMAAAAAAAAAAAAAAAEAAAAAAAAAAEAAABXiZEKAAAAACgAAAAoAAAAZAAAAGQAAAAAAAAAzMzMAAAAAABQAAAAUAAAAGQAAABkAAAAAAAAABcAAAAUAAAAAAAAAAAAAAD/fwAA/38AAAAAAAAJAAAABAAAAAAAAAAeAAAAaAAAAAAAAAAAAAAAAAAAAAAAAAAAAAAAECcAABAnAAAAAAAAAAAAAAAAAAAAAAAAAAAAAAAAAAAAAAAAAAAAABQAAAAAAAAAwMD/AAAAAABkAAAAMgAAAAAAAABkAAAAAAAAAH9/fwAKAAAAIgAAABgAAAAAAAAAAAAAAAAAAAAAAAAAAAAAAAAAAAAkAAAAJAAAAAAAAAAHAAAAAAAAAAAAAAAAAAAAAAAAAAAAAAAAAAAAf39/ACUAAABYAAAAAAAAAAAAAAAAAAAAAAAAAAAAAAAAAAAAAAAAAAAAAAAAAAAAAAAAAAAAAAA/AAAAAAAAAKCGAQAAAAAAAAAAAAAAAAAMAAAAAQAAAAAAAAAAAAAAAAAAAB8AAABUAAAAAAAABQAAAAEAAAAAAAAAAAAAAAAAAAAAAAAAAAAAAAAAAAAAAAAAAAAAAAJ/f38AAAAAA8zMzADAwP8Af39/AAAAAAAAAAAAAAAAAAAAAAAAAAAAIQAAABgAAAAUAAAAwAMAALABAABARwAAuAgAABAAAAAmAAAACAAAAAAAAAAAAAAA"/>
               </a:ext>
             </a:extLst>
           </p:cNvSpPr>
@@ -5465,6 +5477,88 @@
     <a:extraClrScheme>
       <a:clrScheme name="Presentation 14">
         <a:dk1>
+          <a:srgbClr val="FFFFFF"/>
+        </a:dk1>
+        <a:lt1>
+          <a:srgbClr val="034F84"/>
+        </a:lt1>
+        <a:dk2>
+          <a:srgbClr val="CCFFFF"/>
+        </a:dk2>
+        <a:lt2>
+          <a:srgbClr val="578991"/>
+        </a:lt2>
+        <a:accent1>
+          <a:srgbClr val="3366CC"/>
+        </a:accent1>
+        <a:accent2>
+          <a:srgbClr val="00B000"/>
+        </a:accent2>
+        <a:accent3>
+          <a:srgbClr val="209020"/>
+        </a:accent3>
+        <a:accent4>
+          <a:srgbClr val="407040"/>
+        </a:accent4>
+        <a:accent5>
+          <a:srgbClr val="605060"/>
+        </a:accent5>
+        <a:accent6>
+          <a:srgbClr val="803080"/>
+        </a:accent6>
+        <a:hlink>
+          <a:srgbClr val="212529"/>
+        </a:hlink>
+        <a:folHlink>
+          <a:srgbClr val="FFE701"/>
+        </a:folHlink>
+      </a:clrScheme>
+      <a:clrMap bg1="lt1" tx1="dk1" bg2="lt2" tx2="dk2" accent1="accent1" accent2="accent2" accent3="accent3" accent4="accent4" accent5="accent5" accent6="accent6" hlink="hlink" folHlink="folHlink"/>
+    </a:extraClrScheme>
+    <a:extraClrScheme>
+      <a:clrScheme name="Presentation 15">
+        <a:dk1>
+          <a:srgbClr val="FFFFFF"/>
+        </a:dk1>
+        <a:lt1>
+          <a:srgbClr val="034F84"/>
+        </a:lt1>
+        <a:dk2>
+          <a:srgbClr val="CCFFFF"/>
+        </a:dk2>
+        <a:lt2>
+          <a:srgbClr val="578991"/>
+        </a:lt2>
+        <a:accent1>
+          <a:srgbClr val="3366CC"/>
+        </a:accent1>
+        <a:accent2>
+          <a:srgbClr val="00B000"/>
+        </a:accent2>
+        <a:accent3>
+          <a:srgbClr val="209020"/>
+        </a:accent3>
+        <a:accent4>
+          <a:srgbClr val="407040"/>
+        </a:accent4>
+        <a:accent5>
+          <a:srgbClr val="605060"/>
+        </a:accent5>
+        <a:accent6>
+          <a:srgbClr val="803080"/>
+        </a:accent6>
+        <a:hlink>
+          <a:srgbClr val="212529"/>
+        </a:hlink>
+        <a:folHlink>
+          <a:srgbClr val="FFE701"/>
+        </a:folHlink>
+      </a:clrScheme>
+      <a:clrMap bg1="lt1" tx1="dk1" bg2="lt2" tx2="dk2" accent1="accent1" accent2="accent2" accent3="accent3" accent4="accent4" accent5="accent5" accent6="accent6" hlink="hlink" folHlink="folHlink"/>
+    </a:extraClrScheme>
+    <a:extraClrScheme>
+      <a:clrScheme name="Presentation 16">
+        <a:dk1>
           <a:srgbClr val="000000"/>
         </a:dk1>
         <a:lt1>

</xml_diff>